<commit_message>
Envio do HLD e LLD solicitando as alteracoes
</commit_message>
<xml_diff>
--- a/Tecnologia da Informação/HLD&LLD.pptx
+++ b/Tecnologia da Informação/HLD&LLD.pptx
@@ -1,29 +1,29 @@
 
 <file path=ppt/presentation.xml><?xml version="1.0" encoding="utf-8"?>
-<p:presentation xmlns:a="http://schemas.openxmlformats.org/drawingml/2006/main" xmlns:r="http://schemas.openxmlformats.org/officeDocument/2006/relationships" xmlns:mc="http://schemas.openxmlformats.org/markup-compatibility/2006" xmlns:mv="urn:schemas-microsoft-com:mac:vml" xmlns:p="http://schemas.openxmlformats.org/presentationml/2006/main" xmlns:c="http://schemas.openxmlformats.org/drawingml/2006/chart" xmlns:dgm="http://schemas.openxmlformats.org/drawingml/2006/diagram" xmlns:o="urn:schemas-microsoft-com:office:office" xmlns:v="urn:schemas-microsoft-com:vml" xmlns:pvml="urn:schemas-microsoft-com:office:powerpoint" xmlns:com="http://schemas.openxmlformats.org/drawingml/2006/compatibility" xmlns:p14="http://schemas.microsoft.com/office/powerpoint/2010/main" xmlns:p15="http://schemas.microsoft.com/office/powerpoint/2012/main" xmlns:ahyp="http://schemas.microsoft.com/office/drawing/2018/hyperlinkcolor" autoCompressPictures="0" embedTrueTypeFonts="1" strictFirstAndLastChars="0" saveSubsetFonts="1">
+<p:presentation xmlns:a="http://schemas.openxmlformats.org/drawingml/2006/main" xmlns:r="http://schemas.openxmlformats.org/officeDocument/2006/relationships" xmlns:p="http://schemas.openxmlformats.org/presentationml/2006/main" strictFirstAndLastChars="0" embedTrueTypeFonts="1" saveSubsetFonts="1" autoCompressPictures="0">
   <p:sldMasterIdLst>
-    <p:sldMasterId id="2147483659" r:id="rId4"/>
+    <p:sldMasterId id="2147483659" r:id="rId1"/>
   </p:sldMasterIdLst>
   <p:notesMasterIdLst>
-    <p:notesMasterId r:id="rId5"/>
+    <p:notesMasterId r:id="rId4"/>
   </p:notesMasterIdLst>
   <p:sldIdLst>
-    <p:sldId id="256" r:id="rId6"/>
-    <p:sldId id="257" r:id="rId7"/>
+    <p:sldId id="256" r:id="rId2"/>
+    <p:sldId id="257" r:id="rId3"/>
   </p:sldIdLst>
-  <p:sldSz cy="5143500" cx="9144000"/>
+  <p:sldSz cx="9144000" cy="5143500" type="screen16x9"/>
   <p:notesSz cx="6858000" cy="9144000"/>
   <p:embeddedFontLst>
     <p:embeddedFont>
-      <p:font typeface="Roboto"/>
-      <p:regular r:id="rId8"/>
-      <p:bold r:id="rId9"/>
-      <p:italic r:id="rId10"/>
-      <p:boldItalic r:id="rId11"/>
+      <p:font typeface="Roboto" panose="020B0604020202020204" charset="0"/>
+      <p:regular r:id="rId5"/>
+      <p:bold r:id="rId6"/>
+      <p:italic r:id="rId7"/>
+      <p:boldItalic r:id="rId8"/>
     </p:embeddedFont>
   </p:embeddedFontLst>
   <p:defaultTextStyle>
-    <a:defPPr lvl="0" marR="0" rtl="0" algn="l">
+    <a:defPPr marR="0" lvl="0" algn="l" rtl="0">
       <a:lnSpc>
         <a:spcPct val="100000"/>
       </a:lnSpc>
@@ -34,7 +34,7 @@
         <a:spcPts val="0"/>
       </a:spcAft>
     </a:defPPr>
-    <a:lvl1pPr lvl="0" marR="0" rtl="0" algn="l">
+    <a:lvl1pPr marR="0" lvl="0" algn="l" rtl="0">
       <a:lnSpc>
         <a:spcPct val="100000"/>
       </a:lnSpc>
@@ -48,7 +48,7 @@
         <a:srgbClr val="000000"/>
       </a:buClr>
       <a:buFont typeface="Arial"/>
-      <a:defRPr b="0" i="0" sz="1400" u="none" cap="none" strike="noStrike">
+      <a:defRPr sz="1400" b="0" i="0" u="none" strike="noStrike" cap="none">
         <a:solidFill>
           <a:srgbClr val="000000"/>
         </a:solidFill>
@@ -58,7 +58,7 @@
         <a:sym typeface="Arial"/>
       </a:defRPr>
     </a:lvl1pPr>
-    <a:lvl2pPr lvl="1" marR="0" rtl="0" algn="l">
+    <a:lvl2pPr marR="0" lvl="1" algn="l" rtl="0">
       <a:lnSpc>
         <a:spcPct val="100000"/>
       </a:lnSpc>
@@ -72,7 +72,7 @@
         <a:srgbClr val="000000"/>
       </a:buClr>
       <a:buFont typeface="Arial"/>
-      <a:defRPr b="0" i="0" sz="1400" u="none" cap="none" strike="noStrike">
+      <a:defRPr sz="1400" b="0" i="0" u="none" strike="noStrike" cap="none">
         <a:solidFill>
           <a:srgbClr val="000000"/>
         </a:solidFill>
@@ -82,7 +82,7 @@
         <a:sym typeface="Arial"/>
       </a:defRPr>
     </a:lvl2pPr>
-    <a:lvl3pPr lvl="2" marR="0" rtl="0" algn="l">
+    <a:lvl3pPr marR="0" lvl="2" algn="l" rtl="0">
       <a:lnSpc>
         <a:spcPct val="100000"/>
       </a:lnSpc>
@@ -96,7 +96,7 @@
         <a:srgbClr val="000000"/>
       </a:buClr>
       <a:buFont typeface="Arial"/>
-      <a:defRPr b="0" i="0" sz="1400" u="none" cap="none" strike="noStrike">
+      <a:defRPr sz="1400" b="0" i="0" u="none" strike="noStrike" cap="none">
         <a:solidFill>
           <a:srgbClr val="000000"/>
         </a:solidFill>
@@ -106,7 +106,7 @@
         <a:sym typeface="Arial"/>
       </a:defRPr>
     </a:lvl3pPr>
-    <a:lvl4pPr lvl="3" marR="0" rtl="0" algn="l">
+    <a:lvl4pPr marR="0" lvl="3" algn="l" rtl="0">
       <a:lnSpc>
         <a:spcPct val="100000"/>
       </a:lnSpc>
@@ -120,7 +120,7 @@
         <a:srgbClr val="000000"/>
       </a:buClr>
       <a:buFont typeface="Arial"/>
-      <a:defRPr b="0" i="0" sz="1400" u="none" cap="none" strike="noStrike">
+      <a:defRPr sz="1400" b="0" i="0" u="none" strike="noStrike" cap="none">
         <a:solidFill>
           <a:srgbClr val="000000"/>
         </a:solidFill>
@@ -130,7 +130,7 @@
         <a:sym typeface="Arial"/>
       </a:defRPr>
     </a:lvl4pPr>
-    <a:lvl5pPr lvl="4" marR="0" rtl="0" algn="l">
+    <a:lvl5pPr marR="0" lvl="4" algn="l" rtl="0">
       <a:lnSpc>
         <a:spcPct val="100000"/>
       </a:lnSpc>
@@ -144,7 +144,7 @@
         <a:srgbClr val="000000"/>
       </a:buClr>
       <a:buFont typeface="Arial"/>
-      <a:defRPr b="0" i="0" sz="1400" u="none" cap="none" strike="noStrike">
+      <a:defRPr sz="1400" b="0" i="0" u="none" strike="noStrike" cap="none">
         <a:solidFill>
           <a:srgbClr val="000000"/>
         </a:solidFill>
@@ -154,7 +154,7 @@
         <a:sym typeface="Arial"/>
       </a:defRPr>
     </a:lvl5pPr>
-    <a:lvl6pPr lvl="5" marR="0" rtl="0" algn="l">
+    <a:lvl6pPr marR="0" lvl="5" algn="l" rtl="0">
       <a:lnSpc>
         <a:spcPct val="100000"/>
       </a:lnSpc>
@@ -168,7 +168,7 @@
         <a:srgbClr val="000000"/>
       </a:buClr>
       <a:buFont typeface="Arial"/>
-      <a:defRPr b="0" i="0" sz="1400" u="none" cap="none" strike="noStrike">
+      <a:defRPr sz="1400" b="0" i="0" u="none" strike="noStrike" cap="none">
         <a:solidFill>
           <a:srgbClr val="000000"/>
         </a:solidFill>
@@ -178,7 +178,7 @@
         <a:sym typeface="Arial"/>
       </a:defRPr>
     </a:lvl6pPr>
-    <a:lvl7pPr lvl="6" marR="0" rtl="0" algn="l">
+    <a:lvl7pPr marR="0" lvl="6" algn="l" rtl="0">
       <a:lnSpc>
         <a:spcPct val="100000"/>
       </a:lnSpc>
@@ -192,7 +192,7 @@
         <a:srgbClr val="000000"/>
       </a:buClr>
       <a:buFont typeface="Arial"/>
-      <a:defRPr b="0" i="0" sz="1400" u="none" cap="none" strike="noStrike">
+      <a:defRPr sz="1400" b="0" i="0" u="none" strike="noStrike" cap="none">
         <a:solidFill>
           <a:srgbClr val="000000"/>
         </a:solidFill>
@@ -202,7 +202,7 @@
         <a:sym typeface="Arial"/>
       </a:defRPr>
     </a:lvl7pPr>
-    <a:lvl8pPr lvl="7" marR="0" rtl="0" algn="l">
+    <a:lvl8pPr marR="0" lvl="7" algn="l" rtl="0">
       <a:lnSpc>
         <a:spcPct val="100000"/>
       </a:lnSpc>
@@ -216,7 +216,7 @@
         <a:srgbClr val="000000"/>
       </a:buClr>
       <a:buFont typeface="Arial"/>
-      <a:defRPr b="0" i="0" sz="1400" u="none" cap="none" strike="noStrike">
+      <a:defRPr sz="1400" b="0" i="0" u="none" strike="noStrike" cap="none">
         <a:solidFill>
           <a:srgbClr val="000000"/>
         </a:solidFill>
@@ -226,7 +226,7 @@
         <a:sym typeface="Arial"/>
       </a:defRPr>
     </a:lvl8pPr>
-    <a:lvl9pPr lvl="8" marR="0" rtl="0" algn="l">
+    <a:lvl9pPr marR="0" lvl="8" algn="l" rtl="0">
       <a:lnSpc>
         <a:spcPct val="100000"/>
       </a:lnSpc>
@@ -240,7 +240,7 @@
         <a:srgbClr val="000000"/>
       </a:buClr>
       <a:buFont typeface="Arial"/>
-      <a:defRPr b="0" i="0" sz="1400" u="none" cap="none" strike="noStrike">
+      <a:defRPr sz="1400" b="0" i="0" u="none" strike="noStrike" cap="none">
         <a:solidFill>
           <a:srgbClr val="000000"/>
         </a:solidFill>
@@ -253,7 +253,7 @@
   </p:defaultTextStyle>
   <p:extLst>
     <p:ext uri="{EFAFB233-063F-42B5-8137-9DF3F51BA10A}">
-      <p15:sldGuideLst>
+      <p15:sldGuideLst xmlns:p15="http://schemas.microsoft.com/office/powerpoint/2012/main">
         <p15:guide id="1" orient="horz" pos="1620">
           <p15:clr>
             <a:srgbClr val="A4A3A4"/>
@@ -271,11 +271,16 @@
 </file>
 
 <file path=ppt/notesMasters/notesMaster1.xml><?xml version="1.0" encoding="utf-8"?>
-<p:notesMaster xmlns:a="http://schemas.openxmlformats.org/drawingml/2006/main" xmlns:r="http://schemas.openxmlformats.org/officeDocument/2006/relationships" xmlns:mc="http://schemas.openxmlformats.org/markup-compatibility/2006" xmlns:mv="urn:schemas-microsoft-com:mac:vml" xmlns:p="http://schemas.openxmlformats.org/presentationml/2006/main" xmlns:c="http://schemas.openxmlformats.org/drawingml/2006/chart" xmlns:dgm="http://schemas.openxmlformats.org/drawingml/2006/diagram" xmlns:o="urn:schemas-microsoft-com:office:office" xmlns:v="urn:schemas-microsoft-com:vml" xmlns:pvml="urn:schemas-microsoft-com:office:powerpoint" xmlns:com="http://schemas.openxmlformats.org/drawingml/2006/compatibility" xmlns:p14="http://schemas.microsoft.com/office/powerpoint/2010/main" xmlns:p15="http://schemas.microsoft.com/office/powerpoint/2012/main" xmlns:ahyp="http://schemas.microsoft.com/office/drawing/2018/hyperlinkcolor">
+<p:notesMaster xmlns:a="http://schemas.openxmlformats.org/drawingml/2006/main" xmlns:r="http://schemas.openxmlformats.org/officeDocument/2006/relationships" xmlns:p="http://schemas.openxmlformats.org/presentationml/2006/main">
   <p:cSld>
+    <p:bg>
+      <p:bgRef idx="1001">
+        <a:schemeClr val="bg1"/>
+      </p:bgRef>
+    </p:bg>
     <p:spTree>
       <p:nvGrpSpPr>
-        <p:cNvPr id="2" name="Shape 2"/>
+        <p:cNvPr id="1" name="Shape 2"/>
         <p:cNvGrpSpPr/>
         <p:nvPr/>
       </p:nvGrpSpPr>
@@ -290,9 +295,11 @@
       <p:sp>
         <p:nvSpPr>
           <p:cNvPr id="3" name="Google Shape;3;n"/>
-          <p:cNvSpPr/>
+          <p:cNvSpPr>
+            <a:spLocks noGrp="1" noRot="1" noChangeAspect="1"/>
+          </p:cNvSpPr>
           <p:nvPr>
-            <p:ph idx="2" type="sldImg"/>
+            <p:ph type="sldImg" idx="2"/>
           </p:nvPr>
         </p:nvSpPr>
         <p:spPr>
@@ -301,9 +308,13 @@
             <a:ext cx="6096075" cy="3429000"/>
           </a:xfrm>
           <a:custGeom>
-            <a:rect b="b" l="l" r="r" t="t"/>
+            <a:avLst/>
+            <a:gdLst/>
+            <a:ahLst/>
+            <a:cxnLst/>
+            <a:rect l="l" t="t" r="r" b="b"/>
             <a:pathLst>
-              <a:path extrusionOk="0" h="120000" w="120000">
+              <a:path w="120000" h="120000" extrusionOk="0">
                 <a:moveTo>
                   <a:pt x="0" y="0"/>
                 </a:moveTo>
@@ -321,23 +332,25 @@
             </a:pathLst>
           </a:custGeom>
           <a:noFill/>
-          <a:ln cap="flat" cmpd="sng" w="9525">
+          <a:ln w="9525" cap="flat" cmpd="sng">
             <a:solidFill>
               <a:srgbClr val="000000"/>
             </a:solidFill>
             <a:prstDash val="solid"/>
             <a:round/>
-            <a:headEnd len="sm" w="sm" type="none"/>
-            <a:tailEnd len="sm" w="sm" type="none"/>
+            <a:headEnd type="none" w="sm" len="sm"/>
+            <a:tailEnd type="none" w="sm" len="sm"/>
           </a:ln>
         </p:spPr>
       </p:sp>
       <p:sp>
         <p:nvSpPr>
           <p:cNvPr id="4" name="Google Shape;4;n"/>
-          <p:cNvSpPr txBox="1"/>
+          <p:cNvSpPr txBox="1">
+            <a:spLocks noGrp="1"/>
+          </p:cNvSpPr>
           <p:nvPr>
-            <p:ph idx="1" type="body"/>
+            <p:ph type="body" idx="1"/>
           </p:nvPr>
         </p:nvSpPr>
         <p:spPr>
@@ -354,11 +367,11 @@
           </a:ln>
         </p:spPr>
         <p:txBody>
-          <a:bodyPr anchorCtr="0" anchor="t" bIns="91425" lIns="91425" spcFirstLastPara="1" rIns="91425" wrap="square" tIns="91425">
+          <a:bodyPr spcFirstLastPara="1" wrap="square" lIns="91425" tIns="91425" rIns="91425" bIns="91425" anchor="t" anchorCtr="0">
             <a:noAutofit/>
           </a:bodyPr>
           <a:lstStyle>
-            <a:lvl1pPr indent="-298450" lvl="0" marL="457200">
+            <a:lvl1pPr marL="457200" lvl="0" indent="-298450">
               <a:spcBef>
                 <a:spcPts val="0"/>
               </a:spcBef>
@@ -369,7 +382,7 @@
               <a:buChar char="●"/>
               <a:defRPr sz="1100"/>
             </a:lvl1pPr>
-            <a:lvl2pPr indent="-298450" lvl="1" marL="914400">
+            <a:lvl2pPr marL="914400" lvl="1" indent="-298450">
               <a:spcBef>
                 <a:spcPts val="0"/>
               </a:spcBef>
@@ -380,7 +393,7 @@
               <a:buChar char="○"/>
               <a:defRPr sz="1100"/>
             </a:lvl2pPr>
-            <a:lvl3pPr indent="-298450" lvl="2" marL="1371600">
+            <a:lvl3pPr marL="1371600" lvl="2" indent="-298450">
               <a:spcBef>
                 <a:spcPts val="0"/>
               </a:spcBef>
@@ -391,7 +404,7 @@
               <a:buChar char="■"/>
               <a:defRPr sz="1100"/>
             </a:lvl3pPr>
-            <a:lvl4pPr indent="-298450" lvl="3" marL="1828800">
+            <a:lvl4pPr marL="1828800" lvl="3" indent="-298450">
               <a:spcBef>
                 <a:spcPts val="0"/>
               </a:spcBef>
@@ -402,7 +415,7 @@
               <a:buChar char="●"/>
               <a:defRPr sz="1100"/>
             </a:lvl4pPr>
-            <a:lvl5pPr indent="-298450" lvl="4" marL="2286000">
+            <a:lvl5pPr marL="2286000" lvl="4" indent="-298450">
               <a:spcBef>
                 <a:spcPts val="0"/>
               </a:spcBef>
@@ -413,7 +426,7 @@
               <a:buChar char="○"/>
               <a:defRPr sz="1100"/>
             </a:lvl5pPr>
-            <a:lvl6pPr indent="-298450" lvl="5" marL="2743200">
+            <a:lvl6pPr marL="2743200" lvl="5" indent="-298450">
               <a:spcBef>
                 <a:spcPts val="0"/>
               </a:spcBef>
@@ -424,7 +437,7 @@
               <a:buChar char="■"/>
               <a:defRPr sz="1100"/>
             </a:lvl6pPr>
-            <a:lvl7pPr indent="-298450" lvl="6" marL="3200400">
+            <a:lvl7pPr marL="3200400" lvl="6" indent="-298450">
               <a:spcBef>
                 <a:spcPts val="0"/>
               </a:spcBef>
@@ -435,7 +448,7 @@
               <a:buChar char="●"/>
               <a:defRPr sz="1100"/>
             </a:lvl7pPr>
-            <a:lvl8pPr indent="-298450" lvl="7" marL="3657600">
+            <a:lvl8pPr marL="3657600" lvl="7" indent="-298450">
               <a:spcBef>
                 <a:spcPts val="0"/>
               </a:spcBef>
@@ -446,7 +459,7 @@
               <a:buChar char="○"/>
               <a:defRPr sz="1100"/>
             </a:lvl8pPr>
-            <a:lvl9pPr indent="-298450" lvl="8" marL="4114800">
+            <a:lvl9pPr marL="4114800" lvl="8" indent="-298450">
               <a:spcBef>
                 <a:spcPts val="0"/>
               </a:spcBef>
@@ -458,14 +471,16 @@
               <a:defRPr sz="1100"/>
             </a:lvl9pPr>
           </a:lstStyle>
-          <a:p/>
+          <a:p>
+            <a:endParaRPr/>
+          </a:p>
         </p:txBody>
       </p:sp>
     </p:spTree>
   </p:cSld>
-  <p:clrMap accent1="accent1" accent2="accent2" accent3="accent3" accent4="accent4" accent5="accent5" accent6="accent6" bg1="lt1" bg2="dk2" tx1="dk1" tx2="lt2" folHlink="folHlink" hlink="hlink"/>
+  <p:clrMap bg1="lt1" tx1="dk1" bg2="dk2" tx2="lt2" accent1="accent1" accent2="accent2" accent3="accent3" accent4="accent4" accent5="accent5" accent6="accent6" hlink="hlink" folHlink="folHlink"/>
   <p:notesStyle>
-    <a:defPPr lvl="0" marR="0" rtl="0" algn="l">
+    <a:defPPr marR="0" lvl="0" algn="l" rtl="0">
       <a:lnSpc>
         <a:spcPct val="100000"/>
       </a:lnSpc>
@@ -476,7 +491,7 @@
         <a:spcPts val="0"/>
       </a:spcAft>
     </a:defPPr>
-    <a:lvl1pPr lvl="0" marR="0" rtl="0" algn="l">
+    <a:lvl1pPr marR="0" lvl="0" algn="l" rtl="0">
       <a:lnSpc>
         <a:spcPct val="100000"/>
       </a:lnSpc>
@@ -490,7 +505,7 @@
         <a:srgbClr val="000000"/>
       </a:buClr>
       <a:buFont typeface="Arial"/>
-      <a:defRPr b="0" i="0" sz="1400" u="none" cap="none" strike="noStrike">
+      <a:defRPr sz="1400" b="0" i="0" u="none" strike="noStrike" cap="none">
         <a:solidFill>
           <a:srgbClr val="000000"/>
         </a:solidFill>
@@ -500,7 +515,7 @@
         <a:sym typeface="Arial"/>
       </a:defRPr>
     </a:lvl1pPr>
-    <a:lvl2pPr lvl="1" marR="0" rtl="0" algn="l">
+    <a:lvl2pPr marR="0" lvl="1" algn="l" rtl="0">
       <a:lnSpc>
         <a:spcPct val="100000"/>
       </a:lnSpc>
@@ -514,7 +529,7 @@
         <a:srgbClr val="000000"/>
       </a:buClr>
       <a:buFont typeface="Arial"/>
-      <a:defRPr b="0" i="0" sz="1400" u="none" cap="none" strike="noStrike">
+      <a:defRPr sz="1400" b="0" i="0" u="none" strike="noStrike" cap="none">
         <a:solidFill>
           <a:srgbClr val="000000"/>
         </a:solidFill>
@@ -524,7 +539,7 @@
         <a:sym typeface="Arial"/>
       </a:defRPr>
     </a:lvl2pPr>
-    <a:lvl3pPr lvl="2" marR="0" rtl="0" algn="l">
+    <a:lvl3pPr marR="0" lvl="2" algn="l" rtl="0">
       <a:lnSpc>
         <a:spcPct val="100000"/>
       </a:lnSpc>
@@ -538,7 +553,7 @@
         <a:srgbClr val="000000"/>
       </a:buClr>
       <a:buFont typeface="Arial"/>
-      <a:defRPr b="0" i="0" sz="1400" u="none" cap="none" strike="noStrike">
+      <a:defRPr sz="1400" b="0" i="0" u="none" strike="noStrike" cap="none">
         <a:solidFill>
           <a:srgbClr val="000000"/>
         </a:solidFill>
@@ -548,7 +563,7 @@
         <a:sym typeface="Arial"/>
       </a:defRPr>
     </a:lvl3pPr>
-    <a:lvl4pPr lvl="3" marR="0" rtl="0" algn="l">
+    <a:lvl4pPr marR="0" lvl="3" algn="l" rtl="0">
       <a:lnSpc>
         <a:spcPct val="100000"/>
       </a:lnSpc>
@@ -562,7 +577,7 @@
         <a:srgbClr val="000000"/>
       </a:buClr>
       <a:buFont typeface="Arial"/>
-      <a:defRPr b="0" i="0" sz="1400" u="none" cap="none" strike="noStrike">
+      <a:defRPr sz="1400" b="0" i="0" u="none" strike="noStrike" cap="none">
         <a:solidFill>
           <a:srgbClr val="000000"/>
         </a:solidFill>
@@ -572,7 +587,7 @@
         <a:sym typeface="Arial"/>
       </a:defRPr>
     </a:lvl4pPr>
-    <a:lvl5pPr lvl="4" marR="0" rtl="0" algn="l">
+    <a:lvl5pPr marR="0" lvl="4" algn="l" rtl="0">
       <a:lnSpc>
         <a:spcPct val="100000"/>
       </a:lnSpc>
@@ -586,7 +601,7 @@
         <a:srgbClr val="000000"/>
       </a:buClr>
       <a:buFont typeface="Arial"/>
-      <a:defRPr b="0" i="0" sz="1400" u="none" cap="none" strike="noStrike">
+      <a:defRPr sz="1400" b="0" i="0" u="none" strike="noStrike" cap="none">
         <a:solidFill>
           <a:srgbClr val="000000"/>
         </a:solidFill>
@@ -596,7 +611,7 @@
         <a:sym typeface="Arial"/>
       </a:defRPr>
     </a:lvl5pPr>
-    <a:lvl6pPr lvl="5" marR="0" rtl="0" algn="l">
+    <a:lvl6pPr marR="0" lvl="5" algn="l" rtl="0">
       <a:lnSpc>
         <a:spcPct val="100000"/>
       </a:lnSpc>
@@ -610,7 +625,7 @@
         <a:srgbClr val="000000"/>
       </a:buClr>
       <a:buFont typeface="Arial"/>
-      <a:defRPr b="0" i="0" sz="1400" u="none" cap="none" strike="noStrike">
+      <a:defRPr sz="1400" b="0" i="0" u="none" strike="noStrike" cap="none">
         <a:solidFill>
           <a:srgbClr val="000000"/>
         </a:solidFill>
@@ -620,7 +635,7 @@
         <a:sym typeface="Arial"/>
       </a:defRPr>
     </a:lvl6pPr>
-    <a:lvl7pPr lvl="6" marR="0" rtl="0" algn="l">
+    <a:lvl7pPr marR="0" lvl="6" algn="l" rtl="0">
       <a:lnSpc>
         <a:spcPct val="100000"/>
       </a:lnSpc>
@@ -634,7 +649,7 @@
         <a:srgbClr val="000000"/>
       </a:buClr>
       <a:buFont typeface="Arial"/>
-      <a:defRPr b="0" i="0" sz="1400" u="none" cap="none" strike="noStrike">
+      <a:defRPr sz="1400" b="0" i="0" u="none" strike="noStrike" cap="none">
         <a:solidFill>
           <a:srgbClr val="000000"/>
         </a:solidFill>
@@ -644,7 +659,7 @@
         <a:sym typeface="Arial"/>
       </a:defRPr>
     </a:lvl7pPr>
-    <a:lvl8pPr lvl="7" marR="0" rtl="0" algn="l">
+    <a:lvl8pPr marR="0" lvl="7" algn="l" rtl="0">
       <a:lnSpc>
         <a:spcPct val="100000"/>
       </a:lnSpc>
@@ -658,7 +673,7 @@
         <a:srgbClr val="000000"/>
       </a:buClr>
       <a:buFont typeface="Arial"/>
-      <a:defRPr b="0" i="0" sz="1400" u="none" cap="none" strike="noStrike">
+      <a:defRPr sz="1400" b="0" i="0" u="none" strike="noStrike" cap="none">
         <a:solidFill>
           <a:srgbClr val="000000"/>
         </a:solidFill>
@@ -668,7 +683,7 @@
         <a:sym typeface="Arial"/>
       </a:defRPr>
     </a:lvl8pPr>
-    <a:lvl9pPr lvl="8" marR="0" rtl="0" algn="l">
+    <a:lvl9pPr marR="0" lvl="8" algn="l" rtl="0">
       <a:lnSpc>
         <a:spcPct val="100000"/>
       </a:lnSpc>
@@ -682,7 +697,7 @@
         <a:srgbClr val="000000"/>
       </a:buClr>
       <a:buFont typeface="Arial"/>
-      <a:defRPr b="0" i="0" sz="1400" u="none" cap="none" strike="noStrike">
+      <a:defRPr sz="1400" b="0" i="0" u="none" strike="noStrike" cap="none">
         <a:solidFill>
           <a:srgbClr val="000000"/>
         </a:solidFill>
@@ -697,11 +712,11 @@
 </file>
 
 <file path=ppt/notesSlides/notesSlide1.xml><?xml version="1.0" encoding="utf-8"?>
-<p:notes xmlns:a="http://schemas.openxmlformats.org/drawingml/2006/main" xmlns:r="http://schemas.openxmlformats.org/officeDocument/2006/relationships" xmlns:mc="http://schemas.openxmlformats.org/markup-compatibility/2006" xmlns:mv="urn:schemas-microsoft-com:mac:vml" xmlns:p="http://schemas.openxmlformats.org/presentationml/2006/main" xmlns:c="http://schemas.openxmlformats.org/drawingml/2006/chart" xmlns:dgm="http://schemas.openxmlformats.org/drawingml/2006/diagram" xmlns:o="urn:schemas-microsoft-com:office:office" xmlns:v="urn:schemas-microsoft-com:vml" xmlns:pvml="urn:schemas-microsoft-com:office:powerpoint" xmlns:com="http://schemas.openxmlformats.org/drawingml/2006/compatibility" xmlns:p14="http://schemas.microsoft.com/office/powerpoint/2010/main" xmlns:p15="http://schemas.microsoft.com/office/powerpoint/2012/main" xmlns:ahyp="http://schemas.microsoft.com/office/drawing/2018/hyperlinkcolor" showMasterPhAnim="0" showMasterSp="0">
+<p:notes xmlns:a="http://schemas.openxmlformats.org/drawingml/2006/main" xmlns:r="http://schemas.openxmlformats.org/officeDocument/2006/relationships" xmlns:p="http://schemas.openxmlformats.org/presentationml/2006/main" showMasterSp="0" showMasterPhAnim="0">
   <p:cSld>
     <p:spTree>
       <p:nvGrpSpPr>
-        <p:cNvPr id="50" name="Shape 50"/>
+        <p:cNvPr id="1" name="Shape 50"/>
         <p:cNvGrpSpPr/>
         <p:nvPr/>
       </p:nvGrpSpPr>
@@ -716,9 +731,11 @@
       <p:sp>
         <p:nvSpPr>
           <p:cNvPr id="51" name="Google Shape;51;p:notes"/>
-          <p:cNvSpPr/>
+          <p:cNvSpPr>
+            <a:spLocks noGrp="1" noRot="1" noChangeAspect="1"/>
+          </p:cNvSpPr>
           <p:nvPr>
-            <p:ph idx="2" type="sldImg"/>
+            <p:ph type="sldImg" idx="2"/>
           </p:nvPr>
         </p:nvSpPr>
         <p:spPr>
@@ -727,9 +744,13 @@
             <a:ext cx="6096075" cy="3429000"/>
           </a:xfrm>
           <a:custGeom>
-            <a:rect b="b" l="l" r="r" t="t"/>
+            <a:avLst/>
+            <a:gdLst/>
+            <a:ahLst/>
+            <a:cxnLst/>
+            <a:rect l="l" t="t" r="r" b="b"/>
             <a:pathLst>
-              <a:path extrusionOk="0" h="120000" w="120000">
+              <a:path w="120000" h="120000" extrusionOk="0">
                 <a:moveTo>
                   <a:pt x="0" y="0"/>
                 </a:moveTo>
@@ -751,9 +772,11 @@
       <p:sp>
         <p:nvSpPr>
           <p:cNvPr id="52" name="Google Shape;52;p:notes"/>
-          <p:cNvSpPr txBox="1"/>
+          <p:cNvSpPr txBox="1">
+            <a:spLocks noGrp="1"/>
+          </p:cNvSpPr>
           <p:nvPr>
-            <p:ph idx="1" type="body"/>
+            <p:ph type="body" idx="1"/>
           </p:nvPr>
         </p:nvSpPr>
         <p:spPr>
@@ -766,12 +789,12 @@
           </a:prstGeom>
         </p:spPr>
         <p:txBody>
-          <a:bodyPr anchorCtr="0" anchor="t" bIns="91425" lIns="91425" spcFirstLastPara="1" rIns="91425" wrap="square" tIns="91425">
+          <a:bodyPr spcFirstLastPara="1" wrap="square" lIns="91425" tIns="91425" rIns="91425" bIns="91425" anchor="t" anchorCtr="0">
             <a:noAutofit/>
           </a:bodyPr>
           <a:lstStyle/>
           <a:p>
-            <a:pPr indent="0" lvl="0" marL="0" rtl="0" algn="l">
+            <a:pPr marL="0" lvl="0" indent="0" algn="l" rtl="0">
               <a:spcBef>
                 <a:spcPts val="0"/>
               </a:spcBef>
@@ -780,9 +803,6 @@
               </a:spcAft>
               <a:buNone/>
             </a:pPr>
-            <a:r>
-              <a:t/>
-            </a:r>
             <a:endParaRPr/>
           </a:p>
         </p:txBody>
@@ -796,11 +816,11 @@
 </file>
 
 <file path=ppt/notesSlides/notesSlide2.xml><?xml version="1.0" encoding="utf-8"?>
-<p:notes xmlns:a="http://schemas.openxmlformats.org/drawingml/2006/main" xmlns:r="http://schemas.openxmlformats.org/officeDocument/2006/relationships" xmlns:mc="http://schemas.openxmlformats.org/markup-compatibility/2006" xmlns:mv="urn:schemas-microsoft-com:mac:vml" xmlns:p="http://schemas.openxmlformats.org/presentationml/2006/main" xmlns:c="http://schemas.openxmlformats.org/drawingml/2006/chart" xmlns:dgm="http://schemas.openxmlformats.org/drawingml/2006/diagram" xmlns:o="urn:schemas-microsoft-com:office:office" xmlns:v="urn:schemas-microsoft-com:vml" xmlns:pvml="urn:schemas-microsoft-com:office:powerpoint" xmlns:com="http://schemas.openxmlformats.org/drawingml/2006/compatibility" xmlns:p14="http://schemas.microsoft.com/office/powerpoint/2010/main" xmlns:p15="http://schemas.microsoft.com/office/powerpoint/2012/main" xmlns:ahyp="http://schemas.microsoft.com/office/drawing/2018/hyperlinkcolor" showMasterPhAnim="0" showMasterSp="0">
+<p:notes xmlns:a="http://schemas.openxmlformats.org/drawingml/2006/main" xmlns:r="http://schemas.openxmlformats.org/officeDocument/2006/relationships" xmlns:p="http://schemas.openxmlformats.org/presentationml/2006/main" showMasterSp="0" showMasterPhAnim="0">
   <p:cSld>
     <p:spTree>
       <p:nvGrpSpPr>
-        <p:cNvPr id="84" name="Shape 84"/>
+        <p:cNvPr id="1" name="Shape 84"/>
         <p:cNvGrpSpPr/>
         <p:nvPr/>
       </p:nvGrpSpPr>
@@ -815,20 +835,26 @@
       <p:sp>
         <p:nvSpPr>
           <p:cNvPr id="85" name="Google Shape;85;ga01a64bcdd_6_0:notes"/>
-          <p:cNvSpPr/>
+          <p:cNvSpPr>
+            <a:spLocks noGrp="1" noRot="1" noChangeAspect="1"/>
+          </p:cNvSpPr>
           <p:nvPr>
-            <p:ph idx="2" type="sldImg"/>
+            <p:ph type="sldImg" idx="2"/>
           </p:nvPr>
         </p:nvSpPr>
         <p:spPr>
           <a:xfrm>
-            <a:off x="381300" y="685800"/>
+            <a:off x="381000" y="685800"/>
             <a:ext cx="6096000" cy="3429000"/>
           </a:xfrm>
           <a:custGeom>
-            <a:rect b="b" l="l" r="r" t="t"/>
+            <a:avLst/>
+            <a:gdLst/>
+            <a:ahLst/>
+            <a:cxnLst/>
+            <a:rect l="l" t="t" r="r" b="b"/>
             <a:pathLst>
-              <a:path extrusionOk="0" h="120000" w="120000">
+              <a:path w="120000" h="120000" extrusionOk="0">
                 <a:moveTo>
                   <a:pt x="0" y="0"/>
                 </a:moveTo>
@@ -850,9 +876,11 @@
       <p:sp>
         <p:nvSpPr>
           <p:cNvPr id="86" name="Google Shape;86;ga01a64bcdd_6_0:notes"/>
-          <p:cNvSpPr txBox="1"/>
+          <p:cNvSpPr txBox="1">
+            <a:spLocks noGrp="1"/>
+          </p:cNvSpPr>
           <p:nvPr>
-            <p:ph idx="1" type="body"/>
+            <p:ph type="body" idx="1"/>
           </p:nvPr>
         </p:nvSpPr>
         <p:spPr>
@@ -865,12 +893,12 @@
           </a:prstGeom>
         </p:spPr>
         <p:txBody>
-          <a:bodyPr anchorCtr="0" anchor="t" bIns="91425" lIns="91425" spcFirstLastPara="1" rIns="91425" wrap="square" tIns="91425">
+          <a:bodyPr spcFirstLastPara="1" wrap="square" lIns="91425" tIns="91425" rIns="91425" bIns="91425" anchor="t" anchorCtr="0">
             <a:noAutofit/>
           </a:bodyPr>
           <a:lstStyle/>
           <a:p>
-            <a:pPr indent="0" lvl="0" marL="0" rtl="0" algn="l">
+            <a:pPr marL="0" lvl="0" indent="0" algn="l" rtl="0">
               <a:spcBef>
                 <a:spcPts val="0"/>
               </a:spcBef>
@@ -879,9 +907,6 @@
               </a:spcAft>
               <a:buNone/>
             </a:pPr>
-            <a:r>
-              <a:t/>
-            </a:r>
             <a:endParaRPr/>
           </a:p>
         </p:txBody>
@@ -895,11 +920,11 @@
 </file>
 
 <file path=ppt/slideLayouts/slideLayout1.xml><?xml version="1.0" encoding="utf-8"?>
-<p:sldLayout xmlns:a="http://schemas.openxmlformats.org/drawingml/2006/main" xmlns:r="http://schemas.openxmlformats.org/officeDocument/2006/relationships" xmlns:mc="http://schemas.openxmlformats.org/markup-compatibility/2006" xmlns:mv="urn:schemas-microsoft-com:mac:vml" xmlns:p="http://schemas.openxmlformats.org/presentationml/2006/main" xmlns:c="http://schemas.openxmlformats.org/drawingml/2006/chart" xmlns:dgm="http://schemas.openxmlformats.org/drawingml/2006/diagram" xmlns:o="urn:schemas-microsoft-com:office:office" xmlns:v="urn:schemas-microsoft-com:vml" xmlns:pvml="urn:schemas-microsoft-com:office:powerpoint" xmlns:com="http://schemas.openxmlformats.org/drawingml/2006/compatibility" xmlns:p14="http://schemas.microsoft.com/office/powerpoint/2010/main" xmlns:p15="http://schemas.microsoft.com/office/powerpoint/2012/main" xmlns:ahyp="http://schemas.microsoft.com/office/drawing/2018/hyperlinkcolor" matchingName="Title slide" type="title">
+<p:sldLayout xmlns:a="http://schemas.openxmlformats.org/drawingml/2006/main" xmlns:r="http://schemas.openxmlformats.org/officeDocument/2006/relationships" xmlns:p="http://schemas.openxmlformats.org/presentationml/2006/main" matchingName="Title slide" type="title">
   <p:cSld name="TITLE">
     <p:spTree>
       <p:nvGrpSpPr>
-        <p:cNvPr id="9" name="Shape 9"/>
+        <p:cNvPr id="1" name="Shape 9"/>
         <p:cNvGrpSpPr/>
         <p:nvPr/>
       </p:nvGrpSpPr>
@@ -914,7 +939,9 @@
       <p:sp>
         <p:nvSpPr>
           <p:cNvPr id="10" name="Google Shape;10;p2"/>
-          <p:cNvSpPr txBox="1"/>
+          <p:cNvSpPr txBox="1">
+            <a:spLocks noGrp="1"/>
+          </p:cNvSpPr>
           <p:nvPr>
             <p:ph type="ctrTitle"/>
           </p:nvPr>
@@ -929,7 +956,7 @@
           </a:prstGeom>
         </p:spPr>
         <p:txBody>
-          <a:bodyPr anchorCtr="0" anchor="b" bIns="91425" lIns="91425" spcFirstLastPara="1" rIns="91425" wrap="square" tIns="91425">
+          <a:bodyPr spcFirstLastPara="1" wrap="square" lIns="91425" tIns="91425" rIns="91425" bIns="91425" anchor="b" anchorCtr="0">
             <a:noAutofit/>
           </a:bodyPr>
           <a:lstStyle>
@@ -1033,15 +1060,19 @@
               <a:defRPr sz="5200"/>
             </a:lvl9pPr>
           </a:lstStyle>
-          <a:p/>
+          <a:p>
+            <a:endParaRPr/>
+          </a:p>
         </p:txBody>
       </p:sp>
       <p:sp>
         <p:nvSpPr>
           <p:cNvPr id="11" name="Google Shape;11;p2"/>
-          <p:cNvSpPr txBox="1"/>
+          <p:cNvSpPr txBox="1">
+            <a:spLocks noGrp="1"/>
+          </p:cNvSpPr>
           <p:nvPr>
-            <p:ph idx="1" type="subTitle"/>
+            <p:ph type="subTitle" idx="1"/>
           </p:nvPr>
         </p:nvSpPr>
         <p:spPr>
@@ -1054,7 +1085,7 @@
           </a:prstGeom>
         </p:spPr>
         <p:txBody>
-          <a:bodyPr anchorCtr="0" anchor="t" bIns="91425" lIns="91425" spcFirstLastPara="1" rIns="91425" wrap="square" tIns="91425">
+          <a:bodyPr spcFirstLastPara="1" wrap="square" lIns="91425" tIns="91425" rIns="91425" bIns="91425" anchor="t" anchorCtr="0">
             <a:noAutofit/>
           </a:bodyPr>
           <a:lstStyle>
@@ -1185,15 +1216,19 @@
               <a:defRPr sz="2800"/>
             </a:lvl9pPr>
           </a:lstStyle>
-          <a:p/>
+          <a:p>
+            <a:endParaRPr/>
+          </a:p>
         </p:txBody>
       </p:sp>
       <p:sp>
         <p:nvSpPr>
           <p:cNvPr id="12" name="Google Shape;12;p2"/>
-          <p:cNvSpPr txBox="1"/>
+          <p:cNvSpPr txBox="1">
+            <a:spLocks noGrp="1"/>
+          </p:cNvSpPr>
           <p:nvPr>
-            <p:ph idx="12" type="sldNum"/>
+            <p:ph type="sldNum" idx="12"/>
           </p:nvPr>
         </p:nvSpPr>
         <p:spPr>
@@ -1206,7 +1241,7 @@
           </a:prstGeom>
         </p:spPr>
         <p:txBody>
-          <a:bodyPr anchorCtr="0" anchor="ctr" bIns="91425" lIns="91425" spcFirstLastPara="1" rIns="91425" wrap="square" tIns="91425">
+          <a:bodyPr spcFirstLastPara="1" wrap="square" lIns="91425" tIns="91425" rIns="91425" bIns="91425" anchor="ctr" anchorCtr="0">
             <a:noAutofit/>
           </a:bodyPr>
           <a:lstStyle>
@@ -1248,7 +1283,7 @@
             </a:lvl9pPr>
           </a:lstStyle>
           <a:p>
-            <a:pPr indent="0" lvl="0" marL="0" rtl="0" algn="r">
+            <a:pPr marL="0" lvl="0" indent="0" algn="r" rtl="0">
               <a:spcBef>
                 <a:spcPts val="0"/>
               </a:spcBef>
@@ -1259,7 +1294,7 @@
             </a:pPr>
             <a:fld id="{00000000-1234-1234-1234-123412341234}" type="slidenum">
               <a:rPr lang="pt-BR"/>
-              <a:t>‹#›</a:t>
+              <a:t>‹nº›</a:t>
             </a:fld>
             <a:endParaRPr/>
           </a:p>
@@ -1274,11 +1309,11 @@
 </file>
 
 <file path=ppt/slideLayouts/slideLayout10.xml><?xml version="1.0" encoding="utf-8"?>
-<p:sldLayout xmlns:a="http://schemas.openxmlformats.org/drawingml/2006/main" xmlns:r="http://schemas.openxmlformats.org/officeDocument/2006/relationships" xmlns:mc="http://schemas.openxmlformats.org/markup-compatibility/2006" xmlns:mv="urn:schemas-microsoft-com:mac:vml" xmlns:p="http://schemas.openxmlformats.org/presentationml/2006/main" xmlns:c="http://schemas.openxmlformats.org/drawingml/2006/chart" xmlns:dgm="http://schemas.openxmlformats.org/drawingml/2006/diagram" xmlns:o="urn:schemas-microsoft-com:office:office" xmlns:v="urn:schemas-microsoft-com:vml" xmlns:pvml="urn:schemas-microsoft-com:office:powerpoint" xmlns:com="http://schemas.openxmlformats.org/drawingml/2006/compatibility" xmlns:p14="http://schemas.microsoft.com/office/powerpoint/2010/main" xmlns:p15="http://schemas.microsoft.com/office/powerpoint/2012/main" xmlns:ahyp="http://schemas.microsoft.com/office/drawing/2018/hyperlinkcolor" matchingName="Big number">
+<p:sldLayout xmlns:a="http://schemas.openxmlformats.org/drawingml/2006/main" xmlns:r="http://schemas.openxmlformats.org/officeDocument/2006/relationships" xmlns:p="http://schemas.openxmlformats.org/presentationml/2006/main" matchingName="Big number">
   <p:cSld name="BIG_NUMBER">
     <p:spTree>
       <p:nvGrpSpPr>
-        <p:cNvPr id="44" name="Shape 44"/>
+        <p:cNvPr id="1" name="Shape 44"/>
         <p:cNvGrpSpPr/>
         <p:nvPr/>
       </p:nvGrpSpPr>
@@ -1293,9 +1328,11 @@
       <p:sp>
         <p:nvSpPr>
           <p:cNvPr id="45" name="Google Shape;45;p11"/>
-          <p:cNvSpPr txBox="1"/>
+          <p:cNvSpPr txBox="1">
+            <a:spLocks noGrp="1"/>
+          </p:cNvSpPr>
           <p:nvPr>
-            <p:ph hasCustomPrompt="1" type="title"/>
+            <p:ph type="title" hasCustomPrompt="1"/>
           </p:nvPr>
         </p:nvSpPr>
         <p:spPr>
@@ -1308,7 +1345,7 @@
           </a:prstGeom>
         </p:spPr>
         <p:txBody>
-          <a:bodyPr anchorCtr="0" anchor="b" bIns="91425" lIns="91425" spcFirstLastPara="1" rIns="91425" wrap="square" tIns="91425">
+          <a:bodyPr spcFirstLastPara="1" wrap="square" lIns="91425" tIns="91425" rIns="91425" bIns="91425" anchor="b" anchorCtr="0">
             <a:noAutofit/>
           </a:bodyPr>
           <a:lstStyle>
@@ -1422,9 +1459,11 @@
       <p:sp>
         <p:nvSpPr>
           <p:cNvPr id="46" name="Google Shape;46;p11"/>
-          <p:cNvSpPr txBox="1"/>
+          <p:cNvSpPr txBox="1">
+            <a:spLocks noGrp="1"/>
+          </p:cNvSpPr>
           <p:nvPr>
-            <p:ph idx="1" type="body"/>
+            <p:ph type="body" idx="1"/>
           </p:nvPr>
         </p:nvSpPr>
         <p:spPr>
@@ -1437,11 +1476,11 @@
           </a:prstGeom>
         </p:spPr>
         <p:txBody>
-          <a:bodyPr anchorCtr="0" anchor="t" bIns="91425" lIns="91425" spcFirstLastPara="1" rIns="91425" wrap="square" tIns="91425">
+          <a:bodyPr spcFirstLastPara="1" wrap="square" lIns="91425" tIns="91425" rIns="91425" bIns="91425" anchor="t" anchorCtr="0">
             <a:noAutofit/>
           </a:bodyPr>
           <a:lstStyle>
-            <a:lvl1pPr indent="-342900" lvl="0" marL="457200" algn="ctr">
+            <a:lvl1pPr marL="457200" lvl="0" indent="-342900" algn="ctr">
               <a:spcBef>
                 <a:spcPts val="0"/>
               </a:spcBef>
@@ -1452,7 +1491,7 @@
               <a:buChar char="●"/>
               <a:defRPr/>
             </a:lvl1pPr>
-            <a:lvl2pPr indent="-317500" lvl="1" marL="914400" algn="ctr">
+            <a:lvl2pPr marL="914400" lvl="1" indent="-317500" algn="ctr">
               <a:spcBef>
                 <a:spcPts val="1600"/>
               </a:spcBef>
@@ -1463,7 +1502,7 @@
               <a:buChar char="○"/>
               <a:defRPr/>
             </a:lvl2pPr>
-            <a:lvl3pPr indent="-317500" lvl="2" marL="1371600" algn="ctr">
+            <a:lvl3pPr marL="1371600" lvl="2" indent="-317500" algn="ctr">
               <a:spcBef>
                 <a:spcPts val="1600"/>
               </a:spcBef>
@@ -1474,7 +1513,7 @@
               <a:buChar char="■"/>
               <a:defRPr/>
             </a:lvl3pPr>
-            <a:lvl4pPr indent="-317500" lvl="3" marL="1828800" algn="ctr">
+            <a:lvl4pPr marL="1828800" lvl="3" indent="-317500" algn="ctr">
               <a:spcBef>
                 <a:spcPts val="1600"/>
               </a:spcBef>
@@ -1485,7 +1524,7 @@
               <a:buChar char="●"/>
               <a:defRPr/>
             </a:lvl4pPr>
-            <a:lvl5pPr indent="-317500" lvl="4" marL="2286000" algn="ctr">
+            <a:lvl5pPr marL="2286000" lvl="4" indent="-317500" algn="ctr">
               <a:spcBef>
                 <a:spcPts val="1600"/>
               </a:spcBef>
@@ -1496,7 +1535,7 @@
               <a:buChar char="○"/>
               <a:defRPr/>
             </a:lvl5pPr>
-            <a:lvl6pPr indent="-317500" lvl="5" marL="2743200" algn="ctr">
+            <a:lvl6pPr marL="2743200" lvl="5" indent="-317500" algn="ctr">
               <a:spcBef>
                 <a:spcPts val="1600"/>
               </a:spcBef>
@@ -1507,7 +1546,7 @@
               <a:buChar char="■"/>
               <a:defRPr/>
             </a:lvl6pPr>
-            <a:lvl7pPr indent="-317500" lvl="6" marL="3200400" algn="ctr">
+            <a:lvl7pPr marL="3200400" lvl="6" indent="-317500" algn="ctr">
               <a:spcBef>
                 <a:spcPts val="1600"/>
               </a:spcBef>
@@ -1518,7 +1557,7 @@
               <a:buChar char="●"/>
               <a:defRPr/>
             </a:lvl7pPr>
-            <a:lvl8pPr indent="-317500" lvl="7" marL="3657600" algn="ctr">
+            <a:lvl8pPr marL="3657600" lvl="7" indent="-317500" algn="ctr">
               <a:spcBef>
                 <a:spcPts val="1600"/>
               </a:spcBef>
@@ -1529,7 +1568,7 @@
               <a:buChar char="○"/>
               <a:defRPr/>
             </a:lvl8pPr>
-            <a:lvl9pPr indent="-317500" lvl="8" marL="4114800" algn="ctr">
+            <a:lvl9pPr marL="4114800" lvl="8" indent="-317500" algn="ctr">
               <a:spcBef>
                 <a:spcPts val="1600"/>
               </a:spcBef>
@@ -1541,15 +1580,19 @@
               <a:defRPr/>
             </a:lvl9pPr>
           </a:lstStyle>
-          <a:p/>
+          <a:p>
+            <a:endParaRPr/>
+          </a:p>
         </p:txBody>
       </p:sp>
       <p:sp>
         <p:nvSpPr>
           <p:cNvPr id="47" name="Google Shape;47;p11"/>
-          <p:cNvSpPr txBox="1"/>
+          <p:cNvSpPr txBox="1">
+            <a:spLocks noGrp="1"/>
+          </p:cNvSpPr>
           <p:nvPr>
-            <p:ph idx="12" type="sldNum"/>
+            <p:ph type="sldNum" idx="12"/>
           </p:nvPr>
         </p:nvSpPr>
         <p:spPr>
@@ -1562,7 +1605,7 @@
           </a:prstGeom>
         </p:spPr>
         <p:txBody>
-          <a:bodyPr anchorCtr="0" anchor="ctr" bIns="91425" lIns="91425" spcFirstLastPara="1" rIns="91425" wrap="square" tIns="91425">
+          <a:bodyPr spcFirstLastPara="1" wrap="square" lIns="91425" tIns="91425" rIns="91425" bIns="91425" anchor="ctr" anchorCtr="0">
             <a:noAutofit/>
           </a:bodyPr>
           <a:lstStyle>
@@ -1604,7 +1647,7 @@
             </a:lvl9pPr>
           </a:lstStyle>
           <a:p>
-            <a:pPr indent="0" lvl="0" marL="0" rtl="0" algn="r">
+            <a:pPr marL="0" lvl="0" indent="0" algn="r" rtl="0">
               <a:spcBef>
                 <a:spcPts val="0"/>
               </a:spcBef>
@@ -1615,7 +1658,7 @@
             </a:pPr>
             <a:fld id="{00000000-1234-1234-1234-123412341234}" type="slidenum">
               <a:rPr lang="pt-BR"/>
-              <a:t>‹#›</a:t>
+              <a:t>‹nº›</a:t>
             </a:fld>
             <a:endParaRPr/>
           </a:p>
@@ -1630,11 +1673,11 @@
 </file>
 
 <file path=ppt/slideLayouts/slideLayout11.xml><?xml version="1.0" encoding="utf-8"?>
-<p:sldLayout xmlns:a="http://schemas.openxmlformats.org/drawingml/2006/main" xmlns:r="http://schemas.openxmlformats.org/officeDocument/2006/relationships" xmlns:mc="http://schemas.openxmlformats.org/markup-compatibility/2006" xmlns:mv="urn:schemas-microsoft-com:mac:vml" xmlns:p="http://schemas.openxmlformats.org/presentationml/2006/main" xmlns:c="http://schemas.openxmlformats.org/drawingml/2006/chart" xmlns:dgm="http://schemas.openxmlformats.org/drawingml/2006/diagram" xmlns:o="urn:schemas-microsoft-com:office:office" xmlns:v="urn:schemas-microsoft-com:vml" xmlns:pvml="urn:schemas-microsoft-com:office:powerpoint" xmlns:com="http://schemas.openxmlformats.org/drawingml/2006/compatibility" xmlns:p14="http://schemas.microsoft.com/office/powerpoint/2010/main" xmlns:p15="http://schemas.microsoft.com/office/powerpoint/2012/main" xmlns:ahyp="http://schemas.microsoft.com/office/drawing/2018/hyperlinkcolor" matchingName="Blank" type="blank">
+<p:sldLayout xmlns:a="http://schemas.openxmlformats.org/drawingml/2006/main" xmlns:r="http://schemas.openxmlformats.org/officeDocument/2006/relationships" xmlns:p="http://schemas.openxmlformats.org/presentationml/2006/main" matchingName="Blank" type="blank">
   <p:cSld name="BLANK">
     <p:spTree>
       <p:nvGrpSpPr>
-        <p:cNvPr id="48" name="Shape 48"/>
+        <p:cNvPr id="1" name="Shape 48"/>
         <p:cNvGrpSpPr/>
         <p:nvPr/>
       </p:nvGrpSpPr>
@@ -1649,9 +1692,11 @@
       <p:sp>
         <p:nvSpPr>
           <p:cNvPr id="49" name="Google Shape;49;p12"/>
-          <p:cNvSpPr txBox="1"/>
+          <p:cNvSpPr txBox="1">
+            <a:spLocks noGrp="1"/>
+          </p:cNvSpPr>
           <p:nvPr>
-            <p:ph idx="12" type="sldNum"/>
+            <p:ph type="sldNum" idx="12"/>
           </p:nvPr>
         </p:nvSpPr>
         <p:spPr>
@@ -1664,7 +1709,7 @@
           </a:prstGeom>
         </p:spPr>
         <p:txBody>
-          <a:bodyPr anchorCtr="0" anchor="ctr" bIns="91425" lIns="91425" spcFirstLastPara="1" rIns="91425" wrap="square" tIns="91425">
+          <a:bodyPr spcFirstLastPara="1" wrap="square" lIns="91425" tIns="91425" rIns="91425" bIns="91425" anchor="ctr" anchorCtr="0">
             <a:noAutofit/>
           </a:bodyPr>
           <a:lstStyle>
@@ -1706,7 +1751,7 @@
             </a:lvl9pPr>
           </a:lstStyle>
           <a:p>
-            <a:pPr indent="0" lvl="0" marL="0" rtl="0" algn="r">
+            <a:pPr marL="0" lvl="0" indent="0" algn="r" rtl="0">
               <a:spcBef>
                 <a:spcPts val="0"/>
               </a:spcBef>
@@ -1717,7 +1762,7 @@
             </a:pPr>
             <a:fld id="{00000000-1234-1234-1234-123412341234}" type="slidenum">
               <a:rPr lang="pt-BR"/>
-              <a:t>‹#›</a:t>
+              <a:t>‹nº›</a:t>
             </a:fld>
             <a:endParaRPr/>
           </a:p>
@@ -1732,11 +1777,11 @@
 </file>
 
 <file path=ppt/slideLayouts/slideLayout2.xml><?xml version="1.0" encoding="utf-8"?>
-<p:sldLayout xmlns:a="http://schemas.openxmlformats.org/drawingml/2006/main" xmlns:r="http://schemas.openxmlformats.org/officeDocument/2006/relationships" xmlns:mc="http://schemas.openxmlformats.org/markup-compatibility/2006" xmlns:mv="urn:schemas-microsoft-com:mac:vml" xmlns:p="http://schemas.openxmlformats.org/presentationml/2006/main" xmlns:c="http://schemas.openxmlformats.org/drawingml/2006/chart" xmlns:dgm="http://schemas.openxmlformats.org/drawingml/2006/diagram" xmlns:o="urn:schemas-microsoft-com:office:office" xmlns:v="urn:schemas-microsoft-com:vml" xmlns:pvml="urn:schemas-microsoft-com:office:powerpoint" xmlns:com="http://schemas.openxmlformats.org/drawingml/2006/compatibility" xmlns:p14="http://schemas.microsoft.com/office/powerpoint/2010/main" xmlns:p15="http://schemas.microsoft.com/office/powerpoint/2012/main" xmlns:ahyp="http://schemas.microsoft.com/office/drawing/2018/hyperlinkcolor" matchingName="Section header" type="secHead">
+<p:sldLayout xmlns:a="http://schemas.openxmlformats.org/drawingml/2006/main" xmlns:r="http://schemas.openxmlformats.org/officeDocument/2006/relationships" xmlns:p="http://schemas.openxmlformats.org/presentationml/2006/main" matchingName="Section header" type="secHead">
   <p:cSld name="SECTION_HEADER">
     <p:spTree>
       <p:nvGrpSpPr>
-        <p:cNvPr id="13" name="Shape 13"/>
+        <p:cNvPr id="1" name="Shape 13"/>
         <p:cNvGrpSpPr/>
         <p:nvPr/>
       </p:nvGrpSpPr>
@@ -1751,7 +1796,9 @@
       <p:sp>
         <p:nvSpPr>
           <p:cNvPr id="14" name="Google Shape;14;p3"/>
-          <p:cNvSpPr txBox="1"/>
+          <p:cNvSpPr txBox="1">
+            <a:spLocks noGrp="1"/>
+          </p:cNvSpPr>
           <p:nvPr>
             <p:ph type="title"/>
           </p:nvPr>
@@ -1766,7 +1813,7 @@
           </a:prstGeom>
         </p:spPr>
         <p:txBody>
-          <a:bodyPr anchorCtr="0" anchor="ctr" bIns="91425" lIns="91425" spcFirstLastPara="1" rIns="91425" wrap="square" tIns="91425">
+          <a:bodyPr spcFirstLastPara="1" wrap="square" lIns="91425" tIns="91425" rIns="91425" bIns="91425" anchor="ctr" anchorCtr="0">
             <a:noAutofit/>
           </a:bodyPr>
           <a:lstStyle>
@@ -1870,15 +1917,19 @@
               <a:defRPr sz="3600"/>
             </a:lvl9pPr>
           </a:lstStyle>
-          <a:p/>
+          <a:p>
+            <a:endParaRPr/>
+          </a:p>
         </p:txBody>
       </p:sp>
       <p:sp>
         <p:nvSpPr>
           <p:cNvPr id="15" name="Google Shape;15;p3"/>
-          <p:cNvSpPr txBox="1"/>
+          <p:cNvSpPr txBox="1">
+            <a:spLocks noGrp="1"/>
+          </p:cNvSpPr>
           <p:nvPr>
-            <p:ph idx="12" type="sldNum"/>
+            <p:ph type="sldNum" idx="12"/>
           </p:nvPr>
         </p:nvSpPr>
         <p:spPr>
@@ -1891,7 +1942,7 @@
           </a:prstGeom>
         </p:spPr>
         <p:txBody>
-          <a:bodyPr anchorCtr="0" anchor="ctr" bIns="91425" lIns="91425" spcFirstLastPara="1" rIns="91425" wrap="square" tIns="91425">
+          <a:bodyPr spcFirstLastPara="1" wrap="square" lIns="91425" tIns="91425" rIns="91425" bIns="91425" anchor="ctr" anchorCtr="0">
             <a:noAutofit/>
           </a:bodyPr>
           <a:lstStyle>
@@ -1933,7 +1984,7 @@
             </a:lvl9pPr>
           </a:lstStyle>
           <a:p>
-            <a:pPr indent="0" lvl="0" marL="0" rtl="0" algn="r">
+            <a:pPr marL="0" lvl="0" indent="0" algn="r" rtl="0">
               <a:spcBef>
                 <a:spcPts val="0"/>
               </a:spcBef>
@@ -1944,7 +1995,7 @@
             </a:pPr>
             <a:fld id="{00000000-1234-1234-1234-123412341234}" type="slidenum">
               <a:rPr lang="pt-BR"/>
-              <a:t>‹#›</a:t>
+              <a:t>‹nº›</a:t>
             </a:fld>
             <a:endParaRPr/>
           </a:p>
@@ -1959,11 +2010,11 @@
 </file>
 
 <file path=ppt/slideLayouts/slideLayout3.xml><?xml version="1.0" encoding="utf-8"?>
-<p:sldLayout xmlns:a="http://schemas.openxmlformats.org/drawingml/2006/main" xmlns:r="http://schemas.openxmlformats.org/officeDocument/2006/relationships" xmlns:mc="http://schemas.openxmlformats.org/markup-compatibility/2006" xmlns:mv="urn:schemas-microsoft-com:mac:vml" xmlns:p="http://schemas.openxmlformats.org/presentationml/2006/main" xmlns:c="http://schemas.openxmlformats.org/drawingml/2006/chart" xmlns:dgm="http://schemas.openxmlformats.org/drawingml/2006/diagram" xmlns:o="urn:schemas-microsoft-com:office:office" xmlns:v="urn:schemas-microsoft-com:vml" xmlns:pvml="urn:schemas-microsoft-com:office:powerpoint" xmlns:com="http://schemas.openxmlformats.org/drawingml/2006/compatibility" xmlns:p14="http://schemas.microsoft.com/office/powerpoint/2010/main" xmlns:p15="http://schemas.microsoft.com/office/powerpoint/2012/main" xmlns:ahyp="http://schemas.microsoft.com/office/drawing/2018/hyperlinkcolor" matchingName="Title and body" type="tx">
+<p:sldLayout xmlns:a="http://schemas.openxmlformats.org/drawingml/2006/main" xmlns:r="http://schemas.openxmlformats.org/officeDocument/2006/relationships" xmlns:p="http://schemas.openxmlformats.org/presentationml/2006/main" matchingName="Title and body" type="tx">
   <p:cSld name="TITLE_AND_BODY">
     <p:spTree>
       <p:nvGrpSpPr>
-        <p:cNvPr id="16" name="Shape 16"/>
+        <p:cNvPr id="1" name="Shape 16"/>
         <p:cNvGrpSpPr/>
         <p:nvPr/>
       </p:nvGrpSpPr>
@@ -1978,7 +2029,9 @@
       <p:sp>
         <p:nvSpPr>
           <p:cNvPr id="17" name="Google Shape;17;p4"/>
-          <p:cNvSpPr txBox="1"/>
+          <p:cNvSpPr txBox="1">
+            <a:spLocks noGrp="1"/>
+          </p:cNvSpPr>
           <p:nvPr>
             <p:ph type="title"/>
           </p:nvPr>
@@ -1993,7 +2046,7 @@
           </a:prstGeom>
         </p:spPr>
         <p:txBody>
-          <a:bodyPr anchorCtr="0" anchor="t" bIns="91425" lIns="91425" spcFirstLastPara="1" rIns="91425" wrap="square" tIns="91425">
+          <a:bodyPr spcFirstLastPara="1" wrap="square" lIns="91425" tIns="91425" rIns="91425" bIns="91425" anchor="t" anchorCtr="0">
             <a:noAutofit/>
           </a:bodyPr>
           <a:lstStyle>
@@ -2097,15 +2150,19 @@
               <a:defRPr/>
             </a:lvl9pPr>
           </a:lstStyle>
-          <a:p/>
+          <a:p>
+            <a:endParaRPr/>
+          </a:p>
         </p:txBody>
       </p:sp>
       <p:sp>
         <p:nvSpPr>
           <p:cNvPr id="18" name="Google Shape;18;p4"/>
-          <p:cNvSpPr txBox="1"/>
+          <p:cNvSpPr txBox="1">
+            <a:spLocks noGrp="1"/>
+          </p:cNvSpPr>
           <p:nvPr>
-            <p:ph idx="1" type="body"/>
+            <p:ph type="body" idx="1"/>
           </p:nvPr>
         </p:nvSpPr>
         <p:spPr>
@@ -2118,11 +2175,11 @@
           </a:prstGeom>
         </p:spPr>
         <p:txBody>
-          <a:bodyPr anchorCtr="0" anchor="t" bIns="91425" lIns="91425" spcFirstLastPara="1" rIns="91425" wrap="square" tIns="91425">
+          <a:bodyPr spcFirstLastPara="1" wrap="square" lIns="91425" tIns="91425" rIns="91425" bIns="91425" anchor="t" anchorCtr="0">
             <a:noAutofit/>
           </a:bodyPr>
           <a:lstStyle>
-            <a:lvl1pPr indent="-342900" lvl="0" marL="457200">
+            <a:lvl1pPr marL="457200" lvl="0" indent="-342900">
               <a:spcBef>
                 <a:spcPts val="0"/>
               </a:spcBef>
@@ -2133,7 +2190,7 @@
               <a:buChar char="●"/>
               <a:defRPr/>
             </a:lvl1pPr>
-            <a:lvl2pPr indent="-317500" lvl="1" marL="914400">
+            <a:lvl2pPr marL="914400" lvl="1" indent="-317500">
               <a:spcBef>
                 <a:spcPts val="1600"/>
               </a:spcBef>
@@ -2144,7 +2201,7 @@
               <a:buChar char="○"/>
               <a:defRPr/>
             </a:lvl2pPr>
-            <a:lvl3pPr indent="-317500" lvl="2" marL="1371600">
+            <a:lvl3pPr marL="1371600" lvl="2" indent="-317500">
               <a:spcBef>
                 <a:spcPts val="1600"/>
               </a:spcBef>
@@ -2155,7 +2212,7 @@
               <a:buChar char="■"/>
               <a:defRPr/>
             </a:lvl3pPr>
-            <a:lvl4pPr indent="-317500" lvl="3" marL="1828800">
+            <a:lvl4pPr marL="1828800" lvl="3" indent="-317500">
               <a:spcBef>
                 <a:spcPts val="1600"/>
               </a:spcBef>
@@ -2166,7 +2223,7 @@
               <a:buChar char="●"/>
               <a:defRPr/>
             </a:lvl4pPr>
-            <a:lvl5pPr indent="-317500" lvl="4" marL="2286000">
+            <a:lvl5pPr marL="2286000" lvl="4" indent="-317500">
               <a:spcBef>
                 <a:spcPts val="1600"/>
               </a:spcBef>
@@ -2177,7 +2234,7 @@
               <a:buChar char="○"/>
               <a:defRPr/>
             </a:lvl5pPr>
-            <a:lvl6pPr indent="-317500" lvl="5" marL="2743200">
+            <a:lvl6pPr marL="2743200" lvl="5" indent="-317500">
               <a:spcBef>
                 <a:spcPts val="1600"/>
               </a:spcBef>
@@ -2188,7 +2245,7 @@
               <a:buChar char="■"/>
               <a:defRPr/>
             </a:lvl6pPr>
-            <a:lvl7pPr indent="-317500" lvl="6" marL="3200400">
+            <a:lvl7pPr marL="3200400" lvl="6" indent="-317500">
               <a:spcBef>
                 <a:spcPts val="1600"/>
               </a:spcBef>
@@ -2199,7 +2256,7 @@
               <a:buChar char="●"/>
               <a:defRPr/>
             </a:lvl7pPr>
-            <a:lvl8pPr indent="-317500" lvl="7" marL="3657600">
+            <a:lvl8pPr marL="3657600" lvl="7" indent="-317500">
               <a:spcBef>
                 <a:spcPts val="1600"/>
               </a:spcBef>
@@ -2210,7 +2267,7 @@
               <a:buChar char="○"/>
               <a:defRPr/>
             </a:lvl8pPr>
-            <a:lvl9pPr indent="-317500" lvl="8" marL="4114800">
+            <a:lvl9pPr marL="4114800" lvl="8" indent="-317500">
               <a:spcBef>
                 <a:spcPts val="1600"/>
               </a:spcBef>
@@ -2222,15 +2279,19 @@
               <a:defRPr/>
             </a:lvl9pPr>
           </a:lstStyle>
-          <a:p/>
+          <a:p>
+            <a:endParaRPr/>
+          </a:p>
         </p:txBody>
       </p:sp>
       <p:sp>
         <p:nvSpPr>
           <p:cNvPr id="19" name="Google Shape;19;p4"/>
-          <p:cNvSpPr txBox="1"/>
+          <p:cNvSpPr txBox="1">
+            <a:spLocks noGrp="1"/>
+          </p:cNvSpPr>
           <p:nvPr>
-            <p:ph idx="12" type="sldNum"/>
+            <p:ph type="sldNum" idx="12"/>
           </p:nvPr>
         </p:nvSpPr>
         <p:spPr>
@@ -2243,7 +2304,7 @@
           </a:prstGeom>
         </p:spPr>
         <p:txBody>
-          <a:bodyPr anchorCtr="0" anchor="ctr" bIns="91425" lIns="91425" spcFirstLastPara="1" rIns="91425" wrap="square" tIns="91425">
+          <a:bodyPr spcFirstLastPara="1" wrap="square" lIns="91425" tIns="91425" rIns="91425" bIns="91425" anchor="ctr" anchorCtr="0">
             <a:noAutofit/>
           </a:bodyPr>
           <a:lstStyle>
@@ -2285,7 +2346,7 @@
             </a:lvl9pPr>
           </a:lstStyle>
           <a:p>
-            <a:pPr indent="0" lvl="0" marL="0" rtl="0" algn="r">
+            <a:pPr marL="0" lvl="0" indent="0" algn="r" rtl="0">
               <a:spcBef>
                 <a:spcPts val="0"/>
               </a:spcBef>
@@ -2296,7 +2357,7 @@
             </a:pPr>
             <a:fld id="{00000000-1234-1234-1234-123412341234}" type="slidenum">
               <a:rPr lang="pt-BR"/>
-              <a:t>‹#›</a:t>
+              <a:t>‹nº›</a:t>
             </a:fld>
             <a:endParaRPr/>
           </a:p>
@@ -2311,11 +2372,11 @@
 </file>
 
 <file path=ppt/slideLayouts/slideLayout4.xml><?xml version="1.0" encoding="utf-8"?>
-<p:sldLayout xmlns:a="http://schemas.openxmlformats.org/drawingml/2006/main" xmlns:r="http://schemas.openxmlformats.org/officeDocument/2006/relationships" xmlns:mc="http://schemas.openxmlformats.org/markup-compatibility/2006" xmlns:mv="urn:schemas-microsoft-com:mac:vml" xmlns:p="http://schemas.openxmlformats.org/presentationml/2006/main" xmlns:c="http://schemas.openxmlformats.org/drawingml/2006/chart" xmlns:dgm="http://schemas.openxmlformats.org/drawingml/2006/diagram" xmlns:o="urn:schemas-microsoft-com:office:office" xmlns:v="urn:schemas-microsoft-com:vml" xmlns:pvml="urn:schemas-microsoft-com:office:powerpoint" xmlns:com="http://schemas.openxmlformats.org/drawingml/2006/compatibility" xmlns:p14="http://schemas.microsoft.com/office/powerpoint/2010/main" xmlns:p15="http://schemas.microsoft.com/office/powerpoint/2012/main" xmlns:ahyp="http://schemas.microsoft.com/office/drawing/2018/hyperlinkcolor" matchingName="Title and two columns" type="twoColTx">
+<p:sldLayout xmlns:a="http://schemas.openxmlformats.org/drawingml/2006/main" xmlns:r="http://schemas.openxmlformats.org/officeDocument/2006/relationships" xmlns:p="http://schemas.openxmlformats.org/presentationml/2006/main" matchingName="Title and two columns" type="twoColTx">
   <p:cSld name="TITLE_AND_TWO_COLUMNS">
     <p:spTree>
       <p:nvGrpSpPr>
-        <p:cNvPr id="20" name="Shape 20"/>
+        <p:cNvPr id="1" name="Shape 20"/>
         <p:cNvGrpSpPr/>
         <p:nvPr/>
       </p:nvGrpSpPr>
@@ -2330,7 +2391,9 @@
       <p:sp>
         <p:nvSpPr>
           <p:cNvPr id="21" name="Google Shape;21;p5"/>
-          <p:cNvSpPr txBox="1"/>
+          <p:cNvSpPr txBox="1">
+            <a:spLocks noGrp="1"/>
+          </p:cNvSpPr>
           <p:nvPr>
             <p:ph type="title"/>
           </p:nvPr>
@@ -2345,7 +2408,7 @@
           </a:prstGeom>
         </p:spPr>
         <p:txBody>
-          <a:bodyPr anchorCtr="0" anchor="t" bIns="91425" lIns="91425" spcFirstLastPara="1" rIns="91425" wrap="square" tIns="91425">
+          <a:bodyPr spcFirstLastPara="1" wrap="square" lIns="91425" tIns="91425" rIns="91425" bIns="91425" anchor="t" anchorCtr="0">
             <a:noAutofit/>
           </a:bodyPr>
           <a:lstStyle>
@@ -2449,15 +2512,19 @@
               <a:defRPr/>
             </a:lvl9pPr>
           </a:lstStyle>
-          <a:p/>
+          <a:p>
+            <a:endParaRPr/>
+          </a:p>
         </p:txBody>
       </p:sp>
       <p:sp>
         <p:nvSpPr>
           <p:cNvPr id="22" name="Google Shape;22;p5"/>
-          <p:cNvSpPr txBox="1"/>
+          <p:cNvSpPr txBox="1">
+            <a:spLocks noGrp="1"/>
+          </p:cNvSpPr>
           <p:nvPr>
-            <p:ph idx="1" type="body"/>
+            <p:ph type="body" idx="1"/>
           </p:nvPr>
         </p:nvSpPr>
         <p:spPr>
@@ -2470,11 +2537,11 @@
           </a:prstGeom>
         </p:spPr>
         <p:txBody>
-          <a:bodyPr anchorCtr="0" anchor="t" bIns="91425" lIns="91425" spcFirstLastPara="1" rIns="91425" wrap="square" tIns="91425">
+          <a:bodyPr spcFirstLastPara="1" wrap="square" lIns="91425" tIns="91425" rIns="91425" bIns="91425" anchor="t" anchorCtr="0">
             <a:noAutofit/>
           </a:bodyPr>
           <a:lstStyle>
-            <a:lvl1pPr indent="-317500" lvl="0" marL="457200">
+            <a:lvl1pPr marL="457200" lvl="0" indent="-317500">
               <a:spcBef>
                 <a:spcPts val="0"/>
               </a:spcBef>
@@ -2485,7 +2552,7 @@
               <a:buChar char="●"/>
               <a:defRPr sz="1400"/>
             </a:lvl1pPr>
-            <a:lvl2pPr indent="-304800" lvl="1" marL="914400">
+            <a:lvl2pPr marL="914400" lvl="1" indent="-304800">
               <a:spcBef>
                 <a:spcPts val="1600"/>
               </a:spcBef>
@@ -2496,7 +2563,7 @@
               <a:buChar char="○"/>
               <a:defRPr sz="1200"/>
             </a:lvl2pPr>
-            <a:lvl3pPr indent="-304800" lvl="2" marL="1371600">
+            <a:lvl3pPr marL="1371600" lvl="2" indent="-304800">
               <a:spcBef>
                 <a:spcPts val="1600"/>
               </a:spcBef>
@@ -2507,7 +2574,7 @@
               <a:buChar char="■"/>
               <a:defRPr sz="1200"/>
             </a:lvl3pPr>
-            <a:lvl4pPr indent="-304800" lvl="3" marL="1828800">
+            <a:lvl4pPr marL="1828800" lvl="3" indent="-304800">
               <a:spcBef>
                 <a:spcPts val="1600"/>
               </a:spcBef>
@@ -2518,7 +2585,7 @@
               <a:buChar char="●"/>
               <a:defRPr sz="1200"/>
             </a:lvl4pPr>
-            <a:lvl5pPr indent="-304800" lvl="4" marL="2286000">
+            <a:lvl5pPr marL="2286000" lvl="4" indent="-304800">
               <a:spcBef>
                 <a:spcPts val="1600"/>
               </a:spcBef>
@@ -2529,7 +2596,7 @@
               <a:buChar char="○"/>
               <a:defRPr sz="1200"/>
             </a:lvl5pPr>
-            <a:lvl6pPr indent="-304800" lvl="5" marL="2743200">
+            <a:lvl6pPr marL="2743200" lvl="5" indent="-304800">
               <a:spcBef>
                 <a:spcPts val="1600"/>
               </a:spcBef>
@@ -2540,7 +2607,7 @@
               <a:buChar char="■"/>
               <a:defRPr sz="1200"/>
             </a:lvl6pPr>
-            <a:lvl7pPr indent="-304800" lvl="6" marL="3200400">
+            <a:lvl7pPr marL="3200400" lvl="6" indent="-304800">
               <a:spcBef>
                 <a:spcPts val="1600"/>
               </a:spcBef>
@@ -2551,7 +2618,7 @@
               <a:buChar char="●"/>
               <a:defRPr sz="1200"/>
             </a:lvl7pPr>
-            <a:lvl8pPr indent="-304800" lvl="7" marL="3657600">
+            <a:lvl8pPr marL="3657600" lvl="7" indent="-304800">
               <a:spcBef>
                 <a:spcPts val="1600"/>
               </a:spcBef>
@@ -2562,7 +2629,7 @@
               <a:buChar char="○"/>
               <a:defRPr sz="1200"/>
             </a:lvl8pPr>
-            <a:lvl9pPr indent="-304800" lvl="8" marL="4114800">
+            <a:lvl9pPr marL="4114800" lvl="8" indent="-304800">
               <a:spcBef>
                 <a:spcPts val="1600"/>
               </a:spcBef>
@@ -2574,15 +2641,19 @@
               <a:defRPr sz="1200"/>
             </a:lvl9pPr>
           </a:lstStyle>
-          <a:p/>
+          <a:p>
+            <a:endParaRPr/>
+          </a:p>
         </p:txBody>
       </p:sp>
       <p:sp>
         <p:nvSpPr>
           <p:cNvPr id="23" name="Google Shape;23;p5"/>
-          <p:cNvSpPr txBox="1"/>
+          <p:cNvSpPr txBox="1">
+            <a:spLocks noGrp="1"/>
+          </p:cNvSpPr>
           <p:nvPr>
-            <p:ph idx="2" type="body"/>
+            <p:ph type="body" idx="2"/>
           </p:nvPr>
         </p:nvSpPr>
         <p:spPr>
@@ -2595,11 +2666,11 @@
           </a:prstGeom>
         </p:spPr>
         <p:txBody>
-          <a:bodyPr anchorCtr="0" anchor="t" bIns="91425" lIns="91425" spcFirstLastPara="1" rIns="91425" wrap="square" tIns="91425">
+          <a:bodyPr spcFirstLastPara="1" wrap="square" lIns="91425" tIns="91425" rIns="91425" bIns="91425" anchor="t" anchorCtr="0">
             <a:noAutofit/>
           </a:bodyPr>
           <a:lstStyle>
-            <a:lvl1pPr indent="-317500" lvl="0" marL="457200">
+            <a:lvl1pPr marL="457200" lvl="0" indent="-317500">
               <a:spcBef>
                 <a:spcPts val="0"/>
               </a:spcBef>
@@ -2610,7 +2681,7 @@
               <a:buChar char="●"/>
               <a:defRPr sz="1400"/>
             </a:lvl1pPr>
-            <a:lvl2pPr indent="-304800" lvl="1" marL="914400">
+            <a:lvl2pPr marL="914400" lvl="1" indent="-304800">
               <a:spcBef>
                 <a:spcPts val="1600"/>
               </a:spcBef>
@@ -2621,7 +2692,7 @@
               <a:buChar char="○"/>
               <a:defRPr sz="1200"/>
             </a:lvl2pPr>
-            <a:lvl3pPr indent="-304800" lvl="2" marL="1371600">
+            <a:lvl3pPr marL="1371600" lvl="2" indent="-304800">
               <a:spcBef>
                 <a:spcPts val="1600"/>
               </a:spcBef>
@@ -2632,7 +2703,7 @@
               <a:buChar char="■"/>
               <a:defRPr sz="1200"/>
             </a:lvl3pPr>
-            <a:lvl4pPr indent="-304800" lvl="3" marL="1828800">
+            <a:lvl4pPr marL="1828800" lvl="3" indent="-304800">
               <a:spcBef>
                 <a:spcPts val="1600"/>
               </a:spcBef>
@@ -2643,7 +2714,7 @@
               <a:buChar char="●"/>
               <a:defRPr sz="1200"/>
             </a:lvl4pPr>
-            <a:lvl5pPr indent="-304800" lvl="4" marL="2286000">
+            <a:lvl5pPr marL="2286000" lvl="4" indent="-304800">
               <a:spcBef>
                 <a:spcPts val="1600"/>
               </a:spcBef>
@@ -2654,7 +2725,7 @@
               <a:buChar char="○"/>
               <a:defRPr sz="1200"/>
             </a:lvl5pPr>
-            <a:lvl6pPr indent="-304800" lvl="5" marL="2743200">
+            <a:lvl6pPr marL="2743200" lvl="5" indent="-304800">
               <a:spcBef>
                 <a:spcPts val="1600"/>
               </a:spcBef>
@@ -2665,7 +2736,7 @@
               <a:buChar char="■"/>
               <a:defRPr sz="1200"/>
             </a:lvl6pPr>
-            <a:lvl7pPr indent="-304800" lvl="6" marL="3200400">
+            <a:lvl7pPr marL="3200400" lvl="6" indent="-304800">
               <a:spcBef>
                 <a:spcPts val="1600"/>
               </a:spcBef>
@@ -2676,7 +2747,7 @@
               <a:buChar char="●"/>
               <a:defRPr sz="1200"/>
             </a:lvl7pPr>
-            <a:lvl8pPr indent="-304800" lvl="7" marL="3657600">
+            <a:lvl8pPr marL="3657600" lvl="7" indent="-304800">
               <a:spcBef>
                 <a:spcPts val="1600"/>
               </a:spcBef>
@@ -2687,7 +2758,7 @@
               <a:buChar char="○"/>
               <a:defRPr sz="1200"/>
             </a:lvl8pPr>
-            <a:lvl9pPr indent="-304800" lvl="8" marL="4114800">
+            <a:lvl9pPr marL="4114800" lvl="8" indent="-304800">
               <a:spcBef>
                 <a:spcPts val="1600"/>
               </a:spcBef>
@@ -2699,15 +2770,19 @@
               <a:defRPr sz="1200"/>
             </a:lvl9pPr>
           </a:lstStyle>
-          <a:p/>
+          <a:p>
+            <a:endParaRPr/>
+          </a:p>
         </p:txBody>
       </p:sp>
       <p:sp>
         <p:nvSpPr>
           <p:cNvPr id="24" name="Google Shape;24;p5"/>
-          <p:cNvSpPr txBox="1"/>
+          <p:cNvSpPr txBox="1">
+            <a:spLocks noGrp="1"/>
+          </p:cNvSpPr>
           <p:nvPr>
-            <p:ph idx="12" type="sldNum"/>
+            <p:ph type="sldNum" idx="12"/>
           </p:nvPr>
         </p:nvSpPr>
         <p:spPr>
@@ -2720,7 +2795,7 @@
           </a:prstGeom>
         </p:spPr>
         <p:txBody>
-          <a:bodyPr anchorCtr="0" anchor="ctr" bIns="91425" lIns="91425" spcFirstLastPara="1" rIns="91425" wrap="square" tIns="91425">
+          <a:bodyPr spcFirstLastPara="1" wrap="square" lIns="91425" tIns="91425" rIns="91425" bIns="91425" anchor="ctr" anchorCtr="0">
             <a:noAutofit/>
           </a:bodyPr>
           <a:lstStyle>
@@ -2762,7 +2837,7 @@
             </a:lvl9pPr>
           </a:lstStyle>
           <a:p>
-            <a:pPr indent="0" lvl="0" marL="0" rtl="0" algn="r">
+            <a:pPr marL="0" lvl="0" indent="0" algn="r" rtl="0">
               <a:spcBef>
                 <a:spcPts val="0"/>
               </a:spcBef>
@@ -2773,7 +2848,7 @@
             </a:pPr>
             <a:fld id="{00000000-1234-1234-1234-123412341234}" type="slidenum">
               <a:rPr lang="pt-BR"/>
-              <a:t>‹#›</a:t>
+              <a:t>‹nº›</a:t>
             </a:fld>
             <a:endParaRPr/>
           </a:p>
@@ -2788,11 +2863,11 @@
 </file>
 
 <file path=ppt/slideLayouts/slideLayout5.xml><?xml version="1.0" encoding="utf-8"?>
-<p:sldLayout xmlns:a="http://schemas.openxmlformats.org/drawingml/2006/main" xmlns:r="http://schemas.openxmlformats.org/officeDocument/2006/relationships" xmlns:mc="http://schemas.openxmlformats.org/markup-compatibility/2006" xmlns:mv="urn:schemas-microsoft-com:mac:vml" xmlns:p="http://schemas.openxmlformats.org/presentationml/2006/main" xmlns:c="http://schemas.openxmlformats.org/drawingml/2006/chart" xmlns:dgm="http://schemas.openxmlformats.org/drawingml/2006/diagram" xmlns:o="urn:schemas-microsoft-com:office:office" xmlns:v="urn:schemas-microsoft-com:vml" xmlns:pvml="urn:schemas-microsoft-com:office:powerpoint" xmlns:com="http://schemas.openxmlformats.org/drawingml/2006/compatibility" xmlns:p14="http://schemas.microsoft.com/office/powerpoint/2010/main" xmlns:p15="http://schemas.microsoft.com/office/powerpoint/2012/main" xmlns:ahyp="http://schemas.microsoft.com/office/drawing/2018/hyperlinkcolor" matchingName="Title only" type="titleOnly">
+<p:sldLayout xmlns:a="http://schemas.openxmlformats.org/drawingml/2006/main" xmlns:r="http://schemas.openxmlformats.org/officeDocument/2006/relationships" xmlns:p="http://schemas.openxmlformats.org/presentationml/2006/main" matchingName="Title only" type="titleOnly">
   <p:cSld name="TITLE_ONLY">
     <p:spTree>
       <p:nvGrpSpPr>
-        <p:cNvPr id="25" name="Shape 25"/>
+        <p:cNvPr id="1" name="Shape 25"/>
         <p:cNvGrpSpPr/>
         <p:nvPr/>
       </p:nvGrpSpPr>
@@ -2807,7 +2882,9 @@
       <p:sp>
         <p:nvSpPr>
           <p:cNvPr id="26" name="Google Shape;26;p6"/>
-          <p:cNvSpPr txBox="1"/>
+          <p:cNvSpPr txBox="1">
+            <a:spLocks noGrp="1"/>
+          </p:cNvSpPr>
           <p:nvPr>
             <p:ph type="title"/>
           </p:nvPr>
@@ -2822,7 +2899,7 @@
           </a:prstGeom>
         </p:spPr>
         <p:txBody>
-          <a:bodyPr anchorCtr="0" anchor="t" bIns="91425" lIns="91425" spcFirstLastPara="1" rIns="91425" wrap="square" tIns="91425">
+          <a:bodyPr spcFirstLastPara="1" wrap="square" lIns="91425" tIns="91425" rIns="91425" bIns="91425" anchor="t" anchorCtr="0">
             <a:noAutofit/>
           </a:bodyPr>
           <a:lstStyle>
@@ -2926,15 +3003,19 @@
               <a:defRPr/>
             </a:lvl9pPr>
           </a:lstStyle>
-          <a:p/>
+          <a:p>
+            <a:endParaRPr/>
+          </a:p>
         </p:txBody>
       </p:sp>
       <p:sp>
         <p:nvSpPr>
           <p:cNvPr id="27" name="Google Shape;27;p6"/>
-          <p:cNvSpPr txBox="1"/>
+          <p:cNvSpPr txBox="1">
+            <a:spLocks noGrp="1"/>
+          </p:cNvSpPr>
           <p:nvPr>
-            <p:ph idx="12" type="sldNum"/>
+            <p:ph type="sldNum" idx="12"/>
           </p:nvPr>
         </p:nvSpPr>
         <p:spPr>
@@ -2947,7 +3028,7 @@
           </a:prstGeom>
         </p:spPr>
         <p:txBody>
-          <a:bodyPr anchorCtr="0" anchor="ctr" bIns="91425" lIns="91425" spcFirstLastPara="1" rIns="91425" wrap="square" tIns="91425">
+          <a:bodyPr spcFirstLastPara="1" wrap="square" lIns="91425" tIns="91425" rIns="91425" bIns="91425" anchor="ctr" anchorCtr="0">
             <a:noAutofit/>
           </a:bodyPr>
           <a:lstStyle>
@@ -2989,7 +3070,7 @@
             </a:lvl9pPr>
           </a:lstStyle>
           <a:p>
-            <a:pPr indent="0" lvl="0" marL="0" rtl="0" algn="r">
+            <a:pPr marL="0" lvl="0" indent="0" algn="r" rtl="0">
               <a:spcBef>
                 <a:spcPts val="0"/>
               </a:spcBef>
@@ -3000,7 +3081,7 @@
             </a:pPr>
             <a:fld id="{00000000-1234-1234-1234-123412341234}" type="slidenum">
               <a:rPr lang="pt-BR"/>
-              <a:t>‹#›</a:t>
+              <a:t>‹nº›</a:t>
             </a:fld>
             <a:endParaRPr/>
           </a:p>
@@ -3015,11 +3096,11 @@
 </file>
 
 <file path=ppt/slideLayouts/slideLayout6.xml><?xml version="1.0" encoding="utf-8"?>
-<p:sldLayout xmlns:a="http://schemas.openxmlformats.org/drawingml/2006/main" xmlns:r="http://schemas.openxmlformats.org/officeDocument/2006/relationships" xmlns:mc="http://schemas.openxmlformats.org/markup-compatibility/2006" xmlns:mv="urn:schemas-microsoft-com:mac:vml" xmlns:p="http://schemas.openxmlformats.org/presentationml/2006/main" xmlns:c="http://schemas.openxmlformats.org/drawingml/2006/chart" xmlns:dgm="http://schemas.openxmlformats.org/drawingml/2006/diagram" xmlns:o="urn:schemas-microsoft-com:office:office" xmlns:v="urn:schemas-microsoft-com:vml" xmlns:pvml="urn:schemas-microsoft-com:office:powerpoint" xmlns:com="http://schemas.openxmlformats.org/drawingml/2006/compatibility" xmlns:p14="http://schemas.microsoft.com/office/powerpoint/2010/main" xmlns:p15="http://schemas.microsoft.com/office/powerpoint/2012/main" xmlns:ahyp="http://schemas.microsoft.com/office/drawing/2018/hyperlinkcolor" matchingName="One column text">
+<p:sldLayout xmlns:a="http://schemas.openxmlformats.org/drawingml/2006/main" xmlns:r="http://schemas.openxmlformats.org/officeDocument/2006/relationships" xmlns:p="http://schemas.openxmlformats.org/presentationml/2006/main" matchingName="One column text">
   <p:cSld name="ONE_COLUMN_TEXT">
     <p:spTree>
       <p:nvGrpSpPr>
-        <p:cNvPr id="28" name="Shape 28"/>
+        <p:cNvPr id="1" name="Shape 28"/>
         <p:cNvGrpSpPr/>
         <p:nvPr/>
       </p:nvGrpSpPr>
@@ -3034,7 +3115,9 @@
       <p:sp>
         <p:nvSpPr>
           <p:cNvPr id="29" name="Google Shape;29;p7"/>
-          <p:cNvSpPr txBox="1"/>
+          <p:cNvSpPr txBox="1">
+            <a:spLocks noGrp="1"/>
+          </p:cNvSpPr>
           <p:nvPr>
             <p:ph type="title"/>
           </p:nvPr>
@@ -3049,7 +3132,7 @@
           </a:prstGeom>
         </p:spPr>
         <p:txBody>
-          <a:bodyPr anchorCtr="0" anchor="b" bIns="91425" lIns="91425" spcFirstLastPara="1" rIns="91425" wrap="square" tIns="91425">
+          <a:bodyPr spcFirstLastPara="1" wrap="square" lIns="91425" tIns="91425" rIns="91425" bIns="91425" anchor="b" anchorCtr="0">
             <a:noAutofit/>
           </a:bodyPr>
           <a:lstStyle>
@@ -3153,15 +3236,19 @@
               <a:defRPr sz="2400"/>
             </a:lvl9pPr>
           </a:lstStyle>
-          <a:p/>
+          <a:p>
+            <a:endParaRPr/>
+          </a:p>
         </p:txBody>
       </p:sp>
       <p:sp>
         <p:nvSpPr>
           <p:cNvPr id="30" name="Google Shape;30;p7"/>
-          <p:cNvSpPr txBox="1"/>
+          <p:cNvSpPr txBox="1">
+            <a:spLocks noGrp="1"/>
+          </p:cNvSpPr>
           <p:nvPr>
-            <p:ph idx="1" type="body"/>
+            <p:ph type="body" idx="1"/>
           </p:nvPr>
         </p:nvSpPr>
         <p:spPr>
@@ -3174,11 +3261,11 @@
           </a:prstGeom>
         </p:spPr>
         <p:txBody>
-          <a:bodyPr anchorCtr="0" anchor="t" bIns="91425" lIns="91425" spcFirstLastPara="1" rIns="91425" wrap="square" tIns="91425">
+          <a:bodyPr spcFirstLastPara="1" wrap="square" lIns="91425" tIns="91425" rIns="91425" bIns="91425" anchor="t" anchorCtr="0">
             <a:noAutofit/>
           </a:bodyPr>
           <a:lstStyle>
-            <a:lvl1pPr indent="-304800" lvl="0" marL="457200">
+            <a:lvl1pPr marL="457200" lvl="0" indent="-304800">
               <a:spcBef>
                 <a:spcPts val="0"/>
               </a:spcBef>
@@ -3189,7 +3276,7 @@
               <a:buChar char="●"/>
               <a:defRPr sz="1200"/>
             </a:lvl1pPr>
-            <a:lvl2pPr indent="-304800" lvl="1" marL="914400">
+            <a:lvl2pPr marL="914400" lvl="1" indent="-304800">
               <a:spcBef>
                 <a:spcPts val="1600"/>
               </a:spcBef>
@@ -3200,7 +3287,7 @@
               <a:buChar char="○"/>
               <a:defRPr sz="1200"/>
             </a:lvl2pPr>
-            <a:lvl3pPr indent="-304800" lvl="2" marL="1371600">
+            <a:lvl3pPr marL="1371600" lvl="2" indent="-304800">
               <a:spcBef>
                 <a:spcPts val="1600"/>
               </a:spcBef>
@@ -3211,7 +3298,7 @@
               <a:buChar char="■"/>
               <a:defRPr sz="1200"/>
             </a:lvl3pPr>
-            <a:lvl4pPr indent="-304800" lvl="3" marL="1828800">
+            <a:lvl4pPr marL="1828800" lvl="3" indent="-304800">
               <a:spcBef>
                 <a:spcPts val="1600"/>
               </a:spcBef>
@@ -3222,7 +3309,7 @@
               <a:buChar char="●"/>
               <a:defRPr sz="1200"/>
             </a:lvl4pPr>
-            <a:lvl5pPr indent="-304800" lvl="4" marL="2286000">
+            <a:lvl5pPr marL="2286000" lvl="4" indent="-304800">
               <a:spcBef>
                 <a:spcPts val="1600"/>
               </a:spcBef>
@@ -3233,7 +3320,7 @@
               <a:buChar char="○"/>
               <a:defRPr sz="1200"/>
             </a:lvl5pPr>
-            <a:lvl6pPr indent="-304800" lvl="5" marL="2743200">
+            <a:lvl6pPr marL="2743200" lvl="5" indent="-304800">
               <a:spcBef>
                 <a:spcPts val="1600"/>
               </a:spcBef>
@@ -3244,7 +3331,7 @@
               <a:buChar char="■"/>
               <a:defRPr sz="1200"/>
             </a:lvl6pPr>
-            <a:lvl7pPr indent="-304800" lvl="6" marL="3200400">
+            <a:lvl7pPr marL="3200400" lvl="6" indent="-304800">
               <a:spcBef>
                 <a:spcPts val="1600"/>
               </a:spcBef>
@@ -3255,7 +3342,7 @@
               <a:buChar char="●"/>
               <a:defRPr sz="1200"/>
             </a:lvl7pPr>
-            <a:lvl8pPr indent="-304800" lvl="7" marL="3657600">
+            <a:lvl8pPr marL="3657600" lvl="7" indent="-304800">
               <a:spcBef>
                 <a:spcPts val="1600"/>
               </a:spcBef>
@@ -3266,7 +3353,7 @@
               <a:buChar char="○"/>
               <a:defRPr sz="1200"/>
             </a:lvl8pPr>
-            <a:lvl9pPr indent="-304800" lvl="8" marL="4114800">
+            <a:lvl9pPr marL="4114800" lvl="8" indent="-304800">
               <a:spcBef>
                 <a:spcPts val="1600"/>
               </a:spcBef>
@@ -3278,15 +3365,19 @@
               <a:defRPr sz="1200"/>
             </a:lvl9pPr>
           </a:lstStyle>
-          <a:p/>
+          <a:p>
+            <a:endParaRPr/>
+          </a:p>
         </p:txBody>
       </p:sp>
       <p:sp>
         <p:nvSpPr>
           <p:cNvPr id="31" name="Google Shape;31;p7"/>
-          <p:cNvSpPr txBox="1"/>
+          <p:cNvSpPr txBox="1">
+            <a:spLocks noGrp="1"/>
+          </p:cNvSpPr>
           <p:nvPr>
-            <p:ph idx="12" type="sldNum"/>
+            <p:ph type="sldNum" idx="12"/>
           </p:nvPr>
         </p:nvSpPr>
         <p:spPr>
@@ -3299,7 +3390,7 @@
           </a:prstGeom>
         </p:spPr>
         <p:txBody>
-          <a:bodyPr anchorCtr="0" anchor="ctr" bIns="91425" lIns="91425" spcFirstLastPara="1" rIns="91425" wrap="square" tIns="91425">
+          <a:bodyPr spcFirstLastPara="1" wrap="square" lIns="91425" tIns="91425" rIns="91425" bIns="91425" anchor="ctr" anchorCtr="0">
             <a:noAutofit/>
           </a:bodyPr>
           <a:lstStyle>
@@ -3341,7 +3432,7 @@
             </a:lvl9pPr>
           </a:lstStyle>
           <a:p>
-            <a:pPr indent="0" lvl="0" marL="0" rtl="0" algn="r">
+            <a:pPr marL="0" lvl="0" indent="0" algn="r" rtl="0">
               <a:spcBef>
                 <a:spcPts val="0"/>
               </a:spcBef>
@@ -3352,7 +3443,7 @@
             </a:pPr>
             <a:fld id="{00000000-1234-1234-1234-123412341234}" type="slidenum">
               <a:rPr lang="pt-BR"/>
-              <a:t>‹#›</a:t>
+              <a:t>‹nº›</a:t>
             </a:fld>
             <a:endParaRPr/>
           </a:p>
@@ -3367,11 +3458,11 @@
 </file>
 
 <file path=ppt/slideLayouts/slideLayout7.xml><?xml version="1.0" encoding="utf-8"?>
-<p:sldLayout xmlns:a="http://schemas.openxmlformats.org/drawingml/2006/main" xmlns:r="http://schemas.openxmlformats.org/officeDocument/2006/relationships" xmlns:mc="http://schemas.openxmlformats.org/markup-compatibility/2006" xmlns:mv="urn:schemas-microsoft-com:mac:vml" xmlns:p="http://schemas.openxmlformats.org/presentationml/2006/main" xmlns:c="http://schemas.openxmlformats.org/drawingml/2006/chart" xmlns:dgm="http://schemas.openxmlformats.org/drawingml/2006/diagram" xmlns:o="urn:schemas-microsoft-com:office:office" xmlns:v="urn:schemas-microsoft-com:vml" xmlns:pvml="urn:schemas-microsoft-com:office:powerpoint" xmlns:com="http://schemas.openxmlformats.org/drawingml/2006/compatibility" xmlns:p14="http://schemas.microsoft.com/office/powerpoint/2010/main" xmlns:p15="http://schemas.microsoft.com/office/powerpoint/2012/main" xmlns:ahyp="http://schemas.microsoft.com/office/drawing/2018/hyperlinkcolor" matchingName="Main point">
+<p:sldLayout xmlns:a="http://schemas.openxmlformats.org/drawingml/2006/main" xmlns:r="http://schemas.openxmlformats.org/officeDocument/2006/relationships" xmlns:p="http://schemas.openxmlformats.org/presentationml/2006/main" matchingName="Main point">
   <p:cSld name="MAIN_POINT">
     <p:spTree>
       <p:nvGrpSpPr>
-        <p:cNvPr id="32" name="Shape 32"/>
+        <p:cNvPr id="1" name="Shape 32"/>
         <p:cNvGrpSpPr/>
         <p:nvPr/>
       </p:nvGrpSpPr>
@@ -3386,7 +3477,9 @@
       <p:sp>
         <p:nvSpPr>
           <p:cNvPr id="33" name="Google Shape;33;p8"/>
-          <p:cNvSpPr txBox="1"/>
+          <p:cNvSpPr txBox="1">
+            <a:spLocks noGrp="1"/>
+          </p:cNvSpPr>
           <p:nvPr>
             <p:ph type="title"/>
           </p:nvPr>
@@ -3401,7 +3494,7 @@
           </a:prstGeom>
         </p:spPr>
         <p:txBody>
-          <a:bodyPr anchorCtr="0" anchor="ctr" bIns="91425" lIns="91425" spcFirstLastPara="1" rIns="91425" wrap="square" tIns="91425">
+          <a:bodyPr spcFirstLastPara="1" wrap="square" lIns="91425" tIns="91425" rIns="91425" bIns="91425" anchor="ctr" anchorCtr="0">
             <a:noAutofit/>
           </a:bodyPr>
           <a:lstStyle>
@@ -3505,15 +3598,19 @@
               <a:defRPr sz="4800"/>
             </a:lvl9pPr>
           </a:lstStyle>
-          <a:p/>
+          <a:p>
+            <a:endParaRPr/>
+          </a:p>
         </p:txBody>
       </p:sp>
       <p:sp>
         <p:nvSpPr>
           <p:cNvPr id="34" name="Google Shape;34;p8"/>
-          <p:cNvSpPr txBox="1"/>
+          <p:cNvSpPr txBox="1">
+            <a:spLocks noGrp="1"/>
+          </p:cNvSpPr>
           <p:nvPr>
-            <p:ph idx="12" type="sldNum"/>
+            <p:ph type="sldNum" idx="12"/>
           </p:nvPr>
         </p:nvSpPr>
         <p:spPr>
@@ -3526,7 +3623,7 @@
           </a:prstGeom>
         </p:spPr>
         <p:txBody>
-          <a:bodyPr anchorCtr="0" anchor="ctr" bIns="91425" lIns="91425" spcFirstLastPara="1" rIns="91425" wrap="square" tIns="91425">
+          <a:bodyPr spcFirstLastPara="1" wrap="square" lIns="91425" tIns="91425" rIns="91425" bIns="91425" anchor="ctr" anchorCtr="0">
             <a:noAutofit/>
           </a:bodyPr>
           <a:lstStyle>
@@ -3568,7 +3665,7 @@
             </a:lvl9pPr>
           </a:lstStyle>
           <a:p>
-            <a:pPr indent="0" lvl="0" marL="0" rtl="0" algn="r">
+            <a:pPr marL="0" lvl="0" indent="0" algn="r" rtl="0">
               <a:spcBef>
                 <a:spcPts val="0"/>
               </a:spcBef>
@@ -3579,7 +3676,7 @@
             </a:pPr>
             <a:fld id="{00000000-1234-1234-1234-123412341234}" type="slidenum">
               <a:rPr lang="pt-BR"/>
-              <a:t>‹#›</a:t>
+              <a:t>‹nº›</a:t>
             </a:fld>
             <a:endParaRPr/>
           </a:p>
@@ -3594,11 +3691,11 @@
 </file>
 
 <file path=ppt/slideLayouts/slideLayout8.xml><?xml version="1.0" encoding="utf-8"?>
-<p:sldLayout xmlns:a="http://schemas.openxmlformats.org/drawingml/2006/main" xmlns:r="http://schemas.openxmlformats.org/officeDocument/2006/relationships" xmlns:mc="http://schemas.openxmlformats.org/markup-compatibility/2006" xmlns:mv="urn:schemas-microsoft-com:mac:vml" xmlns:p="http://schemas.openxmlformats.org/presentationml/2006/main" xmlns:c="http://schemas.openxmlformats.org/drawingml/2006/chart" xmlns:dgm="http://schemas.openxmlformats.org/drawingml/2006/diagram" xmlns:o="urn:schemas-microsoft-com:office:office" xmlns:v="urn:schemas-microsoft-com:vml" xmlns:pvml="urn:schemas-microsoft-com:office:powerpoint" xmlns:com="http://schemas.openxmlformats.org/drawingml/2006/compatibility" xmlns:p14="http://schemas.microsoft.com/office/powerpoint/2010/main" xmlns:p15="http://schemas.microsoft.com/office/powerpoint/2012/main" xmlns:ahyp="http://schemas.microsoft.com/office/drawing/2018/hyperlinkcolor" matchingName="Section title and description">
+<p:sldLayout xmlns:a="http://schemas.openxmlformats.org/drawingml/2006/main" xmlns:r="http://schemas.openxmlformats.org/officeDocument/2006/relationships" xmlns:p="http://schemas.openxmlformats.org/presentationml/2006/main" matchingName="Section title and description">
   <p:cSld name="SECTION_TITLE_AND_DESCRIPTION">
     <p:spTree>
       <p:nvGrpSpPr>
-        <p:cNvPr id="35" name="Shape 35"/>
+        <p:cNvPr id="1" name="Shape 35"/>
         <p:cNvGrpSpPr/>
         <p:nvPr/>
       </p:nvGrpSpPr>
@@ -3632,12 +3729,12 @@
           </a:ln>
         </p:spPr>
         <p:txBody>
-          <a:bodyPr anchorCtr="0" anchor="ctr" bIns="91425" lIns="91425" spcFirstLastPara="1" rIns="91425" wrap="square" tIns="91425">
+          <a:bodyPr spcFirstLastPara="1" wrap="square" lIns="91425" tIns="91425" rIns="91425" bIns="91425" anchor="ctr" anchorCtr="0">
             <a:noAutofit/>
           </a:bodyPr>
           <a:lstStyle/>
           <a:p>
-            <a:pPr indent="0" lvl="0" marL="0" rtl="0" algn="l">
+            <a:pPr marL="0" lvl="0" indent="0" algn="l" rtl="0">
               <a:spcBef>
                 <a:spcPts val="0"/>
               </a:spcBef>
@@ -3646,9 +3743,6 @@
               </a:spcAft>
               <a:buNone/>
             </a:pPr>
-            <a:r>
-              <a:t/>
-            </a:r>
             <a:endParaRPr/>
           </a:p>
         </p:txBody>
@@ -3656,7 +3750,9 @@
       <p:sp>
         <p:nvSpPr>
           <p:cNvPr id="37" name="Google Shape;37;p9"/>
-          <p:cNvSpPr txBox="1"/>
+          <p:cNvSpPr txBox="1">
+            <a:spLocks noGrp="1"/>
+          </p:cNvSpPr>
           <p:nvPr>
             <p:ph type="title"/>
           </p:nvPr>
@@ -3671,7 +3767,7 @@
           </a:prstGeom>
         </p:spPr>
         <p:txBody>
-          <a:bodyPr anchorCtr="0" anchor="b" bIns="91425" lIns="91425" spcFirstLastPara="1" rIns="91425" wrap="square" tIns="91425">
+          <a:bodyPr spcFirstLastPara="1" wrap="square" lIns="91425" tIns="91425" rIns="91425" bIns="91425" anchor="b" anchorCtr="0">
             <a:noAutofit/>
           </a:bodyPr>
           <a:lstStyle>
@@ -3775,15 +3871,19 @@
               <a:defRPr sz="4200"/>
             </a:lvl9pPr>
           </a:lstStyle>
-          <a:p/>
+          <a:p>
+            <a:endParaRPr/>
+          </a:p>
         </p:txBody>
       </p:sp>
       <p:sp>
         <p:nvSpPr>
           <p:cNvPr id="38" name="Google Shape;38;p9"/>
-          <p:cNvSpPr txBox="1"/>
+          <p:cNvSpPr txBox="1">
+            <a:spLocks noGrp="1"/>
+          </p:cNvSpPr>
           <p:nvPr>
-            <p:ph idx="1" type="subTitle"/>
+            <p:ph type="subTitle" idx="1"/>
           </p:nvPr>
         </p:nvSpPr>
         <p:spPr>
@@ -3796,7 +3896,7 @@
           </a:prstGeom>
         </p:spPr>
         <p:txBody>
-          <a:bodyPr anchorCtr="0" anchor="t" bIns="91425" lIns="91425" spcFirstLastPara="1" rIns="91425" wrap="square" tIns="91425">
+          <a:bodyPr spcFirstLastPara="1" wrap="square" lIns="91425" tIns="91425" rIns="91425" bIns="91425" anchor="t" anchorCtr="0">
             <a:noAutofit/>
           </a:bodyPr>
           <a:lstStyle>
@@ -3927,15 +4027,19 @@
               <a:defRPr sz="2100"/>
             </a:lvl9pPr>
           </a:lstStyle>
-          <a:p/>
+          <a:p>
+            <a:endParaRPr/>
+          </a:p>
         </p:txBody>
       </p:sp>
       <p:sp>
         <p:nvSpPr>
           <p:cNvPr id="39" name="Google Shape;39;p9"/>
-          <p:cNvSpPr txBox="1"/>
+          <p:cNvSpPr txBox="1">
+            <a:spLocks noGrp="1"/>
+          </p:cNvSpPr>
           <p:nvPr>
-            <p:ph idx="2" type="body"/>
+            <p:ph type="body" idx="2"/>
           </p:nvPr>
         </p:nvSpPr>
         <p:spPr>
@@ -3948,11 +4052,11 @@
           </a:prstGeom>
         </p:spPr>
         <p:txBody>
-          <a:bodyPr anchorCtr="0" anchor="ctr" bIns="91425" lIns="91425" spcFirstLastPara="1" rIns="91425" wrap="square" tIns="91425">
+          <a:bodyPr spcFirstLastPara="1" wrap="square" lIns="91425" tIns="91425" rIns="91425" bIns="91425" anchor="ctr" anchorCtr="0">
             <a:noAutofit/>
           </a:bodyPr>
           <a:lstStyle>
-            <a:lvl1pPr indent="-342900" lvl="0" marL="457200">
+            <a:lvl1pPr marL="457200" lvl="0" indent="-342900">
               <a:spcBef>
                 <a:spcPts val="0"/>
               </a:spcBef>
@@ -3963,7 +4067,7 @@
               <a:buChar char="●"/>
               <a:defRPr/>
             </a:lvl1pPr>
-            <a:lvl2pPr indent="-317500" lvl="1" marL="914400">
+            <a:lvl2pPr marL="914400" lvl="1" indent="-317500">
               <a:spcBef>
                 <a:spcPts val="1600"/>
               </a:spcBef>
@@ -3974,7 +4078,7 @@
               <a:buChar char="○"/>
               <a:defRPr/>
             </a:lvl2pPr>
-            <a:lvl3pPr indent="-317500" lvl="2" marL="1371600">
+            <a:lvl3pPr marL="1371600" lvl="2" indent="-317500">
               <a:spcBef>
                 <a:spcPts val="1600"/>
               </a:spcBef>
@@ -3985,7 +4089,7 @@
               <a:buChar char="■"/>
               <a:defRPr/>
             </a:lvl3pPr>
-            <a:lvl4pPr indent="-317500" lvl="3" marL="1828800">
+            <a:lvl4pPr marL="1828800" lvl="3" indent="-317500">
               <a:spcBef>
                 <a:spcPts val="1600"/>
               </a:spcBef>
@@ -3996,7 +4100,7 @@
               <a:buChar char="●"/>
               <a:defRPr/>
             </a:lvl4pPr>
-            <a:lvl5pPr indent="-317500" lvl="4" marL="2286000">
+            <a:lvl5pPr marL="2286000" lvl="4" indent="-317500">
               <a:spcBef>
                 <a:spcPts val="1600"/>
               </a:spcBef>
@@ -4007,7 +4111,7 @@
               <a:buChar char="○"/>
               <a:defRPr/>
             </a:lvl5pPr>
-            <a:lvl6pPr indent="-317500" lvl="5" marL="2743200">
+            <a:lvl6pPr marL="2743200" lvl="5" indent="-317500">
               <a:spcBef>
                 <a:spcPts val="1600"/>
               </a:spcBef>
@@ -4018,7 +4122,7 @@
               <a:buChar char="■"/>
               <a:defRPr/>
             </a:lvl6pPr>
-            <a:lvl7pPr indent="-317500" lvl="6" marL="3200400">
+            <a:lvl7pPr marL="3200400" lvl="6" indent="-317500">
               <a:spcBef>
                 <a:spcPts val="1600"/>
               </a:spcBef>
@@ -4029,7 +4133,7 @@
               <a:buChar char="●"/>
               <a:defRPr/>
             </a:lvl7pPr>
-            <a:lvl8pPr indent="-317500" lvl="7" marL="3657600">
+            <a:lvl8pPr marL="3657600" lvl="7" indent="-317500">
               <a:spcBef>
                 <a:spcPts val="1600"/>
               </a:spcBef>
@@ -4040,7 +4144,7 @@
               <a:buChar char="○"/>
               <a:defRPr/>
             </a:lvl8pPr>
-            <a:lvl9pPr indent="-317500" lvl="8" marL="4114800">
+            <a:lvl9pPr marL="4114800" lvl="8" indent="-317500">
               <a:spcBef>
                 <a:spcPts val="1600"/>
               </a:spcBef>
@@ -4052,15 +4156,19 @@
               <a:defRPr/>
             </a:lvl9pPr>
           </a:lstStyle>
-          <a:p/>
+          <a:p>
+            <a:endParaRPr/>
+          </a:p>
         </p:txBody>
       </p:sp>
       <p:sp>
         <p:nvSpPr>
           <p:cNvPr id="40" name="Google Shape;40;p9"/>
-          <p:cNvSpPr txBox="1"/>
+          <p:cNvSpPr txBox="1">
+            <a:spLocks noGrp="1"/>
+          </p:cNvSpPr>
           <p:nvPr>
-            <p:ph idx="12" type="sldNum"/>
+            <p:ph type="sldNum" idx="12"/>
           </p:nvPr>
         </p:nvSpPr>
         <p:spPr>
@@ -4073,7 +4181,7 @@
           </a:prstGeom>
         </p:spPr>
         <p:txBody>
-          <a:bodyPr anchorCtr="0" anchor="ctr" bIns="91425" lIns="91425" spcFirstLastPara="1" rIns="91425" wrap="square" tIns="91425">
+          <a:bodyPr spcFirstLastPara="1" wrap="square" lIns="91425" tIns="91425" rIns="91425" bIns="91425" anchor="ctr" anchorCtr="0">
             <a:noAutofit/>
           </a:bodyPr>
           <a:lstStyle>
@@ -4115,7 +4223,7 @@
             </a:lvl9pPr>
           </a:lstStyle>
           <a:p>
-            <a:pPr indent="0" lvl="0" marL="0" rtl="0" algn="r">
+            <a:pPr marL="0" lvl="0" indent="0" algn="r" rtl="0">
               <a:spcBef>
                 <a:spcPts val="0"/>
               </a:spcBef>
@@ -4126,7 +4234,7 @@
             </a:pPr>
             <a:fld id="{00000000-1234-1234-1234-123412341234}" type="slidenum">
               <a:rPr lang="pt-BR"/>
-              <a:t>‹#›</a:t>
+              <a:t>‹nº›</a:t>
             </a:fld>
             <a:endParaRPr/>
           </a:p>
@@ -4141,11 +4249,11 @@
 </file>
 
 <file path=ppt/slideLayouts/slideLayout9.xml><?xml version="1.0" encoding="utf-8"?>
-<p:sldLayout xmlns:a="http://schemas.openxmlformats.org/drawingml/2006/main" xmlns:r="http://schemas.openxmlformats.org/officeDocument/2006/relationships" xmlns:mc="http://schemas.openxmlformats.org/markup-compatibility/2006" xmlns:mv="urn:schemas-microsoft-com:mac:vml" xmlns:p="http://schemas.openxmlformats.org/presentationml/2006/main" xmlns:c="http://schemas.openxmlformats.org/drawingml/2006/chart" xmlns:dgm="http://schemas.openxmlformats.org/drawingml/2006/diagram" xmlns:o="urn:schemas-microsoft-com:office:office" xmlns:v="urn:schemas-microsoft-com:vml" xmlns:pvml="urn:schemas-microsoft-com:office:powerpoint" xmlns:com="http://schemas.openxmlformats.org/drawingml/2006/compatibility" xmlns:p14="http://schemas.microsoft.com/office/powerpoint/2010/main" xmlns:p15="http://schemas.microsoft.com/office/powerpoint/2012/main" xmlns:ahyp="http://schemas.microsoft.com/office/drawing/2018/hyperlinkcolor" matchingName="Caption">
+<p:sldLayout xmlns:a="http://schemas.openxmlformats.org/drawingml/2006/main" xmlns:r="http://schemas.openxmlformats.org/officeDocument/2006/relationships" xmlns:p="http://schemas.openxmlformats.org/presentationml/2006/main" matchingName="Caption">
   <p:cSld name="CAPTION_ONLY">
     <p:spTree>
       <p:nvGrpSpPr>
-        <p:cNvPr id="41" name="Shape 41"/>
+        <p:cNvPr id="1" name="Shape 41"/>
         <p:cNvGrpSpPr/>
         <p:nvPr/>
       </p:nvGrpSpPr>
@@ -4160,9 +4268,11 @@
       <p:sp>
         <p:nvSpPr>
           <p:cNvPr id="42" name="Google Shape;42;p10"/>
-          <p:cNvSpPr txBox="1"/>
+          <p:cNvSpPr txBox="1">
+            <a:spLocks noGrp="1"/>
+          </p:cNvSpPr>
           <p:nvPr>
-            <p:ph idx="1" type="body"/>
+            <p:ph type="body" idx="1"/>
           </p:nvPr>
         </p:nvSpPr>
         <p:spPr>
@@ -4175,11 +4285,11 @@
           </a:prstGeom>
         </p:spPr>
         <p:txBody>
-          <a:bodyPr anchorCtr="0" anchor="ctr" bIns="91425" lIns="91425" spcFirstLastPara="1" rIns="91425" wrap="square" tIns="91425">
+          <a:bodyPr spcFirstLastPara="1" wrap="square" lIns="91425" tIns="91425" rIns="91425" bIns="91425" anchor="ctr" anchorCtr="0">
             <a:noAutofit/>
           </a:bodyPr>
           <a:lstStyle>
-            <a:lvl1pPr indent="-228600" lvl="0" marL="457200">
+            <a:lvl1pPr marL="457200" lvl="0" indent="-228600">
               <a:lnSpc>
                 <a:spcPct val="100000"/>
               </a:lnSpc>
@@ -4194,15 +4304,19 @@
               <a:defRPr/>
             </a:lvl1pPr>
           </a:lstStyle>
-          <a:p/>
+          <a:p>
+            <a:endParaRPr/>
+          </a:p>
         </p:txBody>
       </p:sp>
       <p:sp>
         <p:nvSpPr>
           <p:cNvPr id="43" name="Google Shape;43;p10"/>
-          <p:cNvSpPr txBox="1"/>
+          <p:cNvSpPr txBox="1">
+            <a:spLocks noGrp="1"/>
+          </p:cNvSpPr>
           <p:nvPr>
-            <p:ph idx="12" type="sldNum"/>
+            <p:ph type="sldNum" idx="12"/>
           </p:nvPr>
         </p:nvSpPr>
         <p:spPr>
@@ -4215,7 +4329,7 @@
           </a:prstGeom>
         </p:spPr>
         <p:txBody>
-          <a:bodyPr anchorCtr="0" anchor="ctr" bIns="91425" lIns="91425" spcFirstLastPara="1" rIns="91425" wrap="square" tIns="91425">
+          <a:bodyPr spcFirstLastPara="1" wrap="square" lIns="91425" tIns="91425" rIns="91425" bIns="91425" anchor="ctr" anchorCtr="0">
             <a:noAutofit/>
           </a:bodyPr>
           <a:lstStyle>
@@ -4257,7 +4371,7 @@
             </a:lvl9pPr>
           </a:lstStyle>
           <a:p>
-            <a:pPr indent="0" lvl="0" marL="0" rtl="0" algn="r">
+            <a:pPr marL="0" lvl="0" indent="0" algn="r" rtl="0">
               <a:spcBef>
                 <a:spcPts val="0"/>
               </a:spcBef>
@@ -4268,7 +4382,7 @@
             </a:pPr>
             <a:fld id="{00000000-1234-1234-1234-123412341234}" type="slidenum">
               <a:rPr lang="pt-BR"/>
-              <a:t>‹#›</a:t>
+              <a:t>‹nº›</a:t>
             </a:fld>
             <a:endParaRPr/>
           </a:p>
@@ -4283,18 +4397,19 @@
 </file>
 
 <file path=ppt/slideMasters/slideMaster1.xml><?xml version="1.0" encoding="utf-8"?>
-<p:sldMaster xmlns:a="http://schemas.openxmlformats.org/drawingml/2006/main" xmlns:r="http://schemas.openxmlformats.org/officeDocument/2006/relationships" xmlns:mc="http://schemas.openxmlformats.org/markup-compatibility/2006" xmlns:mv="urn:schemas-microsoft-com:mac:vml" xmlns:p="http://schemas.openxmlformats.org/presentationml/2006/main" xmlns:c="http://schemas.openxmlformats.org/drawingml/2006/chart" xmlns:dgm="http://schemas.openxmlformats.org/drawingml/2006/diagram" xmlns:o="urn:schemas-microsoft-com:office:office" xmlns:v="urn:schemas-microsoft-com:vml" xmlns:pvml="urn:schemas-microsoft-com:office:powerpoint" xmlns:com="http://schemas.openxmlformats.org/drawingml/2006/compatibility" xmlns:p14="http://schemas.microsoft.com/office/powerpoint/2010/main" xmlns:p15="http://schemas.microsoft.com/office/powerpoint/2012/main" xmlns:ahyp="http://schemas.microsoft.com/office/drawing/2018/hyperlinkcolor">
+<p:sldMaster xmlns:a="http://schemas.openxmlformats.org/drawingml/2006/main" xmlns:r="http://schemas.openxmlformats.org/officeDocument/2006/relationships" xmlns:p="http://schemas.openxmlformats.org/presentationml/2006/main">
   <p:cSld name="simple-light-2">
     <p:bg>
       <p:bgPr>
         <a:solidFill>
           <a:schemeClr val="lt1"/>
         </a:solidFill>
+        <a:effectLst/>
       </p:bgPr>
     </p:bg>
     <p:spTree>
       <p:nvGrpSpPr>
-        <p:cNvPr id="5" name="Shape 5"/>
+        <p:cNvPr id="1" name="Shape 5"/>
         <p:cNvGrpSpPr/>
         <p:nvPr/>
       </p:nvGrpSpPr>
@@ -4309,7 +4424,9 @@
       <p:sp>
         <p:nvSpPr>
           <p:cNvPr id="6" name="Google Shape;6;p1"/>
-          <p:cNvSpPr txBox="1"/>
+          <p:cNvSpPr txBox="1">
+            <a:spLocks noGrp="1"/>
+          </p:cNvSpPr>
           <p:nvPr>
             <p:ph type="title"/>
           </p:nvPr>
@@ -4328,7 +4445,7 @@
           </a:ln>
         </p:spPr>
         <p:txBody>
-          <a:bodyPr anchorCtr="0" anchor="t" bIns="91425" lIns="91425" spcFirstLastPara="1" rIns="91425" wrap="square" tIns="91425">
+          <a:bodyPr spcFirstLastPara="1" wrap="square" lIns="91425" tIns="91425" rIns="91425" bIns="91425" anchor="t" anchorCtr="0">
             <a:noAutofit/>
           </a:bodyPr>
           <a:lstStyle>
@@ -4495,15 +4612,19 @@
               </a:defRPr>
             </a:lvl9pPr>
           </a:lstStyle>
-          <a:p/>
+          <a:p>
+            <a:endParaRPr/>
+          </a:p>
         </p:txBody>
       </p:sp>
       <p:sp>
         <p:nvSpPr>
           <p:cNvPr id="7" name="Google Shape;7;p1"/>
-          <p:cNvSpPr txBox="1"/>
+          <p:cNvSpPr txBox="1">
+            <a:spLocks noGrp="1"/>
+          </p:cNvSpPr>
           <p:nvPr>
-            <p:ph idx="1" type="body"/>
+            <p:ph type="body" idx="1"/>
           </p:nvPr>
         </p:nvSpPr>
         <p:spPr>
@@ -4520,11 +4641,11 @@
           </a:ln>
         </p:spPr>
         <p:txBody>
-          <a:bodyPr anchorCtr="0" anchor="t" bIns="91425" lIns="91425" spcFirstLastPara="1" rIns="91425" wrap="square" tIns="91425">
+          <a:bodyPr spcFirstLastPara="1" wrap="square" lIns="91425" tIns="91425" rIns="91425" bIns="91425" anchor="t" anchorCtr="0">
             <a:noAutofit/>
           </a:bodyPr>
           <a:lstStyle>
-            <a:lvl1pPr indent="-342900" lvl="0" marL="457200">
+            <a:lvl1pPr marL="457200" lvl="0" indent="-342900">
               <a:lnSpc>
                 <a:spcPct val="115000"/>
               </a:lnSpc>
@@ -4545,7 +4666,7 @@
                 </a:solidFill>
               </a:defRPr>
             </a:lvl1pPr>
-            <a:lvl2pPr indent="-317500" lvl="1" marL="914400">
+            <a:lvl2pPr marL="914400" lvl="1" indent="-317500">
               <a:lnSpc>
                 <a:spcPct val="115000"/>
               </a:lnSpc>
@@ -4566,7 +4687,7 @@
                 </a:solidFill>
               </a:defRPr>
             </a:lvl2pPr>
-            <a:lvl3pPr indent="-317500" lvl="2" marL="1371600">
+            <a:lvl3pPr marL="1371600" lvl="2" indent="-317500">
               <a:lnSpc>
                 <a:spcPct val="115000"/>
               </a:lnSpc>
@@ -4587,7 +4708,7 @@
                 </a:solidFill>
               </a:defRPr>
             </a:lvl3pPr>
-            <a:lvl4pPr indent="-317500" lvl="3" marL="1828800">
+            <a:lvl4pPr marL="1828800" lvl="3" indent="-317500">
               <a:lnSpc>
                 <a:spcPct val="115000"/>
               </a:lnSpc>
@@ -4608,7 +4729,7 @@
                 </a:solidFill>
               </a:defRPr>
             </a:lvl4pPr>
-            <a:lvl5pPr indent="-317500" lvl="4" marL="2286000">
+            <a:lvl5pPr marL="2286000" lvl="4" indent="-317500">
               <a:lnSpc>
                 <a:spcPct val="115000"/>
               </a:lnSpc>
@@ -4629,7 +4750,7 @@
                 </a:solidFill>
               </a:defRPr>
             </a:lvl5pPr>
-            <a:lvl6pPr indent="-317500" lvl="5" marL="2743200">
+            <a:lvl6pPr marL="2743200" lvl="5" indent="-317500">
               <a:lnSpc>
                 <a:spcPct val="115000"/>
               </a:lnSpc>
@@ -4650,7 +4771,7 @@
                 </a:solidFill>
               </a:defRPr>
             </a:lvl6pPr>
-            <a:lvl7pPr indent="-317500" lvl="6" marL="3200400">
+            <a:lvl7pPr marL="3200400" lvl="6" indent="-317500">
               <a:lnSpc>
                 <a:spcPct val="115000"/>
               </a:lnSpc>
@@ -4671,7 +4792,7 @@
                 </a:solidFill>
               </a:defRPr>
             </a:lvl7pPr>
-            <a:lvl8pPr indent="-317500" lvl="7" marL="3657600">
+            <a:lvl8pPr marL="3657600" lvl="7" indent="-317500">
               <a:lnSpc>
                 <a:spcPct val="115000"/>
               </a:lnSpc>
@@ -4692,7 +4813,7 @@
                 </a:solidFill>
               </a:defRPr>
             </a:lvl8pPr>
-            <a:lvl9pPr indent="-317500" lvl="8" marL="4114800">
+            <a:lvl9pPr marL="4114800" lvl="8" indent="-317500">
               <a:lnSpc>
                 <a:spcPct val="115000"/>
               </a:lnSpc>
@@ -4714,15 +4835,19 @@
               </a:defRPr>
             </a:lvl9pPr>
           </a:lstStyle>
-          <a:p/>
+          <a:p>
+            <a:endParaRPr/>
+          </a:p>
         </p:txBody>
       </p:sp>
       <p:sp>
         <p:nvSpPr>
           <p:cNvPr id="8" name="Google Shape;8;p1"/>
-          <p:cNvSpPr txBox="1"/>
+          <p:cNvSpPr txBox="1">
+            <a:spLocks noGrp="1"/>
+          </p:cNvSpPr>
           <p:nvPr>
-            <p:ph idx="12" type="sldNum"/>
+            <p:ph type="sldNum" idx="12"/>
           </p:nvPr>
         </p:nvSpPr>
         <p:spPr>
@@ -4739,7 +4864,7 @@
           </a:ln>
         </p:spPr>
         <p:txBody>
-          <a:bodyPr anchorCtr="0" anchor="ctr" bIns="91425" lIns="91425" spcFirstLastPara="1" rIns="91425" wrap="square" tIns="91425">
+          <a:bodyPr spcFirstLastPara="1" wrap="square" lIns="91425" tIns="91425" rIns="91425" bIns="91425" anchor="ctr" anchorCtr="0">
             <a:noAutofit/>
           </a:bodyPr>
           <a:lstStyle>
@@ -4817,7 +4942,7 @@
             </a:lvl9pPr>
           </a:lstStyle>
           <a:p>
-            <a:pPr indent="0" lvl="0" marL="0" rtl="0" algn="r">
+            <a:pPr marL="0" lvl="0" indent="0" algn="r" rtl="0">
               <a:spcBef>
                 <a:spcPts val="0"/>
               </a:spcBef>
@@ -4828,7 +4953,7 @@
             </a:pPr>
             <a:fld id="{00000000-1234-1234-1234-123412341234}" type="slidenum">
               <a:rPr lang="pt-BR"/>
-              <a:t>‹#›</a:t>
+              <a:t>‹nº›</a:t>
             </a:fld>
             <a:endParaRPr/>
           </a:p>
@@ -4836,7 +4961,7 @@
       </p:sp>
     </p:spTree>
   </p:cSld>
-  <p:clrMap accent1="accent1" accent2="accent2" accent3="accent3" accent4="accent4" accent5="accent5" accent6="accent6" bg1="lt1" bg2="dk2" tx1="dk1" tx2="lt2" folHlink="folHlink" hlink="hlink"/>
+  <p:clrMap bg1="lt1" tx1="dk1" bg2="dk2" tx2="lt2" accent1="accent1" accent2="accent2" accent3="accent3" accent4="accent4" accent5="accent5" accent6="accent6" hlink="hlink" folHlink="folHlink"/>
   <p:sldLayoutIdLst>
     <p:sldLayoutId id="2147483648" r:id="rId1"/>
     <p:sldLayoutId id="2147483649" r:id="rId2"/>
@@ -4850,10 +4975,10 @@
     <p:sldLayoutId id="2147483657" r:id="rId10"/>
     <p:sldLayoutId id="2147483658" r:id="rId11"/>
   </p:sldLayoutIdLst>
-  <p:hf dt="0" ftr="0" hdr="0" sldNum="0"/>
+  <p:hf sldNum="0" hdr="0" ftr="0" dt="0"/>
   <p:txStyles>
     <p:titleStyle>
-      <a:defPPr lvl="0" marR="0" rtl="0" algn="l">
+      <a:defPPr marR="0" lvl="0" algn="l" rtl="0">
         <a:lnSpc>
           <a:spcPct val="100000"/>
         </a:lnSpc>
@@ -4864,7 +4989,7 @@
           <a:spcPts val="0"/>
         </a:spcAft>
       </a:defPPr>
-      <a:lvl1pPr lvl="0" marR="0" rtl="0" algn="l">
+      <a:lvl1pPr marR="0" lvl="0" algn="l" rtl="0">
         <a:lnSpc>
           <a:spcPct val="100000"/>
         </a:lnSpc>
@@ -4878,7 +5003,7 @@
           <a:srgbClr val="000000"/>
         </a:buClr>
         <a:buFont typeface="Arial"/>
-        <a:defRPr b="0" i="0" sz="1400" u="none" cap="none" strike="noStrike">
+        <a:defRPr sz="1400" b="0" i="0" u="none" strike="noStrike" cap="none">
           <a:solidFill>
             <a:srgbClr val="000000"/>
           </a:solidFill>
@@ -4888,7 +5013,7 @@
           <a:sym typeface="Arial"/>
         </a:defRPr>
       </a:lvl1pPr>
-      <a:lvl2pPr lvl="1" marR="0" rtl="0" algn="l">
+      <a:lvl2pPr marR="0" lvl="1" algn="l" rtl="0">
         <a:lnSpc>
           <a:spcPct val="100000"/>
         </a:lnSpc>
@@ -4902,7 +5027,7 @@
           <a:srgbClr val="000000"/>
         </a:buClr>
         <a:buFont typeface="Arial"/>
-        <a:defRPr b="0" i="0" sz="1400" u="none" cap="none" strike="noStrike">
+        <a:defRPr sz="1400" b="0" i="0" u="none" strike="noStrike" cap="none">
           <a:solidFill>
             <a:srgbClr val="000000"/>
           </a:solidFill>
@@ -4912,7 +5037,7 @@
           <a:sym typeface="Arial"/>
         </a:defRPr>
       </a:lvl2pPr>
-      <a:lvl3pPr lvl="2" marR="0" rtl="0" algn="l">
+      <a:lvl3pPr marR="0" lvl="2" algn="l" rtl="0">
         <a:lnSpc>
           <a:spcPct val="100000"/>
         </a:lnSpc>
@@ -4926,7 +5051,7 @@
           <a:srgbClr val="000000"/>
         </a:buClr>
         <a:buFont typeface="Arial"/>
-        <a:defRPr b="0" i="0" sz="1400" u="none" cap="none" strike="noStrike">
+        <a:defRPr sz="1400" b="0" i="0" u="none" strike="noStrike" cap="none">
           <a:solidFill>
             <a:srgbClr val="000000"/>
           </a:solidFill>
@@ -4936,7 +5061,7 @@
           <a:sym typeface="Arial"/>
         </a:defRPr>
       </a:lvl3pPr>
-      <a:lvl4pPr lvl="3" marR="0" rtl="0" algn="l">
+      <a:lvl4pPr marR="0" lvl="3" algn="l" rtl="0">
         <a:lnSpc>
           <a:spcPct val="100000"/>
         </a:lnSpc>
@@ -4950,7 +5075,7 @@
           <a:srgbClr val="000000"/>
         </a:buClr>
         <a:buFont typeface="Arial"/>
-        <a:defRPr b="0" i="0" sz="1400" u="none" cap="none" strike="noStrike">
+        <a:defRPr sz="1400" b="0" i="0" u="none" strike="noStrike" cap="none">
           <a:solidFill>
             <a:srgbClr val="000000"/>
           </a:solidFill>
@@ -4960,7 +5085,7 @@
           <a:sym typeface="Arial"/>
         </a:defRPr>
       </a:lvl4pPr>
-      <a:lvl5pPr lvl="4" marR="0" rtl="0" algn="l">
+      <a:lvl5pPr marR="0" lvl="4" algn="l" rtl="0">
         <a:lnSpc>
           <a:spcPct val="100000"/>
         </a:lnSpc>
@@ -4974,7 +5099,7 @@
           <a:srgbClr val="000000"/>
         </a:buClr>
         <a:buFont typeface="Arial"/>
-        <a:defRPr b="0" i="0" sz="1400" u="none" cap="none" strike="noStrike">
+        <a:defRPr sz="1400" b="0" i="0" u="none" strike="noStrike" cap="none">
           <a:solidFill>
             <a:srgbClr val="000000"/>
           </a:solidFill>
@@ -4984,7 +5109,7 @@
           <a:sym typeface="Arial"/>
         </a:defRPr>
       </a:lvl5pPr>
-      <a:lvl6pPr lvl="5" marR="0" rtl="0" algn="l">
+      <a:lvl6pPr marR="0" lvl="5" algn="l" rtl="0">
         <a:lnSpc>
           <a:spcPct val="100000"/>
         </a:lnSpc>
@@ -4998,7 +5123,7 @@
           <a:srgbClr val="000000"/>
         </a:buClr>
         <a:buFont typeface="Arial"/>
-        <a:defRPr b="0" i="0" sz="1400" u="none" cap="none" strike="noStrike">
+        <a:defRPr sz="1400" b="0" i="0" u="none" strike="noStrike" cap="none">
           <a:solidFill>
             <a:srgbClr val="000000"/>
           </a:solidFill>
@@ -5008,7 +5133,7 @@
           <a:sym typeface="Arial"/>
         </a:defRPr>
       </a:lvl6pPr>
-      <a:lvl7pPr lvl="6" marR="0" rtl="0" algn="l">
+      <a:lvl7pPr marR="0" lvl="6" algn="l" rtl="0">
         <a:lnSpc>
           <a:spcPct val="100000"/>
         </a:lnSpc>
@@ -5022,7 +5147,7 @@
           <a:srgbClr val="000000"/>
         </a:buClr>
         <a:buFont typeface="Arial"/>
-        <a:defRPr b="0" i="0" sz="1400" u="none" cap="none" strike="noStrike">
+        <a:defRPr sz="1400" b="0" i="0" u="none" strike="noStrike" cap="none">
           <a:solidFill>
             <a:srgbClr val="000000"/>
           </a:solidFill>
@@ -5032,7 +5157,7 @@
           <a:sym typeface="Arial"/>
         </a:defRPr>
       </a:lvl7pPr>
-      <a:lvl8pPr lvl="7" marR="0" rtl="0" algn="l">
+      <a:lvl8pPr marR="0" lvl="7" algn="l" rtl="0">
         <a:lnSpc>
           <a:spcPct val="100000"/>
         </a:lnSpc>
@@ -5046,7 +5171,7 @@
           <a:srgbClr val="000000"/>
         </a:buClr>
         <a:buFont typeface="Arial"/>
-        <a:defRPr b="0" i="0" sz="1400" u="none" cap="none" strike="noStrike">
+        <a:defRPr sz="1400" b="0" i="0" u="none" strike="noStrike" cap="none">
           <a:solidFill>
             <a:srgbClr val="000000"/>
           </a:solidFill>
@@ -5056,7 +5181,7 @@
           <a:sym typeface="Arial"/>
         </a:defRPr>
       </a:lvl8pPr>
-      <a:lvl9pPr lvl="8" marR="0" rtl="0" algn="l">
+      <a:lvl9pPr marR="0" lvl="8" algn="l" rtl="0">
         <a:lnSpc>
           <a:spcPct val="100000"/>
         </a:lnSpc>
@@ -5070,7 +5195,7 @@
           <a:srgbClr val="000000"/>
         </a:buClr>
         <a:buFont typeface="Arial"/>
-        <a:defRPr b="0" i="0" sz="1400" u="none" cap="none" strike="noStrike">
+        <a:defRPr sz="1400" b="0" i="0" u="none" strike="noStrike" cap="none">
           <a:solidFill>
             <a:srgbClr val="000000"/>
           </a:solidFill>
@@ -5082,7 +5207,7 @@
       </a:lvl9pPr>
     </p:titleStyle>
     <p:bodyStyle>
-      <a:defPPr lvl="0" marR="0" rtl="0" algn="l">
+      <a:defPPr marR="0" lvl="0" algn="l" rtl="0">
         <a:lnSpc>
           <a:spcPct val="100000"/>
         </a:lnSpc>
@@ -5093,7 +5218,7 @@
           <a:spcPts val="0"/>
         </a:spcAft>
       </a:defPPr>
-      <a:lvl1pPr lvl="0" marR="0" rtl="0" algn="l">
+      <a:lvl1pPr marR="0" lvl="0" algn="l" rtl="0">
         <a:lnSpc>
           <a:spcPct val="100000"/>
         </a:lnSpc>
@@ -5107,7 +5232,7 @@
           <a:srgbClr val="000000"/>
         </a:buClr>
         <a:buFont typeface="Arial"/>
-        <a:defRPr b="0" i="0" sz="1400" u="none" cap="none" strike="noStrike">
+        <a:defRPr sz="1400" b="0" i="0" u="none" strike="noStrike" cap="none">
           <a:solidFill>
             <a:srgbClr val="000000"/>
           </a:solidFill>
@@ -5117,7 +5242,7 @@
           <a:sym typeface="Arial"/>
         </a:defRPr>
       </a:lvl1pPr>
-      <a:lvl2pPr lvl="1" marR="0" rtl="0" algn="l">
+      <a:lvl2pPr marR="0" lvl="1" algn="l" rtl="0">
         <a:lnSpc>
           <a:spcPct val="100000"/>
         </a:lnSpc>
@@ -5131,7 +5256,7 @@
           <a:srgbClr val="000000"/>
         </a:buClr>
         <a:buFont typeface="Arial"/>
-        <a:defRPr b="0" i="0" sz="1400" u="none" cap="none" strike="noStrike">
+        <a:defRPr sz="1400" b="0" i="0" u="none" strike="noStrike" cap="none">
           <a:solidFill>
             <a:srgbClr val="000000"/>
           </a:solidFill>
@@ -5141,7 +5266,7 @@
           <a:sym typeface="Arial"/>
         </a:defRPr>
       </a:lvl2pPr>
-      <a:lvl3pPr lvl="2" marR="0" rtl="0" algn="l">
+      <a:lvl3pPr marR="0" lvl="2" algn="l" rtl="0">
         <a:lnSpc>
           <a:spcPct val="100000"/>
         </a:lnSpc>
@@ -5155,7 +5280,7 @@
           <a:srgbClr val="000000"/>
         </a:buClr>
         <a:buFont typeface="Arial"/>
-        <a:defRPr b="0" i="0" sz="1400" u="none" cap="none" strike="noStrike">
+        <a:defRPr sz="1400" b="0" i="0" u="none" strike="noStrike" cap="none">
           <a:solidFill>
             <a:srgbClr val="000000"/>
           </a:solidFill>
@@ -5165,7 +5290,7 @@
           <a:sym typeface="Arial"/>
         </a:defRPr>
       </a:lvl3pPr>
-      <a:lvl4pPr lvl="3" marR="0" rtl="0" algn="l">
+      <a:lvl4pPr marR="0" lvl="3" algn="l" rtl="0">
         <a:lnSpc>
           <a:spcPct val="100000"/>
         </a:lnSpc>
@@ -5179,7 +5304,7 @@
           <a:srgbClr val="000000"/>
         </a:buClr>
         <a:buFont typeface="Arial"/>
-        <a:defRPr b="0" i="0" sz="1400" u="none" cap="none" strike="noStrike">
+        <a:defRPr sz="1400" b="0" i="0" u="none" strike="noStrike" cap="none">
           <a:solidFill>
             <a:srgbClr val="000000"/>
           </a:solidFill>
@@ -5189,7 +5314,7 @@
           <a:sym typeface="Arial"/>
         </a:defRPr>
       </a:lvl4pPr>
-      <a:lvl5pPr lvl="4" marR="0" rtl="0" algn="l">
+      <a:lvl5pPr marR="0" lvl="4" algn="l" rtl="0">
         <a:lnSpc>
           <a:spcPct val="100000"/>
         </a:lnSpc>
@@ -5203,7 +5328,7 @@
           <a:srgbClr val="000000"/>
         </a:buClr>
         <a:buFont typeface="Arial"/>
-        <a:defRPr b="0" i="0" sz="1400" u="none" cap="none" strike="noStrike">
+        <a:defRPr sz="1400" b="0" i="0" u="none" strike="noStrike" cap="none">
           <a:solidFill>
             <a:srgbClr val="000000"/>
           </a:solidFill>
@@ -5213,7 +5338,7 @@
           <a:sym typeface="Arial"/>
         </a:defRPr>
       </a:lvl5pPr>
-      <a:lvl6pPr lvl="5" marR="0" rtl="0" algn="l">
+      <a:lvl6pPr marR="0" lvl="5" algn="l" rtl="0">
         <a:lnSpc>
           <a:spcPct val="100000"/>
         </a:lnSpc>
@@ -5227,7 +5352,7 @@
           <a:srgbClr val="000000"/>
         </a:buClr>
         <a:buFont typeface="Arial"/>
-        <a:defRPr b="0" i="0" sz="1400" u="none" cap="none" strike="noStrike">
+        <a:defRPr sz="1400" b="0" i="0" u="none" strike="noStrike" cap="none">
           <a:solidFill>
             <a:srgbClr val="000000"/>
           </a:solidFill>
@@ -5237,7 +5362,7 @@
           <a:sym typeface="Arial"/>
         </a:defRPr>
       </a:lvl6pPr>
-      <a:lvl7pPr lvl="6" marR="0" rtl="0" algn="l">
+      <a:lvl7pPr marR="0" lvl="6" algn="l" rtl="0">
         <a:lnSpc>
           <a:spcPct val="100000"/>
         </a:lnSpc>
@@ -5251,7 +5376,7 @@
           <a:srgbClr val="000000"/>
         </a:buClr>
         <a:buFont typeface="Arial"/>
-        <a:defRPr b="0" i="0" sz="1400" u="none" cap="none" strike="noStrike">
+        <a:defRPr sz="1400" b="0" i="0" u="none" strike="noStrike" cap="none">
           <a:solidFill>
             <a:srgbClr val="000000"/>
           </a:solidFill>
@@ -5261,7 +5386,7 @@
           <a:sym typeface="Arial"/>
         </a:defRPr>
       </a:lvl7pPr>
-      <a:lvl8pPr lvl="7" marR="0" rtl="0" algn="l">
+      <a:lvl8pPr marR="0" lvl="7" algn="l" rtl="0">
         <a:lnSpc>
           <a:spcPct val="100000"/>
         </a:lnSpc>
@@ -5275,7 +5400,7 @@
           <a:srgbClr val="000000"/>
         </a:buClr>
         <a:buFont typeface="Arial"/>
-        <a:defRPr b="0" i="0" sz="1400" u="none" cap="none" strike="noStrike">
+        <a:defRPr sz="1400" b="0" i="0" u="none" strike="noStrike" cap="none">
           <a:solidFill>
             <a:srgbClr val="000000"/>
           </a:solidFill>
@@ -5285,7 +5410,7 @@
           <a:sym typeface="Arial"/>
         </a:defRPr>
       </a:lvl8pPr>
-      <a:lvl9pPr lvl="8" marR="0" rtl="0" algn="l">
+      <a:lvl9pPr marR="0" lvl="8" algn="l" rtl="0">
         <a:lnSpc>
           <a:spcPct val="100000"/>
         </a:lnSpc>
@@ -5299,7 +5424,7 @@
           <a:srgbClr val="000000"/>
         </a:buClr>
         <a:buFont typeface="Arial"/>
-        <a:defRPr b="0" i="0" sz="1400" u="none" cap="none" strike="noStrike">
+        <a:defRPr sz="1400" b="0" i="0" u="none" strike="noStrike" cap="none">
           <a:solidFill>
             <a:srgbClr val="000000"/>
           </a:solidFill>
@@ -5311,7 +5436,7 @@
       </a:lvl9pPr>
     </p:bodyStyle>
     <p:otherStyle>
-      <a:defPPr lvl="0" marR="0" rtl="0" algn="l">
+      <a:defPPr marR="0" lvl="0" algn="l" rtl="0">
         <a:lnSpc>
           <a:spcPct val="100000"/>
         </a:lnSpc>
@@ -5322,7 +5447,7 @@
           <a:spcPts val="0"/>
         </a:spcAft>
       </a:defPPr>
-      <a:lvl1pPr lvl="0" marR="0" rtl="0" algn="l">
+      <a:lvl1pPr marR="0" lvl="0" algn="l" rtl="0">
         <a:lnSpc>
           <a:spcPct val="100000"/>
         </a:lnSpc>
@@ -5336,7 +5461,7 @@
           <a:srgbClr val="000000"/>
         </a:buClr>
         <a:buFont typeface="Arial"/>
-        <a:defRPr b="0" i="0" sz="1400" u="none" cap="none" strike="noStrike">
+        <a:defRPr sz="1400" b="0" i="0" u="none" strike="noStrike" cap="none">
           <a:solidFill>
             <a:srgbClr val="000000"/>
           </a:solidFill>
@@ -5346,7 +5471,7 @@
           <a:sym typeface="Arial"/>
         </a:defRPr>
       </a:lvl1pPr>
-      <a:lvl2pPr lvl="1" marR="0" rtl="0" algn="l">
+      <a:lvl2pPr marR="0" lvl="1" algn="l" rtl="0">
         <a:lnSpc>
           <a:spcPct val="100000"/>
         </a:lnSpc>
@@ -5360,7 +5485,7 @@
           <a:srgbClr val="000000"/>
         </a:buClr>
         <a:buFont typeface="Arial"/>
-        <a:defRPr b="0" i="0" sz="1400" u="none" cap="none" strike="noStrike">
+        <a:defRPr sz="1400" b="0" i="0" u="none" strike="noStrike" cap="none">
           <a:solidFill>
             <a:srgbClr val="000000"/>
           </a:solidFill>
@@ -5370,7 +5495,7 @@
           <a:sym typeface="Arial"/>
         </a:defRPr>
       </a:lvl2pPr>
-      <a:lvl3pPr lvl="2" marR="0" rtl="0" algn="l">
+      <a:lvl3pPr marR="0" lvl="2" algn="l" rtl="0">
         <a:lnSpc>
           <a:spcPct val="100000"/>
         </a:lnSpc>
@@ -5384,7 +5509,7 @@
           <a:srgbClr val="000000"/>
         </a:buClr>
         <a:buFont typeface="Arial"/>
-        <a:defRPr b="0" i="0" sz="1400" u="none" cap="none" strike="noStrike">
+        <a:defRPr sz="1400" b="0" i="0" u="none" strike="noStrike" cap="none">
           <a:solidFill>
             <a:srgbClr val="000000"/>
           </a:solidFill>
@@ -5394,7 +5519,7 @@
           <a:sym typeface="Arial"/>
         </a:defRPr>
       </a:lvl3pPr>
-      <a:lvl4pPr lvl="3" marR="0" rtl="0" algn="l">
+      <a:lvl4pPr marR="0" lvl="3" algn="l" rtl="0">
         <a:lnSpc>
           <a:spcPct val="100000"/>
         </a:lnSpc>
@@ -5408,7 +5533,7 @@
           <a:srgbClr val="000000"/>
         </a:buClr>
         <a:buFont typeface="Arial"/>
-        <a:defRPr b="0" i="0" sz="1400" u="none" cap="none" strike="noStrike">
+        <a:defRPr sz="1400" b="0" i="0" u="none" strike="noStrike" cap="none">
           <a:solidFill>
             <a:srgbClr val="000000"/>
           </a:solidFill>
@@ -5418,7 +5543,7 @@
           <a:sym typeface="Arial"/>
         </a:defRPr>
       </a:lvl4pPr>
-      <a:lvl5pPr lvl="4" marR="0" rtl="0" algn="l">
+      <a:lvl5pPr marR="0" lvl="4" algn="l" rtl="0">
         <a:lnSpc>
           <a:spcPct val="100000"/>
         </a:lnSpc>
@@ -5432,7 +5557,7 @@
           <a:srgbClr val="000000"/>
         </a:buClr>
         <a:buFont typeface="Arial"/>
-        <a:defRPr b="0" i="0" sz="1400" u="none" cap="none" strike="noStrike">
+        <a:defRPr sz="1400" b="0" i="0" u="none" strike="noStrike" cap="none">
           <a:solidFill>
             <a:srgbClr val="000000"/>
           </a:solidFill>
@@ -5442,7 +5567,7 @@
           <a:sym typeface="Arial"/>
         </a:defRPr>
       </a:lvl5pPr>
-      <a:lvl6pPr lvl="5" marR="0" rtl="0" algn="l">
+      <a:lvl6pPr marR="0" lvl="5" algn="l" rtl="0">
         <a:lnSpc>
           <a:spcPct val="100000"/>
         </a:lnSpc>
@@ -5456,7 +5581,7 @@
           <a:srgbClr val="000000"/>
         </a:buClr>
         <a:buFont typeface="Arial"/>
-        <a:defRPr b="0" i="0" sz="1400" u="none" cap="none" strike="noStrike">
+        <a:defRPr sz="1400" b="0" i="0" u="none" strike="noStrike" cap="none">
           <a:solidFill>
             <a:srgbClr val="000000"/>
           </a:solidFill>
@@ -5466,7 +5591,7 @@
           <a:sym typeface="Arial"/>
         </a:defRPr>
       </a:lvl6pPr>
-      <a:lvl7pPr lvl="6" marR="0" rtl="0" algn="l">
+      <a:lvl7pPr marR="0" lvl="6" algn="l" rtl="0">
         <a:lnSpc>
           <a:spcPct val="100000"/>
         </a:lnSpc>
@@ -5480,7 +5605,7 @@
           <a:srgbClr val="000000"/>
         </a:buClr>
         <a:buFont typeface="Arial"/>
-        <a:defRPr b="0" i="0" sz="1400" u="none" cap="none" strike="noStrike">
+        <a:defRPr sz="1400" b="0" i="0" u="none" strike="noStrike" cap="none">
           <a:solidFill>
             <a:srgbClr val="000000"/>
           </a:solidFill>
@@ -5490,7 +5615,7 @@
           <a:sym typeface="Arial"/>
         </a:defRPr>
       </a:lvl7pPr>
-      <a:lvl8pPr lvl="7" marR="0" rtl="0" algn="l">
+      <a:lvl8pPr marR="0" lvl="7" algn="l" rtl="0">
         <a:lnSpc>
           <a:spcPct val="100000"/>
         </a:lnSpc>
@@ -5504,7 +5629,7 @@
           <a:srgbClr val="000000"/>
         </a:buClr>
         <a:buFont typeface="Arial"/>
-        <a:defRPr b="0" i="0" sz="1400" u="none" cap="none" strike="noStrike">
+        <a:defRPr sz="1400" b="0" i="0" u="none" strike="noStrike" cap="none">
           <a:solidFill>
             <a:srgbClr val="000000"/>
           </a:solidFill>
@@ -5514,7 +5639,7 @@
           <a:sym typeface="Arial"/>
         </a:defRPr>
       </a:lvl8pPr>
-      <a:lvl9pPr lvl="8" marR="0" rtl="0" algn="l">
+      <a:lvl9pPr marR="0" lvl="8" algn="l" rtl="0">
         <a:lnSpc>
           <a:spcPct val="100000"/>
         </a:lnSpc>
@@ -5528,7 +5653,7 @@
           <a:srgbClr val="000000"/>
         </a:buClr>
         <a:buFont typeface="Arial"/>
-        <a:defRPr b="0" i="0" sz="1400" u="none" cap="none" strike="noStrike">
+        <a:defRPr sz="1400" b="0" i="0" u="none" strike="noStrike" cap="none">
           <a:solidFill>
             <a:srgbClr val="000000"/>
           </a:solidFill>
@@ -5544,18 +5669,19 @@
 </file>
 
 <file path=ppt/slides/slide1.xml><?xml version="1.0" encoding="utf-8"?>
-<p:sld xmlns:a="http://schemas.openxmlformats.org/drawingml/2006/main" xmlns:r="http://schemas.openxmlformats.org/officeDocument/2006/relationships" xmlns:mc="http://schemas.openxmlformats.org/markup-compatibility/2006" xmlns:mv="urn:schemas-microsoft-com:mac:vml" xmlns:p="http://schemas.openxmlformats.org/presentationml/2006/main" xmlns:c="http://schemas.openxmlformats.org/drawingml/2006/chart" xmlns:dgm="http://schemas.openxmlformats.org/drawingml/2006/diagram" xmlns:o="urn:schemas-microsoft-com:office:office" xmlns:v="urn:schemas-microsoft-com:vml" xmlns:pvml="urn:schemas-microsoft-com:office:powerpoint" xmlns:com="http://schemas.openxmlformats.org/drawingml/2006/compatibility" xmlns:p14="http://schemas.microsoft.com/office/powerpoint/2010/main" xmlns:p15="http://schemas.microsoft.com/office/powerpoint/2012/main" xmlns:ahyp="http://schemas.microsoft.com/office/drawing/2018/hyperlinkcolor">
+<p:sld xmlns:a="http://schemas.openxmlformats.org/drawingml/2006/main" xmlns:r="http://schemas.openxmlformats.org/officeDocument/2006/relationships" xmlns:p="http://schemas.openxmlformats.org/presentationml/2006/main">
   <p:cSld>
     <p:bg>
       <p:bgPr>
         <a:solidFill>
           <a:srgbClr val="D2FFFC"/>
         </a:solidFill>
+        <a:effectLst/>
       </p:bgPr>
     </p:bg>
     <p:spTree>
       <p:nvGrpSpPr>
-        <p:cNvPr id="53" name="Shape 53"/>
+        <p:cNvPr id="1" name="Shape 53"/>
         <p:cNvGrpSpPr/>
         <p:nvPr/>
       </p:nvGrpSpPr>
@@ -5661,7 +5787,7 @@
           <a:blip r:embed="rId6">
             <a:alphaModFix/>
           </a:blip>
-          <a:srcRect b="0" l="-9770" r="9770" t="0"/>
+          <a:srcRect l="-9770" r="9770"/>
           <a:stretch/>
         </p:blipFill>
         <p:spPr>
@@ -5749,14 +5875,14 @@
             <a:avLst/>
           </a:prstGeom>
           <a:noFill/>
-          <a:ln cap="flat" cmpd="sng" w="9525">
+          <a:ln w="9525" cap="flat" cmpd="sng">
             <a:solidFill>
               <a:schemeClr val="dk2"/>
             </a:solidFill>
             <a:prstDash val="solid"/>
             <a:round/>
-            <a:headEnd len="med" w="med" type="none"/>
-            <a:tailEnd len="med" w="med" type="triangle"/>
+            <a:headEnd type="none" w="med" len="med"/>
+            <a:tailEnd type="triangle" w="med" len="med"/>
           </a:ln>
         </p:spPr>
       </p:cxnSp>
@@ -5767,7 +5893,7 @@
           <p:nvPr/>
         </p:nvCxnSpPr>
         <p:spPr>
-          <a:xfrm flipH="1" rot="10800000">
+          <a:xfrm rot="10800000" flipH="1">
             <a:off x="3101855" y="1372952"/>
             <a:ext cx="773100" cy="3900"/>
           </a:xfrm>
@@ -5775,14 +5901,14 @@
             <a:avLst/>
           </a:prstGeom>
           <a:noFill/>
-          <a:ln cap="flat" cmpd="sng" w="9525">
+          <a:ln w="9525" cap="flat" cmpd="sng">
             <a:solidFill>
               <a:schemeClr val="dk2"/>
             </a:solidFill>
             <a:prstDash val="solid"/>
             <a:round/>
-            <a:headEnd len="med" w="med" type="none"/>
-            <a:tailEnd len="med" w="med" type="triangle"/>
+            <a:headEnd type="none" w="med" len="med"/>
+            <a:tailEnd type="triangle" w="med" len="med"/>
           </a:ln>
         </p:spPr>
       </p:cxnSp>
@@ -5834,12 +5960,12 @@
           </a:ln>
         </p:spPr>
         <p:txBody>
-          <a:bodyPr anchorCtr="0" anchor="t" bIns="91425" lIns="91425" spcFirstLastPara="1" rIns="91425" wrap="square" tIns="91425">
+          <a:bodyPr spcFirstLastPara="1" wrap="square" lIns="91425" tIns="91425" rIns="91425" bIns="91425" anchor="t" anchorCtr="0">
             <a:noAutofit/>
           </a:bodyPr>
           <a:lstStyle/>
           <a:p>
-            <a:pPr indent="0" lvl="0" marL="0" rtl="0" algn="l">
+            <a:pPr marL="0" lvl="0" indent="0" algn="l" rtl="0">
               <a:spcBef>
                 <a:spcPts val="0"/>
               </a:spcBef>
@@ -5848,9 +5974,6 @@
               </a:spcAft>
               <a:buNone/>
             </a:pPr>
-            <a:r>
-              <a:t/>
-            </a:r>
             <a:endParaRPr/>
           </a:p>
         </p:txBody>
@@ -5875,12 +5998,12 @@
           </a:ln>
         </p:spPr>
         <p:txBody>
-          <a:bodyPr anchorCtr="0" anchor="t" bIns="91425" lIns="91425" spcFirstLastPara="1" rIns="91425" wrap="square" tIns="91425">
+          <a:bodyPr spcFirstLastPara="1" wrap="square" lIns="91425" tIns="91425" rIns="91425" bIns="91425" anchor="t" anchorCtr="0">
             <a:noAutofit/>
           </a:bodyPr>
           <a:lstStyle/>
           <a:p>
-            <a:pPr indent="0" lvl="0" marL="0" rtl="0" algn="l">
+            <a:pPr marL="0" lvl="0" indent="0" algn="l" rtl="0">
               <a:spcBef>
                 <a:spcPts val="0"/>
               </a:spcBef>
@@ -5890,7 +6013,7 @@
               <a:buNone/>
             </a:pPr>
             <a:r>
-              <a:rPr b="1" lang="pt-BR" sz="1100">
+              <a:rPr lang="pt-BR" sz="1100" b="1">
                 <a:solidFill>
                   <a:schemeClr val="dk2"/>
                 </a:solidFill>
@@ -5901,7 +6024,7 @@
               </a:rPr>
               <a:t>Provedor de Internet</a:t>
             </a:r>
-            <a:endParaRPr b="1" sz="1100">
+            <a:endParaRPr sz="1100" b="1">
               <a:solidFill>
                 <a:schemeClr val="dk2"/>
               </a:solidFill>
@@ -5933,12 +6056,12 @@
           </a:ln>
         </p:spPr>
         <p:txBody>
-          <a:bodyPr anchorCtr="0" anchor="t" bIns="91425" lIns="91425" spcFirstLastPara="1" rIns="91425" wrap="square" tIns="91425">
+          <a:bodyPr spcFirstLastPara="1" wrap="square" lIns="91425" tIns="91425" rIns="91425" bIns="91425" anchor="t" anchorCtr="0">
             <a:noAutofit/>
           </a:bodyPr>
           <a:lstStyle/>
           <a:p>
-            <a:pPr indent="0" lvl="0" marL="0" rtl="0" algn="l">
+            <a:pPr marL="0" lvl="0" indent="0" algn="l" rtl="0">
               <a:spcBef>
                 <a:spcPts val="0"/>
               </a:spcBef>
@@ -5948,7 +6071,7 @@
               <a:buNone/>
             </a:pPr>
             <a:r>
-              <a:rPr b="1" lang="pt-BR" sz="1100">
+              <a:rPr lang="pt-BR" sz="1100" b="1">
                 <a:solidFill>
                   <a:schemeClr val="dk2"/>
                 </a:solidFill>
@@ -5959,7 +6082,7 @@
               </a:rPr>
               <a:t>Nuvem/Cloud</a:t>
             </a:r>
-            <a:endParaRPr b="1" sz="1100">
+            <a:endParaRPr sz="1100" b="1">
               <a:solidFill>
                 <a:schemeClr val="dk2"/>
               </a:solidFill>
@@ -5970,7 +6093,7 @@
             </a:endParaRPr>
           </a:p>
           <a:p>
-            <a:pPr indent="0" lvl="0" marL="0" rtl="0" algn="l">
+            <a:pPr marL="0" lvl="0" indent="0" algn="l" rtl="0">
               <a:spcBef>
                 <a:spcPts val="0"/>
               </a:spcBef>
@@ -5989,19 +6112,7 @@
                 <a:cs typeface="Roboto"/>
                 <a:sym typeface="Roboto"/>
               </a:rPr>
-              <a:t>- </a:t>
-            </a:r>
-            <a:r>
-              <a:rPr lang="pt-BR" sz="1100">
-                <a:solidFill>
-                  <a:schemeClr val="dk2"/>
-                </a:solidFill>
-                <a:latin typeface="Roboto"/>
-                <a:ea typeface="Roboto"/>
-                <a:cs typeface="Roboto"/>
-                <a:sym typeface="Roboto"/>
-              </a:rPr>
-              <a:t>Servidores;</a:t>
+              <a:t>- Servidores;</a:t>
             </a:r>
             <a:endParaRPr sz="1100">
               <a:solidFill>
@@ -6014,7 +6125,7 @@
             </a:endParaRPr>
           </a:p>
           <a:p>
-            <a:pPr indent="0" lvl="0" marL="0" rtl="0" algn="just">
+            <a:pPr marL="0" lvl="0" indent="0" algn="just" rtl="0">
               <a:spcBef>
                 <a:spcPts val="0"/>
               </a:spcBef>
@@ -6046,7 +6157,7 @@
             </a:endParaRPr>
           </a:p>
           <a:p>
-            <a:pPr indent="0" lvl="0" marL="0" rtl="0" algn="l">
+            <a:pPr marL="0" lvl="0" indent="0" algn="l" rtl="0">
               <a:spcBef>
                 <a:spcPts val="0"/>
               </a:spcBef>
@@ -6078,7 +6189,7 @@
             </a:endParaRPr>
           </a:p>
           <a:p>
-            <a:pPr indent="0" lvl="0" marL="0" rtl="0" algn="l">
+            <a:pPr marL="0" lvl="0" indent="0" algn="l" rtl="0">
               <a:spcBef>
                 <a:spcPts val="0"/>
               </a:spcBef>
@@ -6131,12 +6242,12 @@
           </a:ln>
         </p:spPr>
         <p:txBody>
-          <a:bodyPr anchorCtr="0" anchor="t" bIns="91425" lIns="91425" spcFirstLastPara="1" rIns="91425" wrap="square" tIns="91425">
+          <a:bodyPr spcFirstLastPara="1" wrap="square" lIns="91425" tIns="91425" rIns="91425" bIns="91425" anchor="t" anchorCtr="0">
             <a:noAutofit/>
           </a:bodyPr>
           <a:lstStyle/>
           <a:p>
-            <a:pPr indent="0" lvl="0" marL="0" rtl="0" algn="l">
+            <a:pPr marL="0" lvl="0" indent="0" algn="l" rtl="0">
               <a:spcBef>
                 <a:spcPts val="0"/>
               </a:spcBef>
@@ -6146,7 +6257,7 @@
               <a:buNone/>
             </a:pPr>
             <a:r>
-              <a:rPr b="1" lang="pt-BR" u="sng"/>
+              <a:rPr lang="pt-BR" b="1" u="sng"/>
               <a:t> </a:t>
             </a:r>
             <a:endParaRPr/>
@@ -6173,12 +6284,12 @@
           </a:ln>
         </p:spPr>
         <p:txBody>
-          <a:bodyPr anchorCtr="0" anchor="t" bIns="91425" lIns="91425" spcFirstLastPara="1" rIns="91425" wrap="square" tIns="91425">
+          <a:bodyPr spcFirstLastPara="1" wrap="square" lIns="91425" tIns="91425" rIns="91425" bIns="91425" anchor="t" anchorCtr="0">
             <a:noAutofit/>
           </a:bodyPr>
           <a:lstStyle/>
           <a:p>
-            <a:pPr indent="0" lvl="0" marL="0" rtl="0" algn="l">
+            <a:pPr marL="0" lvl="0" indent="0" algn="l" rtl="0">
               <a:spcBef>
                 <a:spcPts val="0"/>
               </a:spcBef>
@@ -6187,9 +6298,6 @@
               </a:spcAft>
               <a:buNone/>
             </a:pPr>
-            <a:r>
-              <a:t/>
-            </a:r>
             <a:endParaRPr/>
           </a:p>
         </p:txBody>
@@ -6214,12 +6322,12 @@
           </a:ln>
         </p:spPr>
         <p:txBody>
-          <a:bodyPr anchorCtr="0" anchor="t" bIns="91425" lIns="91425" spcFirstLastPara="1" rIns="91425" wrap="square" tIns="91425">
+          <a:bodyPr spcFirstLastPara="1" wrap="square" lIns="91425" tIns="91425" rIns="91425" bIns="91425" anchor="t" anchorCtr="0">
             <a:noAutofit/>
           </a:bodyPr>
           <a:lstStyle/>
           <a:p>
-            <a:pPr indent="0" lvl="0" marL="0" rtl="0" algn="r">
+            <a:pPr marL="0" lvl="0" indent="0" algn="r" rtl="0">
               <a:spcBef>
                 <a:spcPts val="0"/>
               </a:spcBef>
@@ -6229,7 +6337,7 @@
               <a:buNone/>
             </a:pPr>
             <a:r>
-              <a:rPr b="1" lang="pt-BR" sz="1100">
+              <a:rPr lang="pt-BR" sz="1100" b="1">
                 <a:solidFill>
                   <a:schemeClr val="dk2"/>
                 </a:solidFill>
@@ -6240,7 +6348,7 @@
               </a:rPr>
               <a:t>Empresa e motorista</a:t>
             </a:r>
-            <a:endParaRPr b="1" sz="1100">
+            <a:endParaRPr sz="1100" b="1">
               <a:solidFill>
                 <a:schemeClr val="dk2"/>
               </a:solidFill>
@@ -6251,7 +6359,7 @@
             </a:endParaRPr>
           </a:p>
           <a:p>
-            <a:pPr indent="0" lvl="0" marL="0" rtl="0" algn="r">
+            <a:pPr marL="0" lvl="0" indent="0" algn="r" rtl="0">
               <a:spcBef>
                 <a:spcPts val="0"/>
               </a:spcBef>
@@ -6270,19 +6378,7 @@
                 <a:cs typeface="Roboto"/>
                 <a:sym typeface="Roboto"/>
               </a:rPr>
-              <a:t>R</a:t>
-            </a:r>
-            <a:r>
-              <a:rPr lang="pt-BR" sz="1100">
-                <a:solidFill>
-                  <a:schemeClr val="dk2"/>
-                </a:solidFill>
-                <a:latin typeface="Roboto"/>
-                <a:ea typeface="Roboto"/>
-                <a:cs typeface="Roboto"/>
-                <a:sym typeface="Roboto"/>
-              </a:rPr>
-              <a:t>ecebem alertas sobre  alteração de temperatura  e umidade na carga.</a:t>
+              <a:t>Recebem alertas sobre  alteração de temperatura  e umidade na carga.</a:t>
             </a:r>
             <a:endParaRPr sz="1100">
               <a:solidFill>
@@ -6311,14 +6407,14 @@
             <a:avLst/>
           </a:prstGeom>
           <a:noFill/>
-          <a:ln cap="flat" cmpd="sng" w="9525">
+          <a:ln w="9525" cap="flat" cmpd="sng">
             <a:solidFill>
               <a:schemeClr val="dk2"/>
             </a:solidFill>
             <a:prstDash val="solid"/>
             <a:round/>
-            <a:headEnd len="med" w="med" type="none"/>
-            <a:tailEnd len="med" w="med" type="triangle"/>
+            <a:headEnd type="none" w="med" len="med"/>
+            <a:tailEnd type="triangle" w="med" len="med"/>
           </a:ln>
         </p:spPr>
       </p:cxnSp>
@@ -6337,14 +6433,14 @@
             <a:avLst/>
           </a:prstGeom>
           <a:noFill/>
-          <a:ln cap="flat" cmpd="sng" w="9525">
+          <a:ln w="9525" cap="flat" cmpd="sng">
             <a:solidFill>
               <a:schemeClr val="dk2"/>
             </a:solidFill>
             <a:prstDash val="solid"/>
             <a:round/>
-            <a:headEnd len="med" w="med" type="none"/>
-            <a:tailEnd len="med" w="med" type="none"/>
+            <a:headEnd type="none" w="med" len="med"/>
+            <a:tailEnd type="none" w="med" len="med"/>
           </a:ln>
         </p:spPr>
       </p:cxnSp>
@@ -6363,14 +6459,14 @@
             <a:avLst/>
           </a:prstGeom>
           <a:noFill/>
-          <a:ln cap="flat" cmpd="sng" w="9525">
+          <a:ln w="9525" cap="flat" cmpd="sng">
             <a:solidFill>
               <a:schemeClr val="dk2"/>
             </a:solidFill>
             <a:prstDash val="solid"/>
             <a:round/>
-            <a:headEnd len="med" w="med" type="none"/>
-            <a:tailEnd len="med" w="med" type="triangle"/>
+            <a:headEnd type="none" w="med" len="med"/>
+            <a:tailEnd type="triangle" w="med" len="med"/>
           </a:ln>
         </p:spPr>
       </p:cxnSp>
@@ -6445,14 +6541,14 @@
             <a:avLst/>
           </a:prstGeom>
           <a:noFill/>
-          <a:ln cap="flat" cmpd="sng" w="9525">
+          <a:ln w="9525" cap="flat" cmpd="sng">
             <a:solidFill>
               <a:schemeClr val="dk2"/>
             </a:solidFill>
             <a:prstDash val="solid"/>
             <a:round/>
-            <a:headEnd len="med" w="med" type="none"/>
-            <a:tailEnd len="med" w="med" type="triangle"/>
+            <a:headEnd type="none" w="med" len="med"/>
+            <a:tailEnd type="triangle" w="med" len="med"/>
           </a:ln>
         </p:spPr>
       </p:cxnSp>
@@ -6527,14 +6623,14 @@
             <a:avLst/>
           </a:prstGeom>
           <a:noFill/>
-          <a:ln cap="flat" cmpd="sng" w="9525">
+          <a:ln w="9525" cap="flat" cmpd="sng">
             <a:solidFill>
               <a:schemeClr val="dk2"/>
             </a:solidFill>
             <a:prstDash val="solid"/>
             <a:round/>
-            <a:headEnd len="med" w="med" type="none"/>
-            <a:tailEnd len="med" w="med" type="triangle"/>
+            <a:headEnd type="none" w="med" len="med"/>
+            <a:tailEnd type="triangle" w="med" len="med"/>
           </a:ln>
         </p:spPr>
       </p:cxnSp>
@@ -6558,12 +6654,12 @@
           </a:ln>
         </p:spPr>
         <p:txBody>
-          <a:bodyPr anchorCtr="0" anchor="t" bIns="91425" lIns="91425" spcFirstLastPara="1" rIns="91425" wrap="square" tIns="91425">
+          <a:bodyPr spcFirstLastPara="1" wrap="square" lIns="91425" tIns="91425" rIns="91425" bIns="91425" anchor="t" anchorCtr="0">
             <a:noAutofit/>
           </a:bodyPr>
           <a:lstStyle/>
           <a:p>
-            <a:pPr indent="0" lvl="0" marL="0" rtl="0" algn="ctr">
+            <a:pPr marL="0" lvl="0" indent="0" algn="ctr" rtl="0">
               <a:spcBef>
                 <a:spcPts val="0"/>
               </a:spcBef>
@@ -6573,7 +6669,7 @@
               <a:buNone/>
             </a:pPr>
             <a:r>
-              <a:rPr b="1" lang="pt-BR" sz="1100">
+              <a:rPr lang="pt-BR" sz="1100" b="1">
                 <a:solidFill>
                   <a:schemeClr val="dk2"/>
                 </a:solidFill>
@@ -6584,7 +6680,7 @@
               </a:rPr>
               <a:t>TecX analisa os dados</a:t>
             </a:r>
-            <a:endParaRPr b="1" sz="1100">
+            <a:endParaRPr sz="1100" b="1">
               <a:solidFill>
                 <a:schemeClr val="dk2"/>
               </a:solidFill>
@@ -6595,7 +6691,7 @@
             </a:endParaRPr>
           </a:p>
           <a:p>
-            <a:pPr indent="0" lvl="0" marL="0" rtl="0" algn="ctr">
+            <a:pPr marL="0" lvl="0" indent="0" algn="ctr" rtl="0">
               <a:spcBef>
                 <a:spcPts val="0"/>
               </a:spcBef>
@@ -6604,9 +6700,6 @@
               </a:spcAft>
               <a:buNone/>
             </a:pPr>
-            <a:r>
-              <a:t/>
-            </a:r>
             <a:endParaRPr sz="1100">
               <a:latin typeface="Roboto"/>
               <a:ea typeface="Roboto"/>
@@ -6631,14 +6724,14 @@
             <a:avLst/>
           </a:prstGeom>
           <a:noFill/>
-          <a:ln cap="flat" cmpd="sng" w="9525">
+          <a:ln w="9525" cap="flat" cmpd="sng">
             <a:solidFill>
               <a:schemeClr val="dk2"/>
             </a:solidFill>
             <a:prstDash val="solid"/>
             <a:round/>
-            <a:headEnd len="med" w="med" type="none"/>
-            <a:tailEnd len="med" w="med" type="triangle"/>
+            <a:headEnd type="none" w="med" len="med"/>
+            <a:tailEnd type="triangle" w="med" len="med"/>
           </a:ln>
         </p:spPr>
       </p:cxnSp>
@@ -6690,12 +6783,12 @@
           </a:ln>
         </p:spPr>
         <p:txBody>
-          <a:bodyPr anchorCtr="0" anchor="t" bIns="91425" lIns="91425" spcFirstLastPara="1" rIns="91425" wrap="square" tIns="91425">
+          <a:bodyPr spcFirstLastPara="1" wrap="square" lIns="91425" tIns="91425" rIns="91425" bIns="91425" anchor="t" anchorCtr="0">
             <a:noAutofit/>
           </a:bodyPr>
           <a:lstStyle/>
           <a:p>
-            <a:pPr indent="0" lvl="0" marL="0" rtl="0" algn="l">
+            <a:pPr marL="0" lvl="0" indent="0" algn="l" rtl="0">
               <a:spcBef>
                 <a:spcPts val="0"/>
               </a:spcBef>
@@ -6705,10 +6798,10 @@
               <a:buNone/>
             </a:pPr>
             <a:r>
-              <a:rPr b="1" lang="pt-BR" sz="1000"/>
+              <a:rPr lang="pt-BR" sz="1000" b="1"/>
               <a:t>Caminhão em transporte</a:t>
             </a:r>
-            <a:endParaRPr b="1" sz="1000"/>
+            <a:endParaRPr sz="1000" b="1"/>
           </a:p>
         </p:txBody>
       </p:sp>
@@ -6732,12 +6825,12 @@
           </a:ln>
         </p:spPr>
         <p:txBody>
-          <a:bodyPr anchorCtr="0" anchor="t" bIns="91425" lIns="91425" spcFirstLastPara="1" rIns="91425" wrap="square" tIns="91425">
+          <a:bodyPr spcFirstLastPara="1" wrap="square" lIns="91425" tIns="91425" rIns="91425" bIns="91425" anchor="t" anchorCtr="0">
             <a:noAutofit/>
           </a:bodyPr>
           <a:lstStyle/>
           <a:p>
-            <a:pPr indent="0" lvl="0" marL="0" rtl="0" algn="l">
+            <a:pPr marL="0" lvl="0" indent="0" algn="l" rtl="0">
               <a:spcBef>
                 <a:spcPts val="0"/>
               </a:spcBef>
@@ -6774,12 +6867,12 @@
           </a:ln>
         </p:spPr>
         <p:txBody>
-          <a:bodyPr anchorCtr="0" anchor="t" bIns="91425" lIns="91425" spcFirstLastPara="1" rIns="91425" wrap="square" tIns="91425">
+          <a:bodyPr spcFirstLastPara="1" wrap="square" lIns="91425" tIns="91425" rIns="91425" bIns="91425" anchor="t" anchorCtr="0">
             <a:noAutofit/>
           </a:bodyPr>
           <a:lstStyle/>
           <a:p>
-            <a:pPr indent="0" lvl="0" marL="0" rtl="0" algn="l">
+            <a:pPr marL="0" lvl="0" indent="0" algn="l" rtl="0">
               <a:spcBef>
                 <a:spcPts val="0"/>
               </a:spcBef>
@@ -6805,18 +6898,19 @@
 </file>
 
 <file path=ppt/slides/slide2.xml><?xml version="1.0" encoding="utf-8"?>
-<p:sld xmlns:a="http://schemas.openxmlformats.org/drawingml/2006/main" xmlns:r="http://schemas.openxmlformats.org/officeDocument/2006/relationships" xmlns:mc="http://schemas.openxmlformats.org/markup-compatibility/2006" xmlns:mv="urn:schemas-microsoft-com:mac:vml" xmlns:p="http://schemas.openxmlformats.org/presentationml/2006/main" xmlns:c="http://schemas.openxmlformats.org/drawingml/2006/chart" xmlns:dgm="http://schemas.openxmlformats.org/drawingml/2006/diagram" xmlns:o="urn:schemas-microsoft-com:office:office" xmlns:v="urn:schemas-microsoft-com:vml" xmlns:pvml="urn:schemas-microsoft-com:office:powerpoint" xmlns:com="http://schemas.openxmlformats.org/drawingml/2006/compatibility" xmlns:p14="http://schemas.microsoft.com/office/powerpoint/2010/main" xmlns:p15="http://schemas.microsoft.com/office/powerpoint/2012/main" xmlns:ahyp="http://schemas.microsoft.com/office/drawing/2018/hyperlinkcolor">
+<p:sld xmlns:a="http://schemas.openxmlformats.org/drawingml/2006/main" xmlns:r="http://schemas.openxmlformats.org/officeDocument/2006/relationships" xmlns:p="http://schemas.openxmlformats.org/presentationml/2006/main">
   <p:cSld>
     <p:bg>
       <p:bgPr>
         <a:solidFill>
           <a:srgbClr val="D2FFFC"/>
         </a:solidFill>
+        <a:effectLst/>
       </p:bgPr>
     </p:bg>
     <p:spTree>
       <p:nvGrpSpPr>
-        <p:cNvPr id="87" name="Shape 87"/>
+        <p:cNvPr id="1" name="Shape 87"/>
         <p:cNvGrpSpPr/>
         <p:nvPr/>
       </p:nvGrpSpPr>
@@ -6930,14 +7024,14 @@
             <a:avLst/>
           </a:prstGeom>
           <a:noFill/>
-          <a:ln cap="flat" cmpd="sng" w="9525">
+          <a:ln w="9525" cap="flat" cmpd="sng">
             <a:solidFill>
               <a:schemeClr val="dk2"/>
             </a:solidFill>
             <a:prstDash val="solid"/>
             <a:round/>
-            <a:headEnd len="med" w="med" type="none"/>
-            <a:tailEnd len="med" w="med" type="triangle"/>
+            <a:headEnd type="none" w="med" len="med"/>
+            <a:tailEnd type="triangle" w="med" len="med"/>
           </a:ln>
         </p:spPr>
       </p:cxnSp>
@@ -6959,14 +7053,14 @@
             <a:avLst/>
           </a:prstGeom>
           <a:noFill/>
-          <a:ln cap="flat" cmpd="sng" w="9525">
+          <a:ln w="9525" cap="flat" cmpd="sng">
             <a:solidFill>
               <a:schemeClr val="dk2"/>
             </a:solidFill>
             <a:prstDash val="solid"/>
             <a:round/>
-            <a:headEnd len="med" w="med" type="none"/>
-            <a:tailEnd len="med" w="med" type="triangle"/>
+            <a:headEnd type="none" w="med" len="med"/>
+            <a:tailEnd type="triangle" w="med" len="med"/>
           </a:ln>
         </p:spPr>
       </p:cxnSp>
@@ -6987,14 +7081,14 @@
             <a:avLst/>
           </a:prstGeom>
           <a:noFill/>
-          <a:ln cap="flat" cmpd="sng" w="9525">
+          <a:ln w="9525" cap="flat" cmpd="sng">
             <a:solidFill>
               <a:schemeClr val="dk2"/>
             </a:solidFill>
             <a:prstDash val="solid"/>
             <a:round/>
-            <a:headEnd len="med" w="med" type="none"/>
-            <a:tailEnd len="med" w="med" type="none"/>
+            <a:headEnd type="none" w="med" len="med"/>
+            <a:tailEnd type="none" w="med" len="med"/>
           </a:ln>
         </p:spPr>
       </p:cxnSp>
@@ -7018,12 +7112,12 @@
           </a:ln>
         </p:spPr>
         <p:txBody>
-          <a:bodyPr anchorCtr="0" anchor="t" bIns="91425" lIns="91425" spcFirstLastPara="1" rIns="91425" wrap="square" tIns="91425">
+          <a:bodyPr spcFirstLastPara="1" wrap="square" lIns="91425" tIns="91425" rIns="91425" bIns="91425" anchor="t" anchorCtr="0">
             <a:noAutofit/>
           </a:bodyPr>
           <a:lstStyle/>
           <a:p>
-            <a:pPr indent="0" lvl="0" marL="0" rtl="0" algn="l">
+            <a:pPr marL="0" lvl="0" indent="0" algn="l" rtl="0">
               <a:spcBef>
                 <a:spcPts val="0"/>
               </a:spcBef>
@@ -7039,16 +7133,7 @@
                 <a:cs typeface="Roboto"/>
                 <a:sym typeface="Roboto"/>
               </a:rPr>
-              <a:t> </a:t>
-            </a:r>
-            <a:r>
-              <a:rPr lang="pt-BR" sz="1000">
-                <a:latin typeface="Roboto"/>
-                <a:ea typeface="Roboto"/>
-                <a:cs typeface="Roboto"/>
-                <a:sym typeface="Roboto"/>
-              </a:rPr>
-              <a:t>Protoboard</a:t>
+              <a:t> Protoboard</a:t>
             </a:r>
             <a:endParaRPr sz="1000">
               <a:latin typeface="Roboto"/>
@@ -7079,12 +7164,12 @@
           </a:ln>
         </p:spPr>
         <p:txBody>
-          <a:bodyPr anchorCtr="0" anchor="t" bIns="91425" lIns="91425" spcFirstLastPara="1" rIns="91425" wrap="square" tIns="91425">
+          <a:bodyPr spcFirstLastPara="1" wrap="square" lIns="91425" tIns="91425" rIns="91425" bIns="91425" anchor="t" anchorCtr="0">
             <a:noAutofit/>
           </a:bodyPr>
           <a:lstStyle/>
           <a:p>
-            <a:pPr indent="0" lvl="0" marL="0" rtl="0" algn="l">
+            <a:pPr marL="0" lvl="0" indent="0" algn="l" rtl="0">
               <a:spcBef>
                 <a:spcPts val="0"/>
               </a:spcBef>
@@ -7100,16 +7185,7 @@
                 <a:cs typeface="Roboto"/>
                 <a:sym typeface="Roboto"/>
               </a:rPr>
-              <a:t> </a:t>
-            </a:r>
-            <a:r>
-              <a:rPr lang="pt-BR" sz="1000">
-                <a:latin typeface="Roboto"/>
-                <a:ea typeface="Roboto"/>
-                <a:cs typeface="Roboto"/>
-                <a:sym typeface="Roboto"/>
-              </a:rPr>
-              <a:t>Arduino</a:t>
+              <a:t> Arduino</a:t>
             </a:r>
             <a:endParaRPr sz="1000">
               <a:latin typeface="Roboto"/>
@@ -7140,12 +7216,12 @@
           </a:ln>
         </p:spPr>
         <p:txBody>
-          <a:bodyPr anchorCtr="0" anchor="t" bIns="91425" lIns="91425" spcFirstLastPara="1" rIns="91425" wrap="square" tIns="91425">
+          <a:bodyPr spcFirstLastPara="1" wrap="square" lIns="91425" tIns="91425" rIns="91425" bIns="91425" anchor="t" anchorCtr="0">
             <a:noAutofit/>
           </a:bodyPr>
           <a:lstStyle/>
           <a:p>
-            <a:pPr indent="0" lvl="0" marL="0" rtl="0" algn="l">
+            <a:pPr marL="0" lvl="0" indent="0" algn="l" rtl="0">
               <a:spcBef>
                 <a:spcPts val="0"/>
               </a:spcBef>
@@ -7238,12 +7314,12 @@
           </a:ln>
         </p:spPr>
         <p:txBody>
-          <a:bodyPr anchorCtr="0" anchor="t" bIns="91425" lIns="91425" spcFirstLastPara="1" rIns="91425" wrap="square" tIns="91425">
+          <a:bodyPr spcFirstLastPara="1" wrap="square" lIns="91425" tIns="91425" rIns="91425" bIns="91425" anchor="t" anchorCtr="0">
             <a:noAutofit/>
           </a:bodyPr>
           <a:lstStyle/>
           <a:p>
-            <a:pPr indent="0" lvl="0" marL="0" rtl="0" algn="ctr">
+            <a:pPr marL="0" lvl="0" indent="0" algn="ctr" rtl="0">
               <a:spcBef>
                 <a:spcPts val="0"/>
               </a:spcBef>
@@ -7269,7 +7345,7 @@
             </a:endParaRPr>
           </a:p>
           <a:p>
-            <a:pPr indent="0" lvl="0" marL="0" rtl="0" algn="ctr">
+            <a:pPr marL="0" lvl="0" indent="0" algn="ctr" rtl="0">
               <a:spcBef>
                 <a:spcPts val="0"/>
               </a:spcBef>
@@ -7400,12 +7476,12 @@
           </a:ln>
         </p:spPr>
         <p:txBody>
-          <a:bodyPr anchorCtr="0" anchor="t" bIns="91425" lIns="91425" spcFirstLastPara="1" rIns="91425" wrap="square" tIns="91425">
+          <a:bodyPr spcFirstLastPara="1" wrap="square" lIns="91425" tIns="91425" rIns="91425" bIns="91425" anchor="t" anchorCtr="0">
             <a:noAutofit/>
           </a:bodyPr>
           <a:lstStyle/>
           <a:p>
-            <a:pPr indent="0" lvl="0" marL="0" rtl="0" algn="ctr">
+            <a:pPr marL="0" lvl="0" indent="0" algn="ctr" rtl="0">
               <a:spcBef>
                 <a:spcPts val="0"/>
               </a:spcBef>
@@ -7431,7 +7507,7 @@
             </a:endParaRPr>
           </a:p>
           <a:p>
-            <a:pPr indent="0" lvl="0" marL="0" rtl="0" algn="ctr">
+            <a:pPr marL="0" lvl="0" indent="0" algn="ctr" rtl="0">
               <a:spcBef>
                 <a:spcPts val="0"/>
               </a:spcBef>
@@ -7613,14 +7689,14 @@
             <a:avLst/>
           </a:prstGeom>
           <a:noFill/>
-          <a:ln cap="flat" cmpd="sng" w="9525">
+          <a:ln w="9525" cap="flat" cmpd="sng">
             <a:solidFill>
               <a:srgbClr val="000000"/>
             </a:solidFill>
             <a:prstDash val="solid"/>
             <a:round/>
-            <a:headEnd len="med" w="med" type="none"/>
-            <a:tailEnd len="med" w="med" type="triangle"/>
+            <a:headEnd type="none" w="med" len="med"/>
+            <a:tailEnd type="triangle" w="med" len="med"/>
           </a:ln>
         </p:spPr>
       </p:cxnSp>
@@ -7672,12 +7748,12 @@
           </a:ln>
         </p:spPr>
         <p:txBody>
-          <a:bodyPr anchorCtr="0" anchor="t" bIns="91425" lIns="91425" spcFirstLastPara="1" rIns="91425" wrap="square" tIns="91425">
+          <a:bodyPr spcFirstLastPara="1" wrap="square" lIns="91425" tIns="91425" rIns="91425" bIns="91425" anchor="t" anchorCtr="0">
             <a:noAutofit/>
           </a:bodyPr>
           <a:lstStyle/>
           <a:p>
-            <a:pPr indent="0" lvl="0" marL="0" rtl="0" algn="ctr">
+            <a:pPr marL="0" lvl="0" indent="0" algn="ctr" rtl="0">
               <a:spcBef>
                 <a:spcPts val="0"/>
               </a:spcBef>
@@ -7703,7 +7779,7 @@
             </a:endParaRPr>
           </a:p>
           <a:p>
-            <a:pPr indent="0" lvl="0" marL="0" rtl="0" algn="ctr">
+            <a:pPr marL="0" lvl="0" indent="0" algn="ctr" rtl="0">
               <a:spcBef>
                 <a:spcPts val="0"/>
               </a:spcBef>
@@ -7801,14 +7877,14 @@
             <a:avLst/>
           </a:prstGeom>
           <a:noFill/>
-          <a:ln cap="flat" cmpd="sng" w="9525">
+          <a:ln w="9525" cap="flat" cmpd="sng">
             <a:solidFill>
               <a:schemeClr val="dk2"/>
             </a:solidFill>
             <a:prstDash val="solid"/>
             <a:round/>
-            <a:headEnd len="med" w="med" type="none"/>
-            <a:tailEnd len="med" w="med" type="triangle"/>
+            <a:headEnd type="none" w="med" len="med"/>
+            <a:tailEnd type="triangle" w="med" len="med"/>
           </a:ln>
         </p:spPr>
       </p:cxnSp>
@@ -7827,14 +7903,14 @@
             <a:avLst/>
           </a:prstGeom>
           <a:noFill/>
-          <a:ln cap="flat" cmpd="sng" w="9525">
+          <a:ln w="9525" cap="flat" cmpd="sng">
             <a:solidFill>
               <a:srgbClr val="000000"/>
             </a:solidFill>
             <a:prstDash val="solid"/>
             <a:round/>
-            <a:headEnd len="med" w="med" type="none"/>
-            <a:tailEnd len="med" w="med" type="triangle"/>
+            <a:headEnd type="none" w="med" len="med"/>
+            <a:tailEnd type="triangle" w="med" len="med"/>
           </a:ln>
         </p:spPr>
       </p:cxnSp>
@@ -7914,12 +7990,12 @@
           </a:ln>
         </p:spPr>
         <p:txBody>
-          <a:bodyPr anchorCtr="0" anchor="t" bIns="91425" lIns="91425" spcFirstLastPara="1" rIns="91425" wrap="square" tIns="91425">
+          <a:bodyPr spcFirstLastPara="1" wrap="square" lIns="91425" tIns="91425" rIns="91425" bIns="91425" anchor="t" anchorCtr="0">
             <a:noAutofit/>
           </a:bodyPr>
           <a:lstStyle/>
           <a:p>
-            <a:pPr indent="0" lvl="0" marL="0" rtl="0" algn="ctr">
+            <a:pPr marL="0" lvl="0" indent="0" algn="ctr" rtl="0">
               <a:spcBef>
                 <a:spcPts val="0"/>
               </a:spcBef>
@@ -7961,14 +8037,14 @@
             <a:avLst/>
           </a:prstGeom>
           <a:noFill/>
-          <a:ln cap="flat" cmpd="sng" w="9525">
+          <a:ln w="9525" cap="flat" cmpd="sng">
             <a:solidFill>
               <a:srgbClr val="000000"/>
             </a:solidFill>
             <a:prstDash val="solid"/>
             <a:round/>
-            <a:headEnd len="med" w="med" type="none"/>
-            <a:tailEnd len="med" w="med" type="none"/>
+            <a:headEnd type="none" w="med" len="med"/>
+            <a:tailEnd type="none" w="med" len="med"/>
           </a:ln>
         </p:spPr>
       </p:cxnSp>
@@ -7987,14 +8063,14 @@
             <a:avLst/>
           </a:prstGeom>
           <a:noFill/>
-          <a:ln cap="flat" cmpd="sng" w="9525">
+          <a:ln w="9525" cap="flat" cmpd="sng">
             <a:solidFill>
               <a:srgbClr val="000000"/>
             </a:solidFill>
             <a:prstDash val="solid"/>
             <a:round/>
-            <a:headEnd len="med" w="med" type="none"/>
-            <a:tailEnd len="med" w="med" type="triangle"/>
+            <a:headEnd type="none" w="med" len="med"/>
+            <a:tailEnd type="triangle" w="med" len="med"/>
           </a:ln>
         </p:spPr>
       </p:cxnSp>
@@ -8018,12 +8094,12 @@
           </a:ln>
         </p:spPr>
         <p:txBody>
-          <a:bodyPr anchorCtr="0" anchor="t" bIns="91425" lIns="91425" spcFirstLastPara="1" rIns="91425" wrap="square" tIns="91425">
+          <a:bodyPr spcFirstLastPara="1" wrap="square" lIns="91425" tIns="91425" rIns="91425" bIns="91425" anchor="t" anchorCtr="0">
             <a:noAutofit/>
           </a:bodyPr>
           <a:lstStyle/>
           <a:p>
-            <a:pPr indent="0" lvl="0" marL="0" rtl="0" algn="l">
+            <a:pPr marL="0" lvl="0" indent="0" algn="l" rtl="0">
               <a:spcBef>
                 <a:spcPts val="0"/>
               </a:spcBef>
@@ -8032,9 +8108,6 @@
               </a:spcAft>
               <a:buNone/>
             </a:pPr>
-            <a:r>
-              <a:t/>
-            </a:r>
             <a:endParaRPr/>
           </a:p>
         </p:txBody>
@@ -8054,14 +8127,14 @@
             <a:avLst/>
           </a:prstGeom>
           <a:noFill/>
-          <a:ln cap="flat" cmpd="sng" w="9525">
+          <a:ln w="9525" cap="flat" cmpd="sng">
             <a:solidFill>
               <a:srgbClr val="000000"/>
             </a:solidFill>
             <a:prstDash val="solid"/>
             <a:round/>
-            <a:headEnd len="med" w="med" type="none"/>
-            <a:tailEnd len="med" w="med" type="triangle"/>
+            <a:headEnd type="none" w="med" len="med"/>
+            <a:tailEnd type="triangle" w="med" len="med"/>
           </a:ln>
         </p:spPr>
       </p:cxnSp>
@@ -8113,12 +8186,12 @@
           </a:ln>
         </p:spPr>
         <p:txBody>
-          <a:bodyPr anchorCtr="0" anchor="t" bIns="91425" lIns="91425" spcFirstLastPara="1" rIns="91425" wrap="square" tIns="91425">
+          <a:bodyPr spcFirstLastPara="1" wrap="square" lIns="91425" tIns="91425" rIns="91425" bIns="91425" anchor="t" anchorCtr="0">
             <a:noAutofit/>
           </a:bodyPr>
           <a:lstStyle/>
           <a:p>
-            <a:pPr indent="0" lvl="0" marL="0" rtl="0" algn="l">
+            <a:pPr marL="0" lvl="0" indent="0" algn="l" rtl="0">
               <a:spcBef>
                 <a:spcPts val="0"/>
               </a:spcBef>
@@ -8144,7 +8217,7 @@
             </a:endParaRPr>
           </a:p>
           <a:p>
-            <a:pPr indent="0" lvl="0" marL="0" rtl="0" algn="l">
+            <a:pPr marL="0" lvl="0" indent="0" algn="l" rtl="0">
               <a:spcBef>
                 <a:spcPts val="0"/>
               </a:spcBef>
@@ -8153,9 +8226,6 @@
               </a:spcAft>
               <a:buNone/>
             </a:pPr>
-            <a:r>
-              <a:t/>
-            </a:r>
             <a:endParaRPr/>
           </a:p>
         </p:txBody>
@@ -8175,14 +8245,14 @@
             <a:avLst/>
           </a:prstGeom>
           <a:noFill/>
-          <a:ln cap="flat" cmpd="sng" w="9525">
+          <a:ln w="9525" cap="flat" cmpd="sng">
             <a:solidFill>
               <a:srgbClr val="000000"/>
             </a:solidFill>
             <a:prstDash val="solid"/>
             <a:round/>
-            <a:headEnd len="med" w="med" type="none"/>
-            <a:tailEnd len="med" w="med" type="triangle"/>
+            <a:headEnd type="none" w="med" len="med"/>
+            <a:tailEnd type="triangle" w="med" len="med"/>
           </a:ln>
         </p:spPr>
       </p:cxnSp>
@@ -8206,12 +8276,12 @@
           </a:ln>
         </p:spPr>
         <p:txBody>
-          <a:bodyPr anchorCtr="0" anchor="t" bIns="91425" lIns="91425" spcFirstLastPara="1" rIns="91425" wrap="square" tIns="91425">
+          <a:bodyPr spcFirstLastPara="1" wrap="square" lIns="91425" tIns="91425" rIns="91425" bIns="91425" anchor="t" anchorCtr="0">
             <a:noAutofit/>
           </a:bodyPr>
           <a:lstStyle/>
           <a:p>
-            <a:pPr indent="0" lvl="0" marL="0" rtl="0" algn="ctr">
+            <a:pPr marL="0" lvl="0" indent="0" algn="ctr" rtl="0">
               <a:spcBef>
                 <a:spcPts val="0"/>
               </a:spcBef>
@@ -8281,14 +8351,14 @@
             <a:avLst/>
           </a:prstGeom>
           <a:noFill/>
-          <a:ln cap="flat" cmpd="sng" w="9525">
+          <a:ln w="9525" cap="flat" cmpd="sng">
             <a:solidFill>
               <a:srgbClr val="000000"/>
             </a:solidFill>
             <a:prstDash val="solid"/>
             <a:round/>
-            <a:headEnd len="med" w="med" type="none"/>
-            <a:tailEnd len="med" w="med" type="triangle"/>
+            <a:headEnd type="none" w="med" len="med"/>
+            <a:tailEnd type="triangle" w="med" len="med"/>
           </a:ln>
         </p:spPr>
       </p:cxnSp>
@@ -8340,12 +8410,12 @@
           </a:ln>
         </p:spPr>
         <p:txBody>
-          <a:bodyPr anchorCtr="0" anchor="t" bIns="91425" lIns="91425" spcFirstLastPara="1" rIns="91425" wrap="square" tIns="91425">
+          <a:bodyPr spcFirstLastPara="1" wrap="square" lIns="91425" tIns="91425" rIns="91425" bIns="91425" anchor="t" anchorCtr="0">
             <a:noAutofit/>
           </a:bodyPr>
           <a:lstStyle/>
           <a:p>
-            <a:pPr indent="0" lvl="0" marL="0" rtl="0" algn="l">
+            <a:pPr marL="0" lvl="0" indent="0" algn="l" rtl="0">
               <a:spcBef>
                 <a:spcPts val="0"/>
               </a:spcBef>
@@ -8355,15 +8425,24 @@
               <a:buNone/>
             </a:pPr>
             <a:r>
-              <a:rPr lang="pt-BR" sz="1100">
+              <a:rPr lang="pt-BR" sz="1100" dirty="0">
                 <a:latin typeface="Roboto"/>
                 <a:ea typeface="Roboto"/>
                 <a:cs typeface="Roboto"/>
                 <a:sym typeface="Roboto"/>
               </a:rPr>
-              <a:t>Modem Wi-fi</a:t>
+              <a:t>Modem </a:t>
             </a:r>
-            <a:endParaRPr sz="1100">
+            <a:r>
+              <a:rPr lang="pt-BR" sz="1100" dirty="0" err="1">
+                <a:latin typeface="Roboto"/>
+                <a:ea typeface="Roboto"/>
+                <a:cs typeface="Roboto"/>
+                <a:sym typeface="Roboto"/>
+              </a:rPr>
+              <a:t>Wi-fi</a:t>
+            </a:r>
+            <a:endParaRPr sz="1100" dirty="0">
               <a:latin typeface="Roboto"/>
               <a:ea typeface="Roboto"/>
               <a:cs typeface="Roboto"/>
@@ -8371,7 +8450,7 @@
             </a:endParaRPr>
           </a:p>
           <a:p>
-            <a:pPr indent="0" lvl="0" marL="0" rtl="0" algn="l">
+            <a:pPr marL="0" lvl="0" indent="0" algn="l" rtl="0">
               <a:spcBef>
                 <a:spcPts val="0"/>
               </a:spcBef>
@@ -8380,10 +8459,7 @@
               </a:spcAft>
               <a:buNone/>
             </a:pPr>
-            <a:r>
-              <a:t/>
-            </a:r>
-            <a:endParaRPr/>
+            <a:endParaRPr dirty="0"/>
           </a:p>
         </p:txBody>
       </p:sp>
@@ -8402,14 +8478,14 @@
             <a:avLst/>
           </a:prstGeom>
           <a:noFill/>
-          <a:ln cap="flat" cmpd="sng" w="9525">
+          <a:ln w="9525" cap="flat" cmpd="sng">
             <a:solidFill>
               <a:schemeClr val="dk2"/>
             </a:solidFill>
             <a:prstDash val="solid"/>
             <a:round/>
-            <a:headEnd len="med" w="med" type="none"/>
-            <a:tailEnd len="med" w="med" type="triangle"/>
+            <a:headEnd type="none" w="med" len="med"/>
+            <a:tailEnd type="triangle" w="med" len="med"/>
           </a:ln>
         </p:spPr>
       </p:cxnSp>
@@ -8428,14 +8504,14 @@
             <a:avLst/>
           </a:prstGeom>
           <a:noFill/>
-          <a:ln cap="flat" cmpd="sng" w="9525">
+          <a:ln w="9525" cap="flat" cmpd="sng">
             <a:solidFill>
               <a:schemeClr val="dk2"/>
             </a:solidFill>
             <a:prstDash val="solid"/>
             <a:round/>
-            <a:headEnd len="med" w="med" type="none"/>
-            <a:tailEnd len="med" w="med" type="triangle"/>
+            <a:headEnd type="none" w="med" len="med"/>
+            <a:tailEnd type="triangle" w="med" len="med"/>
           </a:ln>
         </p:spPr>
       </p:cxnSp>
@@ -8454,14 +8530,14 @@
             <a:avLst/>
           </a:prstGeom>
           <a:noFill/>
-          <a:ln cap="flat" cmpd="sng" w="9525">
+          <a:ln w="9525" cap="flat" cmpd="sng">
             <a:solidFill>
               <a:schemeClr val="dk2"/>
             </a:solidFill>
             <a:prstDash val="solid"/>
             <a:round/>
-            <a:headEnd len="med" w="med" type="none"/>
-            <a:tailEnd len="med" w="med" type="none"/>
+            <a:headEnd type="none" w="med" len="med"/>
+            <a:tailEnd type="none" w="med" len="med"/>
           </a:ln>
         </p:spPr>
       </p:cxnSp>
@@ -8508,14 +8584,14 @@
             <a:avLst/>
           </a:prstGeom>
           <a:noFill/>
-          <a:ln cap="flat" cmpd="sng" w="9525">
+          <a:ln w="9525" cap="flat" cmpd="sng">
             <a:solidFill>
               <a:schemeClr val="dk2"/>
             </a:solidFill>
             <a:prstDash val="solid"/>
             <a:round/>
-            <a:headEnd len="med" w="med" type="none"/>
-            <a:tailEnd len="med" w="med" type="triangle"/>
+            <a:headEnd type="none" w="med" len="med"/>
+            <a:tailEnd type="triangle" w="med" len="med"/>
           </a:ln>
         </p:spPr>
       </p:cxnSp>
@@ -8534,14 +8610,14 @@
             <a:avLst/>
           </a:prstGeom>
           <a:noFill/>
-          <a:ln cap="flat" cmpd="sng" w="9525">
+          <a:ln w="9525" cap="flat" cmpd="sng">
             <a:solidFill>
               <a:srgbClr val="000000"/>
             </a:solidFill>
             <a:prstDash val="solid"/>
             <a:round/>
-            <a:headEnd len="med" w="med" type="none"/>
-            <a:tailEnd len="med" w="med" type="triangle"/>
+            <a:headEnd type="none" w="med" len="med"/>
+            <a:tailEnd type="triangle" w="med" len="med"/>
           </a:ln>
         </p:spPr>
       </p:cxnSp>
@@ -8601,6 +8677,218 @@
           </a:ln>
         </p:spPr>
       </p:pic>
+      <p:sp>
+        <p:nvSpPr>
+          <p:cNvPr id="2" name="Elipse 1">
+            <a:extLst>
+              <a:ext uri="{FF2B5EF4-FFF2-40B4-BE49-F238E27FC236}">
+                <a16:creationId xmlns:a16="http://schemas.microsoft.com/office/drawing/2014/main" id="{6F37786E-F6DE-460C-8375-17A07C5CF950}"/>
+              </a:ext>
+            </a:extLst>
+          </p:cNvPr>
+          <p:cNvSpPr/>
+          <p:nvPr/>
+        </p:nvSpPr>
+        <p:spPr>
+          <a:xfrm>
+            <a:off x="702528" y="1233775"/>
+            <a:ext cx="1929160" cy="1199167"/>
+          </a:xfrm>
+          <a:prstGeom prst="ellipse">
+            <a:avLst/>
+          </a:prstGeom>
+          <a:noFill/>
+          <a:ln>
+            <a:solidFill>
+              <a:srgbClr val="FF0000"/>
+            </a:solidFill>
+          </a:ln>
+        </p:spPr>
+        <p:style>
+          <a:lnRef idx="2">
+            <a:schemeClr val="accent1">
+              <a:shade val="50000"/>
+            </a:schemeClr>
+          </a:lnRef>
+          <a:fillRef idx="1">
+            <a:schemeClr val="accent1"/>
+          </a:fillRef>
+          <a:effectRef idx="0">
+            <a:schemeClr val="accent1"/>
+          </a:effectRef>
+          <a:fontRef idx="minor">
+            <a:schemeClr val="lt1"/>
+          </a:fontRef>
+        </p:style>
+        <p:txBody>
+          <a:bodyPr rtlCol="0" anchor="ctr"/>
+          <a:lstStyle/>
+          <a:p>
+            <a:pPr algn="ctr"/>
+            <a:endParaRPr lang="pt-BR"/>
+          </a:p>
+        </p:txBody>
+      </p:sp>
+      <p:sp>
+        <p:nvSpPr>
+          <p:cNvPr id="3" name="Elipse 2">
+            <a:extLst>
+              <a:ext uri="{FF2B5EF4-FFF2-40B4-BE49-F238E27FC236}">
+                <a16:creationId xmlns:a16="http://schemas.microsoft.com/office/drawing/2014/main" id="{F48A3DB1-5497-4E40-AF49-90E9941E1588}"/>
+              </a:ext>
+            </a:extLst>
+          </p:cNvPr>
+          <p:cNvSpPr/>
+          <p:nvPr/>
+        </p:nvSpPr>
+        <p:spPr>
+          <a:xfrm>
+            <a:off x="3751889" y="398729"/>
+            <a:ext cx="1929160" cy="1199167"/>
+          </a:xfrm>
+          <a:prstGeom prst="ellipse">
+            <a:avLst/>
+          </a:prstGeom>
+          <a:noFill/>
+          <a:ln>
+            <a:solidFill>
+              <a:srgbClr val="FF0000"/>
+            </a:solidFill>
+          </a:ln>
+        </p:spPr>
+        <p:style>
+          <a:lnRef idx="2">
+            <a:schemeClr val="accent1">
+              <a:shade val="50000"/>
+            </a:schemeClr>
+          </a:lnRef>
+          <a:fillRef idx="1">
+            <a:schemeClr val="accent1"/>
+          </a:fillRef>
+          <a:effectRef idx="0">
+            <a:schemeClr val="accent1"/>
+          </a:effectRef>
+          <a:fontRef idx="minor">
+            <a:schemeClr val="lt1"/>
+          </a:fontRef>
+        </p:style>
+        <p:txBody>
+          <a:bodyPr rtlCol="0" anchor="ctr"/>
+          <a:lstStyle/>
+          <a:p>
+            <a:pPr algn="ctr"/>
+            <a:endParaRPr lang="pt-BR"/>
+          </a:p>
+        </p:txBody>
+      </p:sp>
+      <p:sp>
+        <p:nvSpPr>
+          <p:cNvPr id="4" name="Elipse 3">
+            <a:extLst>
+              <a:ext uri="{FF2B5EF4-FFF2-40B4-BE49-F238E27FC236}">
+                <a16:creationId xmlns:a16="http://schemas.microsoft.com/office/drawing/2014/main" id="{60F6389E-599D-4D49-9297-CC044BE72636}"/>
+              </a:ext>
+            </a:extLst>
+          </p:cNvPr>
+          <p:cNvSpPr/>
+          <p:nvPr/>
+        </p:nvSpPr>
+        <p:spPr>
+          <a:xfrm>
+            <a:off x="6817325" y="292784"/>
+            <a:ext cx="1329132" cy="495916"/>
+          </a:xfrm>
+          <a:prstGeom prst="ellipse">
+            <a:avLst/>
+          </a:prstGeom>
+          <a:noFill/>
+          <a:ln>
+            <a:solidFill>
+              <a:srgbClr val="FF0000"/>
+            </a:solidFill>
+          </a:ln>
+        </p:spPr>
+        <p:style>
+          <a:lnRef idx="2">
+            <a:schemeClr val="accent1">
+              <a:shade val="50000"/>
+            </a:schemeClr>
+          </a:lnRef>
+          <a:fillRef idx="1">
+            <a:schemeClr val="accent1"/>
+          </a:fillRef>
+          <a:effectRef idx="0">
+            <a:schemeClr val="accent1"/>
+          </a:effectRef>
+          <a:fontRef idx="minor">
+            <a:schemeClr val="lt1"/>
+          </a:fontRef>
+        </p:style>
+        <p:txBody>
+          <a:bodyPr rtlCol="0" anchor="ctr"/>
+          <a:lstStyle/>
+          <a:p>
+            <a:pPr algn="ctr"/>
+            <a:endParaRPr lang="pt-BR"/>
+          </a:p>
+        </p:txBody>
+      </p:sp>
+      <p:sp>
+        <p:nvSpPr>
+          <p:cNvPr id="5" name="CaixaDeTexto 4">
+            <a:extLst>
+              <a:ext uri="{FF2B5EF4-FFF2-40B4-BE49-F238E27FC236}">
+                <a16:creationId xmlns:a16="http://schemas.microsoft.com/office/drawing/2014/main" id="{A287C031-C095-424B-A530-48C78D473882}"/>
+              </a:ext>
+            </a:extLst>
+          </p:cNvPr>
+          <p:cNvSpPr txBox="1"/>
+          <p:nvPr/>
+        </p:nvSpPr>
+        <p:spPr>
+          <a:xfrm>
+            <a:off x="6750584" y="406407"/>
+            <a:ext cx="1475089" cy="230832"/>
+          </a:xfrm>
+          <a:prstGeom prst="rect">
+            <a:avLst/>
+          </a:prstGeom>
+          <a:noFill/>
+        </p:spPr>
+        <p:txBody>
+          <a:bodyPr wrap="square" rtlCol="0">
+            <a:spAutoFit/>
+          </a:bodyPr>
+          <a:lstStyle/>
+          <a:p>
+            <a:r>
+              <a:rPr lang="pt-BR" sz="900" dirty="0"/>
+              <a:t>Adicionar </a:t>
+            </a:r>
+            <a:r>
+              <a:rPr lang="pt-BR" sz="900" dirty="0" err="1"/>
+              <a:t>Css</a:t>
+            </a:r>
+            <a:r>
+              <a:rPr lang="pt-BR" sz="900" dirty="0"/>
+              <a:t>, </a:t>
+            </a:r>
+            <a:r>
+              <a:rPr lang="pt-BR" sz="900" dirty="0" err="1"/>
+              <a:t>Js</a:t>
+            </a:r>
+            <a:r>
+              <a:rPr lang="pt-BR" sz="900" dirty="0"/>
+              <a:t> e </a:t>
+            </a:r>
+            <a:r>
+              <a:rPr lang="pt-BR" sz="900" dirty="0" err="1"/>
+              <a:t>Html</a:t>
+            </a:r>
+            <a:endParaRPr lang="pt-BR" sz="900" dirty="0"/>
+          </a:p>
+        </p:txBody>
+      </p:sp>
     </p:spTree>
   </p:cSld>
   <p:clrMapOvr>
@@ -8610,7 +8898,7 @@
 </file>
 
 <file path=ppt/theme/theme1.xml><?xml version="1.0" encoding="utf-8"?>
-<a:theme xmlns:a="http://schemas.openxmlformats.org/drawingml/2006/main" xmlns:r="http://schemas.openxmlformats.org/officeDocument/2006/relationships" name="Simple Light">
+<a:theme xmlns:a="http://schemas.openxmlformats.org/drawingml/2006/main" name="Simple Light">
   <a:themeElements>
     <a:clrScheme name="Simple Light">
       <a:dk1>
@@ -8885,11 +9173,13 @@
       </a:bgFillStyleLst>
     </a:fmtScheme>
   </a:themeElements>
+  <a:objectDefaults/>
+  <a:extraClrSchemeLst/>
 </a:theme>
 </file>
 
 <file path=ppt/theme/theme2.xml><?xml version="1.0" encoding="utf-8"?>
-<a:theme xmlns:a="http://schemas.openxmlformats.org/drawingml/2006/main" xmlns:r="http://schemas.openxmlformats.org/officeDocument/2006/relationships">
+<a:theme xmlns:a="http://schemas.openxmlformats.org/drawingml/2006/main">
   <a:themeElements>
     <a:clrScheme name="Default">
       <a:dk1>
@@ -9164,5 +9454,7 @@
       </a:bgFillStyleLst>
     </a:fmtScheme>
   </a:themeElements>
+  <a:objectDefaults/>
+  <a:extraClrSchemeLst/>
 </a:theme>
 </file>
</xml_diff>

<commit_message>
HLD e LLD finalizado
</commit_message>
<xml_diff>
--- a/Tecnologia da Informação/HLD&LLD.pptx
+++ b/Tecnologia da Informação/HLD&LLD.pptx
@@ -740,8 +740,8 @@
         </p:nvSpPr>
         <p:spPr>
           <a:xfrm>
-            <a:off x="381300" y="685800"/>
-            <a:ext cx="6096075" cy="3429000"/>
+            <a:off x="381000" y="685800"/>
+            <a:ext cx="6096000" cy="3429000"/>
           </a:xfrm>
           <a:custGeom>
             <a:avLst/>
@@ -6337,9 +6337,9 @@
               <a:buNone/>
             </a:pPr>
             <a:r>
-              <a:rPr lang="pt-BR" sz="1100" b="1">
+              <a:rPr lang="pt-BR" sz="1100" b="1" dirty="0">
                 <a:solidFill>
-                  <a:schemeClr val="dk2"/>
+                  <a:schemeClr val="tx1"/>
                 </a:solidFill>
                 <a:latin typeface="Roboto"/>
                 <a:ea typeface="Roboto"/>
@@ -6348,9 +6348,9 @@
               </a:rPr>
               <a:t>Empresa e motorista</a:t>
             </a:r>
-            <a:endParaRPr sz="1100" b="1">
+            <a:endParaRPr sz="1100" b="1" dirty="0">
               <a:solidFill>
-                <a:schemeClr val="dk2"/>
+                <a:schemeClr val="tx1"/>
               </a:solidFill>
               <a:latin typeface="Roboto"/>
               <a:ea typeface="Roboto"/>
@@ -6369,9 +6369,9 @@
               <a:buNone/>
             </a:pPr>
             <a:r>
-              <a:rPr lang="pt-BR" sz="1100">
+              <a:rPr lang="pt-BR" sz="1100" dirty="0">
                 <a:solidFill>
-                  <a:schemeClr val="dk2"/>
+                  <a:schemeClr val="tx1"/>
                 </a:solidFill>
                 <a:latin typeface="Roboto"/>
                 <a:ea typeface="Roboto"/>
@@ -6380,9 +6380,9 @@
               </a:rPr>
               <a:t>Recebem alertas sobre  alteração de temperatura  e umidade na carga.</a:t>
             </a:r>
-            <a:endParaRPr sz="1100">
+            <a:endParaRPr sz="1100" dirty="0">
               <a:solidFill>
-                <a:schemeClr val="dk2"/>
+                <a:schemeClr val="tx1"/>
               </a:solidFill>
               <a:latin typeface="Roboto"/>
               <a:ea typeface="Roboto"/>
@@ -6798,10 +6798,10 @@
               <a:buNone/>
             </a:pPr>
             <a:r>
-              <a:rPr lang="pt-BR" sz="1000" b="1"/>
+              <a:rPr lang="pt-BR" sz="1000" b="1" dirty="0"/>
               <a:t>Caminhão em transporte</a:t>
             </a:r>
-            <a:endParaRPr sz="1000" b="1"/>
+            <a:endParaRPr sz="1000" b="1" dirty="0"/>
           </a:p>
         </p:txBody>
       </p:sp>
@@ -6938,64 +6938,8 @@
         </p:blipFill>
         <p:spPr>
           <a:xfrm>
-            <a:off x="4990749" y="243900"/>
+            <a:off x="4970871" y="0"/>
             <a:ext cx="437848" cy="424476"/>
-          </a:xfrm>
-          <a:prstGeom prst="rect">
-            <a:avLst/>
-          </a:prstGeom>
-          <a:noFill/>
-          <a:ln>
-            <a:noFill/>
-          </a:ln>
-        </p:spPr>
-      </p:pic>
-      <p:pic>
-        <p:nvPicPr>
-          <p:cNvPr id="89" name="Google Shape;89;p14"/>
-          <p:cNvPicPr preferRelativeResize="0"/>
-          <p:nvPr/>
-        </p:nvPicPr>
-        <p:blipFill>
-          <a:blip r:embed="rId4">
-            <a:alphaModFix/>
-          </a:blip>
-          <a:stretch>
-            <a:fillRect/>
-          </a:stretch>
-        </p:blipFill>
-        <p:spPr>
-          <a:xfrm>
-            <a:off x="2823892" y="4058942"/>
-            <a:ext cx="832723" cy="621435"/>
-          </a:xfrm>
-          <a:prstGeom prst="rect">
-            <a:avLst/>
-          </a:prstGeom>
-          <a:noFill/>
-          <a:ln>
-            <a:noFill/>
-          </a:ln>
-        </p:spPr>
-      </p:pic>
-      <p:pic>
-        <p:nvPicPr>
-          <p:cNvPr id="90" name="Google Shape;90;p14"/>
-          <p:cNvPicPr preferRelativeResize="0"/>
-          <p:nvPr/>
-        </p:nvPicPr>
-        <p:blipFill>
-          <a:blip r:embed="rId5">
-            <a:alphaModFix/>
-          </a:blip>
-          <a:stretch>
-            <a:fillRect/>
-          </a:stretch>
-        </p:blipFill>
-        <p:spPr>
-          <a:xfrm>
-            <a:off x="2823880" y="3543107"/>
-            <a:ext cx="772530" cy="576106"/>
           </a:xfrm>
           <a:prstGeom prst="rect">
             <a:avLst/>
@@ -7017,7 +6961,7 @@
         </p:nvCxnSpPr>
         <p:spPr>
           <a:xfrm>
-            <a:off x="3210144" y="3543107"/>
+            <a:off x="3131229" y="3304889"/>
             <a:ext cx="0" cy="0"/>
           </a:xfrm>
           <a:prstGeom prst="straightConnector1">
@@ -7046,7 +6990,7 @@
         </p:nvCxnSpPr>
         <p:spPr>
           <a:xfrm>
-            <a:off x="3210144" y="3543107"/>
+            <a:off x="3131229" y="3304889"/>
             <a:ext cx="0" cy="0"/>
           </a:xfrm>
           <a:prstGeom prst="straightConnector1">
@@ -7074,7 +7018,7 @@
         </p:nvCxnSpPr>
         <p:spPr>
           <a:xfrm>
-            <a:off x="2823892" y="4369659"/>
+            <a:off x="2744976" y="4131441"/>
             <a:ext cx="0" cy="0"/>
           </a:xfrm>
           <a:prstGeom prst="straightConnector1">
@@ -7100,8 +7044,8 @@
         </p:nvSpPr>
         <p:spPr>
           <a:xfrm>
-            <a:off x="2803573" y="4534194"/>
-            <a:ext cx="873300" cy="365400"/>
+            <a:off x="2803014" y="4300233"/>
+            <a:ext cx="832723" cy="365400"/>
           </a:xfrm>
           <a:prstGeom prst="rect">
             <a:avLst/>
@@ -7127,7 +7071,7 @@
               <a:buNone/>
             </a:pPr>
             <a:r>
-              <a:rPr lang="pt-BR" sz="1000">
+              <a:rPr lang="pt-BR" sz="900" b="1" dirty="0">
                 <a:latin typeface="Roboto"/>
                 <a:ea typeface="Roboto"/>
                 <a:cs typeface="Roboto"/>
@@ -7135,7 +7079,7 @@
               </a:rPr>
               <a:t> Protoboard</a:t>
             </a:r>
-            <a:endParaRPr sz="1000">
+            <a:endParaRPr sz="900" b="1" dirty="0">
               <a:latin typeface="Roboto"/>
               <a:ea typeface="Roboto"/>
               <a:cs typeface="Roboto"/>
@@ -7144,16 +7088,145 @@
           </a:p>
         </p:txBody>
       </p:sp>
+      <p:grpSp>
+        <p:nvGrpSpPr>
+          <p:cNvPr id="6" name="Agrupar 5">
+            <a:extLst>
+              <a:ext uri="{FF2B5EF4-FFF2-40B4-BE49-F238E27FC236}">
+                <a16:creationId xmlns:a16="http://schemas.microsoft.com/office/drawing/2014/main" id="{D9320A74-039C-4C35-B75D-4B62F33FF0CA}"/>
+              </a:ext>
+            </a:extLst>
+          </p:cNvPr>
+          <p:cNvGrpSpPr/>
+          <p:nvPr/>
+        </p:nvGrpSpPr>
+        <p:grpSpPr>
+          <a:xfrm>
+            <a:off x="2676435" y="2977907"/>
+            <a:ext cx="974535" cy="1464252"/>
+            <a:chOff x="2735473" y="2972225"/>
+            <a:chExt cx="974535" cy="1464252"/>
+          </a:xfrm>
+        </p:grpSpPr>
+        <p:pic>
+          <p:nvPicPr>
+            <p:cNvPr id="89" name="Google Shape;89;p14"/>
+            <p:cNvPicPr preferRelativeResize="0"/>
+            <p:nvPr/>
+          </p:nvPicPr>
+          <p:blipFill>
+            <a:blip r:embed="rId4">
+              <a:alphaModFix/>
+            </a:blip>
+            <a:stretch>
+              <a:fillRect/>
+            </a:stretch>
+          </p:blipFill>
+          <p:spPr>
+            <a:xfrm>
+              <a:off x="2804014" y="3815042"/>
+              <a:ext cx="832723" cy="621435"/>
+            </a:xfrm>
+            <a:prstGeom prst="rect">
+              <a:avLst/>
+            </a:prstGeom>
+            <a:noFill/>
+            <a:ln>
+              <a:noFill/>
+            </a:ln>
+          </p:spPr>
+        </p:pic>
+        <p:pic>
+          <p:nvPicPr>
+            <p:cNvPr id="90" name="Google Shape;90;p14"/>
+            <p:cNvPicPr preferRelativeResize="0"/>
+            <p:nvPr/>
+          </p:nvPicPr>
+          <p:blipFill>
+            <a:blip r:embed="rId5">
+              <a:alphaModFix/>
+            </a:blip>
+            <a:stretch>
+              <a:fillRect/>
+            </a:stretch>
+          </p:blipFill>
+          <p:spPr>
+            <a:xfrm>
+              <a:off x="2804002" y="3299207"/>
+              <a:ext cx="772530" cy="576106"/>
+            </a:xfrm>
+            <a:prstGeom prst="rect">
+              <a:avLst/>
+            </a:prstGeom>
+            <a:noFill/>
+            <a:ln>
+              <a:noFill/>
+            </a:ln>
+          </p:spPr>
+        </p:pic>
+        <p:sp>
+          <p:nvSpPr>
+            <p:cNvPr id="95" name="Google Shape;95;p14"/>
+            <p:cNvSpPr txBox="1"/>
+            <p:nvPr/>
+          </p:nvSpPr>
+          <p:spPr>
+            <a:xfrm>
+              <a:off x="2735473" y="2972225"/>
+              <a:ext cx="974535" cy="321300"/>
+            </a:xfrm>
+            <a:prstGeom prst="rect">
+              <a:avLst/>
+            </a:prstGeom>
+            <a:noFill/>
+            <a:ln>
+              <a:noFill/>
+            </a:ln>
+          </p:spPr>
+          <p:txBody>
+            <a:bodyPr spcFirstLastPara="1" wrap="square" lIns="91425" tIns="91425" rIns="91425" bIns="91425" anchor="t" anchorCtr="0">
+              <a:noAutofit/>
+            </a:bodyPr>
+            <a:lstStyle/>
+            <a:p>
+              <a:pPr marL="0" lvl="0" indent="0" algn="l" rtl="0">
+                <a:spcBef>
+                  <a:spcPts val="0"/>
+                </a:spcBef>
+                <a:spcAft>
+                  <a:spcPts val="0"/>
+                </a:spcAft>
+                <a:buNone/>
+              </a:pPr>
+              <a:r>
+                <a:rPr lang="pt-BR" b="1" dirty="0">
+                  <a:latin typeface="Roboto"/>
+                  <a:ea typeface="Roboto"/>
+                  <a:cs typeface="Roboto"/>
+                  <a:sym typeface="Roboto"/>
+                </a:rPr>
+                <a:t> Arduino</a:t>
+              </a:r>
+              <a:endParaRPr b="1" dirty="0">
+                <a:latin typeface="Roboto"/>
+                <a:ea typeface="Roboto"/>
+                <a:cs typeface="Roboto"/>
+                <a:sym typeface="Roboto"/>
+              </a:endParaRPr>
+            </a:p>
+          </p:txBody>
+        </p:sp>
+      </p:grpSp>
       <p:sp>
         <p:nvSpPr>
-          <p:cNvPr id="95" name="Google Shape;95;p14"/>
+          <p:cNvPr id="96" name="Google Shape;96;p14"/>
           <p:cNvSpPr txBox="1"/>
           <p:nvPr/>
         </p:nvSpPr>
         <p:spPr>
           <a:xfrm>
-            <a:off x="2900643" y="3249086"/>
-            <a:ext cx="679200" cy="321300"/>
+            <a:off x="4048675" y="3832524"/>
+            <a:ext cx="801424" cy="506875"/>
           </a:xfrm>
           <a:prstGeom prst="rect">
             <a:avLst/>
@@ -7179,62 +7252,16 @@
               <a:buNone/>
             </a:pPr>
             <a:r>
-              <a:rPr lang="pt-BR" sz="1000">
-                <a:latin typeface="Roboto"/>
-                <a:ea typeface="Roboto"/>
-                <a:cs typeface="Roboto"/>
-                <a:sym typeface="Roboto"/>
+              <a:rPr lang="pt-BR" b="1" dirty="0">
+                <a:latin typeface="Roboto" panose="020B0604020202020204" charset="0"/>
+                <a:ea typeface="Roboto" panose="020B0604020202020204" charset="0"/>
               </a:rPr>
-              <a:t> Arduino</a:t>
-            </a:r>
-            <a:endParaRPr sz="1000">
-              <a:latin typeface="Roboto"/>
-              <a:ea typeface="Roboto"/>
-              <a:cs typeface="Roboto"/>
-              <a:sym typeface="Roboto"/>
-            </a:endParaRPr>
-          </a:p>
-        </p:txBody>
-      </p:sp>
-      <p:sp>
-        <p:nvSpPr>
-          <p:cNvPr id="96" name="Google Shape;96;p14"/>
-          <p:cNvSpPr txBox="1"/>
-          <p:nvPr/>
-        </p:nvSpPr>
-        <p:spPr>
-          <a:xfrm>
-            <a:off x="3715646" y="4542012"/>
-            <a:ext cx="986400" cy="349800"/>
-          </a:xfrm>
-          <a:prstGeom prst="rect">
-            <a:avLst/>
-          </a:prstGeom>
-          <a:noFill/>
-          <a:ln>
-            <a:noFill/>
-          </a:ln>
-        </p:spPr>
-        <p:txBody>
-          <a:bodyPr spcFirstLastPara="1" wrap="square" lIns="91425" tIns="91425" rIns="91425" bIns="91425" anchor="t" anchorCtr="0">
-            <a:noAutofit/>
-          </a:bodyPr>
-          <a:lstStyle/>
-          <a:p>
-            <a:pPr marL="0" lvl="0" indent="0" algn="l" rtl="0">
-              <a:spcBef>
-                <a:spcPts val="0"/>
-              </a:spcBef>
-              <a:spcAft>
-                <a:spcPts val="0"/>
-              </a:spcAft>
-              <a:buNone/>
-            </a:pPr>
-            <a:r>
-              <a:rPr lang="pt-BR" sz="1000"/>
               <a:t>Sensor DHT11</a:t>
             </a:r>
-            <a:endParaRPr sz="1000"/>
+            <a:endParaRPr b="1" dirty="0">
+              <a:latin typeface="Roboto" panose="020B0604020202020204" charset="0"/>
+              <a:ea typeface="Roboto" panose="020B0604020202020204" charset="0"/>
+            </a:endParaRPr>
           </a:p>
         </p:txBody>
       </p:sp>
@@ -7254,7 +7281,7 @@
         </p:blipFill>
         <p:spPr>
           <a:xfrm>
-            <a:off x="4060037" y="4078757"/>
+            <a:off x="4173507" y="3407706"/>
             <a:ext cx="511538" cy="495914"/>
           </a:xfrm>
           <a:prstGeom prst="rect">
@@ -7282,7 +7309,7 @@
         </p:blipFill>
         <p:spPr>
           <a:xfrm>
-            <a:off x="1734828" y="3466187"/>
+            <a:off x="1714950" y="3222287"/>
             <a:ext cx="679204" cy="479393"/>
           </a:xfrm>
           <a:prstGeom prst="rect">
@@ -7302,7 +7329,7 @@
         </p:nvSpPr>
         <p:spPr>
           <a:xfrm>
-            <a:off x="1427895" y="4168667"/>
+            <a:off x="1408017" y="3924767"/>
             <a:ext cx="1119300" cy="365400"/>
           </a:xfrm>
           <a:prstGeom prst="rect">
@@ -7329,7 +7356,7 @@
               <a:buNone/>
             </a:pPr>
             <a:r>
-              <a:rPr lang="pt-BR" sz="900">
+              <a:rPr lang="pt-BR" sz="900" b="1" dirty="0">
                 <a:latin typeface="Roboto"/>
                 <a:ea typeface="Roboto"/>
                 <a:cs typeface="Roboto"/>
@@ -7337,7 +7364,7 @@
               </a:rPr>
               <a:t>10m cabo usb </a:t>
             </a:r>
-            <a:endParaRPr sz="900">
+            <a:endParaRPr sz="900" b="1" dirty="0">
               <a:latin typeface="Roboto"/>
               <a:ea typeface="Roboto"/>
               <a:cs typeface="Roboto"/>
@@ -7355,7 +7382,7 @@
               <a:buNone/>
             </a:pPr>
             <a:r>
-              <a:rPr lang="pt-BR" sz="900">
+              <a:rPr lang="pt-BR" sz="900" b="1" dirty="0">
                 <a:latin typeface="Roboto"/>
                 <a:ea typeface="Roboto"/>
                 <a:cs typeface="Roboto"/>
@@ -7363,7 +7390,7 @@
               </a:rPr>
               <a:t>uno para Arduino</a:t>
             </a:r>
-            <a:endParaRPr sz="900">
+            <a:endParaRPr sz="900" b="1" dirty="0">
               <a:latin typeface="Roboto"/>
               <a:ea typeface="Roboto"/>
               <a:cs typeface="Roboto"/>
@@ -7374,7 +7401,7 @@
       </p:sp>
       <p:pic>
         <p:nvPicPr>
-          <p:cNvPr id="100" name="Google Shape;100;p14"/>
+          <p:cNvPr id="101" name="Google Shape;101;p14"/>
           <p:cNvPicPr preferRelativeResize="0"/>
           <p:nvPr/>
         </p:nvPicPr>
@@ -7388,8 +7415,8 @@
         </p:blipFill>
         <p:spPr>
           <a:xfrm>
-            <a:off x="7822205" y="889973"/>
-            <a:ext cx="437849" cy="343803"/>
+            <a:off x="4330866" y="183835"/>
+            <a:ext cx="686547" cy="686547"/>
           </a:xfrm>
           <a:prstGeom prst="rect">
             <a:avLst/>
@@ -7402,7 +7429,7 @@
       </p:pic>
       <p:pic>
         <p:nvPicPr>
-          <p:cNvPr id="101" name="Google Shape;101;p14"/>
+          <p:cNvPr id="104" name="Google Shape;104;p14"/>
           <p:cNvPicPr preferRelativeResize="0"/>
           <p:nvPr/>
         </p:nvPicPr>
@@ -7416,8 +7443,8 @@
         </p:blipFill>
         <p:spPr>
           <a:xfrm>
-            <a:off x="4350744" y="427735"/>
-            <a:ext cx="686547" cy="686547"/>
+            <a:off x="7878834" y="2977907"/>
+            <a:ext cx="566313" cy="321300"/>
           </a:xfrm>
           <a:prstGeom prst="rect">
             <a:avLst/>
@@ -7428,9 +7455,37 @@
           </a:ln>
         </p:spPr>
       </p:pic>
+      <p:cxnSp>
+        <p:nvCxnSpPr>
+          <p:cNvPr id="109" name="Google Shape;109;p14"/>
+          <p:cNvCxnSpPr>
+            <a:cxnSpLocks/>
+          </p:cNvCxnSpPr>
+          <p:nvPr/>
+        </p:nvCxnSpPr>
+        <p:spPr>
+          <a:xfrm flipV="1">
+            <a:off x="5270447" y="589299"/>
+            <a:ext cx="652247" cy="5260"/>
+          </a:xfrm>
+          <a:prstGeom prst="straightConnector1">
+            <a:avLst/>
+          </a:prstGeom>
+          <a:noFill/>
+          <a:ln w="9525" cap="flat" cmpd="sng">
+            <a:solidFill>
+              <a:srgbClr val="000000"/>
+            </a:solidFill>
+            <a:prstDash val="solid"/>
+            <a:round/>
+            <a:headEnd type="none" w="med" len="med"/>
+            <a:tailEnd type="triangle" w="med" len="med"/>
+          </a:ln>
+        </p:spPr>
+      </p:cxnSp>
       <p:pic>
         <p:nvPicPr>
-          <p:cNvPr id="102" name="Google Shape;102;p14"/>
+          <p:cNvPr id="113" name="Google Shape;113;p14"/>
           <p:cNvPicPr preferRelativeResize="0"/>
           <p:nvPr/>
         </p:nvPicPr>
@@ -7444,8 +7499,8 @@
         </p:blipFill>
         <p:spPr>
           <a:xfrm>
-            <a:off x="6207500" y="3487817"/>
-            <a:ext cx="511515" cy="506876"/>
+            <a:off x="6000398" y="326825"/>
+            <a:ext cx="511538" cy="495916"/>
           </a:xfrm>
           <a:prstGeom prst="rect">
             <a:avLst/>
@@ -7456,16 +7511,80 @@
           </a:ln>
         </p:spPr>
       </p:pic>
-      <p:sp>
-        <p:nvSpPr>
-          <p:cNvPr id="103" name="Google Shape;103;p14"/>
-          <p:cNvSpPr txBox="1"/>
+      <p:cxnSp>
+        <p:nvCxnSpPr>
+          <p:cNvPr id="114" name="Google Shape;114;p14"/>
+          <p:cNvCxnSpPr>
+            <a:cxnSpLocks/>
+          </p:cNvCxnSpPr>
           <p:nvPr/>
-        </p:nvSpPr>
-        <p:spPr>
-          <a:xfrm>
-            <a:off x="5870600" y="4070027"/>
-            <a:ext cx="1185300" cy="621300"/>
+        </p:nvCxnSpPr>
+        <p:spPr>
+          <a:xfrm>
+            <a:off x="8130451" y="2528193"/>
+            <a:ext cx="0" cy="331334"/>
+          </a:xfrm>
+          <a:prstGeom prst="straightConnector1">
+            <a:avLst/>
+          </a:prstGeom>
+          <a:noFill/>
+          <a:ln w="9525" cap="flat" cmpd="sng">
+            <a:solidFill>
+              <a:schemeClr val="dk2"/>
+            </a:solidFill>
+            <a:prstDash val="solid"/>
+            <a:round/>
+            <a:headEnd type="none" w="med" len="med"/>
+            <a:tailEnd type="triangle" w="med" len="med"/>
+          </a:ln>
+        </p:spPr>
+      </p:cxnSp>
+      <p:cxnSp>
+        <p:nvCxnSpPr>
+          <p:cNvPr id="115" name="Google Shape;115;p14"/>
+          <p:cNvCxnSpPr>
+            <a:cxnSpLocks/>
+          </p:cNvCxnSpPr>
+          <p:nvPr/>
+        </p:nvCxnSpPr>
+        <p:spPr>
+          <a:xfrm>
+            <a:off x="6616774" y="589299"/>
+            <a:ext cx="495887" cy="2933"/>
+          </a:xfrm>
+          <a:prstGeom prst="straightConnector1">
+            <a:avLst/>
+          </a:prstGeom>
+          <a:noFill/>
+          <a:ln w="9525" cap="flat" cmpd="sng">
+            <a:solidFill>
+              <a:srgbClr val="000000"/>
+            </a:solidFill>
+            <a:prstDash val="solid"/>
+            <a:round/>
+            <a:headEnd type="none" w="med" len="med"/>
+            <a:tailEnd type="triangle" w="med" len="med"/>
+          </a:ln>
+        </p:spPr>
+      </p:cxnSp>
+      <p:pic>
+        <p:nvPicPr>
+          <p:cNvPr id="116" name="Google Shape;116;p14"/>
+          <p:cNvPicPr preferRelativeResize="0"/>
+          <p:nvPr/>
+        </p:nvPicPr>
+        <p:blipFill>
+          <a:blip r:embed="rId9">
+            <a:alphaModFix/>
+          </a:blip>
+          <a:stretch>
+            <a:fillRect/>
+          </a:stretch>
+        </p:blipFill>
+        <p:spPr>
+          <a:xfrm>
+            <a:off x="2897964" y="1291553"/>
+            <a:ext cx="566313" cy="321300"/>
           </a:xfrm>
           <a:prstGeom prst="rect">
             <a:avLst/>
@@ -7475,68 +7594,10 @@
             <a:noFill/>
           </a:ln>
         </p:spPr>
-        <p:txBody>
-          <a:bodyPr spcFirstLastPara="1" wrap="square" lIns="91425" tIns="91425" rIns="91425" bIns="91425" anchor="t" anchorCtr="0">
-            <a:noAutofit/>
-          </a:bodyPr>
-          <a:lstStyle/>
-          <a:p>
-            <a:pPr marL="0" lvl="0" indent="0" algn="ctr" rtl="0">
-              <a:spcBef>
-                <a:spcPts val="0"/>
-              </a:spcBef>
-              <a:spcAft>
-                <a:spcPts val="0"/>
-              </a:spcAft>
-              <a:buNone/>
-            </a:pPr>
-            <a:r>
-              <a:rPr lang="pt-BR" sz="1000">
-                <a:latin typeface="Roboto"/>
-                <a:ea typeface="Roboto"/>
-                <a:cs typeface="Roboto"/>
-                <a:sym typeface="Roboto"/>
-              </a:rPr>
-              <a:t>Android versão 6+</a:t>
-            </a:r>
-            <a:endParaRPr sz="1000">
-              <a:latin typeface="Roboto"/>
-              <a:ea typeface="Roboto"/>
-              <a:cs typeface="Roboto"/>
-              <a:sym typeface="Roboto"/>
-            </a:endParaRPr>
-          </a:p>
-          <a:p>
-            <a:pPr marL="0" lvl="0" indent="0" algn="ctr" rtl="0">
-              <a:spcBef>
-                <a:spcPts val="0"/>
-              </a:spcBef>
-              <a:spcAft>
-                <a:spcPts val="0"/>
-              </a:spcAft>
-              <a:buNone/>
-            </a:pPr>
-            <a:r>
-              <a:rPr lang="pt-BR" sz="1000">
-                <a:latin typeface="Roboto"/>
-                <a:ea typeface="Roboto"/>
-                <a:cs typeface="Roboto"/>
-                <a:sym typeface="Roboto"/>
-              </a:rPr>
-              <a:t>IOS versão 10+</a:t>
-            </a:r>
-            <a:endParaRPr sz="1000">
-              <a:latin typeface="Roboto"/>
-              <a:ea typeface="Roboto"/>
-              <a:cs typeface="Roboto"/>
-              <a:sym typeface="Roboto"/>
-            </a:endParaRPr>
-          </a:p>
-        </p:txBody>
-      </p:sp>
+      </p:pic>
       <p:pic>
         <p:nvPicPr>
-          <p:cNvPr id="104" name="Google Shape;104;p14"/>
+          <p:cNvPr id="117" name="Google Shape;117;p14"/>
           <p:cNvPicPr preferRelativeResize="0"/>
           <p:nvPr/>
         </p:nvPicPr>
@@ -7550,8 +7611,8 @@
         </p:blipFill>
         <p:spPr>
           <a:xfrm>
-            <a:off x="7757995" y="2031282"/>
-            <a:ext cx="566313" cy="321300"/>
+            <a:off x="383822" y="3347456"/>
+            <a:ext cx="929060" cy="889149"/>
           </a:xfrm>
           <a:prstGeom prst="rect">
             <a:avLst/>
@@ -7562,24 +7623,16 @@
           </a:ln>
         </p:spPr>
       </p:pic>
-      <p:pic>
-        <p:nvPicPr>
-          <p:cNvPr id="105" name="Google Shape;105;p14"/>
-          <p:cNvPicPr preferRelativeResize="0"/>
+      <p:sp>
+        <p:nvSpPr>
+          <p:cNvPr id="118" name="Google Shape;118;p14"/>
+          <p:cNvSpPr txBox="1"/>
           <p:nvPr/>
-        </p:nvPicPr>
-        <p:blipFill>
-          <a:blip r:embed="rId12">
-            <a:alphaModFix/>
-          </a:blip>
-          <a:stretch>
-            <a:fillRect/>
-          </a:stretch>
-        </p:blipFill>
-        <p:spPr>
-          <a:xfrm>
-            <a:off x="7375553" y="3591336"/>
-            <a:ext cx="350208" cy="338002"/>
+        </p:nvSpPr>
+        <p:spPr>
+          <a:xfrm>
+            <a:off x="288685" y="4039974"/>
+            <a:ext cx="1119300" cy="517500"/>
           </a:xfrm>
           <a:prstGeom prst="rect">
             <a:avLst/>
@@ -7589,101 +7642,49 @@
             <a:noFill/>
           </a:ln>
         </p:spPr>
-      </p:pic>
-      <p:pic>
-        <p:nvPicPr>
-          <p:cNvPr id="106" name="Google Shape;106;p14"/>
-          <p:cNvPicPr preferRelativeResize="0"/>
-          <p:nvPr/>
-        </p:nvPicPr>
-        <p:blipFill>
-          <a:blip r:embed="rId13">
-            <a:alphaModFix/>
-          </a:blip>
-          <a:stretch>
-            <a:fillRect/>
-          </a:stretch>
-        </p:blipFill>
-        <p:spPr>
-          <a:xfrm>
-            <a:off x="7516088" y="3276475"/>
-            <a:ext cx="276294" cy="266632"/>
-          </a:xfrm>
-          <a:prstGeom prst="rect">
-            <a:avLst/>
-          </a:prstGeom>
-          <a:noFill/>
-          <a:ln>
-            <a:noFill/>
-          </a:ln>
-        </p:spPr>
-      </p:pic>
-      <p:pic>
-        <p:nvPicPr>
-          <p:cNvPr id="107" name="Google Shape;107;p14"/>
-          <p:cNvPicPr preferRelativeResize="0"/>
-          <p:nvPr/>
-        </p:nvPicPr>
-        <p:blipFill>
-          <a:blip r:embed="rId14">
-            <a:alphaModFix/>
-          </a:blip>
-          <a:stretch>
-            <a:fillRect/>
-          </a:stretch>
-        </p:blipFill>
-        <p:spPr>
-          <a:xfrm>
-            <a:off x="8454470" y="3662089"/>
-            <a:ext cx="267589" cy="266638"/>
-          </a:xfrm>
-          <a:prstGeom prst="rect">
-            <a:avLst/>
-          </a:prstGeom>
-          <a:noFill/>
-          <a:ln>
-            <a:noFill/>
-          </a:ln>
-        </p:spPr>
-      </p:pic>
-      <p:pic>
-        <p:nvPicPr>
-          <p:cNvPr id="108" name="Google Shape;108;p14"/>
-          <p:cNvPicPr preferRelativeResize="0"/>
-          <p:nvPr/>
-        </p:nvPicPr>
-        <p:blipFill>
-          <a:blip r:embed="rId15">
-            <a:alphaModFix/>
-          </a:blip>
-          <a:stretch>
-            <a:fillRect/>
-          </a:stretch>
-        </p:blipFill>
-        <p:spPr>
-          <a:xfrm>
-            <a:off x="7783619" y="3498804"/>
-            <a:ext cx="566316" cy="549038"/>
-          </a:xfrm>
-          <a:prstGeom prst="rect">
-            <a:avLst/>
-          </a:prstGeom>
-          <a:noFill/>
-          <a:ln>
-            <a:noFill/>
-          </a:ln>
-        </p:spPr>
-      </p:pic>
+        <p:txBody>
+          <a:bodyPr spcFirstLastPara="1" wrap="square" lIns="91425" tIns="91425" rIns="91425" bIns="91425" anchor="t" anchorCtr="0">
+            <a:noAutofit/>
+          </a:bodyPr>
+          <a:lstStyle/>
+          <a:p>
+            <a:pPr marL="0" lvl="0" indent="0" algn="ctr" rtl="0">
+              <a:spcBef>
+                <a:spcPts val="0"/>
+              </a:spcBef>
+              <a:spcAft>
+                <a:spcPts val="0"/>
+              </a:spcAft>
+              <a:buNone/>
+            </a:pPr>
+            <a:r>
+              <a:rPr lang="pt-BR" b="1" dirty="0">
+                <a:latin typeface="Roboto"/>
+                <a:ea typeface="Roboto"/>
+                <a:cs typeface="Roboto"/>
+                <a:sym typeface="Roboto"/>
+              </a:rPr>
+              <a:t>Caminhão em transporte</a:t>
+            </a:r>
+            <a:endParaRPr b="1" dirty="0">
+              <a:latin typeface="Roboto"/>
+              <a:ea typeface="Roboto"/>
+              <a:cs typeface="Roboto"/>
+              <a:sym typeface="Roboto"/>
+            </a:endParaRPr>
+          </a:p>
+        </p:txBody>
+      </p:sp>
       <p:cxnSp>
         <p:nvCxnSpPr>
-          <p:cNvPr id="109" name="Google Shape;109;p14"/>
+          <p:cNvPr id="120" name="Google Shape;120;p14"/>
           <p:cNvCxnSpPr/>
           <p:nvPr/>
         </p:nvCxnSpPr>
         <p:spPr>
           <a:xfrm>
-            <a:off x="5290325" y="838459"/>
-            <a:ext cx="868200" cy="600"/>
+            <a:off x="1405316" y="3807782"/>
+            <a:ext cx="1306200" cy="10800"/>
           </a:xfrm>
           <a:prstGeom prst="straightConnector1">
             <a:avLst/>
@@ -7700,24 +7701,16 @@
           </a:ln>
         </p:spPr>
       </p:cxnSp>
-      <p:pic>
-        <p:nvPicPr>
-          <p:cNvPr id="110" name="Google Shape;110;p14"/>
-          <p:cNvPicPr preferRelativeResize="0"/>
+      <p:sp>
+        <p:nvSpPr>
+          <p:cNvPr id="121" name="Google Shape;121;p14"/>
+          <p:cNvSpPr txBox="1"/>
           <p:nvPr/>
-        </p:nvPicPr>
-        <p:blipFill>
-          <a:blip r:embed="rId16">
-            <a:alphaModFix/>
-          </a:blip>
-          <a:stretch>
-            <a:fillRect/>
-          </a:stretch>
-        </p:blipFill>
-        <p:spPr>
-          <a:xfrm>
-            <a:off x="6719458" y="3610731"/>
-            <a:ext cx="336446" cy="312477"/>
+        </p:nvSpPr>
+        <p:spPr>
+          <a:xfrm>
+            <a:off x="4408745" y="3419120"/>
+            <a:ext cx="276300" cy="85800"/>
           </a:xfrm>
           <a:prstGeom prst="rect">
             <a:avLst/>
@@ -7727,17 +7720,415 @@
             <a:noFill/>
           </a:ln>
         </p:spPr>
-      </p:pic>
+        <p:txBody>
+          <a:bodyPr spcFirstLastPara="1" wrap="square" lIns="91425" tIns="91425" rIns="91425" bIns="91425" anchor="t" anchorCtr="0">
+            <a:noAutofit/>
+          </a:bodyPr>
+          <a:lstStyle/>
+          <a:p>
+            <a:pPr marL="0" lvl="0" indent="0" algn="l" rtl="0">
+              <a:spcBef>
+                <a:spcPts val="0"/>
+              </a:spcBef>
+              <a:spcAft>
+                <a:spcPts val="0"/>
+              </a:spcAft>
+              <a:buNone/>
+            </a:pPr>
+            <a:endParaRPr/>
+          </a:p>
+        </p:txBody>
+      </p:sp>
+      <p:grpSp>
+        <p:nvGrpSpPr>
+          <p:cNvPr id="25" name="Agrupar 24">
+            <a:extLst>
+              <a:ext uri="{FF2B5EF4-FFF2-40B4-BE49-F238E27FC236}">
+                <a16:creationId xmlns:a16="http://schemas.microsoft.com/office/drawing/2014/main" id="{85C86396-B6E1-4A7C-A838-51B7AE28DE5E}"/>
+              </a:ext>
+            </a:extLst>
+          </p:cNvPr>
+          <p:cNvGrpSpPr/>
+          <p:nvPr/>
+        </p:nvGrpSpPr>
+        <p:grpSpPr>
+          <a:xfrm>
+            <a:off x="5398076" y="2434158"/>
+            <a:ext cx="1536600" cy="1544605"/>
+            <a:chOff x="7602634" y="3568056"/>
+            <a:chExt cx="1536600" cy="1544605"/>
+          </a:xfrm>
+        </p:grpSpPr>
+        <p:pic>
+          <p:nvPicPr>
+            <p:cNvPr id="105" name="Google Shape;105;p14"/>
+            <p:cNvPicPr preferRelativeResize="0"/>
+            <p:nvPr/>
+          </p:nvPicPr>
+          <p:blipFill>
+            <a:blip r:embed="rId12">
+              <a:alphaModFix/>
+            </a:blip>
+            <a:stretch>
+              <a:fillRect/>
+            </a:stretch>
+          </p:blipFill>
+          <p:spPr>
+            <a:xfrm>
+              <a:off x="7679355" y="4009303"/>
+              <a:ext cx="350208" cy="338002"/>
+            </a:xfrm>
+            <a:prstGeom prst="rect">
+              <a:avLst/>
+            </a:prstGeom>
+            <a:noFill/>
+            <a:ln>
+              <a:noFill/>
+            </a:ln>
+          </p:spPr>
+        </p:pic>
+        <p:pic>
+          <p:nvPicPr>
+            <p:cNvPr id="106" name="Google Shape;106;p14"/>
+            <p:cNvPicPr preferRelativeResize="0"/>
+            <p:nvPr/>
+          </p:nvPicPr>
+          <p:blipFill>
+            <a:blip r:embed="rId13">
+              <a:alphaModFix/>
+            </a:blip>
+            <a:stretch>
+              <a:fillRect/>
+            </a:stretch>
+          </p:blipFill>
+          <p:spPr>
+            <a:xfrm>
+              <a:off x="7819890" y="3694442"/>
+              <a:ext cx="276294" cy="266632"/>
+            </a:xfrm>
+            <a:prstGeom prst="rect">
+              <a:avLst/>
+            </a:prstGeom>
+            <a:noFill/>
+            <a:ln>
+              <a:noFill/>
+            </a:ln>
+          </p:spPr>
+        </p:pic>
+        <p:pic>
+          <p:nvPicPr>
+            <p:cNvPr id="107" name="Google Shape;107;p14"/>
+            <p:cNvPicPr preferRelativeResize="0"/>
+            <p:nvPr/>
+          </p:nvPicPr>
+          <p:blipFill>
+            <a:blip r:embed="rId14">
+              <a:alphaModFix/>
+            </a:blip>
+            <a:stretch>
+              <a:fillRect/>
+            </a:stretch>
+          </p:blipFill>
+          <p:spPr>
+            <a:xfrm>
+              <a:off x="8758272" y="4080056"/>
+              <a:ext cx="267589" cy="266638"/>
+            </a:xfrm>
+            <a:prstGeom prst="rect">
+              <a:avLst/>
+            </a:prstGeom>
+            <a:noFill/>
+            <a:ln>
+              <a:noFill/>
+            </a:ln>
+          </p:spPr>
+        </p:pic>
+        <p:pic>
+          <p:nvPicPr>
+            <p:cNvPr id="108" name="Google Shape;108;p14"/>
+            <p:cNvPicPr preferRelativeResize="0"/>
+            <p:nvPr/>
+          </p:nvPicPr>
+          <p:blipFill>
+            <a:blip r:embed="rId15">
+              <a:alphaModFix/>
+            </a:blip>
+            <a:stretch>
+              <a:fillRect/>
+            </a:stretch>
+          </p:blipFill>
+          <p:spPr>
+            <a:xfrm>
+              <a:off x="8087421" y="3916771"/>
+              <a:ext cx="566316" cy="549038"/>
+            </a:xfrm>
+            <a:prstGeom prst="rect">
+              <a:avLst/>
+            </a:prstGeom>
+            <a:noFill/>
+            <a:ln>
+              <a:noFill/>
+            </a:ln>
+          </p:spPr>
+        </p:pic>
+        <p:sp>
+          <p:nvSpPr>
+            <p:cNvPr id="111" name="Google Shape;111;p14"/>
+            <p:cNvSpPr txBox="1"/>
+            <p:nvPr/>
+          </p:nvSpPr>
+          <p:spPr>
+            <a:xfrm>
+              <a:off x="7602634" y="4466461"/>
+              <a:ext cx="1536600" cy="646200"/>
+            </a:xfrm>
+            <a:prstGeom prst="rect">
+              <a:avLst/>
+            </a:prstGeom>
+            <a:noFill/>
+            <a:ln>
+              <a:noFill/>
+            </a:ln>
+          </p:spPr>
+          <p:txBody>
+            <a:bodyPr spcFirstLastPara="1" wrap="square" lIns="91425" tIns="91425" rIns="91425" bIns="91425" anchor="t" anchorCtr="0">
+              <a:noAutofit/>
+            </a:bodyPr>
+            <a:lstStyle/>
+            <a:p>
+              <a:pPr marL="0" lvl="0" indent="0" algn="ctr" rtl="0">
+                <a:spcBef>
+                  <a:spcPts val="0"/>
+                </a:spcBef>
+                <a:spcAft>
+                  <a:spcPts val="0"/>
+                </a:spcAft>
+                <a:buNone/>
+              </a:pPr>
+              <a:r>
+                <a:rPr lang="pt-BR" sz="900" b="1" dirty="0">
+                  <a:latin typeface="Roboto"/>
+                  <a:ea typeface="Roboto"/>
+                  <a:cs typeface="Roboto"/>
+                  <a:sym typeface="Roboto"/>
+                </a:rPr>
+                <a:t>Notebook/ Desktop Core i3 4GB RAM</a:t>
+              </a:r>
+              <a:endParaRPr sz="900" b="1" dirty="0">
+                <a:latin typeface="Roboto"/>
+                <a:ea typeface="Roboto"/>
+                <a:cs typeface="Roboto"/>
+                <a:sym typeface="Roboto"/>
+              </a:endParaRPr>
+            </a:p>
+            <a:p>
+              <a:pPr marL="0" lvl="0" indent="0" algn="ctr" rtl="0">
+                <a:spcBef>
+                  <a:spcPts val="0"/>
+                </a:spcBef>
+                <a:spcAft>
+                  <a:spcPts val="0"/>
+                </a:spcAft>
+                <a:buNone/>
+              </a:pPr>
+              <a:r>
+                <a:rPr lang="pt-BR" sz="900" b="1" dirty="0">
+                  <a:latin typeface="Roboto"/>
+                  <a:ea typeface="Roboto"/>
+                  <a:cs typeface="Roboto"/>
+                  <a:sym typeface="Roboto"/>
+                </a:rPr>
+                <a:t>Com Chrome, Mozila, Opera ou Edge</a:t>
+              </a:r>
+              <a:endParaRPr sz="900" b="1" dirty="0">
+                <a:latin typeface="Roboto"/>
+                <a:ea typeface="Roboto"/>
+                <a:cs typeface="Roboto"/>
+                <a:sym typeface="Roboto"/>
+              </a:endParaRPr>
+            </a:p>
+          </p:txBody>
+        </p:sp>
+        <p:pic>
+          <p:nvPicPr>
+            <p:cNvPr id="112" name="Google Shape;112;p14"/>
+            <p:cNvPicPr preferRelativeResize="0"/>
+            <p:nvPr/>
+          </p:nvPicPr>
+          <p:blipFill>
+            <a:blip r:embed="rId16">
+              <a:alphaModFix/>
+            </a:blip>
+            <a:stretch>
+              <a:fillRect/>
+            </a:stretch>
+          </p:blipFill>
+          <p:spPr>
+            <a:xfrm>
+              <a:off x="8644975" y="3698049"/>
+              <a:ext cx="267592" cy="259418"/>
+            </a:xfrm>
+            <a:prstGeom prst="rect">
+              <a:avLst/>
+            </a:prstGeom>
+            <a:noFill/>
+            <a:ln>
+              <a:noFill/>
+            </a:ln>
+          </p:spPr>
+        </p:pic>
+        <p:pic>
+          <p:nvPicPr>
+            <p:cNvPr id="123" name="Google Shape;123;p14"/>
+            <p:cNvPicPr preferRelativeResize="0"/>
+            <p:nvPr/>
+          </p:nvPicPr>
+          <p:blipFill>
+            <a:blip r:embed="rId17">
+              <a:alphaModFix/>
+            </a:blip>
+            <a:stretch>
+              <a:fillRect/>
+            </a:stretch>
+          </p:blipFill>
+          <p:spPr>
+            <a:xfrm>
+              <a:off x="8206815" y="3568056"/>
+              <a:ext cx="276280" cy="266801"/>
+            </a:xfrm>
+            <a:prstGeom prst="rect">
+              <a:avLst/>
+            </a:prstGeom>
+            <a:noFill/>
+            <a:ln>
+              <a:noFill/>
+            </a:ln>
+          </p:spPr>
+        </p:pic>
+      </p:grpSp>
+      <p:grpSp>
+        <p:nvGrpSpPr>
+          <p:cNvPr id="41" name="Agrupar 40">
+            <a:extLst>
+              <a:ext uri="{FF2B5EF4-FFF2-40B4-BE49-F238E27FC236}">
+                <a16:creationId xmlns:a16="http://schemas.microsoft.com/office/drawing/2014/main" id="{3563D5CC-A1A6-4E43-93B5-135B2EA34BFF}"/>
+              </a:ext>
+            </a:extLst>
+          </p:cNvPr>
+          <p:cNvGrpSpPr/>
+          <p:nvPr/>
+        </p:nvGrpSpPr>
+        <p:grpSpPr>
+          <a:xfrm>
+            <a:off x="7287133" y="1910401"/>
+            <a:ext cx="1629642" cy="600677"/>
+            <a:chOff x="7287133" y="1910401"/>
+            <a:chExt cx="1629642" cy="600677"/>
+          </a:xfrm>
+        </p:grpSpPr>
+        <p:pic>
+          <p:nvPicPr>
+            <p:cNvPr id="100" name="Google Shape;100;p14"/>
+            <p:cNvPicPr preferRelativeResize="0"/>
+            <p:nvPr/>
+          </p:nvPicPr>
+          <p:blipFill>
+            <a:blip r:embed="rId18">
+              <a:alphaModFix/>
+            </a:blip>
+            <a:stretch>
+              <a:fillRect/>
+            </a:stretch>
+          </p:blipFill>
+          <p:spPr>
+            <a:xfrm>
+              <a:off x="7883030" y="1910401"/>
+              <a:ext cx="437849" cy="343803"/>
+            </a:xfrm>
+            <a:prstGeom prst="rect">
+              <a:avLst/>
+            </a:prstGeom>
+            <a:noFill/>
+            <a:ln>
+              <a:noFill/>
+            </a:ln>
+          </p:spPr>
+        </p:pic>
+        <p:sp>
+          <p:nvSpPr>
+            <p:cNvPr id="124" name="Google Shape;124;p14"/>
+            <p:cNvSpPr txBox="1"/>
+            <p:nvPr/>
+          </p:nvSpPr>
+          <p:spPr>
+            <a:xfrm>
+              <a:off x="7287133" y="2161278"/>
+              <a:ext cx="1629642" cy="349800"/>
+            </a:xfrm>
+            <a:prstGeom prst="rect">
+              <a:avLst/>
+            </a:prstGeom>
+            <a:noFill/>
+            <a:ln>
+              <a:noFill/>
+            </a:ln>
+          </p:spPr>
+          <p:txBody>
+            <a:bodyPr spcFirstLastPara="1" wrap="square" lIns="91425" tIns="91425" rIns="91425" bIns="91425" anchor="t" anchorCtr="0">
+              <a:noAutofit/>
+            </a:bodyPr>
+            <a:lstStyle/>
+            <a:p>
+              <a:pPr marL="0" lvl="0" indent="0" algn="l" rtl="0">
+                <a:spcBef>
+                  <a:spcPts val="0"/>
+                </a:spcBef>
+                <a:spcAft>
+                  <a:spcPts val="0"/>
+                </a:spcAft>
+                <a:buNone/>
+              </a:pPr>
+              <a:r>
+                <a:rPr lang="pt-BR" b="1" dirty="0">
+                  <a:latin typeface="Roboto"/>
+                  <a:ea typeface="Roboto"/>
+                  <a:cs typeface="Roboto"/>
+                  <a:sym typeface="Roboto"/>
+                </a:rPr>
+                <a:t>Roteador TP-link</a:t>
+              </a:r>
+              <a:endParaRPr b="1" dirty="0">
+                <a:latin typeface="Roboto"/>
+                <a:ea typeface="Roboto"/>
+                <a:cs typeface="Roboto"/>
+                <a:sym typeface="Roboto"/>
+              </a:endParaRPr>
+            </a:p>
+            <a:p>
+              <a:pPr marL="0" lvl="0" indent="0" algn="l" rtl="0">
+                <a:spcBef>
+                  <a:spcPts val="0"/>
+                </a:spcBef>
+                <a:spcAft>
+                  <a:spcPts val="0"/>
+                </a:spcAft>
+                <a:buNone/>
+              </a:pPr>
+              <a:endParaRPr dirty="0"/>
+            </a:p>
+          </p:txBody>
+        </p:sp>
+      </p:grpSp>
       <p:sp>
         <p:nvSpPr>
-          <p:cNvPr id="111" name="Google Shape;111;p14"/>
+          <p:cNvPr id="126" name="Google Shape;126;p14"/>
           <p:cNvSpPr txBox="1"/>
           <p:nvPr/>
         </p:nvSpPr>
         <p:spPr>
           <a:xfrm>
-            <a:off x="7298832" y="4048494"/>
-            <a:ext cx="1536600" cy="646200"/>
+            <a:off x="4027047" y="804100"/>
+            <a:ext cx="1294200" cy="478551"/>
           </a:xfrm>
           <a:prstGeom prst="rect">
             <a:avLst/>
@@ -7763,20 +8154,14 @@
               <a:buNone/>
             </a:pPr>
             <a:r>
-              <a:rPr lang="pt-BR" sz="900">
+              <a:rPr lang="pt-BR" sz="1200" b="1" dirty="0">
                 <a:latin typeface="Roboto"/>
                 <a:ea typeface="Roboto"/>
                 <a:cs typeface="Roboto"/>
                 <a:sym typeface="Roboto"/>
               </a:rPr>
-              <a:t>Notebook/ Desktop Core i3 4GB RAM</a:t>
+              <a:t>Banco de Dados</a:t>
             </a:r>
-            <a:endParaRPr sz="900">
-              <a:latin typeface="Roboto"/>
-              <a:ea typeface="Roboto"/>
-              <a:cs typeface="Roboto"/>
-              <a:sym typeface="Roboto"/>
-            </a:endParaRPr>
           </a:p>
           <a:p>
             <a:pPr marL="0" lvl="0" indent="0" algn="ctr" rtl="0">
@@ -7789,89 +8174,258 @@
               <a:buNone/>
             </a:pPr>
             <a:r>
-              <a:rPr lang="pt-BR" sz="900">
+              <a:rPr lang="pt-BR" sz="900" b="1" dirty="0">
                 <a:latin typeface="Roboto"/>
                 <a:ea typeface="Roboto"/>
                 <a:cs typeface="Roboto"/>
                 <a:sym typeface="Roboto"/>
               </a:rPr>
-              <a:t>Com Chrome, Mozila, Opera ou Edge</a:t>
+              <a:t>Microsoft Azure</a:t>
             </a:r>
-            <a:endParaRPr sz="900">
-              <a:latin typeface="Roboto"/>
-              <a:ea typeface="Roboto"/>
-              <a:cs typeface="Roboto"/>
-              <a:sym typeface="Roboto"/>
-            </a:endParaRPr>
+          </a:p>
+          <a:p>
+            <a:pPr marL="0" lvl="0" indent="0" algn="ctr" rtl="0">
+              <a:spcBef>
+                <a:spcPts val="0"/>
+              </a:spcBef>
+              <a:spcAft>
+                <a:spcPts val="0"/>
+              </a:spcAft>
+              <a:buNone/>
+            </a:pPr>
+            <a:r>
+              <a:rPr lang="pt-BR" sz="900" b="1" dirty="0">
+                <a:latin typeface="Roboto"/>
+                <a:ea typeface="Roboto"/>
+                <a:cs typeface="Roboto"/>
+                <a:sym typeface="Roboto"/>
+              </a:rPr>
+              <a:t>Programado em MySQL</a:t>
+            </a:r>
           </a:p>
         </p:txBody>
       </p:sp>
-      <p:pic>
-        <p:nvPicPr>
-          <p:cNvPr id="112" name="Google Shape;112;p14"/>
-          <p:cNvPicPr preferRelativeResize="0"/>
+      <p:grpSp>
+        <p:nvGrpSpPr>
+          <p:cNvPr id="26" name="Agrupar 25">
+            <a:extLst>
+              <a:ext uri="{FF2B5EF4-FFF2-40B4-BE49-F238E27FC236}">
+                <a16:creationId xmlns:a16="http://schemas.microsoft.com/office/drawing/2014/main" id="{017B89BE-92F5-47AC-A0A9-60A2ADB55C49}"/>
+              </a:ext>
+            </a:extLst>
+          </p:cNvPr>
+          <p:cNvGrpSpPr/>
           <p:nvPr/>
-        </p:nvPicPr>
-        <p:blipFill>
-          <a:blip r:embed="rId17">
-            <a:alphaModFix/>
-          </a:blip>
-          <a:stretch>
-            <a:fillRect/>
-          </a:stretch>
-        </p:blipFill>
-        <p:spPr>
-          <a:xfrm>
-            <a:off x="8341173" y="3280082"/>
-            <a:ext cx="267592" cy="259418"/>
-          </a:xfrm>
-          <a:prstGeom prst="rect">
-            <a:avLst/>
-          </a:prstGeom>
-          <a:noFill/>
-          <a:ln>
+        </p:nvGrpSpPr>
+        <p:grpSpPr>
+          <a:xfrm>
+            <a:off x="5441485" y="4100134"/>
+            <a:ext cx="1318357" cy="1176860"/>
+            <a:chOff x="6041349" y="3905784"/>
+            <a:chExt cx="1318357" cy="1176860"/>
+          </a:xfrm>
+        </p:grpSpPr>
+        <p:pic>
+          <p:nvPicPr>
+            <p:cNvPr id="102" name="Google Shape;102;p14"/>
+            <p:cNvPicPr preferRelativeResize="0"/>
+            <p:nvPr/>
+          </p:nvPicPr>
+          <p:blipFill>
+            <a:blip r:embed="rId19">
+              <a:alphaModFix/>
+            </a:blip>
+            <a:stretch>
+              <a:fillRect/>
+            </a:stretch>
+          </p:blipFill>
+          <p:spPr>
+            <a:xfrm>
+              <a:off x="6511302" y="3905784"/>
+              <a:ext cx="511515" cy="506876"/>
+            </a:xfrm>
+            <a:prstGeom prst="rect">
+              <a:avLst/>
+            </a:prstGeom>
             <a:noFill/>
-          </a:ln>
-        </p:spPr>
-      </p:pic>
-      <p:pic>
-        <p:nvPicPr>
-          <p:cNvPr id="113" name="Google Shape;113;p14"/>
-          <p:cNvPicPr preferRelativeResize="0"/>
-          <p:nvPr/>
-        </p:nvPicPr>
-        <p:blipFill>
-          <a:blip r:embed="rId18">
-            <a:alphaModFix/>
-          </a:blip>
-          <a:stretch>
-            <a:fillRect/>
-          </a:stretch>
-        </p:blipFill>
-        <p:spPr>
-          <a:xfrm>
-            <a:off x="6278415" y="588174"/>
-            <a:ext cx="511538" cy="495916"/>
-          </a:xfrm>
-          <a:prstGeom prst="rect">
-            <a:avLst/>
-          </a:prstGeom>
-          <a:noFill/>
-          <a:ln>
+            <a:ln>
+              <a:noFill/>
+            </a:ln>
+          </p:spPr>
+        </p:pic>
+        <p:sp>
+          <p:nvSpPr>
+            <p:cNvPr id="103" name="Google Shape;103;p14"/>
+            <p:cNvSpPr txBox="1"/>
+            <p:nvPr/>
+          </p:nvSpPr>
+          <p:spPr>
+            <a:xfrm>
+              <a:off x="6173235" y="4461344"/>
+              <a:ext cx="1185300" cy="621300"/>
+            </a:xfrm>
+            <a:prstGeom prst="rect">
+              <a:avLst/>
+            </a:prstGeom>
             <a:noFill/>
-          </a:ln>
-        </p:spPr>
-      </p:pic>
+            <a:ln>
+              <a:noFill/>
+            </a:ln>
+          </p:spPr>
+          <p:txBody>
+            <a:bodyPr spcFirstLastPara="1" wrap="square" lIns="91425" tIns="91425" rIns="91425" bIns="91425" anchor="t" anchorCtr="0">
+              <a:noAutofit/>
+            </a:bodyPr>
+            <a:lstStyle/>
+            <a:p>
+              <a:pPr marL="0" lvl="0" indent="0" algn="ctr" rtl="0">
+                <a:spcBef>
+                  <a:spcPts val="0"/>
+                </a:spcBef>
+                <a:spcAft>
+                  <a:spcPts val="0"/>
+                </a:spcAft>
+                <a:buNone/>
+              </a:pPr>
+              <a:r>
+                <a:rPr lang="pt-BR" sz="900" b="1" dirty="0">
+                  <a:latin typeface="Roboto"/>
+                  <a:ea typeface="Roboto"/>
+                  <a:cs typeface="Roboto"/>
+                  <a:sym typeface="Roboto"/>
+                </a:rPr>
+                <a:t>Android versão 6+</a:t>
+              </a:r>
+              <a:endParaRPr sz="900" b="1" dirty="0">
+                <a:latin typeface="Roboto"/>
+                <a:ea typeface="Roboto"/>
+                <a:cs typeface="Roboto"/>
+                <a:sym typeface="Roboto"/>
+              </a:endParaRPr>
+            </a:p>
+            <a:p>
+              <a:pPr marL="0" lvl="0" indent="0" algn="ctr" rtl="0">
+                <a:spcBef>
+                  <a:spcPts val="0"/>
+                </a:spcBef>
+                <a:spcAft>
+                  <a:spcPts val="0"/>
+                </a:spcAft>
+                <a:buNone/>
+              </a:pPr>
+              <a:r>
+                <a:rPr lang="pt-BR" sz="900" b="1" dirty="0">
+                  <a:latin typeface="Roboto"/>
+                  <a:ea typeface="Roboto"/>
+                  <a:cs typeface="Roboto"/>
+                  <a:sym typeface="Roboto"/>
+                </a:rPr>
+                <a:t>IOS versão 10+</a:t>
+              </a:r>
+              <a:endParaRPr sz="900" b="1" dirty="0">
+                <a:latin typeface="Roboto"/>
+                <a:ea typeface="Roboto"/>
+                <a:cs typeface="Roboto"/>
+                <a:sym typeface="Roboto"/>
+              </a:endParaRPr>
+            </a:p>
+          </p:txBody>
+        </p:sp>
+        <p:pic>
+          <p:nvPicPr>
+            <p:cNvPr id="110" name="Google Shape;110;p14"/>
+            <p:cNvPicPr preferRelativeResize="0"/>
+            <p:nvPr/>
+          </p:nvPicPr>
+          <p:blipFill>
+            <a:blip r:embed="rId20">
+              <a:alphaModFix/>
+            </a:blip>
+            <a:stretch>
+              <a:fillRect/>
+            </a:stretch>
+          </p:blipFill>
+          <p:spPr>
+            <a:xfrm>
+              <a:off x="7023260" y="4028698"/>
+              <a:ext cx="336446" cy="312477"/>
+            </a:xfrm>
+            <a:prstGeom prst="rect">
+              <a:avLst/>
+            </a:prstGeom>
+            <a:noFill/>
+            <a:ln>
+              <a:noFill/>
+            </a:ln>
+          </p:spPr>
+        </p:pic>
+        <p:pic>
+          <p:nvPicPr>
+            <p:cNvPr id="127" name="Google Shape;127;p14"/>
+            <p:cNvPicPr preferRelativeResize="0"/>
+            <p:nvPr/>
+          </p:nvPicPr>
+          <p:blipFill>
+            <a:blip r:embed="rId21">
+              <a:alphaModFix/>
+            </a:blip>
+            <a:stretch>
+              <a:fillRect/>
+            </a:stretch>
+          </p:blipFill>
+          <p:spPr>
+            <a:xfrm>
+              <a:off x="6041349" y="3993549"/>
+              <a:ext cx="469514" cy="455168"/>
+            </a:xfrm>
+            <a:prstGeom prst="rect">
+              <a:avLst/>
+            </a:prstGeom>
+            <a:noFill/>
+            <a:ln>
+              <a:noFill/>
+            </a:ln>
+          </p:spPr>
+        </p:pic>
+      </p:grpSp>
       <p:cxnSp>
         <p:nvCxnSpPr>
-          <p:cNvPr id="114" name="Google Shape;114;p14"/>
+          <p:cNvPr id="128" name="Google Shape;128;p14"/>
+          <p:cNvCxnSpPr>
+            <a:cxnSpLocks/>
+          </p:cNvCxnSpPr>
+          <p:nvPr/>
+        </p:nvCxnSpPr>
+        <p:spPr>
+          <a:xfrm flipH="1">
+            <a:off x="6946279" y="3124367"/>
+            <a:ext cx="829643" cy="8508"/>
+          </a:xfrm>
+          <a:prstGeom prst="straightConnector1">
+            <a:avLst/>
+          </a:prstGeom>
+          <a:noFill/>
+          <a:ln w="9525" cap="flat" cmpd="sng">
+            <a:solidFill>
+              <a:srgbClr val="000000"/>
+            </a:solidFill>
+            <a:prstDash val="solid"/>
+            <a:round/>
+            <a:headEnd type="none" w="med" len="med"/>
+            <a:tailEnd type="triangle" w="med" len="med"/>
+          </a:ln>
+        </p:spPr>
+      </p:cxnSp>
+      <p:cxnSp>
+        <p:nvCxnSpPr>
+          <p:cNvPr id="132" name="Google Shape;132;p14"/>
           <p:cNvCxnSpPr/>
           <p:nvPr/>
         </p:nvCxnSpPr>
         <p:spPr>
           <a:xfrm>
-            <a:off x="8040853" y="1544622"/>
-            <a:ext cx="600" cy="397800"/>
+            <a:off x="1631466" y="594559"/>
+            <a:ext cx="902100" cy="0"/>
           </a:xfrm>
           <a:prstGeom prst="straightConnector1">
             <a:avLst/>
@@ -7890,14 +8444,14 @@
       </p:cxnSp>
       <p:cxnSp>
         <p:nvCxnSpPr>
-          <p:cNvPr id="115" name="Google Shape;115;p14"/>
+          <p:cNvPr id="133" name="Google Shape;133;p14"/>
           <p:cNvCxnSpPr/>
           <p:nvPr/>
         </p:nvCxnSpPr>
         <p:spPr>
           <a:xfrm>
-            <a:off x="6856228" y="833199"/>
-            <a:ext cx="803400" cy="142500"/>
+            <a:off x="1628045" y="592250"/>
+            <a:ext cx="0" cy="454091"/>
           </a:xfrm>
           <a:prstGeom prst="straightConnector1">
             <a:avLst/>
@@ -7905,23 +8459,23 @@
           <a:noFill/>
           <a:ln w="9525" cap="flat" cmpd="sng">
             <a:solidFill>
-              <a:srgbClr val="000000"/>
+              <a:schemeClr val="dk2"/>
             </a:solidFill>
             <a:prstDash val="solid"/>
             <a:round/>
             <a:headEnd type="none" w="med" len="med"/>
-            <a:tailEnd type="triangle" w="med" len="med"/>
+            <a:tailEnd type="none" w="med" len="med"/>
           </a:ln>
         </p:spPr>
       </p:cxnSp>
       <p:pic>
         <p:nvPicPr>
-          <p:cNvPr id="116" name="Google Shape;116;p14"/>
+          <p:cNvPr id="134" name="Google Shape;134;p14"/>
           <p:cNvPicPr preferRelativeResize="0"/>
           <p:nvPr/>
         </p:nvPicPr>
         <p:blipFill>
-          <a:blip r:embed="rId11">
+          <a:blip r:embed="rId10">
             <a:alphaModFix/>
           </a:blip>
           <a:stretch>
@@ -7930,8 +8484,8 @@
         </p:blipFill>
         <p:spPr>
           <a:xfrm>
-            <a:off x="1401335" y="2509989"/>
-            <a:ext cx="566313" cy="321300"/>
+            <a:off x="2731964" y="308193"/>
+            <a:ext cx="511538" cy="495916"/>
           </a:xfrm>
           <a:prstGeom prst="rect">
             <a:avLst/>
@@ -7942,537 +8496,16 @@
           </a:ln>
         </p:spPr>
       </p:pic>
-      <p:pic>
-        <p:nvPicPr>
-          <p:cNvPr id="117" name="Google Shape;117;p14"/>
-          <p:cNvPicPr preferRelativeResize="0"/>
-          <p:nvPr/>
-        </p:nvPicPr>
-        <p:blipFill>
-          <a:blip r:embed="rId19">
-            <a:alphaModFix/>
-          </a:blip>
-          <a:stretch>
-            <a:fillRect/>
-          </a:stretch>
-        </p:blipFill>
-        <p:spPr>
-          <a:xfrm>
-            <a:off x="403700" y="3591356"/>
-            <a:ext cx="929060" cy="889149"/>
-          </a:xfrm>
-          <a:prstGeom prst="rect">
-            <a:avLst/>
-          </a:prstGeom>
-          <a:noFill/>
-          <a:ln>
-            <a:noFill/>
-          </a:ln>
-        </p:spPr>
-      </p:pic>
-      <p:sp>
-        <p:nvSpPr>
-          <p:cNvPr id="118" name="Google Shape;118;p14"/>
-          <p:cNvSpPr txBox="1"/>
-          <p:nvPr/>
-        </p:nvSpPr>
-        <p:spPr>
-          <a:xfrm>
-            <a:off x="308563" y="4283874"/>
-            <a:ext cx="1119300" cy="517500"/>
-          </a:xfrm>
-          <a:prstGeom prst="rect">
-            <a:avLst/>
-          </a:prstGeom>
-          <a:noFill/>
-          <a:ln>
-            <a:noFill/>
-          </a:ln>
-        </p:spPr>
-        <p:txBody>
-          <a:bodyPr spcFirstLastPara="1" wrap="square" lIns="91425" tIns="91425" rIns="91425" bIns="91425" anchor="t" anchorCtr="0">
-            <a:noAutofit/>
-          </a:bodyPr>
-          <a:lstStyle/>
-          <a:p>
-            <a:pPr marL="0" lvl="0" indent="0" algn="ctr" rtl="0">
-              <a:spcBef>
-                <a:spcPts val="0"/>
-              </a:spcBef>
-              <a:spcAft>
-                <a:spcPts val="0"/>
-              </a:spcAft>
-              <a:buNone/>
-            </a:pPr>
-            <a:r>
-              <a:rPr lang="pt-BR" sz="1000">
-                <a:latin typeface="Roboto"/>
-                <a:ea typeface="Roboto"/>
-                <a:cs typeface="Roboto"/>
-                <a:sym typeface="Roboto"/>
-              </a:rPr>
-              <a:t>Caminhão em transporte</a:t>
-            </a:r>
-            <a:endParaRPr sz="1000">
-              <a:latin typeface="Roboto"/>
-              <a:ea typeface="Roboto"/>
-              <a:cs typeface="Roboto"/>
-              <a:sym typeface="Roboto"/>
-            </a:endParaRPr>
-          </a:p>
-        </p:txBody>
-      </p:sp>
       <p:cxnSp>
         <p:nvCxnSpPr>
-          <p:cNvPr id="119" name="Google Shape;119;p14"/>
+          <p:cNvPr id="135" name="Google Shape;135;p14"/>
           <p:cNvCxnSpPr/>
           <p:nvPr/>
         </p:nvCxnSpPr>
         <p:spPr>
-          <a:xfrm flipH="1">
-            <a:off x="3194399" y="2676099"/>
-            <a:ext cx="6600" cy="616500"/>
-          </a:xfrm>
-          <a:prstGeom prst="straightConnector1">
-            <a:avLst/>
-          </a:prstGeom>
-          <a:noFill/>
-          <a:ln w="9525" cap="flat" cmpd="sng">
-            <a:solidFill>
-              <a:srgbClr val="000000"/>
-            </a:solidFill>
-            <a:prstDash val="solid"/>
-            <a:round/>
-            <a:headEnd type="none" w="med" len="med"/>
-            <a:tailEnd type="none" w="med" len="med"/>
-          </a:ln>
-        </p:spPr>
-      </p:cxnSp>
-      <p:cxnSp>
-        <p:nvCxnSpPr>
-          <p:cNvPr id="120" name="Google Shape;120;p14"/>
-          <p:cNvCxnSpPr/>
-          <p:nvPr/>
-        </p:nvCxnSpPr>
-        <p:spPr>
-          <a:xfrm>
-            <a:off x="1425194" y="4051682"/>
-            <a:ext cx="1306200" cy="10800"/>
-          </a:xfrm>
-          <a:prstGeom prst="straightConnector1">
-            <a:avLst/>
-          </a:prstGeom>
-          <a:noFill/>
-          <a:ln w="9525" cap="flat" cmpd="sng">
-            <a:solidFill>
-              <a:srgbClr val="000000"/>
-            </a:solidFill>
-            <a:prstDash val="solid"/>
-            <a:round/>
-            <a:headEnd type="none" w="med" len="med"/>
-            <a:tailEnd type="triangle" w="med" len="med"/>
-          </a:ln>
-        </p:spPr>
-      </p:cxnSp>
-      <p:sp>
-        <p:nvSpPr>
-          <p:cNvPr id="121" name="Google Shape;121;p14"/>
-          <p:cNvSpPr txBox="1"/>
-          <p:nvPr/>
-        </p:nvSpPr>
-        <p:spPr>
-          <a:xfrm>
-            <a:off x="4428623" y="3663020"/>
-            <a:ext cx="276300" cy="85800"/>
-          </a:xfrm>
-          <a:prstGeom prst="rect">
-            <a:avLst/>
-          </a:prstGeom>
-          <a:noFill/>
-          <a:ln>
-            <a:noFill/>
-          </a:ln>
-        </p:spPr>
-        <p:txBody>
-          <a:bodyPr spcFirstLastPara="1" wrap="square" lIns="91425" tIns="91425" rIns="91425" bIns="91425" anchor="t" anchorCtr="0">
-            <a:noAutofit/>
-          </a:bodyPr>
-          <a:lstStyle/>
-          <a:p>
-            <a:pPr marL="0" lvl="0" indent="0" algn="l" rtl="0">
-              <a:spcBef>
-                <a:spcPts val="0"/>
-              </a:spcBef>
-              <a:spcAft>
-                <a:spcPts val="0"/>
-              </a:spcAft>
-              <a:buNone/>
-            </a:pPr>
-            <a:endParaRPr/>
-          </a:p>
-        </p:txBody>
-      </p:sp>
-      <p:cxnSp>
-        <p:nvCxnSpPr>
-          <p:cNvPr id="122" name="Google Shape;122;p14"/>
-          <p:cNvCxnSpPr/>
-          <p:nvPr/>
-        </p:nvCxnSpPr>
-        <p:spPr>
-          <a:xfrm rot="10800000">
-            <a:off x="2098332" y="2676099"/>
-            <a:ext cx="1111800" cy="0"/>
-          </a:xfrm>
-          <a:prstGeom prst="straightConnector1">
-            <a:avLst/>
-          </a:prstGeom>
-          <a:noFill/>
-          <a:ln w="9525" cap="flat" cmpd="sng">
-            <a:solidFill>
-              <a:srgbClr val="000000"/>
-            </a:solidFill>
-            <a:prstDash val="solid"/>
-            <a:round/>
-            <a:headEnd type="none" w="med" len="med"/>
-            <a:tailEnd type="triangle" w="med" len="med"/>
-          </a:ln>
-        </p:spPr>
-      </p:cxnSp>
-      <p:pic>
-        <p:nvPicPr>
-          <p:cNvPr id="123" name="Google Shape;123;p14"/>
-          <p:cNvPicPr preferRelativeResize="0"/>
-          <p:nvPr/>
-        </p:nvPicPr>
-        <p:blipFill>
-          <a:blip r:embed="rId20">
-            <a:alphaModFix/>
-          </a:blip>
-          <a:stretch>
-            <a:fillRect/>
-          </a:stretch>
-        </p:blipFill>
-        <p:spPr>
-          <a:xfrm>
-            <a:off x="7903013" y="3150089"/>
-            <a:ext cx="276280" cy="266801"/>
-          </a:xfrm>
-          <a:prstGeom prst="rect">
-            <a:avLst/>
-          </a:prstGeom>
-          <a:noFill/>
-          <a:ln>
-            <a:noFill/>
-          </a:ln>
-        </p:spPr>
-      </p:pic>
-      <p:sp>
-        <p:nvSpPr>
-          <p:cNvPr id="124" name="Google Shape;124;p14"/>
-          <p:cNvSpPr txBox="1"/>
-          <p:nvPr/>
-        </p:nvSpPr>
-        <p:spPr>
-          <a:xfrm>
-            <a:off x="7438851" y="1233775"/>
-            <a:ext cx="1356600" cy="349800"/>
-          </a:xfrm>
-          <a:prstGeom prst="rect">
-            <a:avLst/>
-          </a:prstGeom>
-          <a:noFill/>
-          <a:ln>
-            <a:noFill/>
-          </a:ln>
-        </p:spPr>
-        <p:txBody>
-          <a:bodyPr spcFirstLastPara="1" wrap="square" lIns="91425" tIns="91425" rIns="91425" bIns="91425" anchor="t" anchorCtr="0">
-            <a:noAutofit/>
-          </a:bodyPr>
-          <a:lstStyle/>
-          <a:p>
-            <a:pPr marL="0" lvl="0" indent="0" algn="l" rtl="0">
-              <a:spcBef>
-                <a:spcPts val="0"/>
-              </a:spcBef>
-              <a:spcAft>
-                <a:spcPts val="0"/>
-              </a:spcAft>
-              <a:buNone/>
-            </a:pPr>
-            <a:r>
-              <a:rPr lang="pt-BR" sz="1100">
-                <a:latin typeface="Roboto"/>
-                <a:ea typeface="Roboto"/>
-                <a:cs typeface="Roboto"/>
-                <a:sym typeface="Roboto"/>
-              </a:rPr>
-              <a:t>Roteador Tp-link</a:t>
-            </a:r>
-            <a:endParaRPr sz="1100">
-              <a:latin typeface="Roboto"/>
-              <a:ea typeface="Roboto"/>
-              <a:cs typeface="Roboto"/>
-              <a:sym typeface="Roboto"/>
-            </a:endParaRPr>
-          </a:p>
-          <a:p>
-            <a:pPr marL="0" lvl="0" indent="0" algn="l" rtl="0">
-              <a:spcBef>
-                <a:spcPts val="0"/>
-              </a:spcBef>
-              <a:spcAft>
-                <a:spcPts val="0"/>
-              </a:spcAft>
-              <a:buNone/>
-            </a:pPr>
-            <a:endParaRPr/>
-          </a:p>
-        </p:txBody>
-      </p:sp>
-      <p:cxnSp>
-        <p:nvCxnSpPr>
-          <p:cNvPr id="125" name="Google Shape;125;p14"/>
-          <p:cNvCxnSpPr/>
-          <p:nvPr/>
-        </p:nvCxnSpPr>
-        <p:spPr>
-          <a:xfrm>
-            <a:off x="8040997" y="2483501"/>
-            <a:ext cx="300" cy="505500"/>
-          </a:xfrm>
-          <a:prstGeom prst="straightConnector1">
-            <a:avLst/>
-          </a:prstGeom>
-          <a:noFill/>
-          <a:ln w="9525" cap="flat" cmpd="sng">
-            <a:solidFill>
-              <a:srgbClr val="000000"/>
-            </a:solidFill>
-            <a:prstDash val="solid"/>
-            <a:round/>
-            <a:headEnd type="none" w="med" len="med"/>
-            <a:tailEnd type="triangle" w="med" len="med"/>
-          </a:ln>
-        </p:spPr>
-      </p:cxnSp>
-      <p:sp>
-        <p:nvSpPr>
-          <p:cNvPr id="126" name="Google Shape;126;p14"/>
-          <p:cNvSpPr txBox="1"/>
-          <p:nvPr/>
-        </p:nvSpPr>
-        <p:spPr>
-          <a:xfrm>
-            <a:off x="4046925" y="1048000"/>
-            <a:ext cx="1294200" cy="349800"/>
-          </a:xfrm>
-          <a:prstGeom prst="rect">
-            <a:avLst/>
-          </a:prstGeom>
-          <a:noFill/>
-          <a:ln>
-            <a:noFill/>
-          </a:ln>
-        </p:spPr>
-        <p:txBody>
-          <a:bodyPr spcFirstLastPara="1" wrap="square" lIns="91425" tIns="91425" rIns="91425" bIns="91425" anchor="t" anchorCtr="0">
-            <a:noAutofit/>
-          </a:bodyPr>
-          <a:lstStyle/>
-          <a:p>
-            <a:pPr marL="0" lvl="0" indent="0" algn="ctr" rtl="0">
-              <a:spcBef>
-                <a:spcPts val="0"/>
-              </a:spcBef>
-              <a:spcAft>
-                <a:spcPts val="0"/>
-              </a:spcAft>
-              <a:buNone/>
-            </a:pPr>
-            <a:r>
-              <a:rPr lang="pt-BR" sz="1200">
-                <a:latin typeface="Roboto"/>
-                <a:ea typeface="Roboto"/>
-                <a:cs typeface="Roboto"/>
-                <a:sym typeface="Roboto"/>
-              </a:rPr>
-              <a:t>Banco de dados</a:t>
-            </a:r>
-            <a:endParaRPr sz="1200">
-              <a:latin typeface="Roboto"/>
-              <a:ea typeface="Roboto"/>
-              <a:cs typeface="Roboto"/>
-              <a:sym typeface="Roboto"/>
-            </a:endParaRPr>
-          </a:p>
-        </p:txBody>
-      </p:sp>
-      <p:pic>
-        <p:nvPicPr>
-          <p:cNvPr id="127" name="Google Shape;127;p14"/>
-          <p:cNvPicPr preferRelativeResize="0"/>
-          <p:nvPr/>
-        </p:nvPicPr>
-        <p:blipFill>
-          <a:blip r:embed="rId21">
-            <a:alphaModFix/>
-          </a:blip>
-          <a:stretch>
-            <a:fillRect/>
-          </a:stretch>
-        </p:blipFill>
-        <p:spPr>
-          <a:xfrm>
-            <a:off x="5737547" y="3575582"/>
-            <a:ext cx="469514" cy="455168"/>
-          </a:xfrm>
-          <a:prstGeom prst="rect">
-            <a:avLst/>
-          </a:prstGeom>
-          <a:noFill/>
-          <a:ln>
-            <a:noFill/>
-          </a:ln>
-        </p:spPr>
-      </p:pic>
-      <p:cxnSp>
-        <p:nvCxnSpPr>
-          <p:cNvPr id="128" name="Google Shape;128;p14"/>
-          <p:cNvCxnSpPr/>
-          <p:nvPr/>
-        </p:nvCxnSpPr>
-        <p:spPr>
-          <a:xfrm flipH="1">
-            <a:off x="6604752" y="2434343"/>
-            <a:ext cx="773400" cy="716400"/>
-          </a:xfrm>
-          <a:prstGeom prst="straightConnector1">
-            <a:avLst/>
-          </a:prstGeom>
-          <a:noFill/>
-          <a:ln w="9525" cap="flat" cmpd="sng">
-            <a:solidFill>
-              <a:srgbClr val="000000"/>
-            </a:solidFill>
-            <a:prstDash val="solid"/>
-            <a:round/>
-            <a:headEnd type="none" w="med" len="med"/>
-            <a:tailEnd type="triangle" w="med" len="med"/>
-          </a:ln>
-        </p:spPr>
-      </p:cxnSp>
-      <p:pic>
-        <p:nvPicPr>
-          <p:cNvPr id="129" name="Google Shape;129;p14"/>
-          <p:cNvPicPr preferRelativeResize="0"/>
-          <p:nvPr/>
-        </p:nvPicPr>
-        <p:blipFill>
-          <a:blip r:embed="rId8">
-            <a:alphaModFix/>
-          </a:blip>
-          <a:stretch>
-            <a:fillRect/>
-          </a:stretch>
-        </p:blipFill>
-        <p:spPr>
-          <a:xfrm>
-            <a:off x="1465556" y="1429451"/>
-            <a:ext cx="437849" cy="343803"/>
-          </a:xfrm>
-          <a:prstGeom prst="rect">
-            <a:avLst/>
-          </a:prstGeom>
-          <a:noFill/>
-          <a:ln>
-            <a:noFill/>
-          </a:ln>
-        </p:spPr>
-      </p:pic>
-      <p:sp>
-        <p:nvSpPr>
-          <p:cNvPr id="130" name="Google Shape;130;p14"/>
-          <p:cNvSpPr txBox="1"/>
-          <p:nvPr/>
-        </p:nvSpPr>
-        <p:spPr>
-          <a:xfrm>
-            <a:off x="1173126" y="1731450"/>
-            <a:ext cx="1185300" cy="349800"/>
-          </a:xfrm>
-          <a:prstGeom prst="rect">
-            <a:avLst/>
-          </a:prstGeom>
-          <a:noFill/>
-          <a:ln>
-            <a:noFill/>
-          </a:ln>
-        </p:spPr>
-        <p:txBody>
-          <a:bodyPr spcFirstLastPara="1" wrap="square" lIns="91425" tIns="91425" rIns="91425" bIns="91425" anchor="t" anchorCtr="0">
-            <a:noAutofit/>
-          </a:bodyPr>
-          <a:lstStyle/>
-          <a:p>
-            <a:pPr marL="0" lvl="0" indent="0" algn="l" rtl="0">
-              <a:spcBef>
-                <a:spcPts val="0"/>
-              </a:spcBef>
-              <a:spcAft>
-                <a:spcPts val="0"/>
-              </a:spcAft>
-              <a:buNone/>
-            </a:pPr>
-            <a:r>
-              <a:rPr lang="pt-BR" sz="1100" dirty="0">
-                <a:latin typeface="Roboto"/>
-                <a:ea typeface="Roboto"/>
-                <a:cs typeface="Roboto"/>
-                <a:sym typeface="Roboto"/>
-              </a:rPr>
-              <a:t>Modem </a:t>
-            </a:r>
-            <a:r>
-              <a:rPr lang="pt-BR" sz="1100" dirty="0" err="1">
-                <a:latin typeface="Roboto"/>
-                <a:ea typeface="Roboto"/>
-                <a:cs typeface="Roboto"/>
-                <a:sym typeface="Roboto"/>
-              </a:rPr>
-              <a:t>Wi-fi</a:t>
-            </a:r>
-            <a:endParaRPr sz="1100" dirty="0">
-              <a:latin typeface="Roboto"/>
-              <a:ea typeface="Roboto"/>
-              <a:cs typeface="Roboto"/>
-              <a:sym typeface="Roboto"/>
-            </a:endParaRPr>
-          </a:p>
-          <a:p>
-            <a:pPr marL="0" lvl="0" indent="0" algn="l" rtl="0">
-              <a:spcBef>
-                <a:spcPts val="0"/>
-              </a:spcBef>
-              <a:spcAft>
-                <a:spcPts val="0"/>
-              </a:spcAft>
-              <a:buNone/>
-            </a:pPr>
-            <a:endParaRPr dirty="0"/>
-          </a:p>
-        </p:txBody>
-      </p:sp>
-      <p:cxnSp>
-        <p:nvCxnSpPr>
-          <p:cNvPr id="131" name="Google Shape;131;p14"/>
-          <p:cNvCxnSpPr/>
-          <p:nvPr/>
-        </p:nvCxnSpPr>
-        <p:spPr>
-          <a:xfrm rot="10800000">
-            <a:off x="1684480" y="2031275"/>
-            <a:ext cx="0" cy="397800"/>
+          <a:xfrm>
+            <a:off x="3356671" y="592232"/>
+            <a:ext cx="742800" cy="0"/>
           </a:xfrm>
           <a:prstGeom prst="straightConnector1">
             <a:avLst/>
@@ -8491,120 +8524,16 @@
       </p:cxnSp>
       <p:cxnSp>
         <p:nvCxnSpPr>
-          <p:cNvPr id="132" name="Google Shape;132;p14"/>
-          <p:cNvCxnSpPr/>
+          <p:cNvPr id="136" name="Google Shape;136;p14"/>
+          <p:cNvCxnSpPr>
+            <a:cxnSpLocks/>
+          </p:cNvCxnSpPr>
           <p:nvPr/>
         </p:nvCxnSpPr>
         <p:spPr>
-          <a:xfrm>
-            <a:off x="1651344" y="838459"/>
-            <a:ext cx="902100" cy="0"/>
-          </a:xfrm>
-          <a:prstGeom prst="straightConnector1">
-            <a:avLst/>
-          </a:prstGeom>
-          <a:noFill/>
-          <a:ln w="9525" cap="flat" cmpd="sng">
-            <a:solidFill>
-              <a:schemeClr val="dk2"/>
-            </a:solidFill>
-            <a:prstDash val="solid"/>
-            <a:round/>
-            <a:headEnd type="none" w="med" len="med"/>
-            <a:tailEnd type="triangle" w="med" len="med"/>
-          </a:ln>
-        </p:spPr>
-      </p:cxnSp>
-      <p:cxnSp>
-        <p:nvCxnSpPr>
-          <p:cNvPr id="133" name="Google Shape;133;p14"/>
-          <p:cNvCxnSpPr/>
-          <p:nvPr/>
-        </p:nvCxnSpPr>
-        <p:spPr>
-          <a:xfrm>
-            <a:off x="1664449" y="841996"/>
-            <a:ext cx="0" cy="499500"/>
-          </a:xfrm>
-          <a:prstGeom prst="straightConnector1">
-            <a:avLst/>
-          </a:prstGeom>
-          <a:noFill/>
-          <a:ln w="9525" cap="flat" cmpd="sng">
-            <a:solidFill>
-              <a:schemeClr val="dk2"/>
-            </a:solidFill>
-            <a:prstDash val="solid"/>
-            <a:round/>
-            <a:headEnd type="none" w="med" len="med"/>
-            <a:tailEnd type="none" w="med" len="med"/>
-          </a:ln>
-        </p:spPr>
-      </p:cxnSp>
-      <p:pic>
-        <p:nvPicPr>
-          <p:cNvPr id="134" name="Google Shape;134;p14"/>
-          <p:cNvPicPr preferRelativeResize="0"/>
-          <p:nvPr/>
-        </p:nvPicPr>
-        <p:blipFill>
-          <a:blip r:embed="rId18">
-            <a:alphaModFix/>
-          </a:blip>
-          <a:stretch>
-            <a:fillRect/>
-          </a:stretch>
-        </p:blipFill>
-        <p:spPr>
-          <a:xfrm>
-            <a:off x="2751842" y="552093"/>
-            <a:ext cx="511538" cy="495916"/>
-          </a:xfrm>
-          <a:prstGeom prst="rect">
-            <a:avLst/>
-          </a:prstGeom>
-          <a:noFill/>
-          <a:ln>
-            <a:noFill/>
-          </a:ln>
-        </p:spPr>
-      </p:pic>
-      <p:cxnSp>
-        <p:nvCxnSpPr>
-          <p:cNvPr id="135" name="Google Shape;135;p14"/>
-          <p:cNvCxnSpPr/>
-          <p:nvPr/>
-        </p:nvCxnSpPr>
-        <p:spPr>
-          <a:xfrm>
-            <a:off x="3376549" y="836132"/>
-            <a:ext cx="742800" cy="0"/>
-          </a:xfrm>
-          <a:prstGeom prst="straightConnector1">
-            <a:avLst/>
-          </a:prstGeom>
-          <a:noFill/>
-          <a:ln w="9525" cap="flat" cmpd="sng">
-            <a:solidFill>
-              <a:schemeClr val="dk2"/>
-            </a:solidFill>
-            <a:prstDash val="solid"/>
-            <a:round/>
-            <a:headEnd type="none" w="med" len="med"/>
-            <a:tailEnd type="triangle" w="med" len="med"/>
-          </a:ln>
-        </p:spPr>
-      </p:cxnSp>
-      <p:cxnSp>
-        <p:nvCxnSpPr>
-          <p:cNvPr id="136" name="Google Shape;136;p14"/>
-          <p:cNvCxnSpPr/>
-          <p:nvPr/>
-        </p:nvCxnSpPr>
-        <p:spPr>
-          <a:xfrm rot="10800000">
-            <a:off x="3185879" y="4323294"/>
-            <a:ext cx="831600" cy="6900"/>
+          <a:xfrm flipH="1" flipV="1">
+            <a:off x="3623889" y="3631210"/>
+            <a:ext cx="475582" cy="8556"/>
           </a:xfrm>
           <a:prstGeom prst="straightConnector1">
             <a:avLst/>
@@ -8637,7 +8566,7 @@
         </p:blipFill>
         <p:spPr>
           <a:xfrm>
-            <a:off x="2724463" y="1116198"/>
+            <a:off x="2704585" y="872298"/>
             <a:ext cx="566300" cy="213414"/>
           </a:xfrm>
           <a:prstGeom prst="rect">
@@ -8665,7 +8594,7 @@
         </p:blipFill>
         <p:spPr>
           <a:xfrm>
-            <a:off x="6251025" y="1128098"/>
+            <a:off x="6001507" y="884182"/>
             <a:ext cx="566300" cy="213414"/>
           </a:xfrm>
           <a:prstGeom prst="rect">
@@ -8677,162 +8606,40 @@
           </a:ln>
         </p:spPr>
       </p:pic>
-      <p:sp>
-        <p:nvSpPr>
-          <p:cNvPr id="2" name="Elipse 1">
+      <p:cxnSp>
+        <p:nvCxnSpPr>
+          <p:cNvPr id="60" name="Google Shape;114;p14">
             <a:extLst>
               <a:ext uri="{FF2B5EF4-FFF2-40B4-BE49-F238E27FC236}">
-                <a16:creationId xmlns:a16="http://schemas.microsoft.com/office/drawing/2014/main" id="{6F37786E-F6DE-460C-8375-17A07C5CF950}"/>
+                <a16:creationId xmlns:a16="http://schemas.microsoft.com/office/drawing/2014/main" id="{EB20F36A-A8C6-4672-AECC-7B80C5EE69FE}"/>
               </a:ext>
             </a:extLst>
           </p:cNvPr>
-          <p:cNvSpPr/>
+          <p:cNvCxnSpPr>
+            <a:cxnSpLocks/>
+          </p:cNvCxnSpPr>
           <p:nvPr/>
-        </p:nvSpPr>
-        <p:spPr>
-          <a:xfrm>
-            <a:off x="702528" y="1233775"/>
-            <a:ext cx="1929160" cy="1199167"/>
-          </a:xfrm>
-          <a:prstGeom prst="ellipse">
+        </p:nvCxnSpPr>
+        <p:spPr>
+          <a:xfrm>
+            <a:off x="8114138" y="1262753"/>
+            <a:ext cx="0" cy="524622"/>
+          </a:xfrm>
+          <a:prstGeom prst="straightConnector1">
             <a:avLst/>
           </a:prstGeom>
           <a:noFill/>
-          <a:ln>
+          <a:ln w="9525" cap="flat" cmpd="sng">
             <a:solidFill>
-              <a:srgbClr val="FF0000"/>
+              <a:schemeClr val="dk2"/>
             </a:solidFill>
+            <a:prstDash val="solid"/>
+            <a:round/>
+            <a:headEnd type="none" w="med" len="med"/>
+            <a:tailEnd type="triangle" w="med" len="med"/>
           </a:ln>
         </p:spPr>
-        <p:style>
-          <a:lnRef idx="2">
-            <a:schemeClr val="accent1">
-              <a:shade val="50000"/>
-            </a:schemeClr>
-          </a:lnRef>
-          <a:fillRef idx="1">
-            <a:schemeClr val="accent1"/>
-          </a:fillRef>
-          <a:effectRef idx="0">
-            <a:schemeClr val="accent1"/>
-          </a:effectRef>
-          <a:fontRef idx="minor">
-            <a:schemeClr val="lt1"/>
-          </a:fontRef>
-        </p:style>
-        <p:txBody>
-          <a:bodyPr rtlCol="0" anchor="ctr"/>
-          <a:lstStyle/>
-          <a:p>
-            <a:pPr algn="ctr"/>
-            <a:endParaRPr lang="pt-BR"/>
-          </a:p>
-        </p:txBody>
-      </p:sp>
-      <p:sp>
-        <p:nvSpPr>
-          <p:cNvPr id="3" name="Elipse 2">
-            <a:extLst>
-              <a:ext uri="{FF2B5EF4-FFF2-40B4-BE49-F238E27FC236}">
-                <a16:creationId xmlns:a16="http://schemas.microsoft.com/office/drawing/2014/main" id="{F48A3DB1-5497-4E40-AF49-90E9941E1588}"/>
-              </a:ext>
-            </a:extLst>
-          </p:cNvPr>
-          <p:cNvSpPr/>
-          <p:nvPr/>
-        </p:nvSpPr>
-        <p:spPr>
-          <a:xfrm>
-            <a:off x="3751889" y="398729"/>
-            <a:ext cx="1929160" cy="1199167"/>
-          </a:xfrm>
-          <a:prstGeom prst="ellipse">
-            <a:avLst/>
-          </a:prstGeom>
-          <a:noFill/>
-          <a:ln>
-            <a:solidFill>
-              <a:srgbClr val="FF0000"/>
-            </a:solidFill>
-          </a:ln>
-        </p:spPr>
-        <p:style>
-          <a:lnRef idx="2">
-            <a:schemeClr val="accent1">
-              <a:shade val="50000"/>
-            </a:schemeClr>
-          </a:lnRef>
-          <a:fillRef idx="1">
-            <a:schemeClr val="accent1"/>
-          </a:fillRef>
-          <a:effectRef idx="0">
-            <a:schemeClr val="accent1"/>
-          </a:effectRef>
-          <a:fontRef idx="minor">
-            <a:schemeClr val="lt1"/>
-          </a:fontRef>
-        </p:style>
-        <p:txBody>
-          <a:bodyPr rtlCol="0" anchor="ctr"/>
-          <a:lstStyle/>
-          <a:p>
-            <a:pPr algn="ctr"/>
-            <a:endParaRPr lang="pt-BR"/>
-          </a:p>
-        </p:txBody>
-      </p:sp>
-      <p:sp>
-        <p:nvSpPr>
-          <p:cNvPr id="4" name="Elipse 3">
-            <a:extLst>
-              <a:ext uri="{FF2B5EF4-FFF2-40B4-BE49-F238E27FC236}">
-                <a16:creationId xmlns:a16="http://schemas.microsoft.com/office/drawing/2014/main" id="{60F6389E-599D-4D49-9297-CC044BE72636}"/>
-              </a:ext>
-            </a:extLst>
-          </p:cNvPr>
-          <p:cNvSpPr/>
-          <p:nvPr/>
-        </p:nvSpPr>
-        <p:spPr>
-          <a:xfrm>
-            <a:off x="6817325" y="292784"/>
-            <a:ext cx="1329132" cy="495916"/>
-          </a:xfrm>
-          <a:prstGeom prst="ellipse">
-            <a:avLst/>
-          </a:prstGeom>
-          <a:noFill/>
-          <a:ln>
-            <a:solidFill>
-              <a:srgbClr val="FF0000"/>
-            </a:solidFill>
-          </a:ln>
-        </p:spPr>
-        <p:style>
-          <a:lnRef idx="2">
-            <a:schemeClr val="accent1">
-              <a:shade val="50000"/>
-            </a:schemeClr>
-          </a:lnRef>
-          <a:fillRef idx="1">
-            <a:schemeClr val="accent1"/>
-          </a:fillRef>
-          <a:effectRef idx="0">
-            <a:schemeClr val="accent1"/>
-          </a:effectRef>
-          <a:fontRef idx="minor">
-            <a:schemeClr val="lt1"/>
-          </a:fontRef>
-        </p:style>
-        <p:txBody>
-          <a:bodyPr rtlCol="0" anchor="ctr"/>
-          <a:lstStyle/>
-          <a:p>
-            <a:pPr algn="ctr"/>
-            <a:endParaRPr lang="pt-BR"/>
-          </a:p>
-        </p:txBody>
-      </p:sp>
+      </p:cxnSp>
       <p:sp>
         <p:nvSpPr>
           <p:cNvPr id="5" name="CaixaDeTexto 4">
@@ -8847,8 +8654,8 @@
         </p:nvSpPr>
         <p:spPr>
           <a:xfrm>
-            <a:off x="6750584" y="406407"/>
-            <a:ext cx="1475089" cy="230832"/>
+            <a:off x="7304932" y="104586"/>
+            <a:ext cx="1475089" cy="307777"/>
           </a:xfrm>
           <a:prstGeom prst="rect">
             <a:avLst/>
@@ -8861,34 +8668,862 @@
           </a:bodyPr>
           <a:lstStyle/>
           <a:p>
+            <a:pPr algn="ctr"/>
             <a:r>
-              <a:rPr lang="pt-BR" sz="900" dirty="0"/>
-              <a:t>Adicionar </a:t>
+              <a:rPr lang="pt-BR" b="1" dirty="0">
+                <a:latin typeface="Roboto" panose="020B0604020202020204" charset="0"/>
+                <a:ea typeface="Roboto" panose="020B0604020202020204" charset="0"/>
+              </a:rPr>
+              <a:t>Website</a:t>
             </a:r>
-            <a:r>
-              <a:rPr lang="pt-BR" sz="900" dirty="0" err="1"/>
-              <a:t>Css</a:t>
-            </a:r>
-            <a:r>
-              <a:rPr lang="pt-BR" sz="900" dirty="0"/>
-              <a:t>, </a:t>
-            </a:r>
-            <a:r>
-              <a:rPr lang="pt-BR" sz="900" dirty="0" err="1"/>
-              <a:t>Js</a:t>
-            </a:r>
-            <a:r>
-              <a:rPr lang="pt-BR" sz="900" dirty="0"/>
-              <a:t> e </a:t>
-            </a:r>
-            <a:r>
-              <a:rPr lang="pt-BR" sz="900" dirty="0" err="1"/>
-              <a:t>Html</a:t>
-            </a:r>
-            <a:endParaRPr lang="pt-BR" sz="900" dirty="0"/>
           </a:p>
         </p:txBody>
       </p:sp>
+      <p:cxnSp>
+        <p:nvCxnSpPr>
+          <p:cNvPr id="31" name="Conector: Angulado 30">
+            <a:extLst>
+              <a:ext uri="{FF2B5EF4-FFF2-40B4-BE49-F238E27FC236}">
+                <a16:creationId xmlns:a16="http://schemas.microsoft.com/office/drawing/2014/main" id="{C8E0ECBF-6CC4-41C7-8EE9-1BBD9D7D509C}"/>
+              </a:ext>
+            </a:extLst>
+          </p:cNvPr>
+          <p:cNvCxnSpPr>
+            <a:cxnSpLocks/>
+          </p:cNvCxnSpPr>
+          <p:nvPr/>
+        </p:nvCxnSpPr>
+        <p:spPr>
+          <a:xfrm rot="10800000" flipV="1">
+            <a:off x="7112662" y="3400949"/>
+            <a:ext cx="1017791" cy="1014533"/>
+          </a:xfrm>
+          <a:prstGeom prst="bentConnector3">
+            <a:avLst>
+              <a:gd name="adj1" fmla="val -536"/>
+            </a:avLst>
+          </a:prstGeom>
+          <a:ln>
+            <a:tailEnd type="triangle"/>
+          </a:ln>
+        </p:spPr>
+        <p:style>
+          <a:lnRef idx="1">
+            <a:schemeClr val="dk1"/>
+          </a:lnRef>
+          <a:fillRef idx="0">
+            <a:schemeClr val="dk1"/>
+          </a:fillRef>
+          <a:effectRef idx="0">
+            <a:schemeClr val="dk1"/>
+          </a:effectRef>
+          <a:fontRef idx="minor">
+            <a:schemeClr val="tx1"/>
+          </a:fontRef>
+        </p:style>
+      </p:cxnSp>
+      <p:pic>
+        <p:nvPicPr>
+          <p:cNvPr id="1026" name="Picture 2" descr="Primeiros passos rumo ao Full-Stack com JavaScript - Tableless - Website  com artigos e textos sobre Padrões Web, Design, Back-end e Front-end tudo  em um só lugar.">
+            <a:extLst>
+              <a:ext uri="{FF2B5EF4-FFF2-40B4-BE49-F238E27FC236}">
+                <a16:creationId xmlns:a16="http://schemas.microsoft.com/office/drawing/2014/main" id="{996160F8-2E3A-4959-85B7-404ED705BFB2}"/>
+              </a:ext>
+            </a:extLst>
+          </p:cNvPr>
+          <p:cNvPicPr>
+            <a:picLocks noChangeAspect="1" noChangeArrowheads="1"/>
+          </p:cNvPicPr>
+          <p:nvPr/>
+        </p:nvPicPr>
+        <p:blipFill>
+          <a:blip r:embed="rId23">
+            <a:extLst>
+              <a:ext uri="{28A0092B-C50C-407E-A947-70E740481C1C}">
+                <a14:useLocalDpi xmlns:a14="http://schemas.microsoft.com/office/drawing/2010/main" val="0"/>
+              </a:ext>
+            </a:extLst>
+          </a:blip>
+          <a:srcRect/>
+          <a:stretch>
+            <a:fillRect/>
+          </a:stretch>
+        </p:blipFill>
+        <p:spPr bwMode="auto">
+          <a:xfrm>
+            <a:off x="8577175" y="555935"/>
+            <a:ext cx="316424" cy="316424"/>
+          </a:xfrm>
+          <a:prstGeom prst="rect">
+            <a:avLst/>
+          </a:prstGeom>
+          <a:noFill/>
+          <a:ln>
+            <a:solidFill>
+              <a:schemeClr val="tx1"/>
+            </a:solidFill>
+          </a:ln>
+          <a:extLst>
+            <a:ext uri="{909E8E84-426E-40DD-AFC4-6F175D3DCCD1}">
+              <a14:hiddenFill xmlns:a14="http://schemas.microsoft.com/office/drawing/2010/main">
+                <a:solidFill>
+                  <a:srgbClr val="FFFFFF"/>
+                </a:solidFill>
+              </a14:hiddenFill>
+            </a:ext>
+          </a:extLst>
+        </p:spPr>
+      </p:pic>
+      <p:pic>
+        <p:nvPicPr>
+          <p:cNvPr id="1028" name="Picture 4" descr="CSS - Wikipedia">
+            <a:extLst>
+              <a:ext uri="{FF2B5EF4-FFF2-40B4-BE49-F238E27FC236}">
+                <a16:creationId xmlns:a16="http://schemas.microsoft.com/office/drawing/2014/main" id="{3751B3C6-CFF3-4A3D-A105-35C2F2722402}"/>
+              </a:ext>
+            </a:extLst>
+          </p:cNvPr>
+          <p:cNvPicPr>
+            <a:picLocks noChangeAspect="1" noChangeArrowheads="1"/>
+          </p:cNvPicPr>
+          <p:nvPr/>
+        </p:nvPicPr>
+        <p:blipFill>
+          <a:blip r:embed="rId24">
+            <a:extLst>
+              <a:ext uri="{BEBA8EAE-BF5A-486C-A8C5-ECC9F3942E4B}">
+                <a14:imgProps xmlns:a14="http://schemas.microsoft.com/office/drawing/2010/main">
+                  <a14:imgLayer r:embed="rId25">
+                    <a14:imgEffect>
+                      <a14:backgroundRemoval t="1124" b="98502" l="3175" r="94709">
+                        <a14:foregroundMark x1="7407" y1="21348" x2="34921" y2="31461"/>
+                        <a14:foregroundMark x1="34921" y1="89513" x2="41270" y2="94382"/>
+                        <a14:foregroundMark x1="53439" y1="95131" x2="61376" y2="94382"/>
+                        <a14:foregroundMark x1="50794" y1="96255" x2="50794" y2="97753"/>
+                        <a14:foregroundMark x1="50794" y1="98502" x2="50794" y2="98502"/>
+                        <a14:foregroundMark x1="89947" y1="82022" x2="91005" y2="47566"/>
+                        <a14:foregroundMark x1="91005" y1="47566" x2="95238" y2="34082"/>
+                        <a14:foregroundMark x1="3175" y1="23221" x2="3704" y2="25468"/>
+                        <a14:foregroundMark x1="44444" y1="40824" x2="44444" y2="40824"/>
+                        <a14:foregroundMark x1="42857" y1="38577" x2="59259" y2="42697"/>
+                        <a14:foregroundMark x1="33862" y1="39700" x2="62963" y2="39700"/>
+                        <a14:foregroundMark x1="28042" y1="38951" x2="48148" y2="38951"/>
+                        <a14:foregroundMark x1="48148" y1="38951" x2="62434" y2="37828"/>
+                        <a14:foregroundMark x1="29101" y1="37828" x2="56085" y2="38951"/>
+                        <a14:foregroundMark x1="67725" y1="39700" x2="74074" y2="39700"/>
+                        <a14:foregroundMark x1="74074" y1="39700" x2="73545" y2="50187"/>
+                        <a14:foregroundMark x1="74603" y1="51311" x2="74603" y2="65918"/>
+                        <a14:foregroundMark x1="72487" y1="58052" x2="67725" y2="73408"/>
+                        <a14:foregroundMark x1="67725" y1="73408" x2="53439" y2="77903"/>
+                        <a14:foregroundMark x1="53439" y1="77903" x2="39153" y2="76404"/>
+                        <a14:foregroundMark x1="39153" y1="76404" x2="29630" y2="69663"/>
+                        <a14:foregroundMark x1="25926" y1="56180" x2="64021" y2="61049"/>
+                        <a14:foregroundMark x1="25926" y1="72285" x2="34392" y2="77528"/>
+                        <a14:foregroundMark x1="31217" y1="73783" x2="47619" y2="85019"/>
+                        <a14:foregroundMark x1="56085" y1="60300" x2="56085" y2="60300"/>
+                        <a14:foregroundMark x1="48148" y1="60300" x2="52910" y2="62172"/>
+                        <a14:foregroundMark x1="51852" y1="61423" x2="51852" y2="62172"/>
+                        <a14:foregroundMark x1="35979" y1="60300" x2="48677" y2="63670"/>
+                        <a14:foregroundMark x1="29630" y1="61423" x2="50265" y2="64045"/>
+                        <a14:foregroundMark x1="31217" y1="58801" x2="52381" y2="58801"/>
+                        <a14:foregroundMark x1="35450" y1="46816" x2="48677" y2="46816"/>
+                        <a14:foregroundMark x1="48677" y1="46816" x2="61376" y2="45318"/>
+                        <a14:foregroundMark x1="42328" y1="38577" x2="76190" y2="40075"/>
+                        <a14:foregroundMark x1="37037" y1="40075" x2="66667" y2="40824"/>
+                        <a14:foregroundMark x1="25926" y1="2996" x2="27513" y2="8240"/>
+                        <a14:foregroundMark x1="28571" y1="3371" x2="31746" y2="4120"/>
+                        <a14:foregroundMark x1="29101" y1="3371" x2="31746" y2="3371"/>
+                        <a14:foregroundMark x1="30159" y1="4120" x2="30688" y2="4120"/>
+                        <a14:foregroundMark x1="27513" y1="1124" x2="30688" y2="1873"/>
+                        <a14:foregroundMark x1="24339" y1="1873" x2="33862" y2="4120"/>
+                        <a14:foregroundMark x1="31217" y1="2247" x2="36508" y2="2247"/>
+                        <a14:foregroundMark x1="25926" y1="7865" x2="25926" y2="9738"/>
+                        <a14:foregroundMark x1="25926" y1="9738" x2="28042" y2="10112"/>
+                        <a14:foregroundMark x1="28571" y1="10487" x2="28571" y2="10487"/>
+                        <a14:foregroundMark x1="28042" y1="10487" x2="28042" y2="10487"/>
+                        <a14:foregroundMark x1="48677" y1="10861" x2="48677" y2="10861"/>
+                        <a14:foregroundMark x1="54497" y1="11610" x2="54497" y2="11610"/>
+                        <a14:foregroundMark x1="54497" y1="11236" x2="53439" y2="8240"/>
+                        <a14:foregroundMark x1="52910" y1="7865" x2="52910" y2="7865"/>
+                        <a14:foregroundMark x1="52910" y1="7865" x2="52910" y2="7865"/>
+                        <a14:foregroundMark x1="46032" y1="5243" x2="46032" y2="5243"/>
+                        <a14:foregroundMark x1="46032" y1="5243" x2="46032" y2="5243"/>
+                        <a14:foregroundMark x1="64550" y1="5618" x2="64550" y2="5618"/>
+                        <a14:foregroundMark x1="64550" y1="5618" x2="64550" y2="5618"/>
+                        <a14:foregroundMark x1="62963" y1="2247" x2="62963" y2="2247"/>
+                        <a14:foregroundMark x1="62963" y1="2247" x2="62963" y2="2247"/>
+                        <a14:foregroundMark x1="72487" y1="9363" x2="72487" y2="9363"/>
+                        <a14:foregroundMark x1="72487" y1="9363" x2="72487" y2="9363"/>
+                      </a14:backgroundRemoval>
+                    </a14:imgEffect>
+                  </a14:imgLayer>
+                </a14:imgProps>
+              </a:ext>
+              <a:ext uri="{28A0092B-C50C-407E-A947-70E740481C1C}">
+                <a14:useLocalDpi xmlns:a14="http://schemas.microsoft.com/office/drawing/2010/main" val="0"/>
+              </a:ext>
+            </a:extLst>
+          </a:blip>
+          <a:srcRect/>
+          <a:stretch>
+            <a:fillRect/>
+          </a:stretch>
+        </p:blipFill>
+        <p:spPr bwMode="auto">
+          <a:xfrm>
+            <a:off x="7159309" y="242993"/>
+            <a:ext cx="316800" cy="406545"/>
+          </a:xfrm>
+          <a:prstGeom prst="rect">
+            <a:avLst/>
+          </a:prstGeom>
+          <a:noFill/>
+          <a:extLst>
+            <a:ext uri="{909E8E84-426E-40DD-AFC4-6F175D3DCCD1}">
+              <a14:hiddenFill xmlns:a14="http://schemas.microsoft.com/office/drawing/2010/main">
+                <a:solidFill>
+                  <a:srgbClr val="FFFFFF"/>
+                </a:solidFill>
+              </a14:hiddenFill>
+            </a:ext>
+          </a:extLst>
+        </p:spPr>
+      </p:pic>
+      <p:pic>
+        <p:nvPicPr>
+          <p:cNvPr id="1030" name="Picture 6" descr="HTML5 – Wikipédia, a enciclopédia livre">
+            <a:extLst>
+              <a:ext uri="{FF2B5EF4-FFF2-40B4-BE49-F238E27FC236}">
+                <a16:creationId xmlns:a16="http://schemas.microsoft.com/office/drawing/2014/main" id="{2181CB2E-BCAD-4E2F-8826-C98CACE8E528}"/>
+              </a:ext>
+            </a:extLst>
+          </p:cNvPr>
+          <p:cNvPicPr>
+            <a:picLocks noChangeAspect="1" noChangeArrowheads="1"/>
+          </p:cNvPicPr>
+          <p:nvPr/>
+        </p:nvPicPr>
+        <p:blipFill>
+          <a:blip r:embed="rId26">
+            <a:extLst>
+              <a:ext uri="{BEBA8EAE-BF5A-486C-A8C5-ECC9F3942E4B}">
+                <a14:imgProps xmlns:a14="http://schemas.microsoft.com/office/drawing/2010/main">
+                  <a14:imgLayer r:embed="rId27">
+                    <a14:imgEffect>
+                      <a14:backgroundRemoval t="1333" b="93778" l="9778" r="89778">
+                        <a14:foregroundMark x1="65333" y1="25333" x2="65333" y2="25333"/>
+                        <a14:foregroundMark x1="65333" y1="25333" x2="55556" y2="25333"/>
+                        <a14:foregroundMark x1="54222" y1="25333" x2="54222" y2="25333"/>
+                        <a14:foregroundMark x1="51556" y1="24889" x2="49778" y2="24889"/>
+                        <a14:foregroundMark x1="44444" y1="25333" x2="26667" y2="26667"/>
+                        <a14:foregroundMark x1="26667" y1="26667" x2="26667" y2="26667"/>
+                        <a14:foregroundMark x1="42667" y1="24444" x2="60444" y2="24444"/>
+                        <a14:foregroundMark x1="60444" y1="24444" x2="64889" y2="24000"/>
+                        <a14:foregroundMark x1="59111" y1="37778" x2="35556" y2="36444"/>
+                        <a14:foregroundMark x1="43556" y1="36889" x2="65333" y2="39556"/>
+                        <a14:foregroundMark x1="66222" y1="38667" x2="66222" y2="38667"/>
+                        <a14:foregroundMark x1="32444" y1="39111" x2="33333" y2="42222"/>
+                        <a14:foregroundMark x1="33333" y1="42222" x2="34222" y2="51111"/>
+                        <a14:foregroundMark x1="36444" y1="56444" x2="44444" y2="56889"/>
+                        <a14:foregroundMark x1="55111" y1="57333" x2="62222" y2="58222"/>
+                        <a14:foregroundMark x1="67111" y1="66222" x2="67111" y2="70667"/>
+                        <a14:foregroundMark x1="65333" y1="60889" x2="66222" y2="67111"/>
+                        <a14:foregroundMark x1="66222" y1="71111" x2="62667" y2="75111"/>
+                        <a14:foregroundMark x1="60000" y1="76889" x2="51556" y2="78667"/>
+                        <a14:foregroundMark x1="51556" y1="78667" x2="39111" y2="76444"/>
+                        <a14:foregroundMark x1="62222" y1="93333" x2="56000" y2="94222"/>
+                        <a14:foregroundMark x1="31556" y1="6222" x2="31556" y2="6667"/>
+                        <a14:foregroundMark x1="27556" y1="5333" x2="24444" y2="5333"/>
+                        <a14:foregroundMark x1="21778" y1="1333" x2="21778" y2="1333"/>
+                        <a14:foregroundMark x1="26222" y1="5333" x2="25333" y2="6222"/>
+                        <a14:foregroundMark x1="24000" y1="6222" x2="24000" y2="6222"/>
+                        <a14:foregroundMark x1="23556" y1="7556" x2="23556" y2="7556"/>
+                        <a14:foregroundMark x1="43556" y1="8444" x2="43556" y2="8444"/>
+                        <a14:foregroundMark x1="40000" y1="4889" x2="40000" y2="4889"/>
+                        <a14:foregroundMark x1="51556" y1="7111" x2="51556" y2="7111"/>
+                        <a14:foregroundMark x1="55111" y1="5333" x2="56000" y2="5778"/>
+                        <a14:foregroundMark x1="68889" y1="5778" x2="70667" y2="6667"/>
+                        <a14:foregroundMark x1="36444" y1="69333" x2="38222" y2="71556"/>
+                      </a14:backgroundRemoval>
+                    </a14:imgEffect>
+                  </a14:imgLayer>
+                </a14:imgProps>
+              </a:ext>
+              <a:ext uri="{28A0092B-C50C-407E-A947-70E740481C1C}">
+                <a14:useLocalDpi xmlns:a14="http://schemas.microsoft.com/office/drawing/2010/main" val="0"/>
+              </a:ext>
+            </a:extLst>
+          </a:blip>
+          <a:srcRect/>
+          <a:stretch>
+            <a:fillRect/>
+          </a:stretch>
+        </p:blipFill>
+        <p:spPr bwMode="auto">
+          <a:xfrm>
+            <a:off x="7112661" y="672689"/>
+            <a:ext cx="417918" cy="417918"/>
+          </a:xfrm>
+          <a:prstGeom prst="rect">
+            <a:avLst/>
+          </a:prstGeom>
+          <a:noFill/>
+          <a:extLst>
+            <a:ext uri="{909E8E84-426E-40DD-AFC4-6F175D3DCCD1}">
+              <a14:hiddenFill xmlns:a14="http://schemas.microsoft.com/office/drawing/2010/main">
+                <a:solidFill>
+                  <a:srgbClr val="FFFFFF"/>
+                </a:solidFill>
+              </a14:hiddenFill>
+            </a:ext>
+          </a:extLst>
+        </p:spPr>
+      </p:pic>
+      <p:pic>
+        <p:nvPicPr>
+          <p:cNvPr id="1032" name="Picture 8" descr="Página Da Web Desenho Para Colorir - Ultra Coloring Pages">
+            <a:extLst>
+              <a:ext uri="{FF2B5EF4-FFF2-40B4-BE49-F238E27FC236}">
+                <a16:creationId xmlns:a16="http://schemas.microsoft.com/office/drawing/2014/main" id="{7926544D-E128-492D-A770-8AF7E95F8CA0}"/>
+              </a:ext>
+            </a:extLst>
+          </p:cNvPr>
+          <p:cNvPicPr>
+            <a:picLocks noChangeAspect="1" noChangeArrowheads="1"/>
+          </p:cNvPicPr>
+          <p:nvPr/>
+        </p:nvPicPr>
+        <p:blipFill>
+          <a:blip r:embed="rId28">
+            <a:extLst>
+              <a:ext uri="{BEBA8EAE-BF5A-486C-A8C5-ECC9F3942E4B}">
+                <a14:imgProps xmlns:a14="http://schemas.microsoft.com/office/drawing/2010/main">
+                  <a14:imgLayer r:embed="rId29">
+                    <a14:imgEffect>
+                      <a14:backgroundRemoval t="9778" b="89778" l="8889" r="89778">
+                        <a14:foregroundMark x1="8889" y1="20444" x2="10667" y2="31111"/>
+                        <a14:foregroundMark x1="11111" y1="24000" x2="13778" y2="41333"/>
+                        <a14:foregroundMark x1="16444" y1="31111" x2="20444" y2="55111"/>
+                        <a14:foregroundMark x1="23556" y1="32444" x2="27556" y2="58667"/>
+                        <a14:foregroundMark x1="27556" y1="58667" x2="28000" y2="58667"/>
+                        <a14:foregroundMark x1="40444" y1="41778" x2="40444" y2="60000"/>
+                        <a14:foregroundMark x1="58222" y1="43111" x2="56889" y2="59111"/>
+                        <a14:foregroundMark x1="56000" y1="54222" x2="56000" y2="54222"/>
+                        <a14:foregroundMark x1="61333" y1="55111" x2="63111" y2="56000"/>
+                        <a14:foregroundMark x1="66222" y1="56000" x2="66222" y2="56000"/>
+                        <a14:foregroundMark x1="68000" y1="56000" x2="68000" y2="56000"/>
+                        <a14:foregroundMark x1="72444" y1="56000" x2="72444" y2="56000"/>
+                        <a14:foregroundMark x1="74667" y1="57778" x2="75556" y2="59111"/>
+                        <a14:foregroundMark x1="77333" y1="62667" x2="77333" y2="62667"/>
+                        <a14:foregroundMark x1="77778" y1="63111" x2="77778" y2="63111"/>
+                        <a14:foregroundMark x1="73333" y1="64000" x2="66222" y2="64889"/>
+                        <a14:foregroundMark x1="56889" y1="65778" x2="53333" y2="67111"/>
+                        <a14:foregroundMark x1="50222" y1="68889" x2="45333" y2="69778"/>
+                        <a14:foregroundMark x1="40444" y1="69778" x2="32000" y2="68444"/>
+                        <a14:foregroundMark x1="20000" y1="67111" x2="19111" y2="67111"/>
+                        <a14:foregroundMark x1="18667" y1="67111" x2="18667" y2="67111"/>
+                        <a14:foregroundMark x1="19556" y1="63111" x2="20000" y2="62667"/>
+                        <a14:foregroundMark x1="23556" y1="53333" x2="38222" y2="45333"/>
+                        <a14:foregroundMark x1="40444" y1="45333" x2="47556" y2="51556"/>
+                        <a14:foregroundMark x1="52889" y1="59111" x2="53333" y2="60444"/>
+                        <a14:foregroundMark x1="55556" y1="62222" x2="59111" y2="64000"/>
+                        <a14:foregroundMark x1="63556" y1="64889" x2="64889" y2="66222"/>
+                        <a14:foregroundMark x1="67556" y1="67111" x2="68889" y2="68000"/>
+                        <a14:foregroundMark x1="71111" y1="68000" x2="72444" y2="68000"/>
+                        <a14:foregroundMark x1="75556" y1="68000" x2="76444" y2="68444"/>
+                        <a14:foregroundMark x1="79111" y1="67556" x2="79111" y2="67556"/>
+                        <a14:foregroundMark x1="79556" y1="67556" x2="80444" y2="67111"/>
+                        <a14:foregroundMark x1="82222" y1="60000" x2="82222" y2="59111"/>
+                        <a14:foregroundMark x1="83111" y1="58222" x2="83111" y2="58222"/>
+                        <a14:foregroundMark x1="81333" y1="52889" x2="81333" y2="52889"/>
+                        <a14:foregroundMark x1="84889" y1="65778" x2="86222" y2="70222"/>
+                        <a14:foregroundMark x1="80444" y1="43111" x2="80444" y2="42222"/>
+                        <a14:foregroundMark x1="80444" y1="40889" x2="80444" y2="40889"/>
+                        <a14:foregroundMark x1="82667" y1="40000" x2="82667" y2="40000"/>
+                        <a14:foregroundMark x1="86667" y1="40889" x2="85778" y2="48000"/>
+                        <a14:foregroundMark x1="86222" y1="48889" x2="87111" y2="49333"/>
+                        <a14:foregroundMark x1="85333" y1="48889" x2="73778" y2="43556"/>
+                        <a14:foregroundMark x1="72444" y1="42222" x2="73333" y2="42222"/>
+                        <a14:foregroundMark x1="73333" y1="41333" x2="73333" y2="41333"/>
+                        <a14:foregroundMark x1="41333" y1="32444" x2="41333" y2="32444"/>
+                        <a14:foregroundMark x1="41333" y1="31111" x2="41333" y2="31111"/>
+                        <a14:foregroundMark x1="45778" y1="30667" x2="45778" y2="30667"/>
+                        <a14:foregroundMark x1="48000" y1="30222" x2="48000" y2="30222"/>
+                        <a14:foregroundMark x1="52889" y1="29778" x2="53778" y2="29778"/>
+                        <a14:foregroundMark x1="58667" y1="29333" x2="60444" y2="28444"/>
+                        <a14:foregroundMark x1="67556" y1="28444" x2="68444" y2="28000"/>
+                        <a14:foregroundMark x1="72444" y1="28000" x2="73778" y2="28000"/>
+                        <a14:foregroundMark x1="78667" y1="28000" x2="78667" y2="28000"/>
+                        <a14:foregroundMark x1="80444" y1="29333" x2="81778" y2="30667"/>
+                        <a14:foregroundMark x1="84889" y1="32889" x2="84889" y2="32889"/>
+                        <a14:foregroundMark x1="80000" y1="37333" x2="72444" y2="37778"/>
+                        <a14:foregroundMark x1="54667" y1="22667" x2="54667" y2="22667"/>
+                        <a14:foregroundMark x1="60000" y1="35556" x2="60000" y2="35556"/>
+                        <a14:foregroundMark x1="43111" y1="21333" x2="43111" y2="21333"/>
+                        <a14:foregroundMark x1="44889" y1="21333" x2="44889" y2="21333"/>
+                        <a14:foregroundMark x1="47111" y1="21778" x2="53333" y2="21778"/>
+                        <a14:foregroundMark x1="58222" y1="21778" x2="65778" y2="22667"/>
+                        <a14:foregroundMark x1="66222" y1="22667" x2="75111" y2="23111"/>
+                        <a14:foregroundMark x1="75111" y1="23111" x2="80000" y2="23111"/>
+                        <a14:foregroundMark x1="82222" y1="22222" x2="87111" y2="22222"/>
+                        <a14:foregroundMark x1="89333" y1="22222" x2="87556" y2="22222"/>
+                        <a14:foregroundMark x1="14222" y1="21333" x2="20444" y2="23556"/>
+                        <a14:foregroundMark x1="12444" y1="21778" x2="28444" y2="23556"/>
+                        <a14:foregroundMark x1="31111" y1="23556" x2="40000" y2="24444"/>
+                        <a14:foregroundMark x1="40000" y1="31111" x2="39556" y2="43556"/>
+                        <a14:foregroundMark x1="39556" y1="43556" x2="37778" y2="46222"/>
+                        <a14:foregroundMark x1="31556" y1="43556" x2="33333" y2="51111"/>
+                        <a14:foregroundMark x1="23556" y1="35556" x2="25778" y2="48000"/>
+                        <a14:foregroundMark x1="25778" y1="48000" x2="25778" y2="48000"/>
+                        <a14:foregroundMark x1="17778" y1="34222" x2="20000" y2="50222"/>
+                        <a14:foregroundMark x1="12444" y1="46222" x2="22222" y2="56000"/>
+                        <a14:foregroundMark x1="22222" y1="56000" x2="36000" y2="57778"/>
+                        <a14:foregroundMark x1="36000" y1="57778" x2="40889" y2="56444"/>
+                        <a14:backgroundMark x1="21778" y1="11111" x2="56889" y2="11556"/>
+                        <a14:backgroundMark x1="27111" y1="11111" x2="68889" y2="11111"/>
+                      </a14:backgroundRemoval>
+                    </a14:imgEffect>
+                  </a14:imgLayer>
+                </a14:imgProps>
+              </a:ext>
+              <a:ext uri="{28A0092B-C50C-407E-A947-70E740481C1C}">
+                <a14:useLocalDpi xmlns:a14="http://schemas.microsoft.com/office/drawing/2010/main" val="0"/>
+              </a:ext>
+            </a:extLst>
+          </a:blip>
+          <a:srcRect/>
+          <a:stretch>
+            <a:fillRect/>
+          </a:stretch>
+        </p:blipFill>
+        <p:spPr bwMode="auto">
+          <a:xfrm>
+            <a:off x="7511401" y="187118"/>
+            <a:ext cx="1058108" cy="1058108"/>
+          </a:xfrm>
+          <a:prstGeom prst="rect">
+            <a:avLst/>
+          </a:prstGeom>
+          <a:noFill/>
+          <a:extLst>
+            <a:ext uri="{909E8E84-426E-40DD-AFC4-6F175D3DCCD1}">
+              <a14:hiddenFill xmlns:a14="http://schemas.microsoft.com/office/drawing/2010/main">
+                <a:solidFill>
+                  <a:srgbClr val="FFFFFF"/>
+                </a:solidFill>
+              </a14:hiddenFill>
+            </a:ext>
+          </a:extLst>
+        </p:spPr>
+      </p:pic>
+      <p:sp>
+        <p:nvSpPr>
+          <p:cNvPr id="35" name="CaixaDeTexto 34">
+            <a:extLst>
+              <a:ext uri="{FF2B5EF4-FFF2-40B4-BE49-F238E27FC236}">
+                <a16:creationId xmlns:a16="http://schemas.microsoft.com/office/drawing/2014/main" id="{84AE4C6B-4206-4617-9927-71458E6603C9}"/>
+              </a:ext>
+            </a:extLst>
+          </p:cNvPr>
+          <p:cNvSpPr txBox="1"/>
+          <p:nvPr/>
+        </p:nvSpPr>
+        <p:spPr>
+          <a:xfrm>
+            <a:off x="7409154" y="959439"/>
+            <a:ext cx="1313180" cy="338554"/>
+          </a:xfrm>
+          <a:prstGeom prst="rect">
+            <a:avLst/>
+          </a:prstGeom>
+          <a:noFill/>
+        </p:spPr>
+        <p:txBody>
+          <a:bodyPr wrap="none" rtlCol="0">
+            <a:spAutoFit/>
+          </a:bodyPr>
+          <a:lstStyle/>
+          <a:p>
+            <a:r>
+              <a:rPr lang="pt-BR" sz="800" b="1" dirty="0">
+                <a:latin typeface="Roboto" panose="020B0604020202020204" charset="0"/>
+                <a:ea typeface="Roboto" panose="020B0604020202020204" charset="0"/>
+              </a:rPr>
+              <a:t>Programado em JS, CSS</a:t>
+            </a:r>
+          </a:p>
+          <a:p>
+            <a:pPr algn="ctr"/>
+            <a:r>
+              <a:rPr lang="pt-BR" sz="800" b="1" dirty="0">
+                <a:latin typeface="Roboto" panose="020B0604020202020204" charset="0"/>
+                <a:ea typeface="Roboto" panose="020B0604020202020204" charset="0"/>
+              </a:rPr>
+              <a:t> e HTML</a:t>
+            </a:r>
+          </a:p>
+        </p:txBody>
+      </p:sp>
+      <p:pic>
+        <p:nvPicPr>
+          <p:cNvPr id="4" name="Picture 2" descr="GSM GPRS Shield para Arduino EFCom SIM900 + Antena - FilipeFlop">
+            <a:extLst>
+              <a:ext uri="{FF2B5EF4-FFF2-40B4-BE49-F238E27FC236}">
+                <a16:creationId xmlns:a16="http://schemas.microsoft.com/office/drawing/2014/main" id="{06E6B7BC-E69E-4C9E-925F-9EF97EDA887A}"/>
+              </a:ext>
+            </a:extLst>
+          </p:cNvPr>
+          <p:cNvPicPr>
+            <a:picLocks noChangeAspect="1" noChangeArrowheads="1"/>
+          </p:cNvPicPr>
+          <p:nvPr/>
+        </p:nvPicPr>
+        <p:blipFill>
+          <a:blip r:embed="rId30">
+            <a:extLst>
+              <a:ext uri="{BEBA8EAE-BF5A-486C-A8C5-ECC9F3942E4B}">
+                <a14:imgProps xmlns:a14="http://schemas.microsoft.com/office/drawing/2010/main">
+                  <a14:imgLayer r:embed="rId31">
+                    <a14:imgEffect>
+                      <a14:backgroundRemoval t="5333" b="94667" l="9778" r="89778">
+                        <a14:foregroundMark x1="64000" y1="43556" x2="64000" y2="43556"/>
+                        <a14:foregroundMark x1="67556" y1="43556" x2="67556" y2="43556"/>
+                        <a14:foregroundMark x1="68000" y1="44000" x2="68000" y2="44000"/>
+                        <a14:foregroundMark x1="68444" y1="44444" x2="68444" y2="44444"/>
+                        <a14:foregroundMark x1="68889" y1="44889" x2="68889" y2="44889"/>
+                        <a14:foregroundMark x1="68444" y1="44000" x2="68444" y2="44000"/>
+                        <a14:foregroundMark x1="67111" y1="43556" x2="67111" y2="43556"/>
+                        <a14:foregroundMark x1="67111" y1="43556" x2="67111" y2="43556"/>
+                        <a14:foregroundMark x1="67111" y1="43556" x2="67111" y2="43556"/>
+                        <a14:foregroundMark x1="69778" y1="43556" x2="69778" y2="43556"/>
+                        <a14:foregroundMark x1="68889" y1="43556" x2="68889" y2="43556"/>
+                        <a14:foregroundMark x1="69333" y1="41778" x2="69333" y2="41778"/>
+                        <a14:foregroundMark x1="68444" y1="41333" x2="68444" y2="41333"/>
+                        <a14:foregroundMark x1="72000" y1="44000" x2="72000" y2="44000"/>
+                        <a14:foregroundMark x1="72889" y1="42667" x2="72889" y2="42667"/>
+                        <a14:foregroundMark x1="72889" y1="42667" x2="72889" y2="42667"/>
+                        <a14:foregroundMark x1="72889" y1="42667" x2="72889" y2="42667"/>
+                        <a14:foregroundMark x1="72889" y1="41333" x2="72889" y2="41333"/>
+                        <a14:foregroundMark x1="72889" y1="40889" x2="72889" y2="40889"/>
+                        <a14:foregroundMark x1="73778" y1="40889" x2="73778" y2="40889"/>
+                        <a14:foregroundMark x1="73778" y1="40444" x2="73778" y2="40444"/>
+                        <a14:foregroundMark x1="73778" y1="40000" x2="73778" y2="40000"/>
+                        <a14:foregroundMark x1="73778" y1="39556" x2="73778" y2="39556"/>
+                        <a14:foregroundMark x1="68889" y1="41778" x2="68889" y2="41778"/>
+                        <a14:foregroundMark x1="65333" y1="44444" x2="64889" y2="44444"/>
+                        <a14:foregroundMark x1="61778" y1="47556" x2="61778" y2="47556"/>
+                        <a14:foregroundMark x1="61333" y1="47556" x2="61333" y2="47556"/>
+                        <a14:foregroundMark x1="61333" y1="47111" x2="61333" y2="47111"/>
+                        <a14:foregroundMark x1="60889" y1="47111" x2="60889" y2="47111"/>
+                        <a14:foregroundMark x1="60889" y1="48000" x2="60889" y2="48000"/>
+                        <a14:foregroundMark x1="64000" y1="47556" x2="64000" y2="47556"/>
+                        <a14:foregroundMark x1="66222" y1="45778" x2="66222" y2="45778"/>
+                        <a14:foregroundMark x1="68000" y1="44889" x2="68000" y2="44889"/>
+                        <a14:foregroundMark x1="68444" y1="47111" x2="68444" y2="47111"/>
+                        <a14:foregroundMark x1="68889" y1="47556" x2="68889" y2="47556"/>
+                        <a14:foregroundMark x1="68889" y1="47556" x2="68889" y2="47556"/>
+                        <a14:foregroundMark x1="63111" y1="51111" x2="63111" y2="51111"/>
+                        <a14:foregroundMark x1="64000" y1="50222" x2="64000" y2="50222"/>
+                        <a14:foregroundMark x1="68000" y1="80889" x2="68000" y2="80889"/>
+                        <a14:foregroundMark x1="69333" y1="80889" x2="69333" y2="80889"/>
+                        <a14:foregroundMark x1="68889" y1="80889" x2="68889" y2="80889"/>
+                        <a14:foregroundMark x1="68444" y1="81778" x2="68444" y2="81778"/>
+                        <a14:foregroundMark x1="68444" y1="82222" x2="68444" y2="82222"/>
+                        <a14:foregroundMark x1="72000" y1="79111" x2="72000" y2="79111"/>
+                        <a14:foregroundMark x1="71556" y1="78222" x2="71556" y2="78222"/>
+                        <a14:foregroundMark x1="77778" y1="70667" x2="77778" y2="70667"/>
+                        <a14:foregroundMark x1="79111" y1="68889" x2="79111" y2="68889"/>
+                        <a14:foregroundMark x1="79111" y1="68444" x2="79111" y2="68444"/>
+                        <a14:foregroundMark x1="79111" y1="67556" x2="79111" y2="67556"/>
+                        <a14:foregroundMark x1="80000" y1="67111" x2="80000" y2="67111"/>
+                        <a14:foregroundMark x1="80444" y1="65778" x2="80444" y2="65778"/>
+                        <a14:foregroundMark x1="58222" y1="89333" x2="58222" y2="89333"/>
+                        <a14:foregroundMark x1="56889" y1="91111" x2="56889" y2="91111"/>
+                        <a14:foregroundMark x1="55556" y1="92889" x2="55556" y2="92889"/>
+                        <a14:foregroundMark x1="55111" y1="94667" x2="55111" y2="94667"/>
+                        <a14:foregroundMark x1="56444" y1="93778" x2="56444" y2="93778"/>
+                        <a14:foregroundMark x1="57778" y1="92000" x2="57778" y2="92000"/>
+                        <a14:foregroundMark x1="58667" y1="90667" x2="58667" y2="90667"/>
+                        <a14:foregroundMark x1="60889" y1="89333" x2="60889" y2="89333"/>
+                        <a14:foregroundMark x1="61778" y1="88000" x2="61778" y2="88000"/>
+                        <a14:foregroundMark x1="64444" y1="85333" x2="64444" y2="85333"/>
+                        <a14:foregroundMark x1="65333" y1="83556" x2="65333" y2="83556"/>
+                        <a14:foregroundMark x1="69778" y1="5333" x2="69778" y2="5333"/>
+                        <a14:foregroundMark x1="44444" y1="45778" x2="44444" y2="45778"/>
+                      </a14:backgroundRemoval>
+                    </a14:imgEffect>
+                  </a14:imgLayer>
+                </a14:imgProps>
+              </a:ext>
+              <a:ext uri="{28A0092B-C50C-407E-A947-70E740481C1C}">
+                <a14:useLocalDpi xmlns:a14="http://schemas.microsoft.com/office/drawing/2010/main" val="0"/>
+              </a:ext>
+            </a:extLst>
+          </a:blip>
+          <a:srcRect/>
+          <a:stretch>
+            <a:fillRect/>
+          </a:stretch>
+        </p:blipFill>
+        <p:spPr bwMode="auto">
+          <a:xfrm>
+            <a:off x="1049017" y="810851"/>
+            <a:ext cx="1306200" cy="1306200"/>
+          </a:xfrm>
+          <a:prstGeom prst="rect">
+            <a:avLst/>
+          </a:prstGeom>
+          <a:noFill/>
+          <a:extLst>
+            <a:ext uri="{909E8E84-426E-40DD-AFC4-6F175D3DCCD1}">
+              <a14:hiddenFill xmlns:a14="http://schemas.microsoft.com/office/drawing/2010/main">
+                <a:solidFill>
+                  <a:srgbClr val="FFFFFF"/>
+                </a:solidFill>
+              </a14:hiddenFill>
+            </a:ext>
+          </a:extLst>
+        </p:spPr>
+      </p:pic>
+      <p:sp>
+        <p:nvSpPr>
+          <p:cNvPr id="7" name="CaixaDeTexto 6">
+            <a:extLst>
+              <a:ext uri="{FF2B5EF4-FFF2-40B4-BE49-F238E27FC236}">
+                <a16:creationId xmlns:a16="http://schemas.microsoft.com/office/drawing/2014/main" id="{AD98CF17-2606-4509-B53F-5A75AB58F641}"/>
+              </a:ext>
+            </a:extLst>
+          </p:cNvPr>
+          <p:cNvSpPr txBox="1"/>
+          <p:nvPr/>
+        </p:nvSpPr>
+        <p:spPr>
+          <a:xfrm>
+            <a:off x="921977" y="2044543"/>
+            <a:ext cx="1418979" cy="661720"/>
+          </a:xfrm>
+          <a:prstGeom prst="rect">
+            <a:avLst/>
+          </a:prstGeom>
+          <a:noFill/>
+        </p:spPr>
+        <p:txBody>
+          <a:bodyPr wrap="none" rtlCol="0">
+            <a:spAutoFit/>
+          </a:bodyPr>
+          <a:lstStyle/>
+          <a:p>
+            <a:pPr algn="ctr"/>
+            <a:r>
+              <a:rPr lang="pt-BR" b="1" dirty="0">
+                <a:latin typeface="Roboto" panose="020B0604020202020204" charset="0"/>
+                <a:ea typeface="Roboto" panose="020B0604020202020204" charset="0"/>
+              </a:rPr>
+              <a:t>Arduino shield </a:t>
+            </a:r>
+          </a:p>
+          <a:p>
+            <a:pPr algn="ctr"/>
+            <a:r>
+              <a:rPr lang="pt-BR" b="1" dirty="0">
+                <a:latin typeface="Roboto" panose="020B0604020202020204" charset="0"/>
+                <a:ea typeface="Roboto" panose="020B0604020202020204" charset="0"/>
+              </a:rPr>
+              <a:t>gsm /gprs</a:t>
+            </a:r>
+          </a:p>
+          <a:p>
+            <a:pPr algn="ctr"/>
+            <a:r>
+              <a:rPr lang="pt-BR" sz="900" b="1" dirty="0">
+                <a:latin typeface="Roboto" panose="020B0604020202020204" charset="0"/>
+                <a:ea typeface="Roboto" panose="020B0604020202020204" charset="0"/>
+              </a:rPr>
+              <a:t>Gerara uma conexão 4g</a:t>
+            </a:r>
+          </a:p>
+        </p:txBody>
+      </p:sp>
+      <p:cxnSp>
+        <p:nvCxnSpPr>
+          <p:cNvPr id="10" name="Conector de Seta Reta 9">
+            <a:extLst>
+              <a:ext uri="{FF2B5EF4-FFF2-40B4-BE49-F238E27FC236}">
+                <a16:creationId xmlns:a16="http://schemas.microsoft.com/office/drawing/2014/main" id="{95268A3F-110A-4CE0-B133-35AD59D6CCDA}"/>
+              </a:ext>
+            </a:extLst>
+          </p:cNvPr>
+          <p:cNvCxnSpPr>
+            <a:cxnSpLocks/>
+          </p:cNvCxnSpPr>
+          <p:nvPr/>
+        </p:nvCxnSpPr>
+        <p:spPr>
+          <a:xfrm>
+            <a:off x="2283390" y="1955103"/>
+            <a:ext cx="614574" cy="1022804"/>
+          </a:xfrm>
+          <a:prstGeom prst="straightConnector1">
+            <a:avLst/>
+          </a:prstGeom>
+          <a:ln>
+            <a:headEnd type="triangle"/>
+            <a:tailEnd type="triangle"/>
+          </a:ln>
+        </p:spPr>
+        <p:style>
+          <a:lnRef idx="1">
+            <a:schemeClr val="dk1"/>
+          </a:lnRef>
+          <a:fillRef idx="0">
+            <a:schemeClr val="dk1"/>
+          </a:fillRef>
+          <a:effectRef idx="0">
+            <a:schemeClr val="dk1"/>
+          </a:effectRef>
+          <a:fontRef idx="minor">
+            <a:schemeClr val="tx1"/>
+          </a:fontRef>
+        </p:style>
+      </p:cxnSp>
+      <p:pic>
+        <p:nvPicPr>
+          <p:cNvPr id="12" name="Picture 4" descr="Ícone sem fio 4G Wi-fi - Download de Vetor">
+            <a:extLst>
+              <a:ext uri="{FF2B5EF4-FFF2-40B4-BE49-F238E27FC236}">
+                <a16:creationId xmlns:a16="http://schemas.microsoft.com/office/drawing/2014/main" id="{3A92D1DF-4671-44FB-AC17-1D7086F043E7}"/>
+              </a:ext>
+            </a:extLst>
+          </p:cNvPr>
+          <p:cNvPicPr>
+            <a:picLocks noChangeAspect="1" noChangeArrowheads="1"/>
+          </p:cNvPicPr>
+          <p:nvPr/>
+        </p:nvPicPr>
+        <p:blipFill>
+          <a:blip r:embed="rId32">
+            <a:extLst>
+              <a:ext uri="{BEBA8EAE-BF5A-486C-A8C5-ECC9F3942E4B}">
+                <a14:imgProps xmlns:a14="http://schemas.microsoft.com/office/drawing/2010/main">
+                  <a14:imgLayer r:embed="rId33">
+                    <a14:imgEffect>
+                      <a14:backgroundRemoval t="10000" b="90000" l="10000" r="90000">
+                        <a14:foregroundMark x1="55111" y1="59556" x2="55111" y2="59556"/>
+                        <a14:foregroundMark x1="54667" y1="59556" x2="54667" y2="59556"/>
+                        <a14:foregroundMark x1="66667" y1="37333" x2="66667" y2="37333"/>
+                        <a14:foregroundMark x1="67556" y1="38222" x2="67556" y2="38222"/>
+                        <a14:foregroundMark x1="66222" y1="28000" x2="66222" y2="28000"/>
+                        <a14:foregroundMark x1="66222" y1="28000" x2="66222" y2="28000"/>
+                      </a14:backgroundRemoval>
+                    </a14:imgEffect>
+                  </a14:imgLayer>
+                </a14:imgProps>
+              </a:ext>
+              <a:ext uri="{28A0092B-C50C-407E-A947-70E740481C1C}">
+                <a14:useLocalDpi xmlns:a14="http://schemas.microsoft.com/office/drawing/2010/main" val="0"/>
+              </a:ext>
+            </a:extLst>
+          </a:blip>
+          <a:srcRect/>
+          <a:stretch>
+            <a:fillRect/>
+          </a:stretch>
+        </p:blipFill>
+        <p:spPr bwMode="auto">
+          <a:xfrm>
+            <a:off x="1106550" y="1022931"/>
+            <a:ext cx="441020" cy="441020"/>
+          </a:xfrm>
+          <a:prstGeom prst="rect">
+            <a:avLst/>
+          </a:prstGeom>
+          <a:noFill/>
+          <a:extLst>
+            <a:ext uri="{909E8E84-426E-40DD-AFC4-6F175D3DCCD1}">
+              <a14:hiddenFill xmlns:a14="http://schemas.microsoft.com/office/drawing/2010/main">
+                <a:solidFill>
+                  <a:srgbClr val="FFFFFF"/>
+                </a:solidFill>
+              </a14:hiddenFill>
+            </a:ext>
+          </a:extLst>
+        </p:spPr>
+      </p:pic>
+      <p:pic>
+        <p:nvPicPr>
+          <p:cNvPr id="13" name="Picture 6">
+            <a:extLst>
+              <a:ext uri="{FF2B5EF4-FFF2-40B4-BE49-F238E27FC236}">
+                <a16:creationId xmlns:a16="http://schemas.microsoft.com/office/drawing/2014/main" id="{FBA4CB48-F589-47E8-A404-86AAB5A503E6}"/>
+              </a:ext>
+            </a:extLst>
+          </p:cNvPr>
+          <p:cNvPicPr>
+            <a:picLocks noChangeAspect="1" noChangeArrowheads="1"/>
+          </p:cNvPicPr>
+          <p:nvPr/>
+        </p:nvPicPr>
+        <p:blipFill>
+          <a:blip r:embed="rId34">
+            <a:extLst>
+              <a:ext uri="{BEBA8EAE-BF5A-486C-A8C5-ECC9F3942E4B}">
+                <a14:imgProps xmlns:a14="http://schemas.microsoft.com/office/drawing/2010/main">
+                  <a14:imgLayer r:embed="rId35">
+                    <a14:imgEffect>
+                      <a14:backgroundRemoval t="10000" b="92500" l="2632" r="98565">
+                        <a14:foregroundMark x1="29187" y1="93333" x2="29187" y2="93333"/>
+                        <a14:foregroundMark x1="29187" y1="93333" x2="29187" y2="93333"/>
+                        <a14:foregroundMark x1="8852" y1="46667" x2="8852" y2="46667"/>
+                        <a14:foregroundMark x1="8852" y1="47500" x2="8852" y2="47500"/>
+                        <a14:foregroundMark x1="5742" y1="73333" x2="5742" y2="73333"/>
+                        <a14:foregroundMark x1="5742" y1="73333" x2="5742" y2="73333"/>
+                        <a14:foregroundMark x1="2632" y1="85000" x2="2632" y2="85000"/>
+                        <a14:foregroundMark x1="2632" y1="85000" x2="2632" y2="85000"/>
+                        <a14:foregroundMark x1="45933" y1="50000" x2="45933" y2="50000"/>
+                        <a14:foregroundMark x1="45694" y1="50000" x2="45694" y2="50000"/>
+                        <a14:foregroundMark x1="61244" y1="70833" x2="61244" y2="70833"/>
+                        <a14:foregroundMark x1="61244" y1="70833" x2="61244" y2="70833"/>
+                        <a14:foregroundMark x1="69139" y1="64167" x2="69139" y2="64167"/>
+                        <a14:foregroundMark x1="69139" y1="64167" x2="69139" y2="64167"/>
+                        <a14:foregroundMark x1="83971" y1="67500" x2="83971" y2="67500"/>
+                        <a14:foregroundMark x1="91388" y1="64167" x2="91388" y2="64167"/>
+                        <a14:foregroundMark x1="96411" y1="67500" x2="96411" y2="67500"/>
+                        <a14:foregroundMark x1="98565" y1="69167" x2="98565" y2="69167"/>
+                      </a14:backgroundRemoval>
+                    </a14:imgEffect>
+                  </a14:imgLayer>
+                </a14:imgProps>
+              </a:ext>
+              <a:ext uri="{28A0092B-C50C-407E-A947-70E740481C1C}">
+                <a14:useLocalDpi xmlns:a14="http://schemas.microsoft.com/office/drawing/2010/main" val="0"/>
+              </a:ext>
+            </a:extLst>
+          </a:blip>
+          <a:srcRect/>
+          <a:stretch>
+            <a:fillRect/>
+          </a:stretch>
+        </p:blipFill>
+        <p:spPr bwMode="auto">
+          <a:xfrm>
+            <a:off x="3739244" y="0"/>
+            <a:ext cx="841282" cy="242993"/>
+          </a:xfrm>
+          <a:prstGeom prst="rect">
+            <a:avLst/>
+          </a:prstGeom>
+          <a:noFill/>
+          <a:extLst>
+            <a:ext uri="{909E8E84-426E-40DD-AFC4-6F175D3DCCD1}">
+              <a14:hiddenFill xmlns:a14="http://schemas.microsoft.com/office/drawing/2010/main">
+                <a:solidFill>
+                  <a:srgbClr val="FFFFFF"/>
+                </a:solidFill>
+              </a14:hiddenFill>
+            </a:ext>
+          </a:extLst>
+        </p:spPr>
+      </p:pic>
     </p:spTree>
   </p:cSld>
   <p:clrMapOvr>

</xml_diff>

<commit_message>
HLD e LLD final
</commit_message>
<xml_diff>
--- a/Tecnologia da Informação/HLD&LLD.pptx
+++ b/Tecnologia da Informação/HLD&LLD.pptx
@@ -7427,9 +7427,37 @@
           </a:ln>
         </p:spPr>
       </p:pic>
+      <p:cxnSp>
+        <p:nvCxnSpPr>
+          <p:cNvPr id="109" name="Google Shape;109;p14"/>
+          <p:cNvCxnSpPr>
+            <a:cxnSpLocks/>
+          </p:cNvCxnSpPr>
+          <p:nvPr/>
+        </p:nvCxnSpPr>
+        <p:spPr>
+          <a:xfrm flipV="1">
+            <a:off x="5270447" y="589299"/>
+            <a:ext cx="652247" cy="5260"/>
+          </a:xfrm>
+          <a:prstGeom prst="straightConnector1">
+            <a:avLst/>
+          </a:prstGeom>
+          <a:noFill/>
+          <a:ln w="9525" cap="flat" cmpd="sng">
+            <a:solidFill>
+              <a:srgbClr val="000000"/>
+            </a:solidFill>
+            <a:prstDash val="solid"/>
+            <a:round/>
+            <a:headEnd type="none" w="med" len="med"/>
+            <a:tailEnd type="triangle" w="med" len="med"/>
+          </a:ln>
+        </p:spPr>
+      </p:cxnSp>
       <p:pic>
         <p:nvPicPr>
-          <p:cNvPr id="104" name="Google Shape;104;p14"/>
+          <p:cNvPr id="113" name="Google Shape;113;p14"/>
           <p:cNvPicPr preferRelativeResize="0"/>
           <p:nvPr/>
         </p:nvPicPr>
@@ -7443,8 +7471,8 @@
         </p:blipFill>
         <p:spPr>
           <a:xfrm>
-            <a:off x="7878834" y="2977907"/>
-            <a:ext cx="566313" cy="321300"/>
+            <a:off x="6000398" y="326825"/>
+            <a:ext cx="511538" cy="495916"/>
           </a:xfrm>
           <a:prstGeom prst="rect">
             <a:avLst/>
@@ -7457,16 +7485,16 @@
       </p:pic>
       <p:cxnSp>
         <p:nvCxnSpPr>
-          <p:cNvPr id="109" name="Google Shape;109;p14"/>
+          <p:cNvPr id="115" name="Google Shape;115;p14"/>
           <p:cNvCxnSpPr>
             <a:cxnSpLocks/>
           </p:cNvCxnSpPr>
           <p:nvPr/>
         </p:nvCxnSpPr>
         <p:spPr>
-          <a:xfrm flipV="1">
-            <a:off x="5270447" y="589299"/>
-            <a:ext cx="652247" cy="5260"/>
+          <a:xfrm>
+            <a:off x="6616774" y="589299"/>
+            <a:ext cx="495887" cy="2933"/>
           </a:xfrm>
           <a:prstGeom prst="straightConnector1">
             <a:avLst/>
@@ -7485,124 +7513,12 @@
       </p:cxnSp>
       <p:pic>
         <p:nvPicPr>
-          <p:cNvPr id="113" name="Google Shape;113;p14"/>
+          <p:cNvPr id="117" name="Google Shape;117;p14"/>
           <p:cNvPicPr preferRelativeResize="0"/>
           <p:nvPr/>
         </p:nvPicPr>
         <p:blipFill>
           <a:blip r:embed="rId10">
-            <a:alphaModFix/>
-          </a:blip>
-          <a:stretch>
-            <a:fillRect/>
-          </a:stretch>
-        </p:blipFill>
-        <p:spPr>
-          <a:xfrm>
-            <a:off x="6000398" y="326825"/>
-            <a:ext cx="511538" cy="495916"/>
-          </a:xfrm>
-          <a:prstGeom prst="rect">
-            <a:avLst/>
-          </a:prstGeom>
-          <a:noFill/>
-          <a:ln>
-            <a:noFill/>
-          </a:ln>
-        </p:spPr>
-      </p:pic>
-      <p:cxnSp>
-        <p:nvCxnSpPr>
-          <p:cNvPr id="114" name="Google Shape;114;p14"/>
-          <p:cNvCxnSpPr>
-            <a:cxnSpLocks/>
-          </p:cNvCxnSpPr>
-          <p:nvPr/>
-        </p:nvCxnSpPr>
-        <p:spPr>
-          <a:xfrm>
-            <a:off x="8130451" y="2528193"/>
-            <a:ext cx="0" cy="331334"/>
-          </a:xfrm>
-          <a:prstGeom prst="straightConnector1">
-            <a:avLst/>
-          </a:prstGeom>
-          <a:noFill/>
-          <a:ln w="9525" cap="flat" cmpd="sng">
-            <a:solidFill>
-              <a:schemeClr val="dk2"/>
-            </a:solidFill>
-            <a:prstDash val="solid"/>
-            <a:round/>
-            <a:headEnd type="none" w="med" len="med"/>
-            <a:tailEnd type="triangle" w="med" len="med"/>
-          </a:ln>
-        </p:spPr>
-      </p:cxnSp>
-      <p:cxnSp>
-        <p:nvCxnSpPr>
-          <p:cNvPr id="115" name="Google Shape;115;p14"/>
-          <p:cNvCxnSpPr>
-            <a:cxnSpLocks/>
-          </p:cNvCxnSpPr>
-          <p:nvPr/>
-        </p:nvCxnSpPr>
-        <p:spPr>
-          <a:xfrm>
-            <a:off x="6616774" y="589299"/>
-            <a:ext cx="495887" cy="2933"/>
-          </a:xfrm>
-          <a:prstGeom prst="straightConnector1">
-            <a:avLst/>
-          </a:prstGeom>
-          <a:noFill/>
-          <a:ln w="9525" cap="flat" cmpd="sng">
-            <a:solidFill>
-              <a:srgbClr val="000000"/>
-            </a:solidFill>
-            <a:prstDash val="solid"/>
-            <a:round/>
-            <a:headEnd type="none" w="med" len="med"/>
-            <a:tailEnd type="triangle" w="med" len="med"/>
-          </a:ln>
-        </p:spPr>
-      </p:cxnSp>
-      <p:pic>
-        <p:nvPicPr>
-          <p:cNvPr id="116" name="Google Shape;116;p14"/>
-          <p:cNvPicPr preferRelativeResize="0"/>
-          <p:nvPr/>
-        </p:nvPicPr>
-        <p:blipFill>
-          <a:blip r:embed="rId9">
-            <a:alphaModFix/>
-          </a:blip>
-          <a:stretch>
-            <a:fillRect/>
-          </a:stretch>
-        </p:blipFill>
-        <p:spPr>
-          <a:xfrm>
-            <a:off x="2897964" y="1291553"/>
-            <a:ext cx="566313" cy="321300"/>
-          </a:xfrm>
-          <a:prstGeom prst="rect">
-            <a:avLst/>
-          </a:prstGeom>
-          <a:noFill/>
-          <a:ln>
-            <a:noFill/>
-          </a:ln>
-        </p:spPr>
-      </p:pic>
-      <p:pic>
-        <p:nvPicPr>
-          <p:cNvPr id="117" name="Google Shape;117;p14"/>
-          <p:cNvPicPr preferRelativeResize="0"/>
-          <p:nvPr/>
-        </p:nvPicPr>
-        <p:blipFill>
-          <a:blip r:embed="rId11">
             <a:alphaModFix/>
           </a:blip>
           <a:stretch>
@@ -7753,7 +7669,7 @@
         </p:nvGrpSpPr>
         <p:grpSpPr>
           <a:xfrm>
-            <a:off x="5398076" y="2434158"/>
+            <a:off x="5203851" y="2169471"/>
             <a:ext cx="1536600" cy="1544605"/>
             <a:chOff x="7602634" y="3568056"/>
             <a:chExt cx="1536600" cy="1544605"/>
@@ -7766,7 +7682,7 @@
             <p:nvPr/>
           </p:nvPicPr>
           <p:blipFill>
-            <a:blip r:embed="rId12">
+            <a:blip r:embed="rId11">
               <a:alphaModFix/>
             </a:blip>
             <a:stretch>
@@ -7794,7 +7710,7 @@
             <p:nvPr/>
           </p:nvPicPr>
           <p:blipFill>
-            <a:blip r:embed="rId13">
+            <a:blip r:embed="rId12">
               <a:alphaModFix/>
             </a:blip>
             <a:stretch>
@@ -7822,7 +7738,7 @@
             <p:nvPr/>
           </p:nvPicPr>
           <p:blipFill>
-            <a:blip r:embed="rId14">
+            <a:blip r:embed="rId13">
               <a:alphaModFix/>
             </a:blip>
             <a:stretch>
@@ -7850,7 +7766,7 @@
             <p:nvPr/>
           </p:nvPicPr>
           <p:blipFill>
-            <a:blip r:embed="rId15">
+            <a:blip r:embed="rId14">
               <a:alphaModFix/>
             </a:blip>
             <a:stretch>
@@ -7956,7 +7872,7 @@
             <p:nvPr/>
           </p:nvPicPr>
           <p:blipFill>
-            <a:blip r:embed="rId16">
+            <a:blip r:embed="rId15">
               <a:alphaModFix/>
             </a:blip>
             <a:stretch>
@@ -7984,7 +7900,7 @@
             <p:nvPr/>
           </p:nvPicPr>
           <p:blipFill>
-            <a:blip r:embed="rId17">
+            <a:blip r:embed="rId16">
               <a:alphaModFix/>
             </a:blip>
             <a:stretch>
@@ -8005,119 +7921,6 @@
             </a:ln>
           </p:spPr>
         </p:pic>
-      </p:grpSp>
-      <p:grpSp>
-        <p:nvGrpSpPr>
-          <p:cNvPr id="41" name="Agrupar 40">
-            <a:extLst>
-              <a:ext uri="{FF2B5EF4-FFF2-40B4-BE49-F238E27FC236}">
-                <a16:creationId xmlns:a16="http://schemas.microsoft.com/office/drawing/2014/main" id="{3563D5CC-A1A6-4E43-93B5-135B2EA34BFF}"/>
-              </a:ext>
-            </a:extLst>
-          </p:cNvPr>
-          <p:cNvGrpSpPr/>
-          <p:nvPr/>
-        </p:nvGrpSpPr>
-        <p:grpSpPr>
-          <a:xfrm>
-            <a:off x="7287133" y="1910401"/>
-            <a:ext cx="1629642" cy="600677"/>
-            <a:chOff x="7287133" y="1910401"/>
-            <a:chExt cx="1629642" cy="600677"/>
-          </a:xfrm>
-        </p:grpSpPr>
-        <p:pic>
-          <p:nvPicPr>
-            <p:cNvPr id="100" name="Google Shape;100;p14"/>
-            <p:cNvPicPr preferRelativeResize="0"/>
-            <p:nvPr/>
-          </p:nvPicPr>
-          <p:blipFill>
-            <a:blip r:embed="rId18">
-              <a:alphaModFix/>
-            </a:blip>
-            <a:stretch>
-              <a:fillRect/>
-            </a:stretch>
-          </p:blipFill>
-          <p:spPr>
-            <a:xfrm>
-              <a:off x="7883030" y="1910401"/>
-              <a:ext cx="437849" cy="343803"/>
-            </a:xfrm>
-            <a:prstGeom prst="rect">
-              <a:avLst/>
-            </a:prstGeom>
-            <a:noFill/>
-            <a:ln>
-              <a:noFill/>
-            </a:ln>
-          </p:spPr>
-        </p:pic>
-        <p:sp>
-          <p:nvSpPr>
-            <p:cNvPr id="124" name="Google Shape;124;p14"/>
-            <p:cNvSpPr txBox="1"/>
-            <p:nvPr/>
-          </p:nvSpPr>
-          <p:spPr>
-            <a:xfrm>
-              <a:off x="7287133" y="2161278"/>
-              <a:ext cx="1629642" cy="349800"/>
-            </a:xfrm>
-            <a:prstGeom prst="rect">
-              <a:avLst/>
-            </a:prstGeom>
-            <a:noFill/>
-            <a:ln>
-              <a:noFill/>
-            </a:ln>
-          </p:spPr>
-          <p:txBody>
-            <a:bodyPr spcFirstLastPara="1" wrap="square" lIns="91425" tIns="91425" rIns="91425" bIns="91425" anchor="t" anchorCtr="0">
-              <a:noAutofit/>
-            </a:bodyPr>
-            <a:lstStyle/>
-            <a:p>
-              <a:pPr marL="0" lvl="0" indent="0" algn="l" rtl="0">
-                <a:spcBef>
-                  <a:spcPts val="0"/>
-                </a:spcBef>
-                <a:spcAft>
-                  <a:spcPts val="0"/>
-                </a:spcAft>
-                <a:buNone/>
-              </a:pPr>
-              <a:r>
-                <a:rPr lang="pt-BR" b="1" dirty="0">
-                  <a:latin typeface="Roboto"/>
-                  <a:ea typeface="Roboto"/>
-                  <a:cs typeface="Roboto"/>
-                  <a:sym typeface="Roboto"/>
-                </a:rPr>
-                <a:t>Roteador TP-link</a:t>
-              </a:r>
-              <a:endParaRPr b="1" dirty="0">
-                <a:latin typeface="Roboto"/>
-                <a:ea typeface="Roboto"/>
-                <a:cs typeface="Roboto"/>
-                <a:sym typeface="Roboto"/>
-              </a:endParaRPr>
-            </a:p>
-            <a:p>
-              <a:pPr marL="0" lvl="0" indent="0" algn="l" rtl="0">
-                <a:spcBef>
-                  <a:spcPts val="0"/>
-                </a:spcBef>
-                <a:spcAft>
-                  <a:spcPts val="0"/>
-                </a:spcAft>
-                <a:buNone/>
-              </a:pPr>
-              <a:endParaRPr dirty="0"/>
-            </a:p>
-          </p:txBody>
-        </p:sp>
       </p:grpSp>
       <p:sp>
         <p:nvSpPr>
@@ -8219,7 +8022,7 @@
         </p:nvGrpSpPr>
         <p:grpSpPr>
           <a:xfrm>
-            <a:off x="5441485" y="4100134"/>
+            <a:off x="5286993" y="4059691"/>
             <a:ext cx="1318357" cy="1176860"/>
             <a:chOff x="6041349" y="3905784"/>
             <a:chExt cx="1318357" cy="1176860"/>
@@ -8232,7 +8035,7 @@
             <p:nvPr/>
           </p:nvPicPr>
           <p:blipFill>
-            <a:blip r:embed="rId19">
+            <a:blip r:embed="rId17">
               <a:alphaModFix/>
             </a:blip>
             <a:stretch>
@@ -8338,7 +8141,7 @@
             <p:nvPr/>
           </p:nvPicPr>
           <p:blipFill>
-            <a:blip r:embed="rId20">
+            <a:blip r:embed="rId18">
               <a:alphaModFix/>
             </a:blip>
             <a:stretch>
@@ -8366,7 +8169,7 @@
             <p:nvPr/>
           </p:nvPicPr>
           <p:blipFill>
-            <a:blip r:embed="rId21">
+            <a:blip r:embed="rId19">
               <a:alphaModFix/>
             </a:blip>
             <a:stretch>
@@ -8398,7 +8201,7 @@
         </p:nvCxnSpPr>
         <p:spPr>
           <a:xfrm flipH="1">
-            <a:off x="6946279" y="3124367"/>
+            <a:off x="6785365" y="2781728"/>
             <a:ext cx="829643" cy="8508"/>
           </a:xfrm>
           <a:prstGeom prst="straightConnector1">
@@ -8475,7 +8278,7 @@
           <p:nvPr/>
         </p:nvPicPr>
         <p:blipFill>
-          <a:blip r:embed="rId10">
+          <a:blip r:embed="rId9">
             <a:alphaModFix/>
           </a:blip>
           <a:stretch>
@@ -8557,7 +8360,7 @@
           <p:nvPr/>
         </p:nvPicPr>
         <p:blipFill>
-          <a:blip r:embed="rId22">
+          <a:blip r:embed="rId20">
             <a:alphaModFix/>
           </a:blip>
           <a:stretch>
@@ -8585,7 +8388,7 @@
           <p:nvPr/>
         </p:nvPicPr>
         <p:blipFill>
-          <a:blip r:embed="rId22">
+          <a:blip r:embed="rId20">
             <a:alphaModFix/>
           </a:blip>
           <a:stretch>
@@ -8606,40 +8409,6 @@
           </a:ln>
         </p:spPr>
       </p:pic>
-      <p:cxnSp>
-        <p:nvCxnSpPr>
-          <p:cNvPr id="60" name="Google Shape;114;p14">
-            <a:extLst>
-              <a:ext uri="{FF2B5EF4-FFF2-40B4-BE49-F238E27FC236}">
-                <a16:creationId xmlns:a16="http://schemas.microsoft.com/office/drawing/2014/main" id="{EB20F36A-A8C6-4672-AECC-7B80C5EE69FE}"/>
-              </a:ext>
-            </a:extLst>
-          </p:cNvPr>
-          <p:cNvCxnSpPr>
-            <a:cxnSpLocks/>
-          </p:cNvCxnSpPr>
-          <p:nvPr/>
-        </p:nvCxnSpPr>
-        <p:spPr>
-          <a:xfrm>
-            <a:off x="8114138" y="1262753"/>
-            <a:ext cx="0" cy="524622"/>
-          </a:xfrm>
-          <a:prstGeom prst="straightConnector1">
-            <a:avLst/>
-          </a:prstGeom>
-          <a:noFill/>
-          <a:ln w="9525" cap="flat" cmpd="sng">
-            <a:solidFill>
-              <a:schemeClr val="dk2"/>
-            </a:solidFill>
-            <a:prstDash val="solid"/>
-            <a:round/>
-            <a:headEnd type="none" w="med" len="med"/>
-            <a:tailEnd type="triangle" w="med" len="med"/>
-          </a:ln>
-        </p:spPr>
-      </p:cxnSp>
       <p:sp>
         <p:nvSpPr>
           <p:cNvPr id="5" name="CaixaDeTexto 4">
@@ -8695,12 +8464,12 @@
         </p:nvCxnSpPr>
         <p:spPr>
           <a:xfrm rot="10800000" flipV="1">
-            <a:off x="7112662" y="3400949"/>
-            <a:ext cx="1017791" cy="1014533"/>
+            <a:off x="6864717" y="3539577"/>
+            <a:ext cx="1222008" cy="773552"/>
           </a:xfrm>
           <a:prstGeom prst="bentConnector3">
             <a:avLst>
-              <a:gd name="adj1" fmla="val -536"/>
+              <a:gd name="adj1" fmla="val -665"/>
             </a:avLst>
           </a:prstGeom>
           <a:ln>
@@ -8737,7 +8506,7 @@
           <p:nvPr/>
         </p:nvPicPr>
         <p:blipFill>
-          <a:blip r:embed="rId23">
+          <a:blip r:embed="rId21">
             <a:extLst>
               <a:ext uri="{28A0092B-C50C-407E-A947-70E740481C1C}">
                 <a14:useLocalDpi xmlns:a14="http://schemas.microsoft.com/office/drawing/2010/main" val="0"/>
@@ -8789,11 +8558,11 @@
           <p:nvPr/>
         </p:nvPicPr>
         <p:blipFill>
-          <a:blip r:embed="rId24">
+          <a:blip r:embed="rId22">
             <a:extLst>
               <a:ext uri="{BEBA8EAE-BF5A-486C-A8C5-ECC9F3942E4B}">
                 <a14:imgProps xmlns:a14="http://schemas.microsoft.com/office/drawing/2010/main">
-                  <a14:imgLayer r:embed="rId25">
+                  <a14:imgLayer r:embed="rId23">
                     <a14:imgEffect>
                       <a14:backgroundRemoval t="1124" b="98502" l="3175" r="94709">
                         <a14:foregroundMark x1="7407" y1="21348" x2="34921" y2="31461"/>
@@ -8904,11 +8673,11 @@
           <p:nvPr/>
         </p:nvPicPr>
         <p:blipFill>
-          <a:blip r:embed="rId26">
+          <a:blip r:embed="rId24">
             <a:extLst>
               <a:ext uri="{BEBA8EAE-BF5A-486C-A8C5-ECC9F3942E4B}">
                 <a14:imgProps xmlns:a14="http://schemas.microsoft.com/office/drawing/2010/main">
-                  <a14:imgLayer r:embed="rId27">
+                  <a14:imgLayer r:embed="rId25">
                     <a14:imgEffect>
                       <a14:backgroundRemoval t="1333" b="93778" l="9778" r="89778">
                         <a14:foregroundMark x1="65333" y1="25333" x2="65333" y2="25333"/>
@@ -8994,11 +8763,11 @@
           <p:nvPr/>
         </p:nvPicPr>
         <p:blipFill>
-          <a:blip r:embed="rId28">
+          <a:blip r:embed="rId26">
             <a:extLst>
               <a:ext uri="{BEBA8EAE-BF5A-486C-A8C5-ECC9F3942E4B}">
                 <a14:imgProps xmlns:a14="http://schemas.microsoft.com/office/drawing/2010/main">
-                  <a14:imgLayer r:embed="rId29">
+                  <a14:imgLayer r:embed="rId27">
                     <a14:imgEffect>
                       <a14:backgroundRemoval t="9778" b="89778" l="8889" r="89778">
                         <a14:foregroundMark x1="8889" y1="20444" x2="10667" y2="31111"/>
@@ -9179,11 +8948,11 @@
           <p:nvPr/>
         </p:nvPicPr>
         <p:blipFill>
-          <a:blip r:embed="rId30">
+          <a:blip r:embed="rId28">
             <a:extLst>
               <a:ext uri="{BEBA8EAE-BF5A-486C-A8C5-ECC9F3942E4B}">
                 <a14:imgProps xmlns:a14="http://schemas.microsoft.com/office/drawing/2010/main">
-                  <a14:imgLayer r:embed="rId31">
+                  <a14:imgLayer r:embed="rId29">
                     <a14:imgEffect>
                       <a14:backgroundRemoval t="5333" b="94667" l="9778" r="89778">
                         <a14:foregroundMark x1="64000" y1="43556" x2="64000" y2="43556"/>
@@ -9339,7 +9108,7 @@
                 <a:latin typeface="Roboto" panose="020B0604020202020204" charset="0"/>
                 <a:ea typeface="Roboto" panose="020B0604020202020204" charset="0"/>
               </a:rPr>
-              <a:t>Gerara uma conexão 4g</a:t>
+              <a:t>Gerará uma conexão 4g</a:t>
             </a:r>
           </a:p>
         </p:txBody>
@@ -9401,11 +9170,11 @@
           <p:nvPr/>
         </p:nvPicPr>
         <p:blipFill>
-          <a:blip r:embed="rId32">
+          <a:blip r:embed="rId30">
             <a:extLst>
               <a:ext uri="{BEBA8EAE-BF5A-486C-A8C5-ECC9F3942E4B}">
                 <a14:imgProps xmlns:a14="http://schemas.microsoft.com/office/drawing/2010/main">
-                  <a14:imgLayer r:embed="rId33">
+                  <a14:imgLayer r:embed="rId31">
                     <a14:imgEffect>
                       <a14:backgroundRemoval t="10000" b="90000" l="10000" r="90000">
                         <a14:foregroundMark x1="55111" y1="59556" x2="55111" y2="59556"/>
@@ -9464,11 +9233,11 @@
           <p:nvPr/>
         </p:nvPicPr>
         <p:blipFill>
-          <a:blip r:embed="rId34">
+          <a:blip r:embed="rId32">
             <a:extLst>
               <a:ext uri="{BEBA8EAE-BF5A-486C-A8C5-ECC9F3942E4B}">
                 <a14:imgProps xmlns:a14="http://schemas.microsoft.com/office/drawing/2010/main">
-                  <a14:imgLayer r:embed="rId35">
+                  <a14:imgLayer r:embed="rId33">
                     <a14:imgEffect>
                       <a14:backgroundRemoval t="10000" b="92500" l="2632" r="98565">
                         <a14:foregroundMark x1="29187" y1="93333" x2="29187" y2="93333"/>
@@ -9524,6 +9293,158 @@
           </a:extLst>
         </p:spPr>
       </p:pic>
+      <p:pic>
+        <p:nvPicPr>
+          <p:cNvPr id="2" name="Google Shape;57;p13">
+            <a:extLst>
+              <a:ext uri="{FF2B5EF4-FFF2-40B4-BE49-F238E27FC236}">
+                <a16:creationId xmlns:a16="http://schemas.microsoft.com/office/drawing/2014/main" id="{EC8BD261-BF12-45E3-BD9B-E56282561C5F}"/>
+              </a:ext>
+            </a:extLst>
+          </p:cNvPr>
+          <p:cNvPicPr preferRelativeResize="0"/>
+          <p:nvPr/>
+        </p:nvPicPr>
+        <p:blipFill rotWithShape="1">
+          <a:blip r:embed="rId34">
+            <a:alphaModFix/>
+          </a:blip>
+          <a:srcRect l="-9770" r="9770"/>
+          <a:stretch/>
+        </p:blipFill>
+        <p:spPr>
+          <a:xfrm>
+            <a:off x="4564247" y="177373"/>
+            <a:ext cx="392224" cy="346173"/>
+          </a:xfrm>
+          <a:prstGeom prst="rect">
+            <a:avLst/>
+          </a:prstGeom>
+          <a:noFill/>
+          <a:ln>
+            <a:noFill/>
+          </a:ln>
+        </p:spPr>
+      </p:pic>
+      <p:pic>
+        <p:nvPicPr>
+          <p:cNvPr id="9" name="Imagem 8" descr="Logotipo&#10;&#10;Descrição gerada automaticamente">
+            <a:extLst>
+              <a:ext uri="{FF2B5EF4-FFF2-40B4-BE49-F238E27FC236}">
+                <a16:creationId xmlns:a16="http://schemas.microsoft.com/office/drawing/2014/main" id="{E94FD3DA-BFD9-43B7-973C-1AAF787713FE}"/>
+              </a:ext>
+            </a:extLst>
+          </p:cNvPr>
+          <p:cNvPicPr>
+            <a:picLocks noChangeAspect="1"/>
+          </p:cNvPicPr>
+          <p:nvPr/>
+        </p:nvPicPr>
+        <p:blipFill>
+          <a:blip r:embed="rId35"/>
+          <a:stretch>
+            <a:fillRect/>
+          </a:stretch>
+        </p:blipFill>
+        <p:spPr>
+          <a:xfrm>
+            <a:off x="7728302" y="2434158"/>
+            <a:ext cx="716846" cy="716846"/>
+          </a:xfrm>
+          <a:prstGeom prst="rect">
+            <a:avLst/>
+          </a:prstGeom>
+        </p:spPr>
+      </p:pic>
+      <p:cxnSp>
+        <p:nvCxnSpPr>
+          <p:cNvPr id="18" name="Conector de Seta Reta 17">
+            <a:extLst>
+              <a:ext uri="{FF2B5EF4-FFF2-40B4-BE49-F238E27FC236}">
+                <a16:creationId xmlns:a16="http://schemas.microsoft.com/office/drawing/2014/main" id="{4E6E89BA-2F56-41C7-87BE-B41577E28A24}"/>
+              </a:ext>
+            </a:extLst>
+          </p:cNvPr>
+          <p:cNvCxnSpPr>
+            <a:cxnSpLocks/>
+          </p:cNvCxnSpPr>
+          <p:nvPr/>
+        </p:nvCxnSpPr>
+        <p:spPr>
+          <a:xfrm>
+            <a:off x="8086725" y="1371600"/>
+            <a:ext cx="0" cy="962025"/>
+          </a:xfrm>
+          <a:prstGeom prst="straightConnector1">
+            <a:avLst/>
+          </a:prstGeom>
+          <a:ln>
+            <a:tailEnd type="triangle"/>
+          </a:ln>
+        </p:spPr>
+        <p:style>
+          <a:lnRef idx="1">
+            <a:schemeClr val="dk1"/>
+          </a:lnRef>
+          <a:fillRef idx="0">
+            <a:schemeClr val="dk1"/>
+          </a:fillRef>
+          <a:effectRef idx="0">
+            <a:schemeClr val="dk1"/>
+          </a:effectRef>
+          <a:fontRef idx="minor">
+            <a:schemeClr val="tx1"/>
+          </a:fontRef>
+        </p:style>
+      </p:cxnSp>
+      <p:sp>
+        <p:nvSpPr>
+          <p:cNvPr id="21" name="CaixaDeTexto 20">
+            <a:extLst>
+              <a:ext uri="{FF2B5EF4-FFF2-40B4-BE49-F238E27FC236}">
+                <a16:creationId xmlns:a16="http://schemas.microsoft.com/office/drawing/2014/main" id="{B3CB31CC-66E3-4C67-BB39-93E60D2DAEF7}"/>
+              </a:ext>
+            </a:extLst>
+          </p:cNvPr>
+          <p:cNvSpPr txBox="1"/>
+          <p:nvPr/>
+        </p:nvSpPr>
+        <p:spPr>
+          <a:xfrm>
+            <a:off x="7606293" y="3057392"/>
+            <a:ext cx="901209" cy="523220"/>
+          </a:xfrm>
+          <a:prstGeom prst="rect">
+            <a:avLst/>
+          </a:prstGeom>
+          <a:noFill/>
+        </p:spPr>
+        <p:txBody>
+          <a:bodyPr wrap="none" rtlCol="0">
+            <a:spAutoFit/>
+          </a:bodyPr>
+          <a:lstStyle/>
+          <a:p>
+            <a:r>
+              <a:rPr lang="pt-BR" b="1" dirty="0">
+                <a:latin typeface="Roboto" panose="020B0604020202020204" charset="0"/>
+                <a:ea typeface="Roboto" panose="020B0604020202020204" charset="0"/>
+              </a:rPr>
+              <a:t>Conexão</a:t>
+            </a:r>
+          </a:p>
+          <a:p>
+            <a:pPr algn="ctr"/>
+            <a:r>
+              <a:rPr lang="pt-BR" b="1" dirty="0">
+                <a:latin typeface="Roboto" panose="020B0604020202020204" charset="0"/>
+                <a:ea typeface="Roboto" panose="020B0604020202020204" charset="0"/>
+              </a:rPr>
+              <a:t>Internet</a:t>
+            </a:r>
+          </a:p>
+        </p:txBody>
+      </p:sp>
     </p:spTree>
   </p:cSld>
   <p:clrMapOvr>

</xml_diff>

<commit_message>
Atualização do desenho de solução
</commit_message>
<xml_diff>
--- a/Tecnologia da Informação/HLD&LLD.pptx
+++ b/Tecnologia da Informação/HLD&LLD.pptx
@@ -1710,7 +1710,7 @@
             </a:pPr>
             <a:fld id="{00000000-1234-1234-1234-123412341234}" type="slidenum">
               <a:rPr lang="pt-BR"/>
-              <a:t>‹nº›</a:t>
+              <a:t>‹#›</a:t>
             </a:fld>
             <a:endParaRPr/>
           </a:p>
@@ -2064,7 +2064,7 @@
             </a:pPr>
             <a:fld id="{00000000-1234-1234-1234-123412341234}" type="slidenum">
               <a:rPr lang="pt-BR"/>
-              <a:t>‹nº›</a:t>
+              <a:t>‹#›</a:t>
             </a:fld>
             <a:endParaRPr/>
           </a:p>
@@ -2692,7 +2692,7 @@
             </a:pPr>
             <a:fld id="{00000000-1234-1234-1234-123412341234}" type="slidenum">
               <a:rPr lang="pt-BR"/>
-              <a:t>‹nº›</a:t>
+              <a:t>‹#›</a:t>
             </a:fld>
             <a:endParaRPr/>
           </a:p>
@@ -2998,7 +2998,7 @@
             </a:pPr>
             <a:fld id="{00000000-1234-1234-1234-123412341234}" type="slidenum">
               <a:rPr lang="pt-BR"/>
-              <a:t>‹nº›</a:t>
+              <a:t>‹#›</a:t>
             </a:fld>
             <a:endParaRPr/>
           </a:p>
@@ -3464,7 +3464,7 @@
             </a:pPr>
             <a:fld id="{00000000-1234-1234-1234-123412341234}" type="slidenum">
               <a:rPr lang="pt-BR"/>
-              <a:t>‹nº›</a:t>
+              <a:t>‹#›</a:t>
             </a:fld>
             <a:endParaRPr/>
           </a:p>
@@ -4090,7 +4090,7 @@
             </a:pPr>
             <a:fld id="{00000000-1234-1234-1234-123412341234}" type="slidenum">
               <a:rPr lang="pt-BR"/>
-              <a:t>‹nº›</a:t>
+              <a:t>‹#›</a:t>
             </a:fld>
             <a:endParaRPr/>
           </a:p>
@@ -4876,7 +4876,7 @@
             </a:pPr>
             <a:fld id="{00000000-1234-1234-1234-123412341234}" type="slidenum">
               <a:rPr lang="pt-BR"/>
-              <a:t>‹nº›</a:t>
+              <a:t>‹#›</a:t>
             </a:fld>
             <a:endParaRPr/>
           </a:p>
@@ -5342,7 +5342,7 @@
             </a:pPr>
             <a:fld id="{00000000-1234-1234-1234-123412341234}" type="slidenum">
               <a:rPr lang="pt-BR"/>
-              <a:t>‹nº›</a:t>
+              <a:t>‹#›</a:t>
             </a:fld>
             <a:endParaRPr/>
           </a:p>
@@ -5968,7 +5968,7 @@
             </a:pPr>
             <a:fld id="{00000000-1234-1234-1234-123412341234}" type="slidenum">
               <a:rPr lang="pt-BR"/>
-              <a:t>‹nº›</a:t>
+              <a:t>‹#›</a:t>
             </a:fld>
             <a:endParaRPr/>
           </a:p>
@@ -6434,7 +6434,7 @@
             </a:pPr>
             <a:fld id="{00000000-1234-1234-1234-123412341234}" type="slidenum">
               <a:rPr lang="pt-BR"/>
-              <a:t>‹nº›</a:t>
+              <a:t>‹#›</a:t>
             </a:fld>
             <a:endParaRPr/>
           </a:p>
@@ -7276,7 +7276,7 @@
             </a:pPr>
             <a:fld id="{00000000-1234-1234-1234-123412341234}" type="slidenum">
               <a:rPr lang="pt-BR"/>
-              <a:t>‹nº›</a:t>
+              <a:t>‹#›</a:t>
             </a:fld>
             <a:endParaRPr/>
           </a:p>
@@ -8126,7 +8126,7 @@
             </a:pPr>
             <a:fld id="{00000000-1234-1234-1234-123412341234}" type="slidenum">
               <a:rPr lang="pt-BR"/>
-              <a:t>‹nº›</a:t>
+              <a:t>‹#›</a:t>
             </a:fld>
             <a:endParaRPr/>
           </a:p>
@@ -11345,8 +11345,8 @@
         </p:blipFill>
         <p:spPr>
           <a:xfrm>
-            <a:off x="3161179" y="573447"/>
-            <a:ext cx="686547" cy="686547"/>
+            <a:off x="3210261" y="569802"/>
+            <a:ext cx="551913" cy="566369"/>
           </a:xfrm>
           <a:prstGeom prst="rect">
             <a:avLst/>
@@ -11372,8 +11372,8 @@
         </p:blipFill>
         <p:spPr>
           <a:xfrm>
-            <a:off x="2431794" y="426575"/>
-            <a:ext cx="841282" cy="242993"/>
+            <a:off x="2322173" y="272834"/>
+            <a:ext cx="732265" cy="232162"/>
           </a:xfrm>
           <a:prstGeom prst="rect">
             <a:avLst/>
@@ -11392,8 +11392,8 @@
         </p:nvSpPr>
         <p:spPr>
           <a:xfrm>
-            <a:off x="2704014" y="1193925"/>
-            <a:ext cx="1601100" cy="621300"/>
+            <a:off x="2762720" y="1016548"/>
+            <a:ext cx="1479761" cy="530477"/>
           </a:xfrm>
           <a:prstGeom prst="rect">
             <a:avLst/>
@@ -11427,7 +11427,7 @@
               <a:buNone/>
             </a:pPr>
             <a:r>
-              <a:rPr lang="pt-BR" sz="1200" i="0" u="none" strike="noStrike" cap="none" dirty="0">
+              <a:rPr lang="pt-BR" sz="1200" b="1" i="0" u="none" strike="noStrike" cap="none" dirty="0">
                 <a:solidFill>
                   <a:srgbClr val="000000"/>
                 </a:solidFill>
@@ -11438,7 +11438,7 @@
               </a:rPr>
               <a:t>Banco de Dados</a:t>
             </a:r>
-            <a:endParaRPr dirty="0">
+            <a:endParaRPr b="1" dirty="0">
               <a:latin typeface="Calibri Light" panose="020F0302020204030204" pitchFamily="34" charset="0"/>
               <a:cs typeface="Calibri Light" panose="020F0302020204030204" pitchFamily="34" charset="0"/>
             </a:endParaRPr>
@@ -11530,7 +11530,7 @@
         </p:blipFill>
         <p:spPr>
           <a:xfrm>
-            <a:off x="3847746" y="416200"/>
+            <a:off x="3988127" y="227854"/>
             <a:ext cx="437848" cy="424476"/>
           </a:xfrm>
           <a:prstGeom prst="rect">
@@ -11580,7 +11580,7 @@
               <a:buNone/>
             </a:pPr>
             <a:r>
-              <a:rPr lang="pt-BR" sz="1200" i="0" u="none" strike="noStrike" cap="none" dirty="0">
+              <a:rPr lang="pt-BR" sz="1200" b="1" i="0" u="none" strike="noStrike" cap="none" dirty="0">
                 <a:solidFill>
                   <a:srgbClr val="000000"/>
                 </a:solidFill>
@@ -11591,7 +11591,7 @@
               </a:rPr>
               <a:t>Website</a:t>
             </a:r>
-            <a:endParaRPr dirty="0">
+            <a:endParaRPr b="1" dirty="0">
               <a:latin typeface="Calibri Light" panose="020F0302020204030204" pitchFamily="34" charset="0"/>
               <a:cs typeface="Calibri Light" panose="020F0302020204030204" pitchFamily="34" charset="0"/>
             </a:endParaRPr>
@@ -12151,9 +12151,9 @@
               <a:buNone/>
             </a:pPr>
             <a:r>
-              <a:rPr lang="pt-BR" sz="1100" i="0" u="none" strike="noStrike" cap="none" dirty="0">
-                <a:solidFill>
-                  <a:schemeClr val="dk2"/>
+              <a:rPr lang="pt-BR" sz="1100" b="1" i="0" u="none" strike="noStrike" cap="none" dirty="0">
+                <a:solidFill>
+                  <a:schemeClr val="tx1"/>
                 </a:solidFill>
                 <a:latin typeface="Calibri Light" panose="020F0302020204030204" pitchFamily="34" charset="0"/>
                 <a:ea typeface="Roboto"/>
@@ -12163,9 +12163,9 @@
               <a:t>Conexão</a:t>
             </a:r>
             <a:r>
-              <a:rPr lang="pt-BR" sz="1100" dirty="0">
-                <a:solidFill>
-                  <a:schemeClr val="dk2"/>
+              <a:rPr lang="pt-BR" sz="1100" b="1" dirty="0">
+                <a:solidFill>
+                  <a:schemeClr val="tx1"/>
                 </a:solidFill>
                 <a:latin typeface="Calibri Light" panose="020F0302020204030204" pitchFamily="34" charset="0"/>
                 <a:ea typeface="Roboto"/>
@@ -12175,9 +12175,9 @@
               <a:t> I</a:t>
             </a:r>
             <a:r>
-              <a:rPr lang="pt-BR" sz="1100" i="0" u="none" strike="noStrike" cap="none" dirty="0">
-                <a:solidFill>
-                  <a:schemeClr val="dk2"/>
+              <a:rPr lang="pt-BR" sz="1100" b="1" i="0" u="none" strike="noStrike" cap="none" dirty="0">
+                <a:solidFill>
+                  <a:schemeClr val="tx1"/>
                 </a:solidFill>
                 <a:latin typeface="Calibri Light" panose="020F0302020204030204" pitchFamily="34" charset="0"/>
                 <a:ea typeface="Roboto"/>
@@ -12186,9 +12186,9 @@
               </a:rPr>
               <a:t>nternet</a:t>
             </a:r>
-            <a:endParaRPr sz="1100" dirty="0">
+            <a:endParaRPr sz="1100" b="1" dirty="0">
               <a:solidFill>
-                <a:schemeClr val="dk2"/>
+                <a:schemeClr val="tx1"/>
               </a:solidFill>
               <a:latin typeface="Calibri Light" panose="020F0302020204030204" pitchFamily="34" charset="0"/>
               <a:ea typeface="Roboto"/>
@@ -12455,13 +12455,13 @@
               <a:buNone/>
             </a:pPr>
             <a:r>
-              <a:rPr lang="pt-BR" dirty="0">
+              <a:rPr lang="pt-BR" b="1" dirty="0">
                 <a:latin typeface="Calibri Light" panose="020F0302020204030204" pitchFamily="34" charset="0"/>
                 <a:cs typeface="Calibri Light" panose="020F0302020204030204" pitchFamily="34" charset="0"/>
               </a:rPr>
               <a:t>Caminhão</a:t>
             </a:r>
-            <a:endParaRPr dirty="0">
+            <a:endParaRPr b="1" dirty="0">
               <a:latin typeface="Calibri Light" panose="020F0302020204030204" pitchFamily="34" charset="0"/>
               <a:cs typeface="Calibri Light" panose="020F0302020204030204" pitchFamily="34" charset="0"/>
             </a:endParaRPr>
@@ -12503,13 +12503,13 @@
               <a:buNone/>
             </a:pPr>
             <a:r>
-              <a:rPr lang="pt-BR" dirty="0">
+              <a:rPr lang="pt-BR" b="1" dirty="0">
                 <a:latin typeface="Calibri Light" panose="020F0302020204030204" pitchFamily="34" charset="0"/>
                 <a:cs typeface="Calibri Light" panose="020F0302020204030204" pitchFamily="34" charset="0"/>
               </a:rPr>
               <a:t>Acesso aos Dados</a:t>
             </a:r>
-            <a:endParaRPr dirty="0">
+            <a:endParaRPr b="1" dirty="0">
               <a:latin typeface="Calibri Light" panose="020F0302020204030204" pitchFamily="34" charset="0"/>
               <a:cs typeface="Calibri Light" panose="020F0302020204030204" pitchFamily="34" charset="0"/>
             </a:endParaRPr>
@@ -12589,13 +12589,13 @@
               <a:buNone/>
             </a:pPr>
             <a:r>
-              <a:rPr lang="pt-BR" dirty="0">
+              <a:rPr lang="pt-BR" b="1" dirty="0">
                 <a:latin typeface="Calibri Light" panose="020F0302020204030204" pitchFamily="34" charset="0"/>
                 <a:cs typeface="Calibri Light" panose="020F0302020204030204" pitchFamily="34" charset="0"/>
               </a:rPr>
               <a:t>Servidor do BD</a:t>
             </a:r>
-            <a:endParaRPr dirty="0">
+            <a:endParaRPr b="1" dirty="0">
               <a:latin typeface="Calibri Light" panose="020F0302020204030204" pitchFamily="34" charset="0"/>
               <a:cs typeface="Calibri Light" panose="020F0302020204030204" pitchFamily="34" charset="0"/>
             </a:endParaRPr>
@@ -12648,7 +12648,7 @@
         </p:nvSpPr>
         <p:spPr>
           <a:xfrm>
-            <a:off x="6299804" y="1915229"/>
+            <a:off x="6277437" y="1936029"/>
             <a:ext cx="1846800" cy="381000"/>
           </a:xfrm>
           <a:prstGeom prst="rect">
@@ -12675,16 +12675,140 @@
               <a:buNone/>
             </a:pPr>
             <a:r>
-              <a:rPr lang="pt-BR" dirty="0">
+              <a:rPr lang="pt-BR" b="1" dirty="0">
                 <a:latin typeface="Calibri Light" panose="020F0302020204030204" pitchFamily="34" charset="0"/>
                 <a:cs typeface="Calibri Light" panose="020F0302020204030204" pitchFamily="34" charset="0"/>
               </a:rPr>
               <a:t>Servidor Aplicação</a:t>
             </a:r>
-            <a:endParaRPr dirty="0">
+            <a:endParaRPr b="1" dirty="0">
               <a:latin typeface="Calibri Light" panose="020F0302020204030204" pitchFamily="34" charset="0"/>
               <a:cs typeface="Calibri Light" panose="020F0302020204030204" pitchFamily="34" charset="0"/>
             </a:endParaRPr>
+          </a:p>
+        </p:txBody>
+      </p:sp>
+      <p:pic>
+        <p:nvPicPr>
+          <p:cNvPr id="1026" name="Picture 2" descr="352678266">
+            <a:extLst>
+              <a:ext uri="{FF2B5EF4-FFF2-40B4-BE49-F238E27FC236}">
+                <a16:creationId xmlns:a16="http://schemas.microsoft.com/office/drawing/2014/main" id="{FF20DA33-8450-44BD-B1C6-0649356B895F}"/>
+              </a:ext>
+            </a:extLst>
+          </p:cNvPr>
+          <p:cNvPicPr>
+            <a:picLocks noChangeAspect="1" noChangeArrowheads="1"/>
+          </p:cNvPicPr>
+          <p:nvPr/>
+        </p:nvPicPr>
+        <p:blipFill>
+          <a:blip r:embed="rId27">
+            <a:extLst>
+              <a:ext uri="{BEBA8EAE-BF5A-486C-A8C5-ECC9F3942E4B}">
+                <a14:imgProps xmlns:a14="http://schemas.microsoft.com/office/drawing/2010/main">
+                  <a14:imgLayer r:embed="rId28">
+                    <a14:imgEffect>
+                      <a14:backgroundRemoval t="10000" b="90000" l="10000" r="90000">
+                        <a14:foregroundMark x1="15000" y1="49167" x2="15000" y2="49167"/>
+                        <a14:foregroundMark x1="43333" y1="47917" x2="43333" y2="47917"/>
+                        <a14:foregroundMark x1="38333" y1="47500" x2="39583" y2="45833"/>
+                        <a14:foregroundMark x1="39583" y1="45833" x2="39583" y2="45833"/>
+                        <a14:foregroundMark x1="39583" y1="45833" x2="39583" y2="45833"/>
+                        <a14:foregroundMark x1="34583" y1="45000" x2="34583" y2="45000"/>
+                        <a14:foregroundMark x1="34583" y1="45000" x2="34583" y2="45833"/>
+                        <a14:foregroundMark x1="46667" y1="47917" x2="45833" y2="52083"/>
+                        <a14:foregroundMark x1="62083" y1="42917" x2="62083" y2="42917"/>
+                        <a14:foregroundMark x1="65833" y1="32083" x2="65833" y2="32083"/>
+                        <a14:foregroundMark x1="65833" y1="32083" x2="65833" y2="32083"/>
+                        <a14:foregroundMark x1="65833" y1="47083" x2="65417" y2="42917"/>
+                        <a14:foregroundMark x1="55000" y1="50833" x2="54583" y2="42917"/>
+                        <a14:foregroundMark x1="78750" y1="53333" x2="77500" y2="53333"/>
+                        <a14:foregroundMark x1="79167" y1="46250" x2="79167" y2="46250"/>
+                        <a14:foregroundMark x1="79167" y1="46250" x2="79167" y2="46250"/>
+                        <a14:foregroundMark x1="48750" y1="61667" x2="48750" y2="61667"/>
+                        <a14:foregroundMark x1="46667" y1="61667" x2="46667" y2="61667"/>
+                      </a14:backgroundRemoval>
+                    </a14:imgEffect>
+                  </a14:imgLayer>
+                </a14:imgProps>
+              </a:ext>
+              <a:ext uri="{28A0092B-C50C-407E-A947-70E740481C1C}">
+                <a14:useLocalDpi xmlns:a14="http://schemas.microsoft.com/office/drawing/2010/main" val="0"/>
+              </a:ext>
+            </a:extLst>
+          </a:blip>
+          <a:srcRect/>
+          <a:stretch>
+            <a:fillRect/>
+          </a:stretch>
+        </p:blipFill>
+        <p:spPr bwMode="auto">
+          <a:xfrm>
+            <a:off x="3173624" y="88082"/>
+            <a:ext cx="657955" cy="657955"/>
+          </a:xfrm>
+          <a:prstGeom prst="rect">
+            <a:avLst/>
+          </a:prstGeom>
+          <a:noFill/>
+          <a:extLst>
+            <a:ext uri="{909E8E84-426E-40DD-AFC4-6F175D3DCCD1}">
+              <a14:hiddenFill xmlns:a14="http://schemas.microsoft.com/office/drawing/2010/main">
+                <a:solidFill>
+                  <a:srgbClr val="FFFFFF"/>
+                </a:solidFill>
+              </a14:hiddenFill>
+            </a:ext>
+          </a:extLst>
+        </p:spPr>
+      </p:pic>
+      <p:sp>
+        <p:nvSpPr>
+          <p:cNvPr id="59" name="TextBox 58">
+            <a:extLst>
+              <a:ext uri="{FF2B5EF4-FFF2-40B4-BE49-F238E27FC236}">
+                <a16:creationId xmlns:a16="http://schemas.microsoft.com/office/drawing/2014/main" id="{BB324594-EA65-41FB-AB99-02CAAE6EF1EC}"/>
+              </a:ext>
+            </a:extLst>
+          </p:cNvPr>
+          <p:cNvSpPr txBox="1"/>
+          <p:nvPr/>
+        </p:nvSpPr>
+        <p:spPr>
+          <a:xfrm>
+            <a:off x="2841337" y="1555584"/>
+            <a:ext cx="1601100" cy="369332"/>
+          </a:xfrm>
+          <a:prstGeom prst="rect">
+            <a:avLst/>
+          </a:prstGeom>
+          <a:noFill/>
+        </p:spPr>
+        <p:txBody>
+          <a:bodyPr wrap="square">
+            <a:spAutoFit/>
+          </a:bodyPr>
+          <a:lstStyle/>
+          <a:p>
+            <a:r>
+              <a:rPr lang="pt-BR" sz="900" dirty="0">
+                <a:latin typeface="Calibri Light" panose="020F0302020204030204" pitchFamily="34" charset="0"/>
+                <a:cs typeface="Calibri Light" panose="020F0302020204030204" pitchFamily="34" charset="0"/>
+              </a:rPr>
+              <a:t>Conecta</a:t>
+            </a:r>
+            <a:r>
+              <a:rPr lang="pt-BR" sz="900" dirty="0"/>
+              <a:t> </a:t>
+            </a:r>
+            <a:r>
+              <a:rPr lang="pt-BR" sz="900" dirty="0">
+                <a:latin typeface="Calibri Light" panose="020F0302020204030204" pitchFamily="34" charset="0"/>
+                <a:cs typeface="Calibri Light" panose="020F0302020204030204" pitchFamily="34" charset="0"/>
+              </a:rPr>
+              <a:t>o banco de dados com a dashboard</a:t>
+            </a:r>
           </a:p>
         </p:txBody>
       </p:sp>

</xml_diff>